<commit_message>
added new Approach section to poster
</commit_message>
<xml_diff>
--- a/tapp2019/poster/tapp2019-poster.pptx
+++ b/tapp2019/poster/tapp2019-poster.pptx
@@ -7269,8 +7269,8 @@
         </p:nvSpPr>
         <p:spPr bwMode="auto">
           <a:xfrm>
-            <a:off x="304800" y="4586222"/>
-            <a:ext cx="9448800" cy="17054578"/>
+            <a:off x="304800" y="4595524"/>
+            <a:ext cx="9448800" cy="17426276"/>
           </a:xfrm>
           <a:prstGeom prst="rect">
             <a:avLst/>
@@ -7617,7 +7617,7 @@
         <p:spPr bwMode="auto">
           <a:xfrm>
             <a:off x="9914352" y="4586223"/>
-            <a:ext cx="10790460" cy="25131777"/>
+            <a:ext cx="10790460" cy="16749777"/>
           </a:xfrm>
           <a:prstGeom prst="rect">
             <a:avLst/>
@@ -7636,7 +7636,7 @@
           <a:bodyPr lIns="390000" tIns="390000" rIns="390000" bIns="390000"/>
           <a:lstStyle/>
           <a:p>
-            <a:pPr marL="412737" indent="-412737">
+            <a:pPr>
               <a:spcBef>
                 <a:spcPct val="50000"/>
               </a:spcBef>
@@ -7647,7 +7647,7 @@
                   <a:srgbClr val="CC3300"/>
                 </a:solidFill>
               </a:rPr>
-              <a:t>Prototype</a:t>
+              <a:t>Approach</a:t>
             </a:r>
             <a:endParaRPr lang="en-GB" sz="4400" b="1" dirty="0">
               <a:solidFill>
@@ -7656,2154 +7656,149 @@
             </a:endParaRPr>
           </a:p>
           <a:p>
+            <a:pPr>
+              <a:spcBef>
+                <a:spcPct val="50000"/>
+              </a:spcBef>
+            </a:pPr>
+            <a:r>
+              <a:rPr lang="en-US" altLang="zh-CN" sz="3200" b="1" dirty="0">
+                <a:solidFill>
+                  <a:srgbClr val="CC3200"/>
+                </a:solidFill>
+              </a:rPr>
+              <a:t>Extract, transform, load. </a:t>
+            </a:r>
+            <a:r>
+              <a:rPr lang="en-US" sz="3200" dirty="0"/>
+              <a:t>We extract the data cleaning records captured by </a:t>
+            </a:r>
+            <a:r>
+              <a:rPr lang="en-US" sz="3200" dirty="0" err="1"/>
+              <a:t>OpenRefine</a:t>
+            </a:r>
+            <a:r>
+              <a:rPr lang="en-US" sz="3200" dirty="0"/>
+              <a:t> and store them using a relational schema more amenable to query and visualization.</a:t>
+            </a:r>
+            <a:endParaRPr lang="en-US" sz="3200" b="1" dirty="0"/>
+          </a:p>
+          <a:p>
+            <a:pPr>
+              <a:spcBef>
+                <a:spcPct val="50000"/>
+              </a:spcBef>
+            </a:pPr>
+            <a:r>
+              <a:rPr lang="en-US" sz="3200" b="1" dirty="0">
+                <a:solidFill>
+                  <a:srgbClr val="CC3200"/>
+                </a:solidFill>
+              </a:rPr>
+              <a:t>Objects with identities.  </a:t>
+            </a:r>
+            <a:r>
+              <a:rPr lang="en-US" sz="3200" dirty="0"/>
+              <a:t>Queries useful to researchers are posed and interpreted in light of the meanings of columns, rows, cells, and values in a data set. We support such meaningful queries by assigning to these objects identifiers that persist as they are rearranged, renamed, reformatted, copied, transformed, corrected, and edited, And we associate each update of an object with the state at which the change was introduced.</a:t>
+            </a:r>
+          </a:p>
+          <a:p>
+            <a:pPr>
+              <a:spcBef>
+                <a:spcPct val="50000"/>
+              </a:spcBef>
+            </a:pPr>
+            <a:r>
+              <a:rPr lang="en-US" sz="3200" b="1" dirty="0">
+                <a:solidFill>
+                  <a:srgbClr val="CC3200"/>
+                </a:solidFill>
+              </a:rPr>
+              <a:t>Views of data set states. </a:t>
+            </a:r>
+            <a:r>
+              <a:rPr lang="en-US" sz="3200" dirty="0" err="1"/>
+              <a:t>OpenRefine</a:t>
+            </a:r>
+            <a:r>
+              <a:rPr lang="en-US" sz="3200" dirty="0"/>
+              <a:t> natively provides access to past data set states only by undoing all changes made subsequent state of interest. Our schema supports views and queries over multiple past states concurrently—without storing a complete snapshot of the data set at each state.</a:t>
+            </a:r>
+          </a:p>
+          <a:p>
+            <a:pPr>
+              <a:spcBef>
+                <a:spcPct val="50000"/>
+              </a:spcBef>
+            </a:pPr>
+            <a:r>
+              <a:rPr lang="en-US" sz="3200" b="1" dirty="0">
+                <a:solidFill>
+                  <a:srgbClr val="CC3200"/>
+                </a:solidFill>
+              </a:rPr>
+              <a:t>Separation of concerns.  </a:t>
+            </a:r>
+            <a:r>
+              <a:rPr lang="en-US" sz="3200" dirty="0"/>
+              <a:t>The schema we use to represent the data-cleaning history of a data set is independent of the particular columns, rows, and values comprising any particular data set. The user neither needs to understand the schema representing the history, nor take into account the queries of interest to them prior to cleaning a data set.</a:t>
+            </a:r>
+            <a:endParaRPr lang="en-US" sz="3200" b="1" dirty="0">
+              <a:solidFill>
+                <a:srgbClr val="CC3200"/>
+              </a:solidFill>
+            </a:endParaRPr>
+          </a:p>
+          <a:p>
+            <a:pPr>
+              <a:spcBef>
+                <a:spcPct val="50000"/>
+              </a:spcBef>
+            </a:pPr>
+            <a:r>
+              <a:rPr lang="en-US" sz="3200" b="1" dirty="0">
+                <a:solidFill>
+                  <a:srgbClr val="CC3200"/>
+                </a:solidFill>
+              </a:rPr>
+              <a:t>Logic programming.  </a:t>
+            </a:r>
+            <a:r>
+              <a:rPr lang="en-US" sz="3200" dirty="0"/>
+              <a:t>We support rapid experimentation and prototyping by representing data cleaning histories in formats easily queried using logic programming languages such as </a:t>
+            </a:r>
+            <a:r>
+              <a:rPr lang="en-US" sz="3200" dirty="0" err="1"/>
+              <a:t>Datalog</a:t>
+            </a:r>
+            <a:r>
+              <a:rPr lang="en-US" sz="3200" dirty="0"/>
+              <a:t> and Prolog.  </a:t>
+            </a:r>
+          </a:p>
+          <a:p>
             <a:pPr marL="412737" indent="-412737"/>
-            <a:endParaRPr lang="en-US" sz="3033" b="1" dirty="0"/>
+            <a:endParaRPr lang="en-US" sz="3200" dirty="0"/>
           </a:p>
           <a:p>
             <a:pPr marL="412737" indent="-412737"/>
-            <a:endParaRPr lang="en-US" altLang="zh-CN" sz="3033" dirty="0"/>
+            <a:endParaRPr lang="en-US" sz="3200" dirty="0"/>
           </a:p>
           <a:p>
             <a:pPr marL="412737" indent="-412737"/>
-            <a:endParaRPr lang="en-US" altLang="zh-CN" sz="3033" dirty="0"/>
+            <a:endParaRPr lang="en-US" sz="3200" dirty="0"/>
           </a:p>
           <a:p>
             <a:pPr marL="412737" indent="-412737"/>
-            <a:endParaRPr lang="en-US" altLang="zh-CN" sz="3033" dirty="0"/>
+            <a:endParaRPr lang="en-US" sz="3200" dirty="0"/>
           </a:p>
           <a:p>
             <a:pPr marL="412737" indent="-412737"/>
-            <a:endParaRPr lang="en-US" altLang="zh-CN" sz="3033" dirty="0"/>
+            <a:endParaRPr lang="en-US" sz="3200" dirty="0"/>
           </a:p>
           <a:p>
             <a:pPr marL="412737" indent="-412737"/>
-            <a:endParaRPr lang="en-US" altLang="zh-CN" sz="3033" dirty="0"/>
-          </a:p>
-          <a:p>
-            <a:pPr marL="412737" indent="-412737"/>
-            <a:endParaRPr lang="en-US" altLang="zh-CN" sz="3033" dirty="0"/>
-          </a:p>
-          <a:p>
-            <a:pPr marL="412737" indent="-412737"/>
-            <a:endParaRPr lang="en-US" altLang="zh-CN" sz="3033" dirty="0"/>
-          </a:p>
-          <a:p>
-            <a:pPr marL="412737" indent="-412737"/>
-            <a:endParaRPr lang="en-US" altLang="zh-CN" sz="3033" dirty="0"/>
-          </a:p>
-          <a:p>
-            <a:pPr marL="412737" indent="-412737"/>
-            <a:endParaRPr lang="en-US" altLang="zh-CN" sz="3033" dirty="0"/>
-          </a:p>
-          <a:p>
-            <a:pPr marL="412737" indent="-412737"/>
-            <a:endParaRPr lang="en-US" altLang="zh-CN" sz="3033" dirty="0"/>
-          </a:p>
-          <a:p>
-            <a:pPr marL="412737" indent="-412737" algn="ctr"/>
-            <a:r>
-              <a:rPr lang="en-US" altLang="zh-CN" sz="2800" dirty="0"/>
-              <a:t> </a:t>
-            </a:r>
-          </a:p>
-          <a:p>
-            <a:pPr marL="412737" indent="-412737" algn="ctr"/>
-            <a:endParaRPr lang="en-US" altLang="zh-CN" sz="2800" dirty="0"/>
-          </a:p>
-          <a:p>
-            <a:pPr marL="412737" indent="-412737" algn="ctr"/>
-            <a:endParaRPr lang="en-US" altLang="zh-CN" sz="2800" dirty="0"/>
-          </a:p>
-          <a:p>
-            <a:pPr marL="412737" indent="-412737" algn="ctr"/>
-            <a:r>
-              <a:rPr lang="en-US" altLang="zh-CN" sz="2800" dirty="0"/>
-              <a:t>Fig.2.</a:t>
-            </a:r>
-            <a:r>
-              <a:rPr lang="zh-CN" altLang="en-US" sz="2800" dirty="0"/>
-              <a:t> </a:t>
-            </a:r>
-            <a:r>
-              <a:rPr lang="en-US" altLang="zh-CN" sz="2800" b="1" dirty="0"/>
-              <a:t>CLOPER</a:t>
-            </a:r>
-            <a:r>
-              <a:rPr lang="zh-CN" altLang="en-US" sz="2800" dirty="0"/>
-              <a:t> </a:t>
-            </a:r>
-            <a:r>
-              <a:rPr lang="en-US" altLang="zh-CN" sz="2800" dirty="0"/>
-              <a:t>and</a:t>
-            </a:r>
-            <a:r>
-              <a:rPr lang="zh-CN" altLang="en-US" sz="2800" dirty="0"/>
-              <a:t> </a:t>
-            </a:r>
-            <a:r>
-              <a:rPr lang="en-US" altLang="zh-CN" sz="2800" b="1" dirty="0"/>
-              <a:t>ER3</a:t>
-            </a:r>
-            <a:endParaRPr lang="en-US" altLang="zh-CN" sz="3033" b="1" dirty="0"/>
-          </a:p>
-          <a:p>
-            <a:pPr marL="412737" indent="-412737"/>
-            <a:r>
-              <a:rPr lang="en-US" altLang="zh-CN" sz="3033" dirty="0"/>
-              <a:t>The</a:t>
-            </a:r>
-            <a:r>
-              <a:rPr lang="zh-CN" altLang="en-US" sz="3033" dirty="0"/>
-              <a:t> </a:t>
-            </a:r>
-            <a:r>
-              <a:rPr lang="en-US" altLang="zh-CN" sz="3033" dirty="0"/>
-              <a:t>prototype</a:t>
-            </a:r>
-            <a:r>
-              <a:rPr lang="zh-CN" altLang="en-US" sz="3033" dirty="0"/>
-              <a:t> </a:t>
-            </a:r>
-            <a:r>
-              <a:rPr lang="en-US" altLang="zh-CN" sz="3033" dirty="0"/>
-              <a:t>consists of two systems,</a:t>
-            </a:r>
-            <a:r>
-              <a:rPr lang="zh-CN" altLang="en-US" sz="3033" b="1" dirty="0"/>
-              <a:t> </a:t>
-            </a:r>
-            <a:r>
-              <a:rPr lang="en-US" altLang="zh-CN" sz="3033" b="1" dirty="0"/>
-              <a:t>CLOPER</a:t>
-            </a:r>
-            <a:r>
-              <a:rPr lang="zh-CN" altLang="en-US" sz="3033" b="1" dirty="0"/>
-              <a:t> </a:t>
-            </a:r>
-            <a:r>
-              <a:rPr lang="en-US" altLang="zh-CN" sz="3033" b="1" dirty="0"/>
-              <a:t>(Command-Line</a:t>
-            </a:r>
-            <a:r>
-              <a:rPr lang="zh-CN" altLang="en-US" sz="3033" b="1" dirty="0"/>
-              <a:t> </a:t>
-            </a:r>
-            <a:r>
-              <a:rPr lang="en-US" altLang="zh-CN" sz="3033" b="1" dirty="0"/>
-              <a:t>OpenRefine</a:t>
-            </a:r>
-            <a:r>
-              <a:rPr lang="zh-CN" altLang="en-US" sz="3033" b="1" dirty="0"/>
-              <a:t> </a:t>
-            </a:r>
-            <a:r>
-              <a:rPr lang="en-US" altLang="zh-CN" sz="3033" b="1" dirty="0"/>
-              <a:t>Prototype</a:t>
-            </a:r>
-            <a:r>
-              <a:rPr lang="zh-CN" altLang="en-US" sz="3033" b="1" dirty="0"/>
-              <a:t> </a:t>
-            </a:r>
-            <a:r>
-              <a:rPr lang="en-US" altLang="zh-CN" sz="3033" b="1" dirty="0"/>
-              <a:t>for</a:t>
-            </a:r>
-            <a:r>
-              <a:rPr lang="zh-CN" altLang="en-US" sz="3033" b="1" dirty="0"/>
-              <a:t> </a:t>
-            </a:r>
-            <a:r>
-              <a:rPr lang="en-US" altLang="zh-CN" sz="3033" b="1" dirty="0"/>
-              <a:t>Enhanced</a:t>
-            </a:r>
-            <a:r>
-              <a:rPr lang="zh-CN" altLang="en-US" sz="3033" b="1" dirty="0"/>
-              <a:t> </a:t>
-            </a:r>
-            <a:r>
-              <a:rPr lang="en-US" altLang="zh-CN" sz="3033" b="1" dirty="0"/>
-              <a:t>Recipes)</a:t>
-            </a:r>
-            <a:r>
-              <a:rPr lang="zh-CN" altLang="en-US" sz="3033" b="1" dirty="0"/>
-              <a:t> </a:t>
-            </a:r>
-            <a:r>
-              <a:rPr lang="en-US" altLang="zh-CN" sz="3033" dirty="0"/>
-              <a:t>and</a:t>
-            </a:r>
-            <a:r>
-              <a:rPr lang="zh-CN" altLang="en-US" sz="3033" b="1" dirty="0"/>
-              <a:t> </a:t>
-            </a:r>
-            <a:r>
-              <a:rPr lang="en-US" altLang="zh-CN" sz="3033" b="1" dirty="0"/>
-              <a:t>ER3</a:t>
-            </a:r>
-            <a:r>
-              <a:rPr lang="zh-CN" altLang="en-US" sz="3033" b="1" dirty="0"/>
-              <a:t> </a:t>
-            </a:r>
-            <a:r>
-              <a:rPr lang="en-US" altLang="zh-CN" sz="3033" b="1" dirty="0"/>
-              <a:t>(Enhanced</a:t>
-            </a:r>
-            <a:r>
-              <a:rPr lang="zh-CN" altLang="en-US" sz="3033" b="1" dirty="0"/>
-              <a:t> </a:t>
-            </a:r>
-            <a:r>
-              <a:rPr lang="en-US" altLang="zh-CN" sz="3033" b="1" dirty="0"/>
-              <a:t>Recipe</a:t>
-            </a:r>
-            <a:r>
-              <a:rPr lang="zh-CN" altLang="en-US" sz="3033" b="1" dirty="0"/>
-              <a:t> </a:t>
-            </a:r>
-            <a:r>
-              <a:rPr lang="en-US" altLang="zh-CN" sz="3033" b="1" dirty="0"/>
-              <a:t>Re-Runner</a:t>
-            </a:r>
-            <a:r>
-              <a:rPr lang="en-US" altLang="zh-CN" sz="3033" dirty="0"/>
-              <a:t>)</a:t>
-            </a:r>
-            <a:r>
-              <a:rPr lang="zh-CN" altLang="en-US" sz="3033" dirty="0"/>
-              <a:t> </a:t>
-            </a:r>
-            <a:r>
-              <a:rPr lang="en-US" altLang="zh-CN" sz="3033" dirty="0"/>
-              <a:t>(Fig.2),</a:t>
-            </a:r>
-            <a:r>
-              <a:rPr lang="zh-CN" altLang="en-US" sz="3033" dirty="0"/>
-              <a:t> </a:t>
-            </a:r>
-            <a:r>
-              <a:rPr lang="en-US" altLang="zh-CN" sz="3033" dirty="0"/>
-              <a:t>both</a:t>
-            </a:r>
-            <a:r>
-              <a:rPr lang="zh-CN" altLang="en-US" sz="3033" dirty="0"/>
-              <a:t> </a:t>
-            </a:r>
-            <a:r>
-              <a:rPr lang="en-US" altLang="zh-CN" sz="3033" dirty="0"/>
-              <a:t>of</a:t>
-            </a:r>
-            <a:r>
-              <a:rPr lang="zh-CN" altLang="en-US" sz="3033" dirty="0"/>
-              <a:t> </a:t>
-            </a:r>
-            <a:r>
-              <a:rPr lang="en-US" altLang="zh-CN" sz="3033" dirty="0"/>
-              <a:t>which</a:t>
-            </a:r>
-            <a:r>
-              <a:rPr lang="zh-CN" altLang="en-US" sz="3033" dirty="0"/>
-              <a:t> </a:t>
-            </a:r>
-            <a:r>
-              <a:rPr lang="en-US" altLang="zh-CN" sz="3033" dirty="0"/>
-              <a:t>use</a:t>
-            </a:r>
-            <a:r>
-              <a:rPr lang="zh-CN" altLang="en-US" sz="3033" dirty="0"/>
-              <a:t> </a:t>
-            </a:r>
-            <a:r>
-              <a:rPr lang="en-US" altLang="zh-CN" sz="3033" dirty="0"/>
-              <a:t>a</a:t>
-            </a:r>
-            <a:r>
-              <a:rPr lang="zh-CN" altLang="en-US" sz="3033" dirty="0"/>
-              <a:t> </a:t>
-            </a:r>
-            <a:r>
-              <a:rPr lang="en-US" altLang="zh-CN" sz="3033" dirty="0"/>
-              <a:t>Python</a:t>
-            </a:r>
-            <a:r>
-              <a:rPr lang="zh-CN" altLang="en-US" sz="3033" dirty="0"/>
-              <a:t> </a:t>
-            </a:r>
-            <a:r>
-              <a:rPr lang="en-US" altLang="zh-CN" sz="3033" dirty="0"/>
-              <a:t>client</a:t>
-            </a:r>
-            <a:r>
-              <a:rPr lang="zh-CN" altLang="en-US" sz="3033" dirty="0"/>
-              <a:t> </a:t>
-            </a:r>
-            <a:r>
-              <a:rPr lang="en-US" altLang="zh-CN" sz="3033" dirty="0"/>
-              <a:t>library</a:t>
-            </a:r>
-            <a:r>
-              <a:rPr lang="zh-CN" altLang="en-US" sz="3033" dirty="0"/>
-              <a:t> </a:t>
-            </a:r>
-            <a:r>
-              <a:rPr lang="en-US" altLang="zh-CN" sz="3033" dirty="0"/>
-              <a:t>[2]</a:t>
-            </a:r>
-            <a:r>
-              <a:rPr lang="zh-CN" altLang="en-US" sz="3033" dirty="0"/>
-              <a:t> </a:t>
-            </a:r>
-            <a:r>
-              <a:rPr lang="en-US" altLang="zh-CN" sz="3033" dirty="0"/>
-              <a:t>to</a:t>
-            </a:r>
-            <a:r>
-              <a:rPr lang="zh-CN" altLang="en-US" sz="3033" dirty="0"/>
-              <a:t> </a:t>
-            </a:r>
-            <a:r>
-              <a:rPr lang="en-US" altLang="zh-CN" sz="3033" dirty="0"/>
-              <a:t>communicate</a:t>
-            </a:r>
-            <a:r>
-              <a:rPr lang="zh-CN" altLang="en-US" sz="3033" dirty="0"/>
-              <a:t> </a:t>
-            </a:r>
-            <a:r>
-              <a:rPr lang="en-US" altLang="zh-CN" sz="3033" dirty="0"/>
-              <a:t>with</a:t>
-            </a:r>
-            <a:r>
-              <a:rPr lang="zh-CN" altLang="en-US" sz="3033" dirty="0"/>
-              <a:t> </a:t>
-            </a:r>
-            <a:r>
-              <a:rPr lang="en-US" altLang="zh-CN" sz="3033" dirty="0"/>
-              <a:t>an</a:t>
-            </a:r>
-            <a:r>
-              <a:rPr lang="zh-CN" altLang="en-US" sz="3033" dirty="0"/>
-              <a:t> </a:t>
-            </a:r>
-            <a:r>
-              <a:rPr lang="en-US" altLang="zh-CN" sz="3033" dirty="0"/>
-              <a:t>OpenRefine</a:t>
-            </a:r>
-            <a:r>
-              <a:rPr lang="zh-CN" altLang="en-US" sz="3033" dirty="0"/>
-              <a:t> </a:t>
-            </a:r>
-            <a:r>
-              <a:rPr lang="en-US" altLang="zh-CN" sz="3033" dirty="0"/>
-              <a:t>server.</a:t>
-            </a:r>
-            <a:r>
-              <a:rPr lang="zh-CN" altLang="en-US" sz="3033" dirty="0"/>
-              <a:t> </a:t>
-            </a:r>
-            <a:r>
-              <a:rPr lang="en-US" altLang="zh-CN" sz="3033" b="1" dirty="0"/>
-              <a:t>CLOPER</a:t>
-            </a:r>
-            <a:r>
-              <a:rPr lang="zh-CN" altLang="en-US" sz="3033" dirty="0"/>
-              <a:t> </a:t>
-            </a:r>
-            <a:r>
-              <a:rPr lang="en-US" altLang="zh-CN" sz="3033" dirty="0"/>
-              <a:t>can</a:t>
-            </a:r>
-            <a:r>
-              <a:rPr lang="zh-CN" altLang="en-US" sz="3033" dirty="0"/>
-              <a:t> </a:t>
-            </a:r>
-            <a:r>
-              <a:rPr lang="en-US" altLang="zh-CN" sz="3033" dirty="0"/>
-              <a:t>execute</a:t>
-            </a:r>
-            <a:r>
-              <a:rPr lang="zh-CN" altLang="en-US" sz="3033" dirty="0"/>
-              <a:t> </a:t>
-            </a:r>
-            <a:r>
-              <a:rPr lang="en-US" altLang="zh-CN" sz="3033" dirty="0"/>
-              <a:t>OpenRefine</a:t>
-            </a:r>
-            <a:r>
-              <a:rPr lang="zh-CN" altLang="en-US" sz="3033" dirty="0"/>
-              <a:t> </a:t>
-            </a:r>
-            <a:r>
-              <a:rPr lang="en-US" altLang="zh-CN" sz="3033" dirty="0"/>
-              <a:t>operations</a:t>
-            </a:r>
-            <a:r>
-              <a:rPr lang="zh-CN" altLang="en-US" sz="3033" dirty="0"/>
-              <a:t> </a:t>
-            </a:r>
-            <a:r>
-              <a:rPr lang="en-US" altLang="zh-CN" sz="3033" dirty="0"/>
-              <a:t>via</a:t>
-            </a:r>
-            <a:r>
-              <a:rPr lang="zh-CN" altLang="en-US" sz="3033" dirty="0"/>
-              <a:t> </a:t>
-            </a:r>
-            <a:r>
-              <a:rPr lang="en-US" altLang="zh-CN" sz="3033" dirty="0"/>
-              <a:t>a</a:t>
-            </a:r>
-            <a:r>
-              <a:rPr lang="zh-CN" altLang="en-US" sz="3033" dirty="0"/>
-              <a:t> </a:t>
-            </a:r>
-            <a:r>
-              <a:rPr lang="en-US" altLang="zh-CN" sz="3033" dirty="0"/>
-              <a:t>command-line</a:t>
-            </a:r>
-            <a:r>
-              <a:rPr lang="zh-CN" altLang="en-US" sz="3033" dirty="0"/>
-              <a:t> </a:t>
-            </a:r>
-            <a:r>
-              <a:rPr lang="en-US" altLang="zh-CN" sz="3033" dirty="0"/>
-              <a:t>driven</a:t>
-            </a:r>
-            <a:r>
-              <a:rPr lang="zh-CN" altLang="en-US" sz="3033" dirty="0"/>
-              <a:t> </a:t>
-            </a:r>
-            <a:r>
-              <a:rPr lang="en-US" altLang="zh-CN" sz="3033" dirty="0"/>
-              <a:t>interface</a:t>
-            </a:r>
-            <a:r>
-              <a:rPr lang="zh-CN" altLang="en-US" sz="3033" dirty="0"/>
-              <a:t> </a:t>
-            </a:r>
-            <a:r>
-              <a:rPr lang="en-US" altLang="zh-CN" sz="3033" dirty="0"/>
-              <a:t>(i.e.</a:t>
-            </a:r>
-            <a:r>
-              <a:rPr lang="zh-CN" altLang="en-US" sz="3033" dirty="0"/>
-              <a:t> </a:t>
-            </a:r>
-            <a:r>
-              <a:rPr lang="en-US" altLang="zh-CN" sz="3033" dirty="0"/>
-              <a:t>without</a:t>
-            </a:r>
-            <a:r>
-              <a:rPr lang="zh-CN" altLang="en-US" sz="3033" dirty="0"/>
-              <a:t> </a:t>
-            </a:r>
-            <a:r>
-              <a:rPr lang="en-US" altLang="zh-CN" sz="3033" dirty="0"/>
-              <a:t>a</a:t>
-            </a:r>
-            <a:r>
-              <a:rPr lang="zh-CN" altLang="en-US" sz="3033" dirty="0"/>
-              <a:t> </a:t>
-            </a:r>
-            <a:r>
-              <a:rPr lang="en-US" altLang="zh-CN" sz="3033" dirty="0"/>
-              <a:t>GUI)</a:t>
-            </a:r>
-            <a:r>
-              <a:rPr lang="zh-CN" altLang="en-US" sz="3033" dirty="0"/>
-              <a:t> </a:t>
-            </a:r>
-            <a:r>
-              <a:rPr lang="en-US" altLang="zh-CN" sz="3033" dirty="0"/>
-              <a:t>and</a:t>
-            </a:r>
-            <a:r>
-              <a:rPr lang="zh-CN" altLang="en-US" sz="3033" dirty="0"/>
-              <a:t> </a:t>
-            </a:r>
-            <a:r>
-              <a:rPr lang="en-US" altLang="zh-CN" sz="3033" dirty="0"/>
-              <a:t>adds</a:t>
-            </a:r>
-            <a:r>
-              <a:rPr lang="zh-CN" altLang="en-US" sz="3033" dirty="0"/>
-              <a:t> </a:t>
-            </a:r>
-            <a:r>
-              <a:rPr lang="en-US" altLang="zh-CN" sz="3033" dirty="0"/>
-              <a:t>missing</a:t>
-            </a:r>
-            <a:r>
-              <a:rPr lang="zh-CN" altLang="en-US" sz="3033" dirty="0"/>
-              <a:t> </a:t>
-            </a:r>
-            <a:r>
-              <a:rPr lang="en-US" altLang="zh-CN" sz="3033" dirty="0"/>
-              <a:t>prospective</a:t>
-            </a:r>
-            <a:r>
-              <a:rPr lang="zh-CN" altLang="en-US" sz="3033" dirty="0"/>
-              <a:t> </a:t>
-            </a:r>
-            <a:r>
-              <a:rPr lang="en-US" altLang="zh-CN" sz="3033" dirty="0"/>
-              <a:t>information</a:t>
-            </a:r>
-            <a:r>
-              <a:rPr lang="zh-CN" altLang="en-US" sz="3033" dirty="0"/>
-              <a:t> </a:t>
-            </a:r>
-            <a:r>
-              <a:rPr lang="en-US" altLang="zh-CN" sz="3033" dirty="0"/>
-              <a:t>to</a:t>
-            </a:r>
-            <a:r>
-              <a:rPr lang="zh-CN" altLang="en-US" sz="3033" dirty="0"/>
-              <a:t> </a:t>
-            </a:r>
-            <a:r>
-              <a:rPr lang="en-US" altLang="zh-CN" sz="3033" dirty="0"/>
-              <a:t>recipes.</a:t>
-            </a:r>
-            <a:r>
-              <a:rPr lang="zh-CN" altLang="en-US" sz="3033" dirty="0"/>
-              <a:t> </a:t>
-            </a:r>
-            <a:r>
-              <a:rPr lang="en-US" altLang="zh-CN" sz="3033" b="1" dirty="0"/>
-              <a:t>ER3</a:t>
-            </a:r>
-            <a:r>
-              <a:rPr lang="zh-CN" altLang="en-US" sz="3033" dirty="0"/>
-              <a:t> </a:t>
-            </a:r>
-            <a:r>
-              <a:rPr lang="en-US" altLang="zh-CN" sz="3033" dirty="0"/>
-              <a:t>can</a:t>
-            </a:r>
-            <a:r>
-              <a:rPr lang="zh-CN" altLang="en-US" sz="3033" dirty="0"/>
-              <a:t> </a:t>
-            </a:r>
-            <a:r>
-              <a:rPr lang="en-US" altLang="zh-CN" sz="3033" dirty="0"/>
-              <a:t>then</a:t>
-            </a:r>
-            <a:r>
-              <a:rPr lang="zh-CN" altLang="en-US" sz="3033" dirty="0"/>
-              <a:t> </a:t>
-            </a:r>
-            <a:r>
-              <a:rPr lang="en-US" altLang="zh-CN" sz="3033" dirty="0"/>
-              <a:t>run</a:t>
-            </a:r>
-            <a:r>
-              <a:rPr lang="zh-CN" altLang="en-US" sz="3033" dirty="0"/>
-              <a:t> </a:t>
-            </a:r>
-            <a:r>
-              <a:rPr lang="en-US" altLang="zh-CN" sz="3033" dirty="0"/>
-              <a:t>those</a:t>
-            </a:r>
-            <a:r>
-              <a:rPr lang="zh-CN" altLang="en-US" sz="3033" dirty="0"/>
-              <a:t> </a:t>
-            </a:r>
-            <a:r>
-              <a:rPr lang="en-US" altLang="zh-CN" sz="3033" dirty="0"/>
-              <a:t>enhanced</a:t>
-            </a:r>
-            <a:r>
-              <a:rPr lang="zh-CN" altLang="en-US" sz="3033" dirty="0"/>
-              <a:t> </a:t>
-            </a:r>
-            <a:r>
-              <a:rPr lang="en-US" altLang="zh-CN" sz="3033" dirty="0"/>
-              <a:t>recipes</a:t>
-            </a:r>
-            <a:r>
-              <a:rPr lang="zh-CN" altLang="en-US" sz="3033" dirty="0"/>
-              <a:t> </a:t>
-            </a:r>
-            <a:r>
-              <a:rPr lang="en-US" altLang="zh-CN" sz="3033" dirty="0"/>
-              <a:t>and</a:t>
-            </a:r>
-            <a:r>
-              <a:rPr lang="zh-CN" altLang="en-US" sz="3033" dirty="0"/>
-              <a:t> </a:t>
-            </a:r>
-            <a:r>
-              <a:rPr lang="en-US" altLang="zh-CN" sz="3033" dirty="0"/>
-              <a:t>demonstrate</a:t>
-            </a:r>
-            <a:r>
-              <a:rPr lang="zh-CN" altLang="en-US" sz="3033" dirty="0"/>
-              <a:t> </a:t>
-            </a:r>
-            <a:r>
-              <a:rPr lang="en-US" altLang="zh-CN" sz="3033" dirty="0"/>
-              <a:t>the</a:t>
-            </a:r>
-            <a:r>
-              <a:rPr lang="zh-CN" altLang="en-US" sz="3033" dirty="0"/>
-              <a:t> </a:t>
-            </a:r>
-            <a:r>
-              <a:rPr lang="en-US" altLang="zh-CN" sz="3033" dirty="0"/>
-              <a:t>improved</a:t>
-            </a:r>
-            <a:r>
-              <a:rPr lang="zh-CN" altLang="en-US" sz="3033" dirty="0"/>
-              <a:t> </a:t>
-            </a:r>
-            <a:r>
-              <a:rPr lang="en-US" altLang="zh-CN" sz="3033" dirty="0"/>
-              <a:t>transparency,</a:t>
-            </a:r>
-            <a:r>
-              <a:rPr lang="zh-CN" altLang="en-US" sz="3033" dirty="0"/>
-              <a:t> </a:t>
-            </a:r>
-            <a:r>
-              <a:rPr lang="en-US" altLang="zh-CN" sz="3033" dirty="0"/>
-              <a:t>reproducibility,</a:t>
-            </a:r>
-            <a:r>
-              <a:rPr lang="zh-CN" altLang="en-US" sz="3033" dirty="0"/>
-              <a:t> </a:t>
-            </a:r>
-            <a:r>
-              <a:rPr lang="en-US" altLang="zh-CN" sz="3033" dirty="0"/>
-              <a:t>and</a:t>
-            </a:r>
-            <a:r>
-              <a:rPr lang="zh-CN" altLang="en-US" sz="3033" dirty="0"/>
-              <a:t> </a:t>
-            </a:r>
-            <a:r>
-              <a:rPr lang="en-US" altLang="zh-CN" sz="3033" dirty="0"/>
-              <a:t>reusability.</a:t>
-            </a:r>
-            <a:r>
-              <a:rPr lang="zh-CN" altLang="en-US" sz="3033" dirty="0"/>
-              <a:t> </a:t>
-            </a:r>
-            <a:endParaRPr lang="en-US" altLang="zh-CN" sz="3033" dirty="0"/>
-          </a:p>
-          <a:p>
-            <a:pPr marL="412737" indent="-412737"/>
-            <a:endParaRPr lang="en-US" altLang="zh-CN" sz="3033" b="1" dirty="0"/>
-          </a:p>
-          <a:p>
-            <a:pPr marL="412737" indent="-412737"/>
-            <a:r>
-              <a:rPr lang="en-US" altLang="zh-CN" sz="3033" b="1" dirty="0"/>
-              <a:t>CLOPER</a:t>
-            </a:r>
-            <a:r>
-              <a:rPr lang="zh-CN" altLang="en-US" sz="3033" b="1" dirty="0"/>
-              <a:t> </a:t>
-            </a:r>
-            <a:r>
-              <a:rPr lang="en-US" altLang="zh-CN" sz="3033" b="1" dirty="0"/>
-              <a:t>(Command-Line</a:t>
-            </a:r>
-            <a:r>
-              <a:rPr lang="zh-CN" altLang="en-US" sz="3033" b="1" dirty="0"/>
-              <a:t> </a:t>
-            </a:r>
-            <a:r>
-              <a:rPr lang="en-US" altLang="zh-CN" sz="3033" b="1" dirty="0"/>
-              <a:t>OpenRefine</a:t>
-            </a:r>
-            <a:r>
-              <a:rPr lang="zh-CN" altLang="en-US" sz="3033" b="1" dirty="0"/>
-              <a:t> </a:t>
-            </a:r>
-            <a:r>
-              <a:rPr lang="en-US" altLang="zh-CN" sz="3033" b="1" dirty="0"/>
-              <a:t>Prototype</a:t>
-            </a:r>
-            <a:r>
-              <a:rPr lang="zh-CN" altLang="en-US" sz="3033" b="1" dirty="0"/>
-              <a:t> </a:t>
-            </a:r>
-            <a:r>
-              <a:rPr lang="en-US" altLang="zh-CN" sz="3033" b="1" dirty="0"/>
-              <a:t>for</a:t>
-            </a:r>
-            <a:r>
-              <a:rPr lang="zh-CN" altLang="en-US" sz="3033" b="1" dirty="0"/>
-              <a:t> </a:t>
-            </a:r>
-            <a:r>
-              <a:rPr lang="en-US" altLang="zh-CN" sz="3033" b="1" dirty="0"/>
-              <a:t>Enhanced</a:t>
-            </a:r>
-            <a:r>
-              <a:rPr lang="zh-CN" altLang="en-US" sz="3033" b="1" dirty="0"/>
-              <a:t> </a:t>
-            </a:r>
-            <a:r>
-              <a:rPr lang="en-US" altLang="zh-CN" sz="3033" b="1" dirty="0"/>
-              <a:t>Recipes)</a:t>
-            </a:r>
-            <a:r>
-              <a:rPr lang="en-US" altLang="zh-CN" sz="3033" dirty="0"/>
-              <a:t>:</a:t>
-            </a:r>
-          </a:p>
-          <a:p>
-            <a:pPr marL="412737" indent="-412737"/>
-            <a:r>
-              <a:rPr lang="zh-CN" altLang="en-US" sz="3033" b="1" dirty="0"/>
-              <a:t>    </a:t>
-            </a:r>
-            <a:r>
-              <a:rPr lang="en-US" altLang="zh-CN" sz="3033" b="1" dirty="0"/>
-              <a:t>CLOPER</a:t>
-            </a:r>
-            <a:r>
-              <a:rPr lang="en-US" altLang="zh-CN" sz="3033" dirty="0"/>
-              <a:t> is</a:t>
-            </a:r>
-            <a:r>
-              <a:rPr lang="zh-CN" altLang="en-US" sz="3033" dirty="0"/>
-              <a:t> </a:t>
-            </a:r>
-            <a:r>
-              <a:rPr lang="en-US" altLang="zh-CN" sz="3033" dirty="0"/>
-              <a:t>developed</a:t>
-            </a:r>
-            <a:r>
-              <a:rPr lang="zh-CN" altLang="en-US" sz="3033" dirty="0"/>
-              <a:t> </a:t>
-            </a:r>
-            <a:r>
-              <a:rPr lang="en-US" altLang="zh-CN" sz="3033" dirty="0"/>
-              <a:t>to</a:t>
-            </a:r>
-            <a:r>
-              <a:rPr lang="zh-CN" altLang="en-US" sz="3033" dirty="0"/>
-              <a:t> </a:t>
-            </a:r>
-            <a:r>
-              <a:rPr lang="en-US" altLang="zh-CN" sz="3033" dirty="0"/>
-              <a:t>enhance</a:t>
-            </a:r>
-            <a:r>
-              <a:rPr lang="zh-CN" altLang="en-US" sz="3033" dirty="0"/>
-              <a:t> </a:t>
-            </a:r>
-            <a:r>
-              <a:rPr lang="en-US" altLang="zh-CN" sz="3033" dirty="0"/>
-              <a:t>the</a:t>
-            </a:r>
-            <a:r>
-              <a:rPr lang="zh-CN" altLang="en-US" sz="3033" dirty="0"/>
-              <a:t> </a:t>
-            </a:r>
-            <a:r>
-              <a:rPr lang="en-US" altLang="zh-CN" sz="3033" dirty="0"/>
-              <a:t>native</a:t>
-            </a:r>
-            <a:r>
-              <a:rPr lang="zh-CN" altLang="en-US" sz="3033" dirty="0"/>
-              <a:t> </a:t>
-            </a:r>
-            <a:r>
-              <a:rPr lang="en-US" altLang="zh-CN" sz="3033" dirty="0"/>
-              <a:t>OpenRefine</a:t>
-            </a:r>
-            <a:r>
-              <a:rPr lang="zh-CN" altLang="en-US" sz="3033" dirty="0"/>
-              <a:t> </a:t>
-            </a:r>
-            <a:r>
-              <a:rPr lang="en-US" altLang="zh-CN" sz="3033" dirty="0"/>
-              <a:t>recipes</a:t>
-            </a:r>
-            <a:r>
-              <a:rPr lang="zh-CN" altLang="en-US" sz="3033" dirty="0"/>
-              <a:t> </a:t>
-            </a:r>
-            <a:r>
-              <a:rPr lang="en-US" altLang="zh-CN" sz="3033" dirty="0"/>
-              <a:t>as</a:t>
-            </a:r>
-            <a:r>
-              <a:rPr lang="zh-CN" altLang="en-US" sz="3033" dirty="0"/>
-              <a:t> </a:t>
-            </a:r>
-            <a:r>
-              <a:rPr lang="en-US" altLang="zh-CN" sz="3033" dirty="0"/>
-              <a:t>follows</a:t>
-            </a:r>
-            <a:r>
-              <a:rPr lang="zh-Hans" altLang="en-US" sz="3033" dirty="0"/>
-              <a:t>：            </a:t>
-            </a:r>
-            <a:endParaRPr lang="en-US" altLang="zh-CN" sz="3033" dirty="0"/>
-          </a:p>
-          <a:p>
-            <a:pPr marL="412737" indent="-412737"/>
-            <a:r>
-              <a:rPr lang="en-US" altLang="zh-Hans" sz="3033" dirty="0"/>
-              <a:t>-</a:t>
-            </a:r>
-            <a:r>
-              <a:rPr lang="zh-Hans" altLang="en-US" sz="3033" dirty="0"/>
-              <a:t>   </a:t>
-            </a:r>
-            <a:r>
-              <a:rPr lang="en-US" altLang="zh-CN" sz="3033" dirty="0"/>
-              <a:t>When</a:t>
-            </a:r>
-            <a:r>
-              <a:rPr lang="zh-CN" altLang="en-US" sz="3033" dirty="0"/>
-              <a:t> </a:t>
-            </a:r>
-            <a:r>
-              <a:rPr lang="en-US" altLang="zh-CN" sz="3033" dirty="0"/>
-              <a:t>users</a:t>
-            </a:r>
-            <a:r>
-              <a:rPr lang="zh-CN" altLang="en-US" sz="3033" dirty="0"/>
-              <a:t> </a:t>
-            </a:r>
-            <a:r>
-              <a:rPr lang="en-US" altLang="zh-CN" sz="3033" dirty="0"/>
-              <a:t>select</a:t>
-            </a:r>
-            <a:r>
-              <a:rPr lang="zh-CN" altLang="en-US" sz="3033" dirty="0"/>
-              <a:t> </a:t>
-            </a:r>
-            <a:r>
-              <a:rPr lang="en-US" altLang="zh-CN" sz="3033" dirty="0"/>
-              <a:t>operations</a:t>
-            </a:r>
-            <a:r>
-              <a:rPr lang="zh-CN" altLang="en-US" sz="3033" dirty="0"/>
-              <a:t> </a:t>
-            </a:r>
-            <a:r>
-              <a:rPr lang="en-US" altLang="zh-CN" sz="3033" dirty="0"/>
-              <a:t>as</a:t>
-            </a:r>
-            <a:r>
-              <a:rPr lang="zh-CN" altLang="en-US" sz="3033" dirty="0"/>
-              <a:t> </a:t>
-            </a:r>
-            <a:r>
-              <a:rPr lang="en-US" altLang="zh-CN" sz="3033" i="1" dirty="0">
-                <a:latin typeface="Apple Chancery" panose="03020702040506060504" pitchFamily="66" charset="-79"/>
-                <a:cs typeface="Apple Chancery" panose="03020702040506060504" pitchFamily="66" charset="-79"/>
-              </a:rPr>
-              <a:t>Cluster</a:t>
-            </a:r>
-            <a:r>
-              <a:rPr lang="zh-CN" altLang="en-US" sz="3033" i="1" dirty="0">
-                <a:latin typeface="Apple Chancery" panose="03020702040506060504" pitchFamily="66" charset="-79"/>
-                <a:cs typeface="Apple Chancery" panose="03020702040506060504" pitchFamily="66" charset="-79"/>
-              </a:rPr>
-              <a:t> </a:t>
-            </a:r>
-            <a:r>
-              <a:rPr lang="en-US" altLang="zh-CN" sz="3033" i="1" dirty="0">
-                <a:latin typeface="Apple Chancery" panose="03020702040506060504" pitchFamily="66" charset="-79"/>
-                <a:cs typeface="Apple Chancery" panose="03020702040506060504" pitchFamily="66" charset="-79"/>
-              </a:rPr>
-              <a:t>&amp;</a:t>
-            </a:r>
-            <a:r>
-              <a:rPr lang="zh-CN" altLang="en-US" sz="3033" i="1" dirty="0">
-                <a:latin typeface="Apple Chancery" panose="03020702040506060504" pitchFamily="66" charset="-79"/>
-                <a:cs typeface="Apple Chancery" panose="03020702040506060504" pitchFamily="66" charset="-79"/>
-              </a:rPr>
-              <a:t> </a:t>
-            </a:r>
-            <a:r>
-              <a:rPr lang="en-US" altLang="zh-CN" sz="3033" i="1" dirty="0">
-                <a:latin typeface="Apple Chancery" panose="03020702040506060504" pitchFamily="66" charset="-79"/>
-                <a:cs typeface="Apple Chancery" panose="03020702040506060504" pitchFamily="66" charset="-79"/>
-              </a:rPr>
-              <a:t>Edit</a:t>
-            </a:r>
-            <a:r>
-              <a:rPr lang="zh-CN" altLang="en-US" sz="3033" i="1" dirty="0">
-                <a:latin typeface="Apple Chancery" panose="03020702040506060504" pitchFamily="66" charset="-79"/>
-                <a:cs typeface="Apple Chancery" panose="03020702040506060504" pitchFamily="66" charset="-79"/>
-              </a:rPr>
-              <a:t> </a:t>
-            </a:r>
-            <a:r>
-              <a:rPr lang="en-US" altLang="zh-CN" sz="3033" dirty="0">
-                <a:latin typeface="+mj-lt"/>
-                <a:cs typeface="Apple Chancery" panose="03020702040506060504" pitchFamily="66" charset="-79"/>
-              </a:rPr>
-              <a:t>,</a:t>
-            </a:r>
-            <a:r>
-              <a:rPr lang="zh-CN" altLang="en-US" sz="3033" dirty="0">
-                <a:latin typeface="+mj-lt"/>
-                <a:cs typeface="Apple Chancery" panose="03020702040506060504" pitchFamily="66" charset="-79"/>
-              </a:rPr>
-              <a:t> </a:t>
-            </a:r>
-            <a:r>
-              <a:rPr lang="en-US" altLang="zh-CN" sz="3033" b="1" dirty="0">
-                <a:latin typeface="+mj-lt"/>
-                <a:cs typeface="Apple Chancery" panose="03020702040506060504" pitchFamily="66" charset="-79"/>
-              </a:rPr>
-              <a:t>CLOPER</a:t>
-            </a:r>
-            <a:r>
-              <a:rPr lang="zh-CN" altLang="en-US" sz="3033" dirty="0">
-                <a:latin typeface="+mj-lt"/>
-                <a:cs typeface="Apple Chancery" panose="03020702040506060504" pitchFamily="66" charset="-79"/>
-              </a:rPr>
-              <a:t> </a:t>
-            </a:r>
-            <a:r>
-              <a:rPr lang="en-US" altLang="zh-CN" sz="3033" dirty="0">
-                <a:latin typeface="+mj-lt"/>
-                <a:cs typeface="Apple Chancery" panose="03020702040506060504" pitchFamily="66" charset="-79"/>
-              </a:rPr>
-              <a:t>is</a:t>
-            </a:r>
-            <a:r>
-              <a:rPr lang="zh-CN" altLang="en-US" sz="3033" dirty="0">
-                <a:latin typeface="+mj-lt"/>
-                <a:cs typeface="Apple Chancery" panose="03020702040506060504" pitchFamily="66" charset="-79"/>
-              </a:rPr>
-              <a:t> </a:t>
-            </a:r>
-            <a:r>
-              <a:rPr lang="en-US" altLang="zh-CN" sz="3033" dirty="0">
-                <a:latin typeface="+mj-lt"/>
-                <a:cs typeface="Apple Chancery" panose="03020702040506060504" pitchFamily="66" charset="-79"/>
-              </a:rPr>
-              <a:t>able</a:t>
-            </a:r>
-            <a:r>
-              <a:rPr lang="zh-CN" altLang="en-US" sz="3033" dirty="0">
-                <a:latin typeface="+mj-lt"/>
-                <a:cs typeface="Apple Chancery" panose="03020702040506060504" pitchFamily="66" charset="-79"/>
-              </a:rPr>
-              <a:t> </a:t>
-            </a:r>
-            <a:r>
-              <a:rPr lang="en-US" altLang="zh-CN" sz="3033" dirty="0">
-                <a:latin typeface="+mj-lt"/>
-                <a:cs typeface="Apple Chancery" panose="03020702040506060504" pitchFamily="66" charset="-79"/>
-              </a:rPr>
-              <a:t>to</a:t>
-            </a:r>
-            <a:r>
-              <a:rPr lang="zh-CN" altLang="en-US" sz="3033" dirty="0">
-                <a:latin typeface="+mj-lt"/>
-                <a:cs typeface="Apple Chancery" panose="03020702040506060504" pitchFamily="66" charset="-79"/>
-              </a:rPr>
-              <a:t> </a:t>
-            </a:r>
-            <a:r>
-              <a:rPr lang="en-US" altLang="zh-CN" sz="3033" dirty="0">
-                <a:latin typeface="+mj-lt"/>
-                <a:cs typeface="Apple Chancery" panose="03020702040506060504" pitchFamily="66" charset="-79"/>
-              </a:rPr>
-              <a:t>capture</a:t>
-            </a:r>
-            <a:r>
-              <a:rPr lang="zh-CN" altLang="en-US" sz="3033" dirty="0">
-                <a:latin typeface="+mj-lt"/>
-                <a:cs typeface="Apple Chancery" panose="03020702040506060504" pitchFamily="66" charset="-79"/>
-              </a:rPr>
-              <a:t> </a:t>
-            </a:r>
-            <a:r>
-              <a:rPr lang="en-US" altLang="zh-CN" sz="3033" dirty="0">
-                <a:latin typeface="+mj-lt"/>
-                <a:cs typeface="Apple Chancery" panose="03020702040506060504" pitchFamily="66" charset="-79"/>
-              </a:rPr>
-              <a:t>prospective</a:t>
-            </a:r>
-            <a:r>
-              <a:rPr lang="zh-CN" altLang="en-US" sz="3033" dirty="0">
-                <a:latin typeface="+mj-lt"/>
-                <a:cs typeface="Apple Chancery" panose="03020702040506060504" pitchFamily="66" charset="-79"/>
-              </a:rPr>
-              <a:t> </a:t>
-            </a:r>
-            <a:r>
-              <a:rPr lang="en-US" altLang="zh-CN" sz="3033" dirty="0">
-                <a:latin typeface="+mj-lt"/>
-                <a:cs typeface="Apple Chancery" panose="03020702040506060504" pitchFamily="66" charset="-79"/>
-              </a:rPr>
-              <a:t>information</a:t>
-            </a:r>
-            <a:r>
-              <a:rPr lang="zh-CN" altLang="en-US" sz="3033" dirty="0">
-                <a:latin typeface="+mj-lt"/>
-                <a:cs typeface="Apple Chancery" panose="03020702040506060504" pitchFamily="66" charset="-79"/>
-              </a:rPr>
-              <a:t> </a:t>
-            </a:r>
-            <a:r>
-              <a:rPr lang="en-US" altLang="zh-CN" sz="3033" dirty="0">
-                <a:latin typeface="+mj-lt"/>
-                <a:cs typeface="Apple Chancery" panose="03020702040506060504" pitchFamily="66" charset="-79"/>
-              </a:rPr>
-              <a:t>such</a:t>
-            </a:r>
-            <a:r>
-              <a:rPr lang="zh-CN" altLang="en-US" sz="3033" dirty="0">
-                <a:latin typeface="+mj-lt"/>
-                <a:cs typeface="Apple Chancery" panose="03020702040506060504" pitchFamily="66" charset="-79"/>
-              </a:rPr>
-              <a:t> </a:t>
-            </a:r>
-            <a:r>
-              <a:rPr lang="en-US" altLang="zh-CN" sz="3033" dirty="0">
-                <a:latin typeface="+mj-lt"/>
-                <a:cs typeface="Apple Chancery" panose="03020702040506060504" pitchFamily="66" charset="-79"/>
-              </a:rPr>
-              <a:t>as</a:t>
-            </a:r>
-            <a:r>
-              <a:rPr lang="zh-CN" altLang="en-US" sz="3033" dirty="0">
-                <a:latin typeface="+mj-lt"/>
-                <a:cs typeface="Apple Chancery" panose="03020702040506060504" pitchFamily="66" charset="-79"/>
-              </a:rPr>
-              <a:t> </a:t>
-            </a:r>
-            <a:r>
-              <a:rPr lang="en-US" altLang="zh-CN" sz="3033" dirty="0">
-                <a:latin typeface="+mj-lt"/>
-                <a:cs typeface="Apple Chancery" panose="03020702040506060504" pitchFamily="66" charset="-79"/>
-              </a:rPr>
-              <a:t>the</a:t>
-            </a:r>
-            <a:r>
-              <a:rPr lang="zh-CN" altLang="en-US" sz="3033" dirty="0">
-                <a:latin typeface="+mj-lt"/>
-                <a:cs typeface="Apple Chancery" panose="03020702040506060504" pitchFamily="66" charset="-79"/>
-              </a:rPr>
-              <a:t> </a:t>
-            </a:r>
-            <a:r>
-              <a:rPr lang="en-US" altLang="zh-CN" sz="3033" dirty="0">
-                <a:latin typeface="+mj-lt"/>
-                <a:cs typeface="Apple Chancery" panose="03020702040506060504" pitchFamily="66" charset="-79"/>
-              </a:rPr>
-              <a:t>clustering</a:t>
-            </a:r>
-            <a:r>
-              <a:rPr lang="zh-CN" altLang="en-US" sz="3033" dirty="0">
-                <a:latin typeface="+mj-lt"/>
-                <a:cs typeface="Apple Chancery" panose="03020702040506060504" pitchFamily="66" charset="-79"/>
-              </a:rPr>
-              <a:t> </a:t>
-            </a:r>
-            <a:r>
-              <a:rPr lang="en-US" altLang="zh-CN" sz="3033" dirty="0">
-                <a:latin typeface="+mj-lt"/>
-                <a:cs typeface="Apple Chancery" panose="03020702040506060504" pitchFamily="66" charset="-79"/>
-              </a:rPr>
-              <a:t>method</a:t>
-            </a:r>
-            <a:r>
-              <a:rPr lang="zh-CN" altLang="en-US" sz="3033" dirty="0">
-                <a:latin typeface="+mj-lt"/>
-                <a:cs typeface="Apple Chancery" panose="03020702040506060504" pitchFamily="66" charset="-79"/>
-              </a:rPr>
-              <a:t> </a:t>
-            </a:r>
-            <a:r>
-              <a:rPr lang="en-US" altLang="zh-CN" sz="3033" dirty="0">
-                <a:latin typeface="+mj-lt"/>
-                <a:cs typeface="Apple Chancery" panose="03020702040506060504" pitchFamily="66" charset="-79"/>
-              </a:rPr>
-              <a:t>with</a:t>
-            </a:r>
-            <a:r>
-              <a:rPr lang="zh-CN" altLang="en-US" sz="3033" dirty="0">
-                <a:latin typeface="+mj-lt"/>
-                <a:cs typeface="Apple Chancery" panose="03020702040506060504" pitchFamily="66" charset="-79"/>
-              </a:rPr>
-              <a:t> </a:t>
-            </a:r>
-            <a:r>
-              <a:rPr lang="en-US" altLang="zh-CN" sz="3033" dirty="0">
-                <a:latin typeface="+mj-lt"/>
-                <a:cs typeface="Apple Chancery" panose="03020702040506060504" pitchFamily="66" charset="-79"/>
-              </a:rPr>
-              <a:t>associated</a:t>
-            </a:r>
-            <a:r>
-              <a:rPr lang="zh-CN" altLang="en-US" sz="3033" dirty="0">
-                <a:latin typeface="+mj-lt"/>
-                <a:cs typeface="Apple Chancery" panose="03020702040506060504" pitchFamily="66" charset="-79"/>
-              </a:rPr>
-              <a:t> </a:t>
-            </a:r>
-            <a:r>
-              <a:rPr lang="en-US" altLang="zh-CN" sz="3033" dirty="0">
-                <a:latin typeface="+mj-lt"/>
-                <a:cs typeface="Apple Chancery" panose="03020702040506060504" pitchFamily="66" charset="-79"/>
-              </a:rPr>
-              <a:t>functions</a:t>
-            </a:r>
-            <a:r>
-              <a:rPr lang="zh-CN" altLang="en-US" sz="3033" dirty="0">
-                <a:latin typeface="+mj-lt"/>
-                <a:cs typeface="Apple Chancery" panose="03020702040506060504" pitchFamily="66" charset="-79"/>
-              </a:rPr>
-              <a:t> </a:t>
-            </a:r>
-            <a:r>
-              <a:rPr lang="en-US" altLang="zh-CN" sz="3033" dirty="0">
-                <a:latin typeface="+mj-lt"/>
-                <a:cs typeface="Apple Chancery" panose="03020702040506060504" pitchFamily="66" charset="-79"/>
-              </a:rPr>
-              <a:t>and</a:t>
-            </a:r>
-            <a:r>
-              <a:rPr lang="zh-CN" altLang="en-US" sz="3033" dirty="0">
-                <a:latin typeface="+mj-lt"/>
-                <a:cs typeface="Apple Chancery" panose="03020702040506060504" pitchFamily="66" charset="-79"/>
-              </a:rPr>
-              <a:t> </a:t>
-            </a:r>
-            <a:r>
-              <a:rPr lang="en-US" altLang="zh-CN" sz="3033" dirty="0">
-                <a:latin typeface="+mj-lt"/>
-                <a:cs typeface="Apple Chancery" panose="03020702040506060504" pitchFamily="66" charset="-79"/>
-              </a:rPr>
-              <a:t>parameters.</a:t>
-            </a:r>
-            <a:r>
-              <a:rPr lang="zh-CN" altLang="en-US" sz="3033" dirty="0">
-                <a:latin typeface="+mj-lt"/>
-                <a:cs typeface="Apple Chancery" panose="03020702040506060504" pitchFamily="66" charset="-79"/>
-              </a:rPr>
-              <a:t> </a:t>
-            </a:r>
-            <a:endParaRPr lang="en-US" altLang="zh-CN" sz="3033" dirty="0">
-              <a:latin typeface="+mj-lt"/>
-              <a:cs typeface="Apple Chancery" panose="03020702040506060504" pitchFamily="66" charset="-79"/>
-            </a:endParaRPr>
-          </a:p>
-          <a:p>
-            <a:pPr marL="495285" indent="-495285">
-              <a:buFontTx/>
-              <a:buChar char="-"/>
-            </a:pPr>
-            <a:r>
-              <a:rPr lang="en-US" altLang="zh-CN" sz="3033" dirty="0">
-                <a:latin typeface="+mj-lt"/>
-                <a:cs typeface="Apple Chancery" panose="03020702040506060504" pitchFamily="66" charset="-79"/>
-              </a:rPr>
-              <a:t>For</a:t>
-            </a:r>
-            <a:r>
-              <a:rPr lang="zh-CN" altLang="en-US" sz="3033" dirty="0">
-                <a:latin typeface="+mj-lt"/>
-                <a:cs typeface="Apple Chancery" panose="03020702040506060504" pitchFamily="66" charset="-79"/>
-              </a:rPr>
-              <a:t> </a:t>
-            </a:r>
-            <a:r>
-              <a:rPr lang="en-US" altLang="zh-CN" sz="3033" dirty="0">
-                <a:latin typeface="+mj-lt"/>
-                <a:cs typeface="Apple Chancery" panose="03020702040506060504" pitchFamily="66" charset="-79"/>
-              </a:rPr>
-              <a:t>operation</a:t>
-            </a:r>
-            <a:r>
-              <a:rPr lang="zh-CN" altLang="en-US" sz="3033" dirty="0">
-                <a:latin typeface="+mj-lt"/>
-                <a:cs typeface="Apple Chancery" panose="03020702040506060504" pitchFamily="66" charset="-79"/>
-              </a:rPr>
-              <a:t> </a:t>
-            </a:r>
-            <a:r>
-              <a:rPr lang="en-US" altLang="zh-CN" sz="3033" i="1" dirty="0">
-                <a:latin typeface="Apple Chancery" panose="03020702040506060504" pitchFamily="66" charset="-79"/>
-                <a:cs typeface="Apple Chancery" panose="03020702040506060504" pitchFamily="66" charset="-79"/>
-              </a:rPr>
-              <a:t>single</a:t>
-            </a:r>
-            <a:r>
-              <a:rPr lang="zh-CN" altLang="en-US" sz="3033" i="1" dirty="0">
-                <a:latin typeface="Apple Chancery" panose="03020702040506060504" pitchFamily="66" charset="-79"/>
-                <a:cs typeface="Apple Chancery" panose="03020702040506060504" pitchFamily="66" charset="-79"/>
-              </a:rPr>
-              <a:t> </a:t>
-            </a:r>
-            <a:r>
-              <a:rPr lang="en-US" altLang="zh-CN" sz="3033" i="1" dirty="0">
-                <a:latin typeface="Apple Chancery" panose="03020702040506060504" pitchFamily="66" charset="-79"/>
-                <a:cs typeface="Apple Chancery" panose="03020702040506060504" pitchFamily="66" charset="-79"/>
-              </a:rPr>
-              <a:t>cell</a:t>
-            </a:r>
-            <a:r>
-              <a:rPr lang="zh-CN" altLang="en-US" sz="3033" i="1" dirty="0">
-                <a:latin typeface="Apple Chancery" panose="03020702040506060504" pitchFamily="66" charset="-79"/>
-                <a:cs typeface="Apple Chancery" panose="03020702040506060504" pitchFamily="66" charset="-79"/>
-              </a:rPr>
-              <a:t> </a:t>
-            </a:r>
-            <a:r>
-              <a:rPr lang="en-US" altLang="zh-CN" sz="3033" i="1" dirty="0">
-                <a:latin typeface="Apple Chancery" panose="03020702040506060504" pitchFamily="66" charset="-79"/>
-                <a:cs typeface="Apple Chancery" panose="03020702040506060504" pitchFamily="66" charset="-79"/>
-              </a:rPr>
-              <a:t>edit</a:t>
-            </a:r>
-            <a:r>
-              <a:rPr lang="zh-CN" altLang="en-US" sz="3033" i="1" dirty="0">
-                <a:latin typeface="Apple Chancery" panose="03020702040506060504" pitchFamily="66" charset="-79"/>
-                <a:cs typeface="Apple Chancery" panose="03020702040506060504" pitchFamily="66" charset="-79"/>
-              </a:rPr>
-              <a:t> </a:t>
-            </a:r>
-            <a:r>
-              <a:rPr lang="en-US" altLang="zh-CN" sz="3033" dirty="0">
-                <a:latin typeface="+mj-lt"/>
-                <a:cs typeface="Apple Chancery" panose="03020702040506060504" pitchFamily="66" charset="-79"/>
-              </a:rPr>
-              <a:t>,</a:t>
-            </a:r>
-            <a:r>
-              <a:rPr lang="zh-CN" altLang="en-US" sz="3033" dirty="0">
-                <a:latin typeface="+mj-lt"/>
-                <a:cs typeface="Apple Chancery" panose="03020702040506060504" pitchFamily="66" charset="-79"/>
-              </a:rPr>
-              <a:t> </a:t>
-            </a:r>
-            <a:r>
-              <a:rPr lang="en-US" altLang="zh-CN" sz="3033" dirty="0">
-                <a:latin typeface="+mj-lt"/>
-                <a:cs typeface="Apple Chancery" panose="03020702040506060504" pitchFamily="66" charset="-79"/>
-              </a:rPr>
-              <a:t>the</a:t>
-            </a:r>
-            <a:r>
-              <a:rPr lang="zh-CN" altLang="en-US" sz="3033" dirty="0">
-                <a:latin typeface="+mj-lt"/>
-                <a:cs typeface="Apple Chancery" panose="03020702040506060504" pitchFamily="66" charset="-79"/>
-              </a:rPr>
-              <a:t> </a:t>
-            </a:r>
-            <a:r>
-              <a:rPr lang="en-US" altLang="zh-CN" sz="3033" dirty="0">
-                <a:latin typeface="+mj-lt"/>
-                <a:cs typeface="Apple Chancery" panose="03020702040506060504" pitchFamily="66" charset="-79"/>
-              </a:rPr>
-              <a:t>missing</a:t>
-            </a:r>
-            <a:r>
-              <a:rPr lang="zh-CN" altLang="en-US" sz="3033" dirty="0">
-                <a:latin typeface="+mj-lt"/>
-                <a:cs typeface="Apple Chancery" panose="03020702040506060504" pitchFamily="66" charset="-79"/>
-              </a:rPr>
-              <a:t> </a:t>
-            </a:r>
-            <a:r>
-              <a:rPr lang="en-US" altLang="zh-CN" sz="3033" dirty="0">
-                <a:latin typeface="+mj-lt"/>
-                <a:cs typeface="Apple Chancery" panose="03020702040506060504" pitchFamily="66" charset="-79"/>
-              </a:rPr>
-              <a:t>retrospective</a:t>
-            </a:r>
-            <a:r>
-              <a:rPr lang="zh-CN" altLang="en-US" sz="3033" dirty="0">
-                <a:latin typeface="+mj-lt"/>
-                <a:cs typeface="Apple Chancery" panose="03020702040506060504" pitchFamily="66" charset="-79"/>
-              </a:rPr>
-              <a:t> </a:t>
-            </a:r>
-            <a:r>
-              <a:rPr lang="en-US" altLang="zh-CN" sz="3033" dirty="0">
-                <a:latin typeface="+mj-lt"/>
-                <a:cs typeface="Apple Chancery" panose="03020702040506060504" pitchFamily="66" charset="-79"/>
-              </a:rPr>
-              <a:t>information</a:t>
-            </a:r>
-            <a:r>
-              <a:rPr lang="zh-CN" altLang="en-US" sz="3033" dirty="0">
-                <a:latin typeface="+mj-lt"/>
-                <a:cs typeface="Apple Chancery" panose="03020702040506060504" pitchFamily="66" charset="-79"/>
-              </a:rPr>
-              <a:t> </a:t>
-            </a:r>
-            <a:r>
-              <a:rPr lang="en-US" altLang="zh-CN" sz="3033" dirty="0">
-                <a:latin typeface="+mj-lt"/>
-                <a:cs typeface="Apple Chancery" panose="03020702040506060504" pitchFamily="66" charset="-79"/>
-              </a:rPr>
-              <a:t>can</a:t>
-            </a:r>
-            <a:r>
-              <a:rPr lang="zh-CN" altLang="en-US" sz="3033" dirty="0">
-                <a:latin typeface="+mj-lt"/>
-                <a:cs typeface="Apple Chancery" panose="03020702040506060504" pitchFamily="66" charset="-79"/>
-              </a:rPr>
-              <a:t> </a:t>
-            </a:r>
-            <a:r>
-              <a:rPr lang="en-US" altLang="zh-CN" sz="3033" dirty="0">
-                <a:latin typeface="+mj-lt"/>
-                <a:cs typeface="Apple Chancery" panose="03020702040506060504" pitchFamily="66" charset="-79"/>
-              </a:rPr>
-              <a:t>be</a:t>
-            </a:r>
-            <a:r>
-              <a:rPr lang="zh-CN" altLang="en-US" sz="3033" dirty="0">
-                <a:latin typeface="+mj-lt"/>
-                <a:cs typeface="Apple Chancery" panose="03020702040506060504" pitchFamily="66" charset="-79"/>
-              </a:rPr>
-              <a:t> </a:t>
-            </a:r>
-            <a:r>
-              <a:rPr lang="en-US" altLang="zh-CN" sz="3033" dirty="0">
-                <a:latin typeface="+mj-lt"/>
-                <a:cs typeface="Apple Chancery" panose="03020702040506060504" pitchFamily="66" charset="-79"/>
-              </a:rPr>
-              <a:t>extracted</a:t>
-            </a:r>
-            <a:r>
-              <a:rPr lang="zh-CN" altLang="en-US" sz="3033" dirty="0">
-                <a:latin typeface="+mj-lt"/>
-                <a:cs typeface="Apple Chancery" panose="03020702040506060504" pitchFamily="66" charset="-79"/>
-              </a:rPr>
-              <a:t> </a:t>
-            </a:r>
-            <a:r>
-              <a:rPr lang="en-US" altLang="zh-CN" sz="3033" dirty="0">
-                <a:latin typeface="+mj-lt"/>
-                <a:cs typeface="Apple Chancery" panose="03020702040506060504" pitchFamily="66" charset="-79"/>
-              </a:rPr>
-              <a:t>from</a:t>
-            </a:r>
-            <a:r>
-              <a:rPr lang="zh-CN" altLang="en-US" sz="3033" dirty="0">
-                <a:latin typeface="+mj-lt"/>
-                <a:cs typeface="Apple Chancery" panose="03020702040506060504" pitchFamily="66" charset="-79"/>
-              </a:rPr>
-              <a:t> </a:t>
-            </a:r>
-            <a:r>
-              <a:rPr lang="en-US" altLang="zh-CN" sz="3033" dirty="0">
-                <a:latin typeface="+mj-lt"/>
-                <a:cs typeface="Apple Chancery" panose="03020702040506060504" pitchFamily="66" charset="-79"/>
-              </a:rPr>
-              <a:t>internal</a:t>
-            </a:r>
-            <a:r>
-              <a:rPr lang="zh-CN" altLang="en-US" sz="3033" dirty="0">
-                <a:latin typeface="+mj-lt"/>
-                <a:cs typeface="Apple Chancery" panose="03020702040506060504" pitchFamily="66" charset="-79"/>
-              </a:rPr>
-              <a:t> </a:t>
-            </a:r>
-            <a:r>
-              <a:rPr lang="en-US" altLang="zh-CN" sz="3033" dirty="0">
-                <a:latin typeface="+mj-lt"/>
-                <a:cs typeface="Apple Chancery" panose="03020702040506060504" pitchFamily="66" charset="-79"/>
-              </a:rPr>
-              <a:t>OpenRefine</a:t>
-            </a:r>
-            <a:r>
-              <a:rPr lang="zh-CN" altLang="en-US" sz="3033" dirty="0">
-                <a:latin typeface="+mj-lt"/>
-                <a:cs typeface="Apple Chancery" panose="03020702040506060504" pitchFamily="66" charset="-79"/>
-              </a:rPr>
-              <a:t> </a:t>
-            </a:r>
-            <a:r>
-              <a:rPr lang="en-US" altLang="zh-CN" sz="3033" dirty="0">
-                <a:latin typeface="+mj-lt"/>
-                <a:cs typeface="Apple Chancery" panose="03020702040506060504" pitchFamily="66" charset="-79"/>
-              </a:rPr>
-              <a:t>files</a:t>
-            </a:r>
-            <a:r>
-              <a:rPr lang="zh-CN" altLang="en-US" sz="3033" dirty="0">
-                <a:latin typeface="+mj-lt"/>
-                <a:cs typeface="Apple Chancery" panose="03020702040506060504" pitchFamily="66" charset="-79"/>
-              </a:rPr>
-              <a:t> </a:t>
-            </a:r>
-            <a:r>
-              <a:rPr lang="en-US" altLang="zh-CN" sz="3033" dirty="0">
-                <a:latin typeface="+mj-lt"/>
-                <a:cs typeface="Apple Chancery" panose="03020702040506060504" pitchFamily="66" charset="-79"/>
-              </a:rPr>
-              <a:t>and</a:t>
-            </a:r>
-            <a:r>
-              <a:rPr lang="zh-CN" altLang="en-US" sz="3033" dirty="0">
-                <a:latin typeface="+mj-lt"/>
-                <a:cs typeface="Apple Chancery" panose="03020702040506060504" pitchFamily="66" charset="-79"/>
-              </a:rPr>
-              <a:t> </a:t>
-            </a:r>
-            <a:r>
-              <a:rPr lang="en-US" altLang="zh-CN" sz="3033" dirty="0">
-                <a:latin typeface="+mj-lt"/>
-                <a:cs typeface="Apple Chancery" panose="03020702040506060504" pitchFamily="66" charset="-79"/>
-              </a:rPr>
-              <a:t>made</a:t>
-            </a:r>
-            <a:r>
-              <a:rPr lang="zh-CN" altLang="en-US" sz="3033" dirty="0">
-                <a:latin typeface="+mj-lt"/>
-                <a:cs typeface="Apple Chancery" panose="03020702040506060504" pitchFamily="66" charset="-79"/>
-              </a:rPr>
-              <a:t> </a:t>
-            </a:r>
-            <a:r>
-              <a:rPr lang="en-US" altLang="zh-CN" sz="3033" dirty="0">
-                <a:latin typeface="+mj-lt"/>
-                <a:cs typeface="Apple Chancery" panose="03020702040506060504" pitchFamily="66" charset="-79"/>
-              </a:rPr>
-              <a:t>it</a:t>
-            </a:r>
-            <a:r>
-              <a:rPr lang="zh-CN" altLang="en-US" sz="3033" dirty="0">
-                <a:latin typeface="+mj-lt"/>
-                <a:cs typeface="Apple Chancery" panose="03020702040506060504" pitchFamily="66" charset="-79"/>
-              </a:rPr>
-              <a:t> </a:t>
-            </a:r>
-            <a:r>
-              <a:rPr lang="en-US" altLang="zh-CN" sz="3033" dirty="0">
-                <a:latin typeface="+mj-lt"/>
-                <a:cs typeface="Apple Chancery" panose="03020702040506060504" pitchFamily="66" charset="-79"/>
-              </a:rPr>
-              <a:t>explicit</a:t>
-            </a:r>
-            <a:r>
-              <a:rPr lang="zh-CN" altLang="en-US" sz="3033" dirty="0">
-                <a:latin typeface="+mj-lt"/>
-                <a:cs typeface="Apple Chancery" panose="03020702040506060504" pitchFamily="66" charset="-79"/>
-              </a:rPr>
-              <a:t> </a:t>
-            </a:r>
-            <a:r>
-              <a:rPr lang="en-US" altLang="zh-CN" sz="3033" dirty="0">
-                <a:latin typeface="+mj-lt"/>
-                <a:cs typeface="Apple Chancery" panose="03020702040506060504" pitchFamily="66" charset="-79"/>
-              </a:rPr>
-              <a:t>by</a:t>
-            </a:r>
-            <a:r>
-              <a:rPr lang="zh-CN" altLang="en-US" sz="3033" dirty="0">
-                <a:latin typeface="+mj-lt"/>
-                <a:cs typeface="Apple Chancery" panose="03020702040506060504" pitchFamily="66" charset="-79"/>
-              </a:rPr>
-              <a:t> </a:t>
-            </a:r>
-            <a:r>
-              <a:rPr lang="en-US" altLang="zh-CN" sz="3033" b="1" dirty="0">
-                <a:latin typeface="+mj-lt"/>
-                <a:cs typeface="Apple Chancery" panose="03020702040506060504" pitchFamily="66" charset="-79"/>
-              </a:rPr>
-              <a:t>CLOPER</a:t>
-            </a:r>
-            <a:r>
-              <a:rPr lang="en-US" altLang="zh-CN" sz="3033" dirty="0">
-                <a:latin typeface="+mj-lt"/>
-                <a:cs typeface="Apple Chancery" panose="03020702040506060504" pitchFamily="66" charset="-79"/>
-              </a:rPr>
-              <a:t>.</a:t>
-            </a:r>
-            <a:r>
-              <a:rPr lang="zh-CN" altLang="en-US" sz="3033" dirty="0">
-                <a:latin typeface="+mj-lt"/>
-                <a:cs typeface="Apple Chancery" panose="03020702040506060504" pitchFamily="66" charset="-79"/>
-              </a:rPr>
-              <a:t> </a:t>
-            </a:r>
-            <a:endParaRPr lang="en-US" altLang="zh-CN" sz="3033" dirty="0">
-              <a:latin typeface="+mj-lt"/>
-              <a:cs typeface="Apple Chancery" panose="03020702040506060504" pitchFamily="66" charset="-79"/>
-            </a:endParaRPr>
-          </a:p>
-          <a:p>
-            <a:r>
-              <a:rPr lang="en-US" altLang="zh-CN" sz="3033" dirty="0">
-                <a:latin typeface="+mj-lt"/>
-                <a:cs typeface="Apple Chancery" panose="03020702040506060504" pitchFamily="66" charset="-79"/>
-              </a:rPr>
-              <a:t>After</a:t>
-            </a:r>
-            <a:r>
-              <a:rPr lang="zh-CN" altLang="en-US" sz="3033" dirty="0">
-                <a:latin typeface="+mj-lt"/>
-                <a:cs typeface="Apple Chancery" panose="03020702040506060504" pitchFamily="66" charset="-79"/>
-              </a:rPr>
-              <a:t> </a:t>
-            </a:r>
-            <a:r>
-              <a:rPr lang="en-US" altLang="zh-CN" sz="3033" dirty="0">
-                <a:latin typeface="+mj-lt"/>
-                <a:cs typeface="Apple Chancery" panose="03020702040506060504" pitchFamily="66" charset="-79"/>
-              </a:rPr>
-              <a:t>the</a:t>
-            </a:r>
-            <a:r>
-              <a:rPr lang="zh-CN" altLang="en-US" sz="3033" dirty="0">
-                <a:latin typeface="+mj-lt"/>
-                <a:cs typeface="Apple Chancery" panose="03020702040506060504" pitchFamily="66" charset="-79"/>
-              </a:rPr>
-              <a:t> </a:t>
-            </a:r>
-            <a:r>
-              <a:rPr lang="en-US" altLang="zh-CN" sz="3033" dirty="0">
-                <a:latin typeface="+mj-lt"/>
-                <a:cs typeface="Apple Chancery" panose="03020702040506060504" pitchFamily="66" charset="-79"/>
-              </a:rPr>
-              <a:t>user</a:t>
-            </a:r>
-            <a:r>
-              <a:rPr lang="zh-CN" altLang="en-US" sz="3033" dirty="0">
-                <a:latin typeface="+mj-lt"/>
-                <a:cs typeface="Apple Chancery" panose="03020702040506060504" pitchFamily="66" charset="-79"/>
-              </a:rPr>
-              <a:t> </a:t>
-            </a:r>
-            <a:r>
-              <a:rPr lang="en-US" altLang="zh-CN" sz="3033" dirty="0">
-                <a:latin typeface="+mj-lt"/>
-                <a:cs typeface="Apple Chancery" panose="03020702040506060504" pitchFamily="66" charset="-79"/>
-              </a:rPr>
-              <a:t>has</a:t>
-            </a:r>
-            <a:r>
-              <a:rPr lang="zh-CN" altLang="en-US" sz="3033" dirty="0">
-                <a:latin typeface="+mj-lt"/>
-                <a:cs typeface="Apple Chancery" panose="03020702040506060504" pitchFamily="66" charset="-79"/>
-              </a:rPr>
-              <a:t> </a:t>
-            </a:r>
-            <a:r>
-              <a:rPr lang="en-US" altLang="zh-CN" sz="3033" dirty="0">
-                <a:latin typeface="+mj-lt"/>
-                <a:cs typeface="Apple Chancery" panose="03020702040506060504" pitchFamily="66" charset="-79"/>
-              </a:rPr>
-              <a:t>finished</a:t>
-            </a:r>
-            <a:r>
-              <a:rPr lang="zh-CN" altLang="en-US" sz="3033" dirty="0">
-                <a:latin typeface="+mj-lt"/>
-                <a:cs typeface="Apple Chancery" panose="03020702040506060504" pitchFamily="66" charset="-79"/>
-              </a:rPr>
-              <a:t> </a:t>
-            </a:r>
-            <a:r>
-              <a:rPr lang="en-US" altLang="zh-CN" sz="3033" dirty="0">
-                <a:latin typeface="+mj-lt"/>
-                <a:cs typeface="Apple Chancery" panose="03020702040506060504" pitchFamily="66" charset="-79"/>
-              </a:rPr>
-              <a:t>the</a:t>
-            </a:r>
-            <a:r>
-              <a:rPr lang="zh-CN" altLang="en-US" sz="3033" dirty="0">
-                <a:latin typeface="+mj-lt"/>
-                <a:cs typeface="Apple Chancery" panose="03020702040506060504" pitchFamily="66" charset="-79"/>
-              </a:rPr>
-              <a:t> </a:t>
-            </a:r>
-            <a:r>
-              <a:rPr lang="en-US" altLang="zh-CN" sz="3033" dirty="0">
-                <a:latin typeface="+mj-lt"/>
-                <a:cs typeface="Apple Chancery" panose="03020702040506060504" pitchFamily="66" charset="-79"/>
-              </a:rPr>
-              <a:t>data</a:t>
-            </a:r>
-            <a:r>
-              <a:rPr lang="zh-CN" altLang="en-US" sz="3033" dirty="0">
-                <a:latin typeface="+mj-lt"/>
-                <a:cs typeface="Apple Chancery" panose="03020702040506060504" pitchFamily="66" charset="-79"/>
-              </a:rPr>
-              <a:t> </a:t>
-            </a:r>
-            <a:r>
-              <a:rPr lang="en-US" altLang="zh-CN" sz="3033" dirty="0">
-                <a:latin typeface="+mj-lt"/>
-                <a:cs typeface="Apple Chancery" panose="03020702040506060504" pitchFamily="66" charset="-79"/>
-              </a:rPr>
-              <a:t>cleaning</a:t>
-            </a:r>
-            <a:r>
-              <a:rPr lang="zh-CN" altLang="en-US" sz="3033" dirty="0">
-                <a:latin typeface="+mj-lt"/>
-                <a:cs typeface="Apple Chancery" panose="03020702040506060504" pitchFamily="66" charset="-79"/>
-              </a:rPr>
-              <a:t> </a:t>
-            </a:r>
-            <a:r>
-              <a:rPr lang="en-US" altLang="zh-CN" sz="3033" dirty="0">
-                <a:latin typeface="+mj-lt"/>
-                <a:cs typeface="Apple Chancery" panose="03020702040506060504" pitchFamily="66" charset="-79"/>
-              </a:rPr>
-              <a:t>procedure</a:t>
-            </a:r>
-            <a:r>
-              <a:rPr lang="zh-CN" altLang="en-US" sz="3033" dirty="0">
-                <a:latin typeface="+mj-lt"/>
-                <a:cs typeface="Apple Chancery" panose="03020702040506060504" pitchFamily="66" charset="-79"/>
-              </a:rPr>
-              <a:t> </a:t>
-            </a:r>
-            <a:r>
-              <a:rPr lang="en-US" altLang="zh-CN" sz="3033" dirty="0">
-                <a:latin typeface="+mj-lt"/>
-                <a:cs typeface="Apple Chancery" panose="03020702040506060504" pitchFamily="66" charset="-79"/>
-              </a:rPr>
-              <a:t>with</a:t>
-            </a:r>
-            <a:r>
-              <a:rPr lang="zh-CN" altLang="en-US" sz="3033" dirty="0">
-                <a:latin typeface="+mj-lt"/>
-                <a:cs typeface="Apple Chancery" panose="03020702040506060504" pitchFamily="66" charset="-79"/>
-              </a:rPr>
-              <a:t> </a:t>
-            </a:r>
-            <a:r>
-              <a:rPr lang="en-US" altLang="zh-CN" sz="3033" b="1" dirty="0">
-                <a:latin typeface="+mj-lt"/>
-                <a:cs typeface="Apple Chancery" panose="03020702040506060504" pitchFamily="66" charset="-79"/>
-              </a:rPr>
-              <a:t>CLOPER</a:t>
-            </a:r>
-            <a:r>
-              <a:rPr lang="en-US" altLang="zh-CN" sz="3033" dirty="0">
-                <a:latin typeface="+mj-lt"/>
-                <a:cs typeface="Apple Chancery" panose="03020702040506060504" pitchFamily="66" charset="-79"/>
-              </a:rPr>
-              <a:t>,</a:t>
-            </a:r>
-            <a:r>
-              <a:rPr lang="zh-CN" altLang="en-US" sz="3033" dirty="0">
-                <a:latin typeface="+mj-lt"/>
-                <a:cs typeface="Apple Chancery" panose="03020702040506060504" pitchFamily="66" charset="-79"/>
-              </a:rPr>
-              <a:t> </a:t>
-            </a:r>
-            <a:r>
-              <a:rPr lang="en-US" altLang="zh-CN" sz="3033" dirty="0">
-                <a:latin typeface="+mj-lt"/>
-                <a:cs typeface="Apple Chancery" panose="03020702040506060504" pitchFamily="66" charset="-79"/>
-              </a:rPr>
-              <a:t>an</a:t>
-            </a:r>
-            <a:r>
-              <a:rPr lang="zh-CN" altLang="en-US" sz="3033" dirty="0">
-                <a:latin typeface="+mj-lt"/>
-                <a:cs typeface="Apple Chancery" panose="03020702040506060504" pitchFamily="66" charset="-79"/>
-              </a:rPr>
-              <a:t> </a:t>
-            </a:r>
-            <a:r>
-              <a:rPr lang="en-US" altLang="zh-CN" sz="3033" dirty="0">
-                <a:latin typeface="+mj-lt"/>
-                <a:cs typeface="Apple Chancery" panose="03020702040506060504" pitchFamily="66" charset="-79"/>
-              </a:rPr>
-              <a:t>enhanced</a:t>
-            </a:r>
-            <a:r>
-              <a:rPr lang="zh-CN" altLang="en-US" sz="3033" dirty="0">
-                <a:latin typeface="+mj-lt"/>
-                <a:cs typeface="Apple Chancery" panose="03020702040506060504" pitchFamily="66" charset="-79"/>
-              </a:rPr>
-              <a:t> </a:t>
-            </a:r>
-            <a:r>
-              <a:rPr lang="en-US" altLang="zh-CN" sz="3033" dirty="0">
-                <a:latin typeface="+mj-lt"/>
-                <a:cs typeface="Apple Chancery" panose="03020702040506060504" pitchFamily="66" charset="-79"/>
-              </a:rPr>
-              <a:t>recipe</a:t>
-            </a:r>
-            <a:r>
-              <a:rPr lang="zh-CN" altLang="en-US" sz="3033" dirty="0">
-                <a:latin typeface="+mj-lt"/>
-                <a:cs typeface="Apple Chancery" panose="03020702040506060504" pitchFamily="66" charset="-79"/>
-              </a:rPr>
-              <a:t> </a:t>
-            </a:r>
-            <a:r>
-              <a:rPr lang="en-US" altLang="zh-CN" sz="3033" dirty="0">
-                <a:latin typeface="+mj-lt"/>
-                <a:cs typeface="Apple Chancery" panose="03020702040506060504" pitchFamily="66" charset="-79"/>
-              </a:rPr>
-              <a:t>would</a:t>
-            </a:r>
-            <a:r>
-              <a:rPr lang="zh-CN" altLang="en-US" sz="3033" dirty="0">
-                <a:latin typeface="+mj-lt"/>
-                <a:cs typeface="Apple Chancery" panose="03020702040506060504" pitchFamily="66" charset="-79"/>
-              </a:rPr>
-              <a:t> </a:t>
-            </a:r>
-            <a:r>
-              <a:rPr lang="en-US" altLang="zh-CN" sz="3033" dirty="0">
-                <a:latin typeface="+mj-lt"/>
-                <a:cs typeface="Apple Chancery" panose="03020702040506060504" pitchFamily="66" charset="-79"/>
-              </a:rPr>
-              <a:t>be</a:t>
-            </a:r>
-            <a:r>
-              <a:rPr lang="zh-CN" altLang="en-US" sz="3033" dirty="0">
-                <a:latin typeface="+mj-lt"/>
-                <a:cs typeface="Apple Chancery" panose="03020702040506060504" pitchFamily="66" charset="-79"/>
-              </a:rPr>
-              <a:t> </a:t>
-            </a:r>
-            <a:r>
-              <a:rPr lang="en-US" altLang="zh-CN" sz="3033" dirty="0">
-                <a:latin typeface="+mj-lt"/>
-                <a:cs typeface="Apple Chancery" panose="03020702040506060504" pitchFamily="66" charset="-79"/>
-              </a:rPr>
-              <a:t>generated,</a:t>
-            </a:r>
-            <a:r>
-              <a:rPr lang="zh-CN" altLang="en-US" sz="3033" dirty="0">
-                <a:latin typeface="+mj-lt"/>
-                <a:cs typeface="Apple Chancery" panose="03020702040506060504" pitchFamily="66" charset="-79"/>
-              </a:rPr>
-              <a:t> </a:t>
-            </a:r>
-            <a:r>
-              <a:rPr lang="en-US" altLang="zh-CN" sz="3033" dirty="0">
-                <a:latin typeface="+mj-lt"/>
-                <a:cs typeface="Apple Chancery" panose="03020702040506060504" pitchFamily="66" charset="-79"/>
-              </a:rPr>
-              <a:t>which</a:t>
-            </a:r>
-            <a:r>
-              <a:rPr lang="zh-CN" altLang="en-US" sz="3033" dirty="0">
-                <a:latin typeface="+mj-lt"/>
-                <a:cs typeface="Apple Chancery" panose="03020702040506060504" pitchFamily="66" charset="-79"/>
-              </a:rPr>
-              <a:t> </a:t>
-            </a:r>
-            <a:r>
-              <a:rPr lang="en-US" altLang="zh-CN" sz="3033" dirty="0">
-                <a:latin typeface="+mj-lt"/>
-                <a:cs typeface="Apple Chancery" panose="03020702040506060504" pitchFamily="66" charset="-79"/>
-              </a:rPr>
-              <a:t>has</a:t>
-            </a:r>
-            <a:r>
-              <a:rPr lang="zh-CN" altLang="en-US" sz="3033" dirty="0">
-                <a:latin typeface="+mj-lt"/>
-                <a:cs typeface="Apple Chancery" panose="03020702040506060504" pitchFamily="66" charset="-79"/>
-              </a:rPr>
-              <a:t> </a:t>
-            </a:r>
-            <a:r>
-              <a:rPr lang="en-US" altLang="zh-CN" sz="3033" dirty="0">
-                <a:latin typeface="+mj-lt"/>
-                <a:cs typeface="Apple Chancery" panose="03020702040506060504" pitchFamily="66" charset="-79"/>
-              </a:rPr>
-              <a:t>captured</a:t>
-            </a:r>
-            <a:r>
-              <a:rPr lang="zh-CN" altLang="en-US" sz="3033" dirty="0">
-                <a:latin typeface="+mj-lt"/>
-                <a:cs typeface="Apple Chancery" panose="03020702040506060504" pitchFamily="66" charset="-79"/>
-              </a:rPr>
-              <a:t> </a:t>
-            </a:r>
-            <a:r>
-              <a:rPr lang="en-US" altLang="zh-CN" sz="3033" dirty="0">
-                <a:latin typeface="+mj-lt"/>
-                <a:cs typeface="Apple Chancery" panose="03020702040506060504" pitchFamily="66" charset="-79"/>
-              </a:rPr>
-              <a:t>more</a:t>
-            </a:r>
-            <a:r>
-              <a:rPr lang="zh-CN" altLang="en-US" sz="3033" dirty="0">
-                <a:latin typeface="+mj-lt"/>
-                <a:cs typeface="Apple Chancery" panose="03020702040506060504" pitchFamily="66" charset="-79"/>
-              </a:rPr>
-              <a:t> </a:t>
-            </a:r>
-            <a:r>
-              <a:rPr lang="en-US" altLang="zh-CN" sz="3033" dirty="0">
-                <a:latin typeface="+mj-lt"/>
-                <a:cs typeface="Apple Chancery" panose="03020702040506060504" pitchFamily="66" charset="-79"/>
-              </a:rPr>
-              <a:t>necessary</a:t>
-            </a:r>
-            <a:r>
-              <a:rPr lang="zh-CN" altLang="en-US" sz="3033" dirty="0">
-                <a:latin typeface="+mj-lt"/>
-                <a:cs typeface="Apple Chancery" panose="03020702040506060504" pitchFamily="66" charset="-79"/>
-              </a:rPr>
-              <a:t> </a:t>
-            </a:r>
-            <a:r>
-              <a:rPr lang="en-US" altLang="zh-CN" sz="3033" dirty="0">
-                <a:latin typeface="+mj-lt"/>
-                <a:cs typeface="Apple Chancery" panose="03020702040506060504" pitchFamily="66" charset="-79"/>
-              </a:rPr>
-              <a:t>and</a:t>
-            </a:r>
-            <a:r>
-              <a:rPr lang="zh-CN" altLang="en-US" sz="3033" dirty="0">
-                <a:latin typeface="+mj-lt"/>
-                <a:cs typeface="Apple Chancery" panose="03020702040506060504" pitchFamily="66" charset="-79"/>
-              </a:rPr>
-              <a:t> </a:t>
-            </a:r>
-            <a:r>
-              <a:rPr lang="en-US" altLang="zh-CN" sz="3033" dirty="0">
-                <a:latin typeface="+mj-lt"/>
-                <a:cs typeface="Apple Chancery" panose="03020702040506060504" pitchFamily="66" charset="-79"/>
-              </a:rPr>
-              <a:t>complete</a:t>
-            </a:r>
-            <a:r>
-              <a:rPr lang="zh-CN" altLang="en-US" sz="3033" dirty="0">
-                <a:latin typeface="+mj-lt"/>
-                <a:cs typeface="Apple Chancery" panose="03020702040506060504" pitchFamily="66" charset="-79"/>
-              </a:rPr>
-              <a:t> </a:t>
-            </a:r>
-            <a:r>
-              <a:rPr lang="en-US" altLang="zh-CN" sz="3033" dirty="0">
-                <a:latin typeface="+mj-lt"/>
-                <a:cs typeface="Apple Chancery" panose="03020702040506060504" pitchFamily="66" charset="-79"/>
-              </a:rPr>
-              <a:t>provenance</a:t>
-            </a:r>
-            <a:r>
-              <a:rPr lang="zh-CN" altLang="en-US" sz="3033" dirty="0">
-                <a:latin typeface="+mj-lt"/>
-                <a:cs typeface="Apple Chancery" panose="03020702040506060504" pitchFamily="66" charset="-79"/>
-              </a:rPr>
-              <a:t> </a:t>
-            </a:r>
-            <a:r>
-              <a:rPr lang="en-US" altLang="zh-CN" sz="3033" dirty="0">
-                <a:latin typeface="+mj-lt"/>
-                <a:cs typeface="Apple Chancery" panose="03020702040506060504" pitchFamily="66" charset="-79"/>
-              </a:rPr>
-              <a:t>information</a:t>
-            </a:r>
-            <a:r>
-              <a:rPr lang="zh-CN" altLang="en-US" sz="3033" dirty="0">
-                <a:latin typeface="+mj-lt"/>
-                <a:cs typeface="Apple Chancery" panose="03020702040506060504" pitchFamily="66" charset="-79"/>
-              </a:rPr>
-              <a:t> </a:t>
-            </a:r>
-            <a:r>
-              <a:rPr lang="en-US" altLang="zh-CN" sz="3033" dirty="0">
-                <a:latin typeface="+mj-lt"/>
-                <a:cs typeface="Apple Chancery" panose="03020702040506060504" pitchFamily="66" charset="-79"/>
-              </a:rPr>
-              <a:t>compared</a:t>
-            </a:r>
-            <a:r>
-              <a:rPr lang="zh-CN" altLang="en-US" sz="3033" dirty="0">
-                <a:latin typeface="+mj-lt"/>
-                <a:cs typeface="Apple Chancery" panose="03020702040506060504" pitchFamily="66" charset="-79"/>
-              </a:rPr>
-              <a:t> </a:t>
-            </a:r>
-            <a:r>
-              <a:rPr lang="en-US" altLang="zh-CN" sz="3033" dirty="0">
-                <a:latin typeface="+mj-lt"/>
-                <a:cs typeface="Apple Chancery" panose="03020702040506060504" pitchFamily="66" charset="-79"/>
-              </a:rPr>
-              <a:t>with</a:t>
-            </a:r>
-            <a:r>
-              <a:rPr lang="zh-CN" altLang="en-US" sz="3033" dirty="0">
-                <a:latin typeface="+mj-lt"/>
-                <a:cs typeface="Apple Chancery" panose="03020702040506060504" pitchFamily="66" charset="-79"/>
-              </a:rPr>
-              <a:t> </a:t>
-            </a:r>
-            <a:r>
-              <a:rPr lang="en-US" altLang="zh-CN" sz="3033" dirty="0">
-                <a:latin typeface="+mj-lt"/>
-                <a:cs typeface="Apple Chancery" panose="03020702040506060504" pitchFamily="66" charset="-79"/>
-              </a:rPr>
-              <a:t>the</a:t>
-            </a:r>
-            <a:r>
-              <a:rPr lang="zh-CN" altLang="en-US" sz="3033" dirty="0">
-                <a:latin typeface="+mj-lt"/>
-                <a:cs typeface="Apple Chancery" panose="03020702040506060504" pitchFamily="66" charset="-79"/>
-              </a:rPr>
-              <a:t> </a:t>
-            </a:r>
-            <a:r>
-              <a:rPr lang="en-US" altLang="zh-CN" sz="3033" dirty="0">
-                <a:latin typeface="+mj-lt"/>
-                <a:cs typeface="Apple Chancery" panose="03020702040506060504" pitchFamily="66" charset="-79"/>
-              </a:rPr>
-              <a:t>native</a:t>
-            </a:r>
-            <a:r>
-              <a:rPr lang="zh-CN" altLang="en-US" sz="3033" dirty="0">
-                <a:latin typeface="+mj-lt"/>
-                <a:cs typeface="Apple Chancery" panose="03020702040506060504" pitchFamily="66" charset="-79"/>
-              </a:rPr>
-              <a:t> </a:t>
-            </a:r>
-            <a:r>
-              <a:rPr lang="en-US" altLang="zh-CN" sz="3033" dirty="0">
-                <a:latin typeface="+mj-lt"/>
-                <a:cs typeface="Apple Chancery" panose="03020702040506060504" pitchFamily="66" charset="-79"/>
-              </a:rPr>
-              <a:t>OpenRefine</a:t>
-            </a:r>
-            <a:r>
-              <a:rPr lang="zh-CN" altLang="en-US" sz="3033" dirty="0">
-                <a:latin typeface="+mj-lt"/>
-                <a:cs typeface="Apple Chancery" panose="03020702040506060504" pitchFamily="66" charset="-79"/>
-              </a:rPr>
-              <a:t> </a:t>
-            </a:r>
-            <a:r>
-              <a:rPr lang="en-US" altLang="zh-CN" sz="3033" dirty="0">
-                <a:latin typeface="+mj-lt"/>
-                <a:cs typeface="Apple Chancery" panose="03020702040506060504" pitchFamily="66" charset="-79"/>
-              </a:rPr>
-              <a:t>recipe.</a:t>
-            </a:r>
-            <a:endParaRPr lang="en-US" altLang="zh-CN" sz="3033" b="1" dirty="0"/>
-          </a:p>
-          <a:p>
-            <a:pPr marL="412737" indent="-412737"/>
-            <a:endParaRPr lang="en-US" altLang="zh-CN" sz="3033" b="1" dirty="0"/>
-          </a:p>
-          <a:p>
-            <a:pPr marL="412737" indent="-412737"/>
-            <a:r>
-              <a:rPr lang="en-US" altLang="zh-CN" sz="3033" b="1" dirty="0"/>
-              <a:t>ER3</a:t>
-            </a:r>
-            <a:r>
-              <a:rPr lang="zh-CN" altLang="en-US" sz="3033" b="1" dirty="0"/>
-              <a:t> </a:t>
-            </a:r>
-            <a:r>
-              <a:rPr lang="en-US" altLang="zh-CN" sz="3033" b="1" dirty="0"/>
-              <a:t>(Enhanced</a:t>
-            </a:r>
-            <a:r>
-              <a:rPr lang="zh-CN" altLang="en-US" sz="3033" b="1" dirty="0"/>
-              <a:t> </a:t>
-            </a:r>
-            <a:r>
-              <a:rPr lang="en-US" altLang="zh-CN" sz="3033" b="1" dirty="0"/>
-              <a:t>Recipe</a:t>
-            </a:r>
-            <a:r>
-              <a:rPr lang="zh-CN" altLang="en-US" sz="3033" b="1" dirty="0"/>
-              <a:t> </a:t>
-            </a:r>
-            <a:r>
-              <a:rPr lang="en-US" altLang="zh-CN" sz="3033" b="1" dirty="0"/>
-              <a:t>Re-Runner): </a:t>
-            </a:r>
-          </a:p>
-          <a:p>
-            <a:pPr marL="412737" indent="-412737"/>
-            <a:r>
-              <a:rPr lang="en-US" altLang="zh-CN" sz="3033" b="1" dirty="0"/>
-              <a:t>  ER3 </a:t>
-            </a:r>
-            <a:r>
-              <a:rPr lang="zh-CN" altLang="en-US" sz="3033" b="1" dirty="0"/>
-              <a:t> </a:t>
-            </a:r>
-            <a:r>
-              <a:rPr lang="en-US" altLang="zh-CN" sz="3033" dirty="0"/>
-              <a:t>is</a:t>
-            </a:r>
-            <a:r>
-              <a:rPr lang="zh-CN" altLang="en-US" sz="3033" dirty="0"/>
-              <a:t> </a:t>
-            </a:r>
-            <a:r>
-              <a:rPr lang="en-US" altLang="zh-CN" sz="3033" dirty="0"/>
-              <a:t>developed</a:t>
-            </a:r>
-            <a:r>
-              <a:rPr lang="zh-CN" altLang="en-US" sz="3033" dirty="0"/>
-              <a:t> </a:t>
-            </a:r>
-            <a:r>
-              <a:rPr lang="en-US" altLang="zh-CN" sz="3033" dirty="0"/>
-              <a:t>to</a:t>
-            </a:r>
-            <a:r>
-              <a:rPr lang="zh-CN" altLang="en-US" sz="3033" dirty="0"/>
-              <a:t> </a:t>
-            </a:r>
-            <a:r>
-              <a:rPr lang="en-US" altLang="zh-CN" sz="3033" dirty="0"/>
-              <a:t>verify</a:t>
-            </a:r>
-            <a:r>
-              <a:rPr lang="zh-CN" altLang="en-US" sz="3033" dirty="0"/>
-              <a:t> </a:t>
-            </a:r>
-            <a:r>
-              <a:rPr lang="en-US" altLang="zh-CN" sz="3033" dirty="0"/>
-              <a:t>the</a:t>
-            </a:r>
-            <a:r>
-              <a:rPr lang="zh-CN" altLang="en-US" sz="3033" dirty="0"/>
-              <a:t> </a:t>
-            </a:r>
-            <a:r>
-              <a:rPr lang="en-US" altLang="zh-CN" sz="3033" dirty="0"/>
-              <a:t>reusability</a:t>
-            </a:r>
-            <a:r>
-              <a:rPr lang="zh-CN" altLang="en-US" sz="3033" dirty="0"/>
-              <a:t> </a:t>
-            </a:r>
-            <a:r>
-              <a:rPr lang="en-US" altLang="zh-CN" sz="3033" dirty="0"/>
-              <a:t>of</a:t>
-            </a:r>
-            <a:r>
-              <a:rPr lang="zh-CN" altLang="en-US" sz="3033" dirty="0"/>
-              <a:t> </a:t>
-            </a:r>
-            <a:r>
-              <a:rPr lang="en-US" altLang="zh-CN" sz="3033" dirty="0"/>
-              <a:t>the</a:t>
-            </a:r>
-            <a:r>
-              <a:rPr lang="zh-Hans" altLang="en-US" sz="3033" dirty="0"/>
-              <a:t> </a:t>
-            </a:r>
-            <a:r>
-              <a:rPr lang="en-US" altLang="zh-CN" sz="3033" dirty="0"/>
-              <a:t>enhanced</a:t>
-            </a:r>
-            <a:r>
-              <a:rPr lang="zh-CN" altLang="en-US" sz="3033" dirty="0"/>
-              <a:t> </a:t>
-            </a:r>
-            <a:r>
-              <a:rPr lang="en-US" altLang="zh-CN" sz="3033" dirty="0"/>
-              <a:t>recipe</a:t>
-            </a:r>
-            <a:r>
-              <a:rPr lang="zh-CN" altLang="en-US" sz="3033" dirty="0"/>
-              <a:t> </a:t>
-            </a:r>
-            <a:r>
-              <a:rPr lang="en-US" altLang="zh-CN" sz="3033" dirty="0"/>
-              <a:t>generated</a:t>
-            </a:r>
-            <a:r>
-              <a:rPr lang="zh-CN" altLang="en-US" sz="3033" dirty="0"/>
-              <a:t> </a:t>
-            </a:r>
-            <a:r>
-              <a:rPr lang="en-US" altLang="zh-CN" sz="3033" dirty="0"/>
-              <a:t>by</a:t>
-            </a:r>
-            <a:r>
-              <a:rPr lang="zh-CN" altLang="en-US" sz="3033" dirty="0"/>
-              <a:t> </a:t>
-            </a:r>
-            <a:r>
-              <a:rPr lang="en-US" altLang="zh-CN" sz="3033" b="1" dirty="0"/>
-              <a:t>CLOPER</a:t>
-            </a:r>
-            <a:r>
-              <a:rPr lang="en-US" altLang="zh-CN" sz="3033" dirty="0"/>
-              <a:t>.</a:t>
-            </a:r>
-          </a:p>
-          <a:p>
-            <a:pPr marL="412737" indent="-412737"/>
-            <a:r>
-              <a:rPr lang="en-US" altLang="zh-CN" sz="3033" dirty="0"/>
-              <a:t>- Input messy dataset, enhanced recipe to </a:t>
-            </a:r>
-            <a:r>
-              <a:rPr lang="en-US" altLang="zh-CN" sz="3033" b="1" dirty="0"/>
-              <a:t>ER3</a:t>
-            </a:r>
-            <a:r>
-              <a:rPr lang="en-US" altLang="zh-CN" sz="3033" dirty="0"/>
-              <a:t>. </a:t>
-            </a:r>
-          </a:p>
-          <a:p>
-            <a:pPr marL="412737" indent="-412737"/>
-            <a:r>
-              <a:rPr lang="en-US" altLang="zh-CN" sz="3033" dirty="0"/>
-              <a:t>- </a:t>
-            </a:r>
-            <a:r>
-              <a:rPr lang="en-US" altLang="zh-CN" sz="3033" b="1" dirty="0"/>
-              <a:t>ER3 </a:t>
-            </a:r>
-            <a:r>
-              <a:rPr lang="en-US" altLang="zh-CN" sz="3033" dirty="0"/>
-              <a:t>will activate OpenRefine server and execute the clean dataset which is same as the output clean dataset from </a:t>
-            </a:r>
-            <a:r>
-              <a:rPr lang="en-US" altLang="zh-CN" sz="3033" b="1" dirty="0"/>
-              <a:t>CLOPER</a:t>
-            </a:r>
-            <a:r>
-              <a:rPr lang="en-US" altLang="zh-CN" sz="3033" dirty="0"/>
-              <a:t>.</a:t>
-            </a:r>
-            <a:endParaRPr lang="en-US" sz="3033" dirty="0"/>
-          </a:p>
-          <a:p>
-            <a:pPr marL="412737" indent="-412737"/>
-            <a:endParaRPr lang="en-US" sz="3033" dirty="0"/>
-          </a:p>
-          <a:p>
-            <a:pPr marL="412737" indent="-412737"/>
-            <a:endParaRPr lang="en-US" sz="3033" dirty="0"/>
-          </a:p>
-          <a:p>
-            <a:pPr marL="412737" indent="-412737"/>
-            <a:endParaRPr lang="en-US" sz="3033" dirty="0"/>
-          </a:p>
-          <a:p>
-            <a:pPr marL="412737" indent="-412737"/>
-            <a:endParaRPr lang="en-US" sz="3033" dirty="0"/>
-          </a:p>
-          <a:p>
-            <a:pPr marL="412737" indent="-412737"/>
-            <a:endParaRPr lang="en-US" sz="3033" dirty="0"/>
-          </a:p>
-          <a:p>
-            <a:pPr marL="412737" indent="-412737"/>
-            <a:endParaRPr lang="en-US" sz="3033" dirty="0"/>
-          </a:p>
-          <a:p>
-            <a:pPr marL="412737" indent="-412737"/>
-            <a:endParaRPr lang="en-US" sz="3033" dirty="0"/>
-          </a:p>
-          <a:p>
-            <a:pPr marL="412737" indent="-412737"/>
-            <a:endParaRPr lang="en-US" sz="3033" dirty="0"/>
+            <a:endParaRPr lang="en-US" sz="3200" dirty="0"/>
           </a:p>
         </p:txBody>
       </p:sp>
@@ -10178,10 +8173,10 @@
       </p:pic>
       <p:pic>
         <p:nvPicPr>
-          <p:cNvPr id="9" name="Picture 8">
+          <p:cNvPr id="52" name="Picture 51">
             <a:extLst>
               <a:ext uri="{FF2B5EF4-FFF2-40B4-BE49-F238E27FC236}">
-                <a16:creationId xmlns:a16="http://schemas.microsoft.com/office/drawing/2014/main" id="{FA68A000-877F-D74F-B0E2-190EC8D5A060}"/>
+                <a16:creationId xmlns:a16="http://schemas.microsoft.com/office/drawing/2014/main" id="{6DBF1891-0EA2-C446-89F4-2AA34075DBC6}"/>
               </a:ext>
             </a:extLst>
           </p:cNvPr>
@@ -10198,38 +8193,8 @@
         </p:blipFill>
         <p:spPr>
           <a:xfrm>
-            <a:off x="12204696" y="5928985"/>
-            <a:ext cx="6209771" cy="5563668"/>
-          </a:xfrm>
-          <a:prstGeom prst="rect">
-            <a:avLst/>
-          </a:prstGeom>
-        </p:spPr>
-      </p:pic>
-      <p:pic>
-        <p:nvPicPr>
-          <p:cNvPr id="52" name="Picture 51">
-            <a:extLst>
-              <a:ext uri="{FF2B5EF4-FFF2-40B4-BE49-F238E27FC236}">
-                <a16:creationId xmlns:a16="http://schemas.microsoft.com/office/drawing/2014/main" id="{6DBF1891-0EA2-C446-89F4-2AA34075DBC6}"/>
-              </a:ext>
-            </a:extLst>
-          </p:cNvPr>
-          <p:cNvPicPr>
-            <a:picLocks noChangeAspect="1"/>
-          </p:cNvPicPr>
-          <p:nvPr/>
-        </p:nvPicPr>
-        <p:blipFill>
-          <a:blip r:embed="rId5"/>
-          <a:stretch>
-            <a:fillRect/>
-          </a:stretch>
-        </p:blipFill>
-        <p:spPr>
-          <a:xfrm>
-            <a:off x="1014173" y="12395003"/>
-            <a:ext cx="7561973" cy="6121597"/>
+            <a:off x="609600" y="12395003"/>
+            <a:ext cx="8458199" cy="6121597"/>
           </a:xfrm>
           <a:prstGeom prst="rect">
             <a:avLst/>
@@ -10252,8 +8217,8 @@
         </p:nvSpPr>
         <p:spPr bwMode="auto">
           <a:xfrm>
-            <a:off x="228600" y="21912536"/>
-            <a:ext cx="9525000" cy="13409067"/>
+            <a:off x="266700" y="22277220"/>
+            <a:ext cx="9525000" cy="12565975"/>
           </a:xfrm>
           <a:prstGeom prst="rect">
             <a:avLst/>
@@ -10303,12 +8268,10 @@
             </a:endParaRPr>
           </a:p>
           <a:p>
-            <a:pPr marL="495285" indent="-495285">
+            <a:pPr>
               <a:spcBef>
                 <a:spcPct val="50000"/>
               </a:spcBef>
-              <a:buFontTx/>
-              <a:buChar char="-"/>
             </a:pPr>
             <a:r>
               <a:rPr lang="en-US" altLang="zh-CN" sz="3200" b="1" dirty="0">
@@ -10316,7 +8279,7 @@
                   <a:srgbClr val="CC3200"/>
                 </a:solidFill>
               </a:rPr>
-              <a:t>Modeling. </a:t>
+              <a:t>Modeling.  </a:t>
             </a:r>
             <a:r>
               <a:rPr lang="en-US" altLang="zh-CN" sz="3200" dirty="0" err="1"/>
@@ -10336,12 +8299,10 @@
             </a:r>
           </a:p>
           <a:p>
-            <a:pPr marL="495285" indent="-495285">
+            <a:pPr>
               <a:spcBef>
                 <a:spcPct val="50000"/>
               </a:spcBef>
-              <a:buFontTx/>
-              <a:buChar char="-"/>
             </a:pPr>
             <a:r>
               <a:rPr lang="en-US" altLang="zh-CN" sz="3200" b="1" dirty="0">
@@ -10353,7 +8314,7 @@
             </a:r>
             <a:r>
               <a:rPr lang="zh-CN" altLang="en-US" sz="3200" dirty="0"/>
-              <a:t> </a:t>
+              <a:t>  </a:t>
             </a:r>
             <a:r>
               <a:rPr lang="en-US" altLang="zh-CN" sz="3200" dirty="0"/>
@@ -10378,12 +8339,10 @@
             <a:endParaRPr lang="en-AU" altLang="zh-CN" sz="3200" dirty="0"/>
           </a:p>
           <a:p>
-            <a:pPr marL="495285" indent="-495285">
+            <a:pPr>
               <a:spcBef>
                 <a:spcPct val="50000"/>
               </a:spcBef>
-              <a:buFontTx/>
-              <a:buChar char="-"/>
             </a:pPr>
             <a:r>
               <a:rPr lang="en-US" altLang="zh-CN" sz="3200" b="1" dirty="0">
@@ -10391,19 +8350,11 @@
                   <a:srgbClr val="CC3200"/>
                 </a:solidFill>
               </a:rPr>
-              <a:t>Transparency. </a:t>
+              <a:t>Transparency.  </a:t>
             </a:r>
             <a:r>
               <a:rPr lang="en-US" altLang="zh-CN" sz="3200" dirty="0"/>
-              <a:t>Displaying lists of operations and the ability to revisit past states one at a time provide limited means for interrogating how data was cleaned. We aim to make data cleaning workflows and their products easy to </a:t>
-            </a:r>
-            <a:r>
-              <a:rPr lang="en-US" altLang="zh-CN" sz="3200"/>
-              <a:t>query — prospectively </a:t>
-            </a:r>
-            <a:r>
-              <a:rPr lang="en-US" altLang="zh-CN" sz="3200" dirty="0"/>
-              <a:t>and retrospectively — to answer any questions researchers may have about the provenance of cleaned data sets.</a:t>
+              <a:t>Displaying lists of operations and the ability to revisit past states one at a time provide limited means for interrogating how data was cleaned. We aim to make data cleaning workflows and their products easy to query — prospectively and retrospectively — to answer any questions researchers may have about the provenance of cleaned data sets.</a:t>
             </a:r>
           </a:p>
         </p:txBody>
@@ -10561,7 +8512,7 @@
           <p:nvPr/>
         </p:nvPicPr>
         <p:blipFill>
-          <a:blip r:embed="rId6">
+          <a:blip r:embed="rId5">
             <a:extLst>
               <a:ext uri="{28A0092B-C50C-407E-A947-70E740481C1C}">
                 <a14:useLocalDpi xmlns:a14="http://schemas.microsoft.com/office/drawing/2010/main" val="0"/>
@@ -10608,7 +8559,7 @@
           <p:nvPr/>
         </p:nvPicPr>
         <p:blipFill>
-          <a:blip r:embed="rId7">
+          <a:blip r:embed="rId6">
             <a:extLst>
               <a:ext uri="{28A0092B-C50C-407E-A947-70E740481C1C}">
                 <a14:useLocalDpi xmlns:a14="http://schemas.microsoft.com/office/drawing/2010/main" val="0"/>
@@ -10806,7 +8757,7 @@
             </a:r>
             <a:r>
               <a:rPr lang="en-US" altLang="zh-CN" sz="3033" dirty="0">
-                <a:hlinkClick r:id="rId8"/>
+                <a:hlinkClick r:id="rId7"/>
               </a:rPr>
               <a:t>http://openrefine.org/</a:t>
             </a:r>
@@ -10830,7 +8781,7 @@
             </a:r>
             <a:r>
               <a:rPr lang="en-US" altLang="zh-CN" sz="3033" dirty="0">
-                <a:hlinkClick r:id="rId9"/>
+                <a:hlinkClick r:id="rId8"/>
               </a:rPr>
               <a:t>https://github.com/opencultureconsulting/openrefine-client/</a:t>
             </a:r>
@@ -10878,7 +8829,7 @@
             </a:r>
             <a:r>
               <a:rPr lang="en-US" altLang="zh-CN" sz="3033" dirty="0">
-                <a:hlinkClick r:id="rId10"/>
+                <a:hlinkClick r:id="rId9"/>
               </a:rPr>
               <a:t>http://menus.nypl.org/data</a:t>
             </a:r>
@@ -10933,387 +8884,6 @@
           </a:p>
           <a:p>
             <a:pPr algn="ctr">
-              <a:spcBef>
-                <a:spcPct val="50000"/>
-              </a:spcBef>
-            </a:pPr>
-            <a:endParaRPr lang="en-US" altLang="zh-CN" sz="3033" dirty="0"/>
-          </a:p>
-        </p:txBody>
-      </p:sp>
-      <p:sp>
-        <p:nvSpPr>
-          <p:cNvPr id="19" name="Rectangle 33">
-            <a:extLst>
-              <a:ext uri="{FF2B5EF4-FFF2-40B4-BE49-F238E27FC236}">
-                <a16:creationId xmlns:a16="http://schemas.microsoft.com/office/drawing/2014/main" id="{57C80CEA-5FF6-A64A-BB4A-8F450EE02835}"/>
-              </a:ext>
-            </a:extLst>
-          </p:cNvPr>
-          <p:cNvSpPr>
-            <a:spLocks noChangeArrowheads="1"/>
-          </p:cNvSpPr>
-          <p:nvPr/>
-        </p:nvSpPr>
-        <p:spPr bwMode="auto">
-          <a:xfrm>
-            <a:off x="16992600" y="15568105"/>
-            <a:ext cx="9639416" cy="3332020"/>
-          </a:xfrm>
-          <a:prstGeom prst="rect">
-            <a:avLst/>
-          </a:prstGeom>
-          <a:solidFill>
-            <a:schemeClr val="bg1"/>
-          </a:solidFill>
-          <a:ln>
-            <a:solidFill>
-              <a:schemeClr val="accent1"/>
-            </a:solidFill>
-          </a:ln>
-          <a:extLst>
-            <a:ext uri="{91240B29-F687-4f45-9708-019B960494DF}">
-              <a14:hiddenLine xmlns:mc="http://schemas.openxmlformats.org/markup-compatibility/2006" xmlns:mv="urn:schemas-microsoft-com:mac:vml" xmlns:a14="http://schemas.microsoft.com/office/drawing/2010/main" xmlns="" w="9525">
-                <a:solidFill>
-                  <a:srgbClr val="000000"/>
-                </a:solidFill>
-                <a:miter lim="800000"/>
-                <a:headEnd/>
-                <a:tailEnd/>
-              </a14:hiddenLine>
-            </a:ext>
-          </a:extLst>
-        </p:spPr>
-        <p:txBody>
-          <a:bodyPr lIns="390000" tIns="390000" rIns="390000" bIns="390000"/>
-          <a:lstStyle/>
-          <a:p>
-            <a:pPr>
-              <a:spcBef>
-                <a:spcPct val="50000"/>
-              </a:spcBef>
-            </a:pPr>
-            <a:r>
-              <a:rPr lang="en-US" altLang="zh-CN" sz="4333" b="1" dirty="0">
-                <a:solidFill>
-                  <a:srgbClr val="CC3300"/>
-                </a:solidFill>
-              </a:rPr>
-              <a:t>Approach</a:t>
-            </a:r>
-          </a:p>
-          <a:p>
-            <a:pPr>
-              <a:spcBef>
-                <a:spcPct val="50000"/>
-              </a:spcBef>
-            </a:pPr>
-            <a:r>
-              <a:rPr lang="en-US" altLang="zh-CN" sz="3033" dirty="0">
-                <a:latin typeface="+mj-lt"/>
-              </a:rPr>
-              <a:t>We</a:t>
-            </a:r>
-            <a:r>
-              <a:rPr lang="zh-CN" altLang="en-US" sz="3033" dirty="0">
-                <a:latin typeface="+mj-lt"/>
-              </a:rPr>
-              <a:t> </a:t>
-            </a:r>
-            <a:r>
-              <a:rPr lang="en-US" altLang="zh-CN" sz="3033" dirty="0">
-                <a:latin typeface="+mj-lt"/>
-              </a:rPr>
-              <a:t>propose</a:t>
-            </a:r>
-            <a:r>
-              <a:rPr lang="zh-CN" altLang="en-US" sz="3033" dirty="0">
-                <a:latin typeface="+mj-lt"/>
-              </a:rPr>
-              <a:t> </a:t>
-            </a:r>
-            <a:r>
-              <a:rPr lang="en-US" altLang="zh-CN" sz="3033" dirty="0">
-                <a:latin typeface="+mj-lt"/>
-              </a:rPr>
-              <a:t>to</a:t>
-            </a:r>
-            <a:r>
-              <a:rPr lang="zh-CN" altLang="en-US" sz="3033" dirty="0">
-                <a:latin typeface="+mj-lt"/>
-              </a:rPr>
-              <a:t> </a:t>
-            </a:r>
-            <a:r>
-              <a:rPr lang="en-US" altLang="zh-CN" sz="3033" b="1" i="1" dirty="0">
-                <a:latin typeface="+mj-lt"/>
-              </a:rPr>
-              <a:t>complete</a:t>
-            </a:r>
-            <a:r>
-              <a:rPr lang="zh-CN" altLang="en-US" sz="3033" b="1" i="1" dirty="0">
-                <a:latin typeface="+mj-lt"/>
-              </a:rPr>
-              <a:t> </a:t>
-            </a:r>
-            <a:r>
-              <a:rPr lang="en-US" altLang="zh-CN" sz="3033" b="1" i="1" dirty="0">
-                <a:latin typeface="+mj-lt"/>
-              </a:rPr>
-              <a:t>the</a:t>
-            </a:r>
-            <a:r>
-              <a:rPr lang="zh-CN" altLang="en-US" sz="3033" b="1" i="1" dirty="0">
-                <a:latin typeface="+mj-lt"/>
-              </a:rPr>
-              <a:t> </a:t>
-            </a:r>
-            <a:r>
-              <a:rPr lang="en-US" altLang="zh-CN" sz="3033" b="1" i="1" dirty="0">
-                <a:latin typeface="+mj-lt"/>
-              </a:rPr>
-              <a:t>missing</a:t>
-            </a:r>
-            <a:r>
-              <a:rPr lang="zh-CN" altLang="en-US" sz="3033" b="1" i="1" dirty="0">
-                <a:latin typeface="+mj-lt"/>
-              </a:rPr>
-              <a:t> </a:t>
-            </a:r>
-            <a:r>
-              <a:rPr lang="en-US" altLang="zh-CN" sz="3033" b="1" i="1" dirty="0">
-                <a:latin typeface="+mj-lt"/>
-              </a:rPr>
-              <a:t>information</a:t>
-            </a:r>
-            <a:r>
-              <a:rPr lang="zh-CN" altLang="en-US" sz="3033" b="1" i="1" dirty="0">
-                <a:latin typeface="+mj-lt"/>
-              </a:rPr>
-              <a:t> </a:t>
-            </a:r>
-            <a:r>
-              <a:rPr lang="en-US" altLang="zh-CN" sz="3033" dirty="0">
-                <a:latin typeface="+mj-lt"/>
-              </a:rPr>
-              <a:t>by</a:t>
-            </a:r>
-            <a:r>
-              <a:rPr lang="zh-CN" altLang="en-US" sz="3033" dirty="0">
-                <a:latin typeface="+mj-lt"/>
-              </a:rPr>
-              <a:t> </a:t>
-            </a:r>
-            <a:r>
-              <a:rPr lang="en-US" altLang="zh-CN" sz="3033" dirty="0">
-                <a:latin typeface="+mj-lt"/>
-              </a:rPr>
-              <a:t>capturing</a:t>
-            </a:r>
-            <a:r>
-              <a:rPr lang="zh-CN" altLang="en-US" sz="3033" dirty="0">
-                <a:latin typeface="+mj-lt"/>
-              </a:rPr>
-              <a:t> </a:t>
-            </a:r>
-            <a:r>
-              <a:rPr lang="en-US" altLang="zh-CN" sz="3033" dirty="0">
-                <a:latin typeface="+mj-lt"/>
-              </a:rPr>
-              <a:t>names</a:t>
-            </a:r>
-            <a:r>
-              <a:rPr lang="zh-CN" altLang="en-US" sz="3033" dirty="0">
-                <a:latin typeface="+mj-lt"/>
-              </a:rPr>
-              <a:t> </a:t>
-            </a:r>
-            <a:r>
-              <a:rPr lang="en-US" altLang="zh-CN" sz="3033" dirty="0">
-                <a:latin typeface="+mj-lt"/>
-              </a:rPr>
-              <a:t>and</a:t>
-            </a:r>
-            <a:r>
-              <a:rPr lang="zh-CN" altLang="en-US" sz="3033" dirty="0">
-                <a:latin typeface="+mj-lt"/>
-              </a:rPr>
-              <a:t> </a:t>
-            </a:r>
-            <a:r>
-              <a:rPr lang="en-US" altLang="zh-CN" sz="3033" dirty="0">
-                <a:latin typeface="+mj-lt"/>
-              </a:rPr>
-              <a:t>parameters</a:t>
-            </a:r>
-            <a:r>
-              <a:rPr lang="zh-CN" altLang="en-US" sz="3033" dirty="0">
-                <a:latin typeface="+mj-lt"/>
-              </a:rPr>
-              <a:t> </a:t>
-            </a:r>
-            <a:r>
-              <a:rPr lang="en-US" altLang="zh-CN" sz="3033" dirty="0">
-                <a:latin typeface="+mj-lt"/>
-              </a:rPr>
-              <a:t>of</a:t>
-            </a:r>
-            <a:r>
-              <a:rPr lang="zh-CN" altLang="en-US" sz="3033" dirty="0">
-                <a:latin typeface="+mj-lt"/>
-              </a:rPr>
-              <a:t> </a:t>
-            </a:r>
-            <a:r>
-              <a:rPr lang="en-US" altLang="zh-CN" sz="3033" dirty="0">
-                <a:latin typeface="+mj-lt"/>
-              </a:rPr>
-              <a:t>user-invoked</a:t>
-            </a:r>
-            <a:r>
-              <a:rPr lang="zh-CN" altLang="en-US" sz="3033" dirty="0">
-                <a:latin typeface="+mj-lt"/>
-              </a:rPr>
-              <a:t> </a:t>
-            </a:r>
-            <a:r>
-              <a:rPr lang="en-US" altLang="zh-CN" sz="3033" dirty="0">
-                <a:latin typeface="+mj-lt"/>
-              </a:rPr>
-              <a:t>functions,</a:t>
-            </a:r>
-            <a:r>
-              <a:rPr lang="zh-CN" altLang="en-US" sz="3033" dirty="0">
-                <a:latin typeface="+mj-lt"/>
-              </a:rPr>
-              <a:t> </a:t>
-            </a:r>
-            <a:r>
-              <a:rPr lang="en-US" altLang="zh-CN" sz="3033" dirty="0">
-                <a:latin typeface="+mj-lt"/>
-              </a:rPr>
-              <a:t>and</a:t>
-            </a:r>
-            <a:r>
-              <a:rPr lang="zh-CN" altLang="en-US" sz="3033" dirty="0">
-                <a:latin typeface="+mj-lt"/>
-              </a:rPr>
-              <a:t> </a:t>
-            </a:r>
-            <a:r>
-              <a:rPr lang="en-US" altLang="zh-CN" sz="3033" dirty="0">
-                <a:latin typeface="+mj-lt"/>
-              </a:rPr>
-              <a:t>by</a:t>
-            </a:r>
-            <a:r>
-              <a:rPr lang="zh-CN" altLang="en-US" sz="3033" dirty="0">
-                <a:latin typeface="+mj-lt"/>
-              </a:rPr>
-              <a:t> </a:t>
-            </a:r>
-            <a:r>
-              <a:rPr lang="en-US" altLang="zh-CN" sz="3033" dirty="0">
-                <a:latin typeface="+mj-lt"/>
-              </a:rPr>
-              <a:t>exposing</a:t>
-            </a:r>
-            <a:r>
-              <a:rPr lang="zh-CN" altLang="en-US" sz="3033" dirty="0">
-                <a:latin typeface="+mj-lt"/>
-              </a:rPr>
-              <a:t> </a:t>
-            </a:r>
-            <a:r>
-              <a:rPr lang="en-US" altLang="zh-CN" sz="3033" dirty="0">
-                <a:latin typeface="+mj-lt"/>
-              </a:rPr>
-              <a:t>retrospective</a:t>
-            </a:r>
-            <a:r>
-              <a:rPr lang="zh-CN" altLang="en-US" sz="3033" dirty="0">
-                <a:latin typeface="+mj-lt"/>
-              </a:rPr>
-              <a:t> </a:t>
-            </a:r>
-            <a:r>
-              <a:rPr lang="en-US" altLang="zh-CN" sz="3033" dirty="0">
-                <a:latin typeface="+mj-lt"/>
-              </a:rPr>
-              <a:t>provenance</a:t>
-            </a:r>
-            <a:r>
-              <a:rPr lang="zh-CN" altLang="en-US" sz="3033" dirty="0">
-                <a:latin typeface="+mj-lt"/>
-              </a:rPr>
-              <a:t> </a:t>
-            </a:r>
-            <a:r>
-              <a:rPr lang="en-US" altLang="zh-CN" sz="3033" dirty="0">
-                <a:latin typeface="+mj-lt"/>
-              </a:rPr>
-              <a:t>hidden</a:t>
-            </a:r>
-            <a:r>
-              <a:rPr lang="zh-CN" altLang="en-US" sz="3033" dirty="0">
-                <a:latin typeface="+mj-lt"/>
-              </a:rPr>
-              <a:t> </a:t>
-            </a:r>
-            <a:r>
-              <a:rPr lang="en-US" altLang="zh-CN" sz="3033" dirty="0">
-                <a:latin typeface="+mj-lt"/>
-              </a:rPr>
-              <a:t>in</a:t>
-            </a:r>
-            <a:r>
-              <a:rPr lang="zh-CN" altLang="en-US" sz="3033" dirty="0">
-                <a:latin typeface="+mj-lt"/>
-              </a:rPr>
-              <a:t> </a:t>
-            </a:r>
-            <a:r>
-              <a:rPr lang="en-US" altLang="zh-CN" sz="3033" dirty="0">
-                <a:latin typeface="+mj-lt"/>
-              </a:rPr>
-              <a:t>internal</a:t>
-            </a:r>
-            <a:r>
-              <a:rPr lang="zh-CN" altLang="en-US" sz="3033" dirty="0">
-                <a:latin typeface="+mj-lt"/>
-              </a:rPr>
-              <a:t> </a:t>
-            </a:r>
-            <a:r>
-              <a:rPr lang="en-US" altLang="zh-CN" sz="3033" dirty="0">
-                <a:latin typeface="+mj-lt"/>
-              </a:rPr>
-              <a:t>project</a:t>
-            </a:r>
-            <a:r>
-              <a:rPr lang="zh-CN" altLang="en-US" sz="3033" dirty="0">
-                <a:latin typeface="+mj-lt"/>
-              </a:rPr>
-              <a:t> </a:t>
-            </a:r>
-            <a:r>
-              <a:rPr lang="en-US" altLang="zh-CN" sz="3033" dirty="0">
-                <a:latin typeface="+mj-lt"/>
-              </a:rPr>
-              <a:t>files</a:t>
-            </a:r>
-            <a:r>
-              <a:rPr lang="en-US" altLang="zh-CN" sz="3033" b="1" i="1" dirty="0">
-                <a:latin typeface="+mj-lt"/>
-              </a:rPr>
-              <a:t>.</a:t>
-            </a:r>
-            <a:endParaRPr lang="en-GB" sz="3033" b="1" i="1" dirty="0">
-              <a:latin typeface="+mj-lt"/>
-            </a:endParaRPr>
-          </a:p>
-          <a:p>
-            <a:pPr>
               <a:spcBef>
                 <a:spcPct val="50000"/>
               </a:spcBef>
@@ -11331,7 +8901,7 @@
           <p:nvPr/>
         </p:nvPicPr>
         <p:blipFill>
-          <a:blip r:embed="rId11">
+          <a:blip r:embed="rId10">
             <a:extLst>
               <a:ext uri="{28A0092B-C50C-407E-A947-70E740481C1C}">
                 <a14:useLocalDpi xmlns:a14="http://schemas.microsoft.com/office/drawing/2010/main" val="0"/>
@@ -11361,7 +8931,7 @@
           <p:nvPr/>
         </p:nvPicPr>
         <p:blipFill>
-          <a:blip r:embed="rId12">
+          <a:blip r:embed="rId11">
             <a:extLst>
               <a:ext uri="{28A0092B-C50C-407E-A947-70E740481C1C}">
                 <a14:useLocalDpi xmlns:a14="http://schemas.microsoft.com/office/drawing/2010/main" val="0"/>
@@ -11656,7 +9226,7 @@
             </a:r>
             <a:r>
               <a:rPr lang="en-US" altLang="zh-CN" sz="3033" dirty="0">
-                <a:hlinkClick r:id="rId13"/>
+                <a:hlinkClick r:id="rId12"/>
               </a:rPr>
               <a:t>tmcphill@illinois.edu</a:t>
             </a:r>
@@ -11674,16 +9244,16 @@
           <a:p>
             <a:r>
               <a:rPr lang="en-US" sz="3200" dirty="0">
+                <a:hlinkClick r:id="rId13"/>
+              </a:rPr>
+              <a:t>https://github.com/idaks/openrefine-provenance</a:t>
+            </a:r>
+            <a:endParaRPr lang="en-US" sz="3200" dirty="0"/>
+          </a:p>
+          <a:p>
+            <a:r>
+              <a:rPr lang="en-US" sz="3200" dirty="0">
                 <a:hlinkClick r:id="rId14"/>
-              </a:rPr>
-              <a:t>https://github.com/idaks/openrefine-provenance</a:t>
-            </a:r>
-            <a:endParaRPr lang="en-US" sz="3200" dirty="0"/>
-          </a:p>
-          <a:p>
-            <a:r>
-              <a:rPr lang="en-US" sz="3200" dirty="0">
-                <a:hlinkClick r:id="rId15"/>
               </a:rPr>
               <a:t>https://github.com/idaks/openrefine-reproducibility</a:t>
             </a:r>
@@ -11743,7 +9313,7 @@
           <p:nvPr/>
         </p:nvPicPr>
         <p:blipFill rotWithShape="1">
-          <a:blip r:embed="rId16"/>
+          <a:blip r:embed="rId15"/>
           <a:srcRect l="20477" t="26092" r="16652" b="20045"/>
           <a:stretch/>
         </p:blipFill>

</xml_diff>

<commit_message>
added Tools & Methods section to poster
</commit_message>
<xml_diff>
--- a/tapp2019/poster/tapp2019-poster.pptx
+++ b/tapp2019/poster/tapp2019-poster.pptx
@@ -7617,7 +7617,7 @@
         <p:spPr bwMode="auto">
           <a:xfrm>
             <a:off x="9914352" y="4586223"/>
-            <a:ext cx="10790460" cy="16749777"/>
+            <a:ext cx="10638733" cy="20864578"/>
           </a:xfrm>
           <a:prstGeom prst="rect">
             <a:avLst/>
@@ -7722,7 +7722,7 @@
             </a:r>
             <a:r>
               <a:rPr lang="en-US" sz="3200" dirty="0"/>
-              <a:t> natively provides access to past data set states only by undoing all changes made subsequent state of interest. Our schema supports views and queries over multiple past states concurrently—without storing a complete snapshot of the data set at each state.</a:t>
+              <a:t> natively provides access to past data set states only by undoing all changes made subsequent to the state of interest. Our schema supports views and queries over multiple past states concurrently—without storing a complete snapshot of the data set at each state.</a:t>
             </a:r>
           </a:p>
           <a:p>
@@ -7741,7 +7741,7 @@
             </a:r>
             <a:r>
               <a:rPr lang="en-US" sz="3200" dirty="0"/>
-              <a:t>The schema we use to represent the data-cleaning history of a data set is independent of the particular columns, rows, and values comprising any particular data set. The user neither needs to understand the schema representing the history, nor take into account the queries of interest to them prior to cleaning a data set.</a:t>
+              <a:t>The schema we use to represent the data-cleaning history of a data set is independent of the columns, rows, and values comprising the data set. A researcher neither needs to understand the schema representing the history, nor take into account the queries of interest to them prior to cleaning a data set.</a:t>
             </a:r>
             <a:endParaRPr lang="en-US" sz="3200" b="1" dirty="0">
               <a:solidFill>
@@ -7774,6 +7774,25 @@
             <a:r>
               <a:rPr lang="en-US" sz="3200" dirty="0"/>
               <a:t> and Prolog.  </a:t>
+            </a:r>
+          </a:p>
+          <a:p>
+            <a:pPr>
+              <a:spcBef>
+                <a:spcPct val="50000"/>
+              </a:spcBef>
+            </a:pPr>
+            <a:r>
+              <a:rPr lang="en-US" sz="3200" b="1" dirty="0">
+                <a:solidFill>
+                  <a:srgbClr val="CC3200"/>
+                </a:solidFill>
+              </a:rPr>
+              <a:t>Reproducible reproducibility.  </a:t>
+            </a:r>
+            <a:r>
+              <a:rPr lang="en-US" sz="3200" dirty="0"/>
+              <a:t>We strongly believe that research in provenance and reproducibility should be held to even higher standards of reproducibility and transparency than in other sciences.  To this end we employ reproducible computing environments, and we aim to make it easy for other researchers easily to repeat our observations and to evaluate our claims.</a:t>
             </a:r>
           </a:p>
           <a:p>
@@ -8992,176 +9011,6 @@
       </p:sp>
       <p:sp>
         <p:nvSpPr>
-          <p:cNvPr id="22" name="Rectangle 34">
-            <a:extLst>
-              <a:ext uri="{FF2B5EF4-FFF2-40B4-BE49-F238E27FC236}">
-                <a16:creationId xmlns:a16="http://schemas.microsoft.com/office/drawing/2014/main" id="{66B3782D-FBEF-9F48-A045-31621320540A}"/>
-              </a:ext>
-            </a:extLst>
-          </p:cNvPr>
-          <p:cNvSpPr>
-            <a:spLocks noChangeArrowheads="1"/>
-          </p:cNvSpPr>
-          <p:nvPr/>
-        </p:nvSpPr>
-        <p:spPr bwMode="auto">
-          <a:xfrm>
-            <a:off x="9914351" y="29844803"/>
-            <a:ext cx="10790462" cy="5699933"/>
-          </a:xfrm>
-          <a:prstGeom prst="rect">
-            <a:avLst/>
-          </a:prstGeom>
-          <a:solidFill>
-            <a:schemeClr val="bg1"/>
-          </a:solidFill>
-          <a:ln>
-            <a:noFill/>
-          </a:ln>
-          <a:extLst>
-            <a:ext uri="{91240B29-F687-4f45-9708-019B960494DF}">
-              <a14:hiddenLine xmlns:mc="http://schemas.openxmlformats.org/markup-compatibility/2006" xmlns:mv="urn:schemas-microsoft-com:mac:vml" xmlns:a14="http://schemas.microsoft.com/office/drawing/2010/main" xmlns="" w="9525">
-                <a:solidFill>
-                  <a:srgbClr val="000000"/>
-                </a:solidFill>
-                <a:miter lim="800000"/>
-                <a:headEnd/>
-                <a:tailEnd/>
-              </a14:hiddenLine>
-            </a:ext>
-          </a:extLst>
-        </p:spPr>
-        <p:txBody>
-          <a:bodyPr lIns="390000" tIns="390000" rIns="390000" bIns="390000"/>
-          <a:lstStyle/>
-          <a:p>
-            <a:pPr>
-              <a:spcBef>
-                <a:spcPct val="50000"/>
-              </a:spcBef>
-            </a:pPr>
-            <a:r>
-              <a:rPr lang="en-US" altLang="zh-CN" sz="4400" b="1" dirty="0">
-                <a:solidFill>
-                  <a:srgbClr val="CC3300"/>
-                </a:solidFill>
-              </a:rPr>
-              <a:t>Use Case</a:t>
-            </a:r>
-            <a:r>
-              <a:rPr lang="zh-CN" altLang="en-US" sz="4400" b="1" dirty="0">
-                <a:solidFill>
-                  <a:srgbClr val="CC3300"/>
-                </a:solidFill>
-              </a:rPr>
-              <a:t> </a:t>
-            </a:r>
-            <a:endParaRPr lang="en-US" altLang="zh-CN" sz="4400" b="1" dirty="0">
-              <a:solidFill>
-                <a:srgbClr val="CC3300"/>
-              </a:solidFill>
-            </a:endParaRPr>
-          </a:p>
-          <a:p>
-            <a:pPr>
-              <a:spcBef>
-                <a:spcPct val="50000"/>
-              </a:spcBef>
-            </a:pPr>
-            <a:r>
-              <a:rPr lang="en-US" altLang="zh-CN" sz="4000" dirty="0">
-                <a:cs typeface="Apple Chancery" panose="03020702040506060504" pitchFamily="66" charset="-79"/>
-              </a:rPr>
-              <a:t>1. </a:t>
-            </a:r>
-            <a:r>
-              <a:rPr lang="en-US" altLang="zh-CN" sz="4000" b="1" dirty="0">
-                <a:cs typeface="Apple Chancery" panose="03020702040506060504" pitchFamily="66" charset="-79"/>
-              </a:rPr>
-              <a:t>CLOPER</a:t>
-            </a:r>
-          </a:p>
-          <a:p>
-            <a:pPr>
-              <a:spcBef>
-                <a:spcPct val="50000"/>
-              </a:spcBef>
-            </a:pPr>
-            <a:r>
-              <a:rPr lang="en-US" altLang="zh-CN" sz="3030" dirty="0">
-                <a:cs typeface="Apple Chancery" panose="03020702040506060504" pitchFamily="66" charset="-79"/>
-              </a:rPr>
-              <a:t>Input :  Menu.csv [3] (“messy” input dataset)</a:t>
-            </a:r>
-          </a:p>
-          <a:p>
-            <a:pPr>
-              <a:spcBef>
-                <a:spcPct val="50000"/>
-              </a:spcBef>
-            </a:pPr>
-            <a:r>
-              <a:rPr lang="en-US" altLang="zh-CN" sz="3030" dirty="0">
-                <a:cs typeface="Apple Chancery" panose="03020702040506060504" pitchFamily="66" charset="-79"/>
-              </a:rPr>
-              <a:t>Software : </a:t>
-            </a:r>
-            <a:r>
-              <a:rPr lang="en-US" altLang="zh-CN" sz="3030" b="1" dirty="0">
-                <a:cs typeface="Apple Chancery" panose="03020702040506060504" pitchFamily="66" charset="-79"/>
-              </a:rPr>
-              <a:t>CLOPER</a:t>
-            </a:r>
-          </a:p>
-          <a:p>
-            <a:pPr>
-              <a:spcBef>
-                <a:spcPct val="50000"/>
-              </a:spcBef>
-            </a:pPr>
-            <a:r>
-              <a:rPr lang="en-US" altLang="zh-CN" sz="3030" dirty="0">
-                <a:cs typeface="Apple Chancery" panose="03020702040506060504" pitchFamily="66" charset="-79"/>
-              </a:rPr>
-              <a:t>Output: CleanedMenu.csv (“clean” output dataset), Enhanced Recipe (Enhanced.json), OpenRefine By-products (Operation history, OpenRefine Recipe, OpenRefine Internal project files)</a:t>
-            </a:r>
-          </a:p>
-          <a:p>
-            <a:pPr>
-              <a:spcBef>
-                <a:spcPct val="50000"/>
-              </a:spcBef>
-            </a:pPr>
-            <a:endParaRPr lang="en-US" altLang="zh-CN" sz="3030" dirty="0"/>
-          </a:p>
-          <a:p>
-            <a:pPr algn="ctr">
-              <a:spcBef>
-                <a:spcPct val="50000"/>
-              </a:spcBef>
-            </a:pPr>
-            <a:endParaRPr lang="en-US" altLang="zh-CN" sz="3033" dirty="0"/>
-          </a:p>
-          <a:p>
-            <a:pPr algn="ctr">
-              <a:spcBef>
-                <a:spcPct val="50000"/>
-              </a:spcBef>
-            </a:pPr>
-            <a:endParaRPr lang="en-US" altLang="zh-CN" sz="3033" dirty="0"/>
-          </a:p>
-          <a:p>
-            <a:pPr algn="ctr">
-              <a:spcBef>
-                <a:spcPct val="50000"/>
-              </a:spcBef>
-            </a:pPr>
-            <a:endParaRPr lang="en-US" altLang="zh-CN" sz="3033" dirty="0"/>
-          </a:p>
-        </p:txBody>
-      </p:sp>
-      <p:sp>
-        <p:nvSpPr>
           <p:cNvPr id="23" name="Rectangle 34">
             <a:extLst>
               <a:ext uri="{FF2B5EF4-FFF2-40B4-BE49-F238E27FC236}">
@@ -9327,6 +9176,179 @@
           </a:prstGeom>
         </p:spPr>
       </p:pic>
+      <p:sp>
+        <p:nvSpPr>
+          <p:cNvPr id="26" name="Rectangle 33">
+            <a:extLst>
+              <a:ext uri="{FF2B5EF4-FFF2-40B4-BE49-F238E27FC236}">
+                <a16:creationId xmlns:a16="http://schemas.microsoft.com/office/drawing/2014/main" id="{AA101237-A090-4631-BFB2-A0DA1932C48A}"/>
+              </a:ext>
+            </a:extLst>
+          </p:cNvPr>
+          <p:cNvSpPr>
+            <a:spLocks noChangeArrowheads="1"/>
+          </p:cNvSpPr>
+          <p:nvPr/>
+        </p:nvSpPr>
+        <p:spPr bwMode="auto">
+          <a:xfrm>
+            <a:off x="9914351" y="25603200"/>
+            <a:ext cx="10638733" cy="9239994"/>
+          </a:xfrm>
+          <a:prstGeom prst="rect">
+            <a:avLst/>
+          </a:prstGeom>
+          <a:solidFill>
+            <a:schemeClr val="bg1"/>
+          </a:solidFill>
+          <a:ln>
+            <a:solidFill>
+              <a:schemeClr val="accent1"/>
+            </a:solidFill>
+          </a:ln>
+          <a:extLst>
+            <a:ext uri="{91240B29-F687-4f45-9708-019B960494DF}">
+              <a14:hiddenLine xmlns:mc="http://schemas.openxmlformats.org/markup-compatibility/2006" xmlns:mv="urn:schemas-microsoft-com:mac:vml" xmlns:a14="http://schemas.microsoft.com/office/drawing/2010/main" xmlns="" w="9525">
+                <a:solidFill>
+                  <a:srgbClr val="000000"/>
+                </a:solidFill>
+                <a:miter lim="800000"/>
+                <a:headEnd/>
+                <a:tailEnd/>
+              </a14:hiddenLine>
+            </a:ext>
+          </a:extLst>
+        </p:spPr>
+        <p:txBody>
+          <a:bodyPr lIns="390000" tIns="390000" rIns="390000" bIns="390000"/>
+          <a:lstStyle/>
+          <a:p>
+            <a:pPr>
+              <a:spcBef>
+                <a:spcPct val="50000"/>
+              </a:spcBef>
+            </a:pPr>
+            <a:r>
+              <a:rPr lang="en-US" altLang="zh-CN" sz="4333" b="1" dirty="0">
+                <a:solidFill>
+                  <a:srgbClr val="CC3300"/>
+                </a:solidFill>
+              </a:rPr>
+              <a:t>Tools &amp; Methods</a:t>
+            </a:r>
+            <a:endParaRPr lang="en-US" altLang="zh-CN" sz="3033" b="1" dirty="0">
+              <a:solidFill>
+                <a:srgbClr val="CC3200"/>
+              </a:solidFill>
+            </a:endParaRPr>
+          </a:p>
+          <a:p>
+            <a:pPr>
+              <a:spcBef>
+                <a:spcPct val="50000"/>
+              </a:spcBef>
+            </a:pPr>
+            <a:r>
+              <a:rPr lang="en-US" altLang="zh-CN" sz="3200" b="1" dirty="0" err="1">
+                <a:solidFill>
+                  <a:srgbClr val="CC3200"/>
+                </a:solidFill>
+              </a:rPr>
+              <a:t>OpenRefine</a:t>
+            </a:r>
+            <a:r>
+              <a:rPr lang="en-US" altLang="zh-CN" sz="3200" b="1" dirty="0">
+                <a:solidFill>
+                  <a:srgbClr val="CC3200"/>
+                </a:solidFill>
+              </a:rPr>
+              <a:t>. </a:t>
+            </a:r>
+            <a:r>
+              <a:rPr lang="en-US" altLang="zh-CN" sz="3200" dirty="0"/>
+              <a:t>We carry out our experiments on </a:t>
+            </a:r>
+            <a:r>
+              <a:rPr lang="en-US" altLang="zh-CN" sz="3200" dirty="0" err="1"/>
+              <a:t>OpenRefine</a:t>
+            </a:r>
+            <a:r>
+              <a:rPr lang="en-US" altLang="zh-CN" sz="3200" dirty="0"/>
+              <a:t> version 3.1 [7] in Java 8 environments on multiple platforms. We automate interactions with </a:t>
+            </a:r>
+            <a:r>
+              <a:rPr lang="en-US" altLang="zh-CN" sz="3200" dirty="0" err="1"/>
+              <a:t>OpenRefine</a:t>
+            </a:r>
+            <a:r>
+              <a:rPr lang="en-US" altLang="zh-CN" sz="3200" dirty="0"/>
+              <a:t> via its native HTTP API by using and extending the </a:t>
+            </a:r>
+            <a:r>
+              <a:rPr lang="en-US" altLang="zh-CN" sz="3200" dirty="0" err="1"/>
+              <a:t>OpenRefine</a:t>
+            </a:r>
+            <a:r>
+              <a:rPr lang="en-US" altLang="zh-CN" sz="3200" dirty="0"/>
+              <a:t> Python Client Library [3].</a:t>
+            </a:r>
+          </a:p>
+          <a:p>
+            <a:pPr>
+              <a:spcBef>
+                <a:spcPct val="50000"/>
+              </a:spcBef>
+            </a:pPr>
+            <a:r>
+              <a:rPr lang="en-US" altLang="zh-CN" sz="3200" b="1" dirty="0">
+                <a:solidFill>
+                  <a:srgbClr val="CC3200"/>
+                </a:solidFill>
+              </a:rPr>
+              <a:t>Queries. </a:t>
+            </a:r>
+            <a:r>
+              <a:rPr lang="en-US" altLang="zh-CN" sz="3200" dirty="0"/>
+              <a:t>We employ XSB Prolog [9] for expressing and performing </a:t>
+            </a:r>
+            <a:r>
+              <a:rPr lang="en-US" altLang="zh-CN" sz="3200" dirty="0" err="1"/>
+              <a:t>Datalog</a:t>
+            </a:r>
+            <a:r>
+              <a:rPr lang="en-US" altLang="zh-CN" sz="3200" dirty="0"/>
+              <a:t>-style graph and provenance queries, and </a:t>
+            </a:r>
+            <a:r>
+              <a:rPr lang="en-US" altLang="zh-CN" sz="3200" dirty="0" err="1"/>
+              <a:t>Graphviz</a:t>
+            </a:r>
+            <a:r>
+              <a:rPr lang="en-US" altLang="zh-CN" sz="3200" dirty="0"/>
+              <a:t> for rendering visualizations of query results.</a:t>
+            </a:r>
+          </a:p>
+          <a:p>
+            <a:pPr>
+              <a:spcBef>
+                <a:spcPct val="50000"/>
+              </a:spcBef>
+            </a:pPr>
+            <a:r>
+              <a:rPr lang="en-US" altLang="zh-CN" sz="3200" b="1" dirty="0">
+                <a:solidFill>
+                  <a:srgbClr val="CC3200"/>
+                </a:solidFill>
+              </a:rPr>
+              <a:t>Reproducible computing. </a:t>
+            </a:r>
+            <a:r>
+              <a:rPr lang="en-US" altLang="zh-CN" sz="3200" dirty="0"/>
+              <a:t>We depend on Ansible, Vagrant, and Docker for making research environments reproducible across coauthors’ computers and for enabling other researchers to repeat our experiments on their own systems.</a:t>
+            </a:r>
+          </a:p>
+        </p:txBody>
+      </p:sp>
     </p:spTree>
   </p:cSld>
   <p:clrMapOvr>

</xml_diff>

<commit_message>
Added datalog facts for example
</commit_message>
<xml_diff>
--- a/tapp2019/poster/tapp2019-poster.pptx
+++ b/tapp2019/poster/tapp2019-poster.pptx
@@ -7788,11 +7788,11 @@
                   <a:srgbClr val="CC3200"/>
                 </a:solidFill>
               </a:rPr>
-              <a:t>Reproducible reproducibility.  </a:t>
+              <a:t>Reproducible reproducibility research.  </a:t>
             </a:r>
             <a:r>
               <a:rPr lang="en-US" sz="3200" dirty="0"/>
-              <a:t>We strongly believe that research in provenance and reproducibility should be held to even higher standards of reproducibility and transparency than in other sciences.  To this end we employ reproducible computing environments, and we aim to make it easy for other researchers easily to repeat our observations and to evaluate our claims.</a:t>
+              <a:t>Research into provenance and reproducibility should be held to the highest standards of reproducibility and transparency.  To this end we employ reproducible computing environments, and we aim to make it easy for other researchers easily to repeat our observations and to evaluate our claims.</a:t>
             </a:r>
           </a:p>
           <a:p>
@@ -7818,303 +7818,6 @@
           <a:p>
             <a:pPr marL="412737" indent="-412737"/>
             <a:endParaRPr lang="en-US" sz="3200" dirty="0"/>
-          </a:p>
-        </p:txBody>
-      </p:sp>
-      <p:sp>
-        <p:nvSpPr>
-          <p:cNvPr id="14347" name="Rectangle 32"/>
-          <p:cNvSpPr>
-            <a:spLocks noChangeArrowheads="1"/>
-          </p:cNvSpPr>
-          <p:nvPr/>
-        </p:nvSpPr>
-        <p:spPr bwMode="auto">
-          <a:xfrm>
-            <a:off x="20785254" y="4595525"/>
-            <a:ext cx="14781577" cy="15666808"/>
-          </a:xfrm>
-          <a:prstGeom prst="rect">
-            <a:avLst/>
-          </a:prstGeom>
-          <a:solidFill>
-            <a:schemeClr val="bg1"/>
-          </a:solidFill>
-          <a:ln>
-            <a:noFill/>
-          </a:ln>
-          <a:extLst>
-            <a:ext uri="{91240B29-F687-4f45-9708-019B960494DF}">
-              <a14:hiddenLine xmlns:mc="http://schemas.openxmlformats.org/markup-compatibility/2006" xmlns:mv="urn:schemas-microsoft-com:mac:vml" xmlns:a14="http://schemas.microsoft.com/office/drawing/2010/main" xmlns="" w="9525">
-                <a:solidFill>
-                  <a:srgbClr val="000000"/>
-                </a:solidFill>
-                <a:miter lim="800000"/>
-                <a:headEnd/>
-                <a:tailEnd/>
-              </a14:hiddenLine>
-            </a:ext>
-          </a:extLst>
-        </p:spPr>
-        <p:txBody>
-          <a:bodyPr lIns="390000" tIns="390000" rIns="390000" bIns="390000"/>
-          <a:lstStyle/>
-          <a:p>
-            <a:r>
-              <a:rPr lang="en-US" altLang="zh-CN" sz="4400" b="1" dirty="0">
-                <a:solidFill>
-                  <a:srgbClr val="CC3300"/>
-                </a:solidFill>
-              </a:rPr>
-              <a:t>Use</a:t>
-            </a:r>
-            <a:r>
-              <a:rPr lang="zh-CN" altLang="en-US" sz="4400" b="1" dirty="0">
-                <a:solidFill>
-                  <a:srgbClr val="CC3300"/>
-                </a:solidFill>
-              </a:rPr>
-              <a:t> </a:t>
-            </a:r>
-            <a:r>
-              <a:rPr lang="en-US" altLang="zh-CN" sz="4400" b="1" dirty="0">
-                <a:solidFill>
-                  <a:srgbClr val="CC3300"/>
-                </a:solidFill>
-              </a:rPr>
-              <a:t>Case</a:t>
-            </a:r>
-            <a:endParaRPr lang="en-US" sz="4400" b="1" dirty="0">
-              <a:solidFill>
-                <a:srgbClr val="CC3300"/>
-              </a:solidFill>
-            </a:endParaRPr>
-          </a:p>
-          <a:p>
-            <a:endParaRPr lang="en-US" sz="4333" b="1" dirty="0">
-              <a:solidFill>
-                <a:srgbClr val="CC3300"/>
-              </a:solidFill>
-            </a:endParaRPr>
-          </a:p>
-          <a:p>
-            <a:endParaRPr lang="en-US" sz="4333" b="1" dirty="0">
-              <a:solidFill>
-                <a:srgbClr val="CC3300"/>
-              </a:solidFill>
-            </a:endParaRPr>
-          </a:p>
-          <a:p>
-            <a:endParaRPr lang="en-US" sz="4333" b="1" dirty="0">
-              <a:solidFill>
-                <a:srgbClr val="CC3300"/>
-              </a:solidFill>
-            </a:endParaRPr>
-          </a:p>
-          <a:p>
-            <a:pPr algn="ctr"/>
-            <a:endParaRPr lang="en-US" altLang="zh-CN" sz="4333" b="1" dirty="0">
-              <a:solidFill>
-                <a:srgbClr val="CC3300"/>
-              </a:solidFill>
-            </a:endParaRPr>
-          </a:p>
-          <a:p>
-            <a:pPr algn="ctr"/>
-            <a:endParaRPr lang="en-US" altLang="zh-CN" sz="4333" b="1" dirty="0">
-              <a:solidFill>
-                <a:srgbClr val="CC3300"/>
-              </a:solidFill>
-            </a:endParaRPr>
-          </a:p>
-          <a:p>
-            <a:pPr algn="ctr"/>
-            <a:endParaRPr lang="en-US" altLang="zh-CN" sz="4333" b="1" dirty="0">
-              <a:solidFill>
-                <a:srgbClr val="CC3300"/>
-              </a:solidFill>
-            </a:endParaRPr>
-          </a:p>
-          <a:p>
-            <a:pPr algn="ctr"/>
-            <a:endParaRPr lang="en-US" altLang="zh-CN" sz="4333" b="1" dirty="0">
-              <a:solidFill>
-                <a:srgbClr val="CC3300"/>
-              </a:solidFill>
-            </a:endParaRPr>
-          </a:p>
-          <a:p>
-            <a:pPr algn="ctr"/>
-            <a:endParaRPr lang="en-US" altLang="zh-CN" sz="4333" b="1" dirty="0">
-              <a:solidFill>
-                <a:srgbClr val="CC3300"/>
-              </a:solidFill>
-            </a:endParaRPr>
-          </a:p>
-          <a:p>
-            <a:pPr algn="ctr"/>
-            <a:endParaRPr lang="en-US" altLang="zh-CN" sz="4333" b="1" dirty="0">
-              <a:solidFill>
-                <a:srgbClr val="CC3300"/>
-              </a:solidFill>
-            </a:endParaRPr>
-          </a:p>
-          <a:p>
-            <a:pPr algn="ctr"/>
-            <a:endParaRPr lang="en-US" altLang="zh-CN" sz="3033" dirty="0"/>
-          </a:p>
-          <a:p>
-            <a:pPr algn="ctr"/>
-            <a:endParaRPr lang="en-US" altLang="zh-CN" sz="3033" dirty="0"/>
-          </a:p>
-          <a:p>
-            <a:r>
-              <a:rPr lang="en-US" altLang="zh-CN" sz="2800" dirty="0"/>
-              <a:t>Fig.3. In the left part, from step 1-3 of the history H (background, left) the user can extract a machine-readable JSON recipe R (bright foreground, right). The </a:t>
-            </a:r>
-            <a:r>
-              <a:rPr lang="en-US" altLang="zh-CN" sz="2800" i="1" dirty="0"/>
-              <a:t>mass edit </a:t>
-            </a:r>
-            <a:r>
-              <a:rPr lang="en-US" altLang="zh-CN" sz="2800" dirty="0"/>
-              <a:t>in step 2 is captured via a set of rules {</a:t>
-            </a:r>
-            <a:r>
-              <a:rPr lang="en-US" altLang="zh-CN" sz="2800" b="1" dirty="0"/>
-              <a:t>from</a:t>
-            </a:r>
-            <a:r>
-              <a:rPr lang="en-US" altLang="zh-CN" sz="2800" dirty="0"/>
-              <a:t>:</a:t>
-            </a:r>
-            <a:r>
-              <a:rPr lang="en-US" altLang="zh-CN" sz="2800" i="1" dirty="0"/>
-              <a:t>old</a:t>
-            </a:r>
-            <a:r>
-              <a:rPr lang="en-US" altLang="zh-CN" sz="2800" dirty="0"/>
-              <a:t> </a:t>
-            </a:r>
-            <a:r>
-              <a:rPr lang="en-US" altLang="zh-CN" sz="2800" dirty="0">
-                <a:sym typeface="Wingdings"/>
-              </a:rPr>
-              <a:t> </a:t>
-            </a:r>
-            <a:r>
-              <a:rPr lang="en-US" altLang="zh-CN" sz="2800" b="1" dirty="0">
-                <a:sym typeface="Wingdings"/>
-              </a:rPr>
-              <a:t>to</a:t>
-            </a:r>
-            <a:r>
-              <a:rPr lang="en-US" altLang="zh-CN" sz="2800" dirty="0">
-                <a:sym typeface="Wingdings"/>
-              </a:rPr>
-              <a:t>:</a:t>
-            </a:r>
-            <a:r>
-              <a:rPr lang="en-US" altLang="zh-CN" sz="2800" i="1" dirty="0">
-                <a:sym typeface="Wingdings"/>
-              </a:rPr>
-              <a:t>new</a:t>
-            </a:r>
-            <a:r>
-              <a:rPr lang="en-US" altLang="zh-CN" sz="2800" dirty="0"/>
-              <a:t>}, but it is not recorded which function was used to create these rules. The </a:t>
-            </a:r>
-            <a:r>
-              <a:rPr lang="en-US" altLang="zh-CN" sz="2800" i="1" dirty="0"/>
-              <a:t>single cell edit </a:t>
-            </a:r>
-            <a:r>
-              <a:rPr lang="en-US" altLang="zh-CN" sz="2800" dirty="0"/>
-              <a:t>in step 3 is greyed out and cannot be selected by the user for inclusion in R. Neither H nor R indicate what this edit was. In the right part, compared with the original R, </a:t>
-            </a:r>
-            <a:r>
-              <a:rPr lang="en-US" altLang="zh-CN" sz="2800" b="1" dirty="0"/>
-              <a:t>CLOPER</a:t>
-            </a:r>
-            <a:r>
-              <a:rPr lang="en-US" altLang="zh-CN" sz="2800" dirty="0"/>
-              <a:t> helps to generate the Enhanced Recipe which can fix these missing info problems</a:t>
-            </a:r>
-            <a:endParaRPr lang="en-US" altLang="zh-CN" sz="2800" dirty="0">
-              <a:cs typeface="Apple Chancery" panose="03020702040506060504" pitchFamily="66" charset="-79"/>
-            </a:endParaRPr>
-          </a:p>
-          <a:p>
-            <a:pPr>
-              <a:spcBef>
-                <a:spcPct val="50000"/>
-              </a:spcBef>
-            </a:pPr>
-            <a:r>
-              <a:rPr lang="en-US" altLang="zh-CN" sz="3030" dirty="0"/>
-              <a:t>2. </a:t>
-            </a:r>
-            <a:r>
-              <a:rPr lang="en-US" altLang="zh-CN" sz="3030" b="1" dirty="0"/>
-              <a:t>ER3</a:t>
-            </a:r>
-          </a:p>
-          <a:p>
-            <a:pPr>
-              <a:spcBef>
-                <a:spcPct val="50000"/>
-              </a:spcBef>
-            </a:pPr>
-            <a:r>
-              <a:rPr lang="en-US" altLang="zh-CN" sz="3030" dirty="0"/>
-              <a:t>Input</a:t>
-            </a:r>
-            <a:r>
-              <a:rPr lang="zh-CN" altLang="en-US" sz="3030" dirty="0"/>
-              <a:t> </a:t>
-            </a:r>
-            <a:r>
-              <a:rPr lang="en-US" altLang="zh-CN" sz="3030" dirty="0"/>
-              <a:t>: Menu.csv, Enhanced.json</a:t>
-            </a:r>
-          </a:p>
-          <a:p>
-            <a:pPr>
-              <a:spcBef>
-                <a:spcPct val="50000"/>
-              </a:spcBef>
-            </a:pPr>
-            <a:r>
-              <a:rPr lang="en-US" altLang="zh-CN" sz="3030" dirty="0"/>
-              <a:t>Software:</a:t>
-            </a:r>
-            <a:r>
-              <a:rPr lang="zh-CN" altLang="en-US" sz="3030" dirty="0"/>
-              <a:t> </a:t>
-            </a:r>
-            <a:r>
-              <a:rPr lang="en-US" altLang="zh-CN" sz="3030" b="1" dirty="0"/>
-              <a:t>ER3</a:t>
-            </a:r>
-          </a:p>
-          <a:p>
-            <a:pPr>
-              <a:spcBef>
-                <a:spcPct val="50000"/>
-              </a:spcBef>
-            </a:pPr>
-            <a:r>
-              <a:rPr lang="en-US" altLang="zh-CN" sz="3030" dirty="0"/>
-              <a:t>Output</a:t>
-            </a:r>
-            <a:r>
-              <a:rPr lang="zh-CN" altLang="en-US" sz="3030" dirty="0"/>
-              <a:t> </a:t>
-            </a:r>
-            <a:r>
-              <a:rPr lang="en-US" altLang="zh-CN" sz="3030" dirty="0"/>
-              <a:t>: CleanedMenu.csv, OpenRefine By-products (Operation history, OpenRefine Recipe, OpenRefine Internal project files)</a:t>
-            </a:r>
           </a:p>
         </p:txBody>
       </p:sp>
@@ -8394,7 +8097,7 @@
         </p:nvSpPr>
         <p:spPr bwMode="auto">
           <a:xfrm>
-            <a:off x="20785255" y="20405305"/>
+            <a:off x="-14367136" y="9586942"/>
             <a:ext cx="14781577" cy="4199031"/>
           </a:xfrm>
           <a:prstGeom prst="rect">
@@ -8626,7 +8329,7 @@
         </p:nvSpPr>
         <p:spPr bwMode="auto">
           <a:xfrm>
-            <a:off x="20785255" y="24731973"/>
+            <a:off x="-14637528" y="14873103"/>
             <a:ext cx="14781576" cy="3676553"/>
           </a:xfrm>
           <a:prstGeom prst="rect">
@@ -8911,78 +8614,6 @@
           </a:p>
         </p:txBody>
       </p:sp>
-      <p:pic>
-        <p:nvPicPr>
-          <p:cNvPr id="3" name="Picture 2"/>
-          <p:cNvPicPr>
-            <a:picLocks noChangeAspect="1"/>
-          </p:cNvPicPr>
-          <p:nvPr/>
-        </p:nvPicPr>
-        <p:blipFill>
-          <a:blip r:embed="rId10">
-            <a:extLst>
-              <a:ext uri="{28A0092B-C50C-407E-A947-70E740481C1C}">
-                <a14:useLocalDpi xmlns:a14="http://schemas.microsoft.com/office/drawing/2010/main" val="0"/>
-              </a:ext>
-            </a:extLst>
-          </a:blip>
-          <a:stretch>
-            <a:fillRect/>
-          </a:stretch>
-        </p:blipFill>
-        <p:spPr>
-          <a:xfrm>
-            <a:off x="21019183" y="6479851"/>
-            <a:ext cx="8835663" cy="4461936"/>
-          </a:xfrm>
-          <a:prstGeom prst="rect">
-            <a:avLst/>
-          </a:prstGeom>
-        </p:spPr>
-      </p:pic>
-      <p:pic>
-        <p:nvPicPr>
-          <p:cNvPr id="4" name="Picture 3"/>
-          <p:cNvPicPr>
-            <a:picLocks noChangeAspect="1"/>
-          </p:cNvPicPr>
-          <p:nvPr/>
-        </p:nvPicPr>
-        <p:blipFill>
-          <a:blip r:embed="rId11">
-            <a:extLst>
-              <a:ext uri="{28A0092B-C50C-407E-A947-70E740481C1C}">
-                <a14:useLocalDpi xmlns:a14="http://schemas.microsoft.com/office/drawing/2010/main" val="0"/>
-              </a:ext>
-            </a:extLst>
-          </a:blip>
-          <a:stretch>
-            <a:fillRect/>
-          </a:stretch>
-        </p:blipFill>
-        <p:spPr>
-          <a:xfrm>
-            <a:off x="30994515" y="5436351"/>
-            <a:ext cx="4106218" cy="6548936"/>
-          </a:xfrm>
-          <a:prstGeom prst="rect">
-            <a:avLst/>
-          </a:prstGeom>
-          <a:solidFill>
-            <a:schemeClr val="tx1">
-              <a:alpha val="34000"/>
-            </a:schemeClr>
-          </a:solidFill>
-          <a:ln>
-            <a:solidFill>
-              <a:schemeClr val="accent1">
-                <a:alpha val="73000"/>
-              </a:schemeClr>
-            </a:solidFill>
-          </a:ln>
-        </p:spPr>
-      </p:pic>
       <p:sp>
         <p:nvSpPr>
           <p:cNvPr id="2" name="TextBox 1"/>
@@ -9075,7 +8706,7 @@
             </a:r>
             <a:r>
               <a:rPr lang="en-US" altLang="zh-CN" sz="3033" dirty="0">
-                <a:hlinkClick r:id="rId12"/>
+                <a:hlinkClick r:id="rId10"/>
               </a:rPr>
               <a:t>tmcphill@illinois.edu</a:t>
             </a:r>
@@ -9093,7 +8724,7 @@
           <a:p>
             <a:r>
               <a:rPr lang="en-US" sz="3200" dirty="0">
-                <a:hlinkClick r:id="rId13"/>
+                <a:hlinkClick r:id="rId11"/>
               </a:rPr>
               <a:t>https://github.com/idaks/openrefine-provenance</a:t>
             </a:r>
@@ -9102,7 +8733,7 @@
           <a:p>
             <a:r>
               <a:rPr lang="en-US" sz="3200" dirty="0">
-                <a:hlinkClick r:id="rId14"/>
+                <a:hlinkClick r:id="rId12"/>
               </a:rPr>
               <a:t>https://github.com/idaks/openrefine-reproducibility</a:t>
             </a:r>
@@ -9162,7 +8793,7 @@
           <p:nvPr/>
         </p:nvPicPr>
         <p:blipFill rotWithShape="1">
-          <a:blip r:embed="rId15"/>
+          <a:blip r:embed="rId13"/>
           <a:srcRect l="20477" t="26092" r="16652" b="20045"/>
           <a:stretch/>
         </p:blipFill>
@@ -9346,6 +8977,1298 @@
               <a:rPr lang="en-US" altLang="zh-CN" sz="3200" dirty="0"/>
               <a:t>We depend on Ansible, Vagrant, and Docker for making research environments reproducible across coauthors’ computers and for enabling other researchers to repeat our experiments on their own systems.</a:t>
             </a:r>
+          </a:p>
+        </p:txBody>
+      </p:sp>
+      <p:sp>
+        <p:nvSpPr>
+          <p:cNvPr id="29" name="Rectangle 28">
+            <a:extLst>
+              <a:ext uri="{FF2B5EF4-FFF2-40B4-BE49-F238E27FC236}">
+                <a16:creationId xmlns:a16="http://schemas.microsoft.com/office/drawing/2014/main" id="{A1FBEC61-31AD-415F-8E12-1C5A89737F1A}"/>
+              </a:ext>
+            </a:extLst>
+          </p:cNvPr>
+          <p:cNvSpPr>
+            <a:spLocks noChangeArrowheads="1"/>
+          </p:cNvSpPr>
+          <p:nvPr/>
+        </p:nvSpPr>
+        <p:spPr bwMode="auto">
+          <a:xfrm>
+            <a:off x="20800494" y="4586223"/>
+            <a:ext cx="14594406" cy="23815091"/>
+          </a:xfrm>
+          <a:prstGeom prst="rect">
+            <a:avLst/>
+          </a:prstGeom>
+          <a:solidFill>
+            <a:schemeClr val="bg1"/>
+          </a:solidFill>
+          <a:ln w="9525">
+            <a:noFill/>
+            <a:miter lim="800000"/>
+            <a:headEnd/>
+            <a:tailEnd/>
+          </a:ln>
+        </p:spPr>
+        <p:txBody>
+          <a:bodyPr lIns="390000" tIns="390000" rIns="390000" bIns="390000"/>
+          <a:lstStyle/>
+          <a:p>
+            <a:pPr>
+              <a:spcBef>
+                <a:spcPct val="50000"/>
+              </a:spcBef>
+            </a:pPr>
+            <a:r>
+              <a:rPr lang="en-US" altLang="zh-CN" sz="4400" b="1" dirty="0">
+                <a:solidFill>
+                  <a:srgbClr val="CC3300"/>
+                </a:solidFill>
+              </a:rPr>
+              <a:t>Example Data Cleaning History – Work in Progress</a:t>
+            </a:r>
+            <a:endParaRPr lang="en-GB" sz="4400" b="1" dirty="0">
+              <a:solidFill>
+                <a:srgbClr val="CC3300"/>
+              </a:solidFill>
+            </a:endParaRPr>
+          </a:p>
+          <a:p>
+            <a:pPr marL="412737" indent="-412737"/>
+            <a:endParaRPr lang="en-US" sz="1800" dirty="0"/>
+          </a:p>
+          <a:p>
+            <a:pPr marL="412737" indent="-412737"/>
+            <a:r>
+              <a:rPr lang="en-US" sz="1800" dirty="0">
+                <a:latin typeface="Consolas" panose="020B0609020204030204" pitchFamily="49" charset="0"/>
+              </a:rPr>
+              <a:t>%%%% STATE AFTER INITIAL IMPORT STEP %%%%%</a:t>
+            </a:r>
+          </a:p>
+          <a:p>
+            <a:pPr marL="412737" indent="-412737"/>
+            <a:endParaRPr lang="en-US" sz="1800" dirty="0">
+              <a:latin typeface="Consolas" panose="020B0609020204030204" pitchFamily="49" charset="0"/>
+            </a:endParaRPr>
+          </a:p>
+          <a:p>
+            <a:pPr marL="412737" indent="-412737"/>
+            <a:r>
+              <a:rPr lang="en-US" sz="1800" dirty="0">
+                <a:latin typeface="Consolas" panose="020B0609020204030204" pitchFamily="49" charset="0"/>
+              </a:rPr>
+              <a:t>% source(</a:t>
+            </a:r>
+            <a:r>
+              <a:rPr lang="en-US" sz="1800" dirty="0" err="1">
+                <a:latin typeface="Consolas" panose="020B0609020204030204" pitchFamily="49" charset="0"/>
+              </a:rPr>
+              <a:t>SourceId</a:t>
+            </a:r>
+            <a:r>
+              <a:rPr lang="en-US" sz="1800" dirty="0">
+                <a:latin typeface="Consolas" panose="020B0609020204030204" pitchFamily="49" charset="0"/>
+              </a:rPr>
+              <a:t>, </a:t>
+            </a:r>
+            <a:r>
+              <a:rPr lang="en-US" sz="1800" dirty="0" err="1">
+                <a:latin typeface="Consolas" panose="020B0609020204030204" pitchFamily="49" charset="0"/>
+              </a:rPr>
+              <a:t>SourceUri</a:t>
+            </a:r>
+            <a:r>
+              <a:rPr lang="en-US" sz="1800" dirty="0">
+                <a:latin typeface="Consolas" panose="020B0609020204030204" pitchFamily="49" charset="0"/>
+              </a:rPr>
+              <a:t>, </a:t>
+            </a:r>
+            <a:r>
+              <a:rPr lang="en-US" sz="1800" dirty="0" err="1">
+                <a:latin typeface="Consolas" panose="020B0609020204030204" pitchFamily="49" charset="0"/>
+              </a:rPr>
+              <a:t>SourceFormat</a:t>
+            </a:r>
+            <a:r>
+              <a:rPr lang="en-US" sz="1800" dirty="0">
+                <a:latin typeface="Consolas" panose="020B0609020204030204" pitchFamily="49" charset="0"/>
+              </a:rPr>
+              <a:t>).</a:t>
+            </a:r>
+          </a:p>
+          <a:p>
+            <a:pPr marL="412737" indent="-412737"/>
+            <a:r>
+              <a:rPr lang="en-US" sz="1800" dirty="0">
+                <a:latin typeface="Consolas" panose="020B0609020204030204" pitchFamily="49" charset="0"/>
+              </a:rPr>
+              <a:t>source(source_1, 'biblio.csv', 'text/csv').</a:t>
+            </a:r>
+          </a:p>
+          <a:p>
+            <a:pPr marL="412737" indent="-412737"/>
+            <a:endParaRPr lang="en-US" sz="1800" dirty="0">
+              <a:latin typeface="Consolas" panose="020B0609020204030204" pitchFamily="49" charset="0"/>
+            </a:endParaRPr>
+          </a:p>
+          <a:p>
+            <a:pPr marL="412737" indent="-412737"/>
+            <a:r>
+              <a:rPr lang="en-US" sz="1800" dirty="0">
+                <a:latin typeface="Consolas" panose="020B0609020204030204" pitchFamily="49" charset="0"/>
+              </a:rPr>
+              <a:t>% dataset(</a:t>
+            </a:r>
+            <a:r>
+              <a:rPr lang="en-US" sz="1800" dirty="0" err="1">
+                <a:latin typeface="Consolas" panose="020B0609020204030204" pitchFamily="49" charset="0"/>
+              </a:rPr>
+              <a:t>DatasetId</a:t>
+            </a:r>
+            <a:r>
+              <a:rPr lang="en-US" sz="1800" dirty="0">
+                <a:latin typeface="Consolas" panose="020B0609020204030204" pitchFamily="49" charset="0"/>
+              </a:rPr>
+              <a:t>, </a:t>
+            </a:r>
+            <a:r>
+              <a:rPr lang="en-US" sz="1800" dirty="0" err="1">
+                <a:latin typeface="Consolas" panose="020B0609020204030204" pitchFamily="49" charset="0"/>
+              </a:rPr>
+              <a:t>SourceId</a:t>
+            </a:r>
+            <a:r>
+              <a:rPr lang="en-US" sz="1800" dirty="0">
+                <a:latin typeface="Consolas" panose="020B0609020204030204" pitchFamily="49" charset="0"/>
+              </a:rPr>
+              <a:t>, </a:t>
+            </a:r>
+            <a:r>
+              <a:rPr lang="en-US" sz="1800" dirty="0" err="1">
+                <a:latin typeface="Consolas" panose="020B0609020204030204" pitchFamily="49" charset="0"/>
+              </a:rPr>
+              <a:t>ArrayId</a:t>
+            </a:r>
+            <a:r>
+              <a:rPr lang="en-US" sz="1800" dirty="0">
+                <a:latin typeface="Consolas" panose="020B0609020204030204" pitchFamily="49" charset="0"/>
+              </a:rPr>
+              <a:t>).</a:t>
+            </a:r>
+          </a:p>
+          <a:p>
+            <a:pPr marL="412737" indent="-412737"/>
+            <a:r>
+              <a:rPr lang="en-US" sz="1800" dirty="0">
+                <a:latin typeface="Consolas" panose="020B0609020204030204" pitchFamily="49" charset="0"/>
+              </a:rPr>
+              <a:t>dataset(dataset_1, source_1, array_9).</a:t>
+            </a:r>
+          </a:p>
+          <a:p>
+            <a:pPr marL="412737" indent="-412737"/>
+            <a:endParaRPr lang="en-US" sz="1800" dirty="0">
+              <a:latin typeface="Consolas" panose="020B0609020204030204" pitchFamily="49" charset="0"/>
+            </a:endParaRPr>
+          </a:p>
+          <a:p>
+            <a:pPr marL="412737" indent="-412737"/>
+            <a:r>
+              <a:rPr lang="en-US" sz="1800" dirty="0">
+                <a:latin typeface="Consolas" panose="020B0609020204030204" pitchFamily="49" charset="0"/>
+              </a:rPr>
+              <a:t>% array(</a:t>
+            </a:r>
+            <a:r>
+              <a:rPr lang="en-US" sz="1800" dirty="0" err="1">
+                <a:latin typeface="Consolas" panose="020B0609020204030204" pitchFamily="49" charset="0"/>
+              </a:rPr>
+              <a:t>ArrayId</a:t>
+            </a:r>
+            <a:r>
+              <a:rPr lang="en-US" sz="1800" dirty="0">
+                <a:latin typeface="Consolas" panose="020B0609020204030204" pitchFamily="49" charset="0"/>
+              </a:rPr>
+              <a:t>, </a:t>
+            </a:r>
+            <a:r>
+              <a:rPr lang="en-US" sz="1800" dirty="0" err="1">
+                <a:latin typeface="Consolas" panose="020B0609020204030204" pitchFamily="49" charset="0"/>
+              </a:rPr>
+              <a:t>DatasetId</a:t>
+            </a:r>
+            <a:r>
+              <a:rPr lang="en-US" sz="1800" dirty="0">
+                <a:latin typeface="Consolas" panose="020B0609020204030204" pitchFamily="49" charset="0"/>
+              </a:rPr>
+              <a:t>).</a:t>
+            </a:r>
+          </a:p>
+          <a:p>
+            <a:pPr marL="412737" indent="-412737"/>
+            <a:r>
+              <a:rPr lang="en-US" sz="1800" dirty="0">
+                <a:latin typeface="Consolas" panose="020B0609020204030204" pitchFamily="49" charset="0"/>
+              </a:rPr>
+              <a:t>array(array_1, dataset_1).</a:t>
+            </a:r>
+          </a:p>
+          <a:p>
+            <a:pPr marL="412737" indent="-412737"/>
+            <a:endParaRPr lang="en-US" sz="1800" dirty="0">
+              <a:latin typeface="Consolas" panose="020B0609020204030204" pitchFamily="49" charset="0"/>
+            </a:endParaRPr>
+          </a:p>
+          <a:p>
+            <a:pPr marL="412737" indent="-412737"/>
+            <a:r>
+              <a:rPr lang="en-US" sz="1800" dirty="0">
+                <a:latin typeface="Consolas" panose="020B0609020204030204" pitchFamily="49" charset="0"/>
+              </a:rPr>
+              <a:t>% column(</a:t>
+            </a:r>
+            <a:r>
+              <a:rPr lang="en-US" sz="1800" dirty="0" err="1">
+                <a:latin typeface="Consolas" panose="020B0609020204030204" pitchFamily="49" charset="0"/>
+              </a:rPr>
+              <a:t>ColId</a:t>
+            </a:r>
+            <a:r>
+              <a:rPr lang="en-US" sz="1800" dirty="0">
+                <a:latin typeface="Consolas" panose="020B0609020204030204" pitchFamily="49" charset="0"/>
+              </a:rPr>
+              <a:t>, </a:t>
+            </a:r>
+            <a:r>
+              <a:rPr lang="en-US" sz="1800" dirty="0" err="1">
+                <a:latin typeface="Consolas" panose="020B0609020204030204" pitchFamily="49" charset="0"/>
+              </a:rPr>
+              <a:t>ArrayId</a:t>
+            </a:r>
+            <a:r>
+              <a:rPr lang="en-US" sz="1800" dirty="0">
+                <a:latin typeface="Consolas" panose="020B0609020204030204" pitchFamily="49" charset="0"/>
+              </a:rPr>
+              <a:t>).</a:t>
+            </a:r>
+          </a:p>
+          <a:p>
+            <a:pPr marL="412737" indent="-412737"/>
+            <a:r>
+              <a:rPr lang="en-US" sz="1800" dirty="0">
+                <a:latin typeface="Consolas" panose="020B0609020204030204" pitchFamily="49" charset="0"/>
+              </a:rPr>
+              <a:t>column(col_1, array_1).  column(col_2, array_1).  column(col_3, array_1).</a:t>
+            </a:r>
+          </a:p>
+          <a:p>
+            <a:pPr marL="412737" indent="-412737"/>
+            <a:endParaRPr lang="en-US" sz="1800" dirty="0">
+              <a:latin typeface="Consolas" panose="020B0609020204030204" pitchFamily="49" charset="0"/>
+            </a:endParaRPr>
+          </a:p>
+          <a:p>
+            <a:pPr marL="412737" indent="-412737"/>
+            <a:r>
+              <a:rPr lang="en-US" sz="1800" dirty="0">
+                <a:latin typeface="Consolas" panose="020B0609020204030204" pitchFamily="49" charset="0"/>
+              </a:rPr>
+              <a:t>% row(</a:t>
+            </a:r>
+            <a:r>
+              <a:rPr lang="en-US" sz="1800" dirty="0" err="1">
+                <a:latin typeface="Consolas" panose="020B0609020204030204" pitchFamily="49" charset="0"/>
+              </a:rPr>
+              <a:t>RowId</a:t>
+            </a:r>
+            <a:r>
+              <a:rPr lang="en-US" sz="1800" dirty="0">
+                <a:latin typeface="Consolas" panose="020B0609020204030204" pitchFamily="49" charset="0"/>
+              </a:rPr>
+              <a:t>, </a:t>
+            </a:r>
+            <a:r>
+              <a:rPr lang="en-US" sz="1800" dirty="0" err="1">
+                <a:latin typeface="Consolas" panose="020B0609020204030204" pitchFamily="49" charset="0"/>
+              </a:rPr>
+              <a:t>ArrayId</a:t>
+            </a:r>
+            <a:r>
+              <a:rPr lang="en-US" sz="1800" dirty="0">
+                <a:latin typeface="Consolas" panose="020B0609020204030204" pitchFamily="49" charset="0"/>
+              </a:rPr>
+              <a:t>).</a:t>
+            </a:r>
+          </a:p>
+          <a:p>
+            <a:pPr marL="412737" indent="-412737"/>
+            <a:r>
+              <a:rPr lang="en-US" sz="1800" dirty="0">
+                <a:latin typeface="Consolas" panose="020B0609020204030204" pitchFamily="49" charset="0"/>
+              </a:rPr>
+              <a:t>row(row_1, array_1). </a:t>
+            </a:r>
+          </a:p>
+          <a:p>
+            <a:pPr marL="412737" indent="-412737"/>
+            <a:r>
+              <a:rPr lang="en-US" sz="1800" dirty="0">
+                <a:latin typeface="Consolas" panose="020B0609020204030204" pitchFamily="49" charset="0"/>
+              </a:rPr>
+              <a:t>row(row_2, array_1). </a:t>
+            </a:r>
+          </a:p>
+          <a:p>
+            <a:pPr marL="412737" indent="-412737"/>
+            <a:r>
+              <a:rPr lang="en-US" sz="1800" dirty="0">
+                <a:latin typeface="Consolas" panose="020B0609020204030204" pitchFamily="49" charset="0"/>
+              </a:rPr>
+              <a:t>row(row_3, array_1).</a:t>
+            </a:r>
+          </a:p>
+          <a:p>
+            <a:pPr marL="412737" indent="-412737"/>
+            <a:endParaRPr lang="en-US" sz="1800" dirty="0">
+              <a:latin typeface="Consolas" panose="020B0609020204030204" pitchFamily="49" charset="0"/>
+            </a:endParaRPr>
+          </a:p>
+          <a:p>
+            <a:pPr marL="412737" indent="-412737"/>
+            <a:r>
+              <a:rPr lang="en-US" sz="1800" dirty="0">
+                <a:latin typeface="Consolas" panose="020B0609020204030204" pitchFamily="49" charset="0"/>
+              </a:rPr>
+              <a:t>% cell(</a:t>
+            </a:r>
+            <a:r>
+              <a:rPr lang="en-US" sz="1800" dirty="0" err="1">
+                <a:latin typeface="Consolas" panose="020B0609020204030204" pitchFamily="49" charset="0"/>
+              </a:rPr>
+              <a:t>CellId</a:t>
+            </a:r>
+            <a:r>
+              <a:rPr lang="en-US" sz="1800" dirty="0">
+                <a:latin typeface="Consolas" panose="020B0609020204030204" pitchFamily="49" charset="0"/>
+              </a:rPr>
+              <a:t>, </a:t>
+            </a:r>
+            <a:r>
+              <a:rPr lang="en-US" sz="1800" dirty="0" err="1">
+                <a:latin typeface="Consolas" panose="020B0609020204030204" pitchFamily="49" charset="0"/>
+              </a:rPr>
+              <a:t>ColId</a:t>
+            </a:r>
+            <a:r>
+              <a:rPr lang="en-US" sz="1800" dirty="0">
+                <a:latin typeface="Consolas" panose="020B0609020204030204" pitchFamily="49" charset="0"/>
+              </a:rPr>
+              <a:t>, </a:t>
+            </a:r>
+            <a:r>
+              <a:rPr lang="en-US" sz="1800" dirty="0" err="1">
+                <a:latin typeface="Consolas" panose="020B0609020204030204" pitchFamily="49" charset="0"/>
+              </a:rPr>
+              <a:t>RowId</a:t>
+            </a:r>
+            <a:r>
+              <a:rPr lang="en-US" sz="1800" dirty="0">
+                <a:latin typeface="Consolas" panose="020B0609020204030204" pitchFamily="49" charset="0"/>
+              </a:rPr>
+              <a:t>).</a:t>
+            </a:r>
+          </a:p>
+          <a:p>
+            <a:pPr marL="412737" indent="-412737"/>
+            <a:r>
+              <a:rPr lang="en-US" sz="1800" dirty="0">
+                <a:latin typeface="Consolas" panose="020B0609020204030204" pitchFamily="49" charset="0"/>
+              </a:rPr>
+              <a:t>cell(cell_1, col_1, row_1). cell(cell_4, col_2, row_1). cell(cell_7, col_3, row_1). </a:t>
+            </a:r>
+          </a:p>
+          <a:p>
+            <a:pPr marL="412737" indent="-412737"/>
+            <a:r>
+              <a:rPr lang="en-US" sz="1800" dirty="0">
+                <a:latin typeface="Consolas" panose="020B0609020204030204" pitchFamily="49" charset="0"/>
+              </a:rPr>
+              <a:t>cell(cell_2, col_1, row_2). cell(cell_5, col_2, row_2). cell(cell_8, col_3, row_2).</a:t>
+            </a:r>
+          </a:p>
+          <a:p>
+            <a:pPr marL="412737" indent="-412737"/>
+            <a:r>
+              <a:rPr lang="en-US" sz="1800" dirty="0">
+                <a:latin typeface="Consolas" panose="020B0609020204030204" pitchFamily="49" charset="0"/>
+              </a:rPr>
+              <a:t>cell(cell_3, col_1, row_3). cell(cell_6, col_2, row_3). cell(cell_9, col_3, row_3).</a:t>
+            </a:r>
+          </a:p>
+          <a:p>
+            <a:pPr marL="412737" indent="-412737"/>
+            <a:endParaRPr lang="en-US" sz="1800" dirty="0">
+              <a:latin typeface="Consolas" panose="020B0609020204030204" pitchFamily="49" charset="0"/>
+            </a:endParaRPr>
+          </a:p>
+          <a:p>
+            <a:pPr marL="412737" indent="-412737"/>
+            <a:r>
+              <a:rPr lang="en-US" sz="1800" dirty="0">
+                <a:latin typeface="Consolas" panose="020B0609020204030204" pitchFamily="49" charset="0"/>
+              </a:rPr>
+              <a:t>% state(</a:t>
+            </a:r>
+            <a:r>
+              <a:rPr lang="en-US" sz="1800" dirty="0" err="1">
+                <a:latin typeface="Consolas" panose="020B0609020204030204" pitchFamily="49" charset="0"/>
+              </a:rPr>
+              <a:t>StateId</a:t>
+            </a:r>
+            <a:r>
+              <a:rPr lang="en-US" sz="1800" dirty="0">
+                <a:latin typeface="Consolas" panose="020B0609020204030204" pitchFamily="49" charset="0"/>
+              </a:rPr>
+              <a:t>, </a:t>
+            </a:r>
+            <a:r>
+              <a:rPr lang="en-US" sz="1800" dirty="0" err="1">
+                <a:latin typeface="Consolas" panose="020B0609020204030204" pitchFamily="49" charset="0"/>
+              </a:rPr>
+              <a:t>ArrayId</a:t>
+            </a:r>
+            <a:r>
+              <a:rPr lang="en-US" sz="1800" dirty="0">
+                <a:latin typeface="Consolas" panose="020B0609020204030204" pitchFamily="49" charset="0"/>
+              </a:rPr>
+              <a:t>, </a:t>
+            </a:r>
+            <a:r>
+              <a:rPr lang="en-US" sz="1800" dirty="0" err="1">
+                <a:latin typeface="Consolas" panose="020B0609020204030204" pitchFamily="49" charset="0"/>
+              </a:rPr>
+              <a:t>PreviousStateId</a:t>
+            </a:r>
+            <a:r>
+              <a:rPr lang="en-US" sz="1800" dirty="0">
+                <a:latin typeface="Consolas" panose="020B0609020204030204" pitchFamily="49" charset="0"/>
+              </a:rPr>
+              <a:t>).</a:t>
+            </a:r>
+          </a:p>
+          <a:p>
+            <a:pPr marL="412737" indent="-412737"/>
+            <a:r>
+              <a:rPr lang="en-US" sz="1800" dirty="0">
+                <a:latin typeface="Consolas" panose="020B0609020204030204" pitchFamily="49" charset="0"/>
+              </a:rPr>
+              <a:t>state(state_1, array_9, nil).</a:t>
+            </a:r>
+          </a:p>
+          <a:p>
+            <a:pPr marL="412737" indent="-412737"/>
+            <a:endParaRPr lang="en-US" sz="1800" dirty="0">
+              <a:latin typeface="Consolas" panose="020B0609020204030204" pitchFamily="49" charset="0"/>
+            </a:endParaRPr>
+          </a:p>
+          <a:p>
+            <a:pPr marL="412737" indent="-412737"/>
+            <a:r>
+              <a:rPr lang="en-US" sz="1800" dirty="0">
+                <a:latin typeface="Consolas" panose="020B0609020204030204" pitchFamily="49" charset="0"/>
+              </a:rPr>
+              <a:t>% content(</a:t>
+            </a:r>
+            <a:r>
+              <a:rPr lang="en-US" sz="1800" dirty="0" err="1">
+                <a:latin typeface="Consolas" panose="020B0609020204030204" pitchFamily="49" charset="0"/>
+              </a:rPr>
+              <a:t>ContentId</a:t>
+            </a:r>
+            <a:r>
+              <a:rPr lang="en-US" sz="1800" dirty="0">
+                <a:latin typeface="Consolas" panose="020B0609020204030204" pitchFamily="49" charset="0"/>
+              </a:rPr>
+              <a:t>, </a:t>
+            </a:r>
+            <a:r>
+              <a:rPr lang="en-US" sz="1800" dirty="0" err="1">
+                <a:latin typeface="Consolas" panose="020B0609020204030204" pitchFamily="49" charset="0"/>
+              </a:rPr>
+              <a:t>CellId</a:t>
+            </a:r>
+            <a:r>
+              <a:rPr lang="en-US" sz="1800" dirty="0">
+                <a:latin typeface="Consolas" panose="020B0609020204030204" pitchFamily="49" charset="0"/>
+              </a:rPr>
+              <a:t>, </a:t>
+            </a:r>
+            <a:r>
+              <a:rPr lang="en-US" sz="1800" dirty="0" err="1">
+                <a:latin typeface="Consolas" panose="020B0609020204030204" pitchFamily="49" charset="0"/>
+              </a:rPr>
+              <a:t>StateId</a:t>
+            </a:r>
+            <a:r>
+              <a:rPr lang="en-US" sz="1800" dirty="0">
+                <a:latin typeface="Consolas" panose="020B0609020204030204" pitchFamily="49" charset="0"/>
+              </a:rPr>
+              <a:t>, </a:t>
+            </a:r>
+            <a:r>
+              <a:rPr lang="en-US" sz="1800" dirty="0" err="1">
+                <a:latin typeface="Consolas" panose="020B0609020204030204" pitchFamily="49" charset="0"/>
+              </a:rPr>
+              <a:t>ValId</a:t>
+            </a:r>
+            <a:r>
+              <a:rPr lang="en-US" sz="1800" dirty="0">
+                <a:latin typeface="Consolas" panose="020B0609020204030204" pitchFamily="49" charset="0"/>
+              </a:rPr>
+              <a:t>, </a:t>
+            </a:r>
+            <a:r>
+              <a:rPr lang="en-US" sz="1800" dirty="0" err="1">
+                <a:latin typeface="Consolas" panose="020B0609020204030204" pitchFamily="49" charset="0"/>
+              </a:rPr>
+              <a:t>PrevContentId</a:t>
+            </a:r>
+            <a:r>
+              <a:rPr lang="en-US" sz="1800" dirty="0">
+                <a:latin typeface="Consolas" panose="020B0609020204030204" pitchFamily="49" charset="0"/>
+              </a:rPr>
+              <a:t>).</a:t>
+            </a:r>
+          </a:p>
+          <a:p>
+            <a:pPr marL="412737" indent="-412737"/>
+            <a:r>
+              <a:rPr lang="en-US" sz="1800" dirty="0">
+                <a:latin typeface="Consolas" panose="020B0609020204030204" pitchFamily="49" charset="0"/>
+              </a:rPr>
+              <a:t>content(content_11, cell_1, state_1, val_1, nil).</a:t>
+            </a:r>
+          </a:p>
+          <a:p>
+            <a:pPr marL="412737" indent="-412737"/>
+            <a:r>
+              <a:rPr lang="en-US" sz="1800" dirty="0">
+                <a:latin typeface="Consolas" panose="020B0609020204030204" pitchFamily="49" charset="0"/>
+              </a:rPr>
+              <a:t>content(content_12, cell_2, state_1, val_2, nil).</a:t>
+            </a:r>
+          </a:p>
+          <a:p>
+            <a:pPr marL="412737" indent="-412737"/>
+            <a:r>
+              <a:rPr lang="en-US" sz="1800" dirty="0">
+                <a:latin typeface="Consolas" panose="020B0609020204030204" pitchFamily="49" charset="0"/>
+              </a:rPr>
+              <a:t>content(content_13, cell_3, state_1, val_3, nil).</a:t>
+            </a:r>
+          </a:p>
+          <a:p>
+            <a:pPr marL="412737" indent="-412737"/>
+            <a:r>
+              <a:rPr lang="en-US" sz="1800" dirty="0">
+                <a:latin typeface="Consolas" panose="020B0609020204030204" pitchFamily="49" charset="0"/>
+              </a:rPr>
+              <a:t>content(content_14, cell_4, state_1, val_4, nil).</a:t>
+            </a:r>
+          </a:p>
+          <a:p>
+            <a:pPr marL="412737" indent="-412737"/>
+            <a:r>
+              <a:rPr lang="en-US" sz="1800" dirty="0">
+                <a:latin typeface="Consolas" panose="020B0609020204030204" pitchFamily="49" charset="0"/>
+              </a:rPr>
+              <a:t>content(content_15, cell_5, state_1, val_5, nil).</a:t>
+            </a:r>
+          </a:p>
+          <a:p>
+            <a:pPr marL="412737" indent="-412737"/>
+            <a:r>
+              <a:rPr lang="en-US" sz="1800" dirty="0">
+                <a:latin typeface="Consolas" panose="020B0609020204030204" pitchFamily="49" charset="0"/>
+              </a:rPr>
+              <a:t>content(content_16, cell_6, state_1, val_6, nil).</a:t>
+            </a:r>
+          </a:p>
+          <a:p>
+            <a:pPr marL="412737" indent="-412737"/>
+            <a:r>
+              <a:rPr lang="en-US" sz="1800" dirty="0">
+                <a:latin typeface="Consolas" panose="020B0609020204030204" pitchFamily="49" charset="0"/>
+              </a:rPr>
+              <a:t>content(content_17, cell_7, state_1, val_7, nil).</a:t>
+            </a:r>
+          </a:p>
+          <a:p>
+            <a:pPr marL="412737" indent="-412737"/>
+            <a:r>
+              <a:rPr lang="en-US" sz="1800" dirty="0">
+                <a:latin typeface="Consolas" panose="020B0609020204030204" pitchFamily="49" charset="0"/>
+              </a:rPr>
+              <a:t>content(content_18, cell_8, state_1, val_8, nil).</a:t>
+            </a:r>
+          </a:p>
+          <a:p>
+            <a:pPr marL="412737" indent="-412737"/>
+            <a:r>
+              <a:rPr lang="en-US" sz="1800" dirty="0">
+                <a:latin typeface="Consolas" panose="020B0609020204030204" pitchFamily="49" charset="0"/>
+              </a:rPr>
+              <a:t>content(content_19, cell_9, state_1, val_9, nil).</a:t>
+            </a:r>
+          </a:p>
+          <a:p>
+            <a:pPr marL="412737" indent="-412737"/>
+            <a:endParaRPr lang="en-US" sz="1800" dirty="0">
+              <a:latin typeface="Consolas" panose="020B0609020204030204" pitchFamily="49" charset="0"/>
+            </a:endParaRPr>
+          </a:p>
+          <a:p>
+            <a:pPr marL="412737" indent="-412737"/>
+            <a:r>
+              <a:rPr lang="en-US" sz="1800" dirty="0">
+                <a:latin typeface="Consolas" panose="020B0609020204030204" pitchFamily="49" charset="0"/>
+              </a:rPr>
+              <a:t>% value(</a:t>
+            </a:r>
+            <a:r>
+              <a:rPr lang="en-US" sz="1800" dirty="0" err="1">
+                <a:latin typeface="Consolas" panose="020B0609020204030204" pitchFamily="49" charset="0"/>
+              </a:rPr>
+              <a:t>ValId</a:t>
+            </a:r>
+            <a:r>
+              <a:rPr lang="en-US" sz="1800" dirty="0">
+                <a:latin typeface="Consolas" panose="020B0609020204030204" pitchFamily="49" charset="0"/>
+              </a:rPr>
+              <a:t>, </a:t>
+            </a:r>
+            <a:r>
+              <a:rPr lang="en-US" sz="1800" dirty="0" err="1">
+                <a:latin typeface="Consolas" panose="020B0609020204030204" pitchFamily="49" charset="0"/>
+              </a:rPr>
+              <a:t>ValText</a:t>
+            </a:r>
+            <a:r>
+              <a:rPr lang="en-US" sz="1800" dirty="0">
+                <a:latin typeface="Consolas" panose="020B0609020204030204" pitchFamily="49" charset="0"/>
+              </a:rPr>
+              <a:t>).</a:t>
+            </a:r>
+          </a:p>
+          <a:p>
+            <a:pPr marL="412737" indent="-412737"/>
+            <a:r>
+              <a:rPr lang="en-US" sz="1800" dirty="0">
+                <a:latin typeface="Consolas" panose="020B0609020204030204" pitchFamily="49" charset="0"/>
+              </a:rPr>
+              <a:t>value(val_1, 'Against Method’).      value(val_4, 'Paul </a:t>
+            </a:r>
+            <a:r>
+              <a:rPr lang="en-US" sz="1800" dirty="0" err="1">
+                <a:latin typeface="Consolas" panose="020B0609020204030204" pitchFamily="49" charset="0"/>
+              </a:rPr>
+              <a:t>Feyerabend</a:t>
+            </a:r>
+            <a:r>
+              <a:rPr lang="en-US" sz="1800" dirty="0">
+                <a:latin typeface="Consolas" panose="020B0609020204030204" pitchFamily="49" charset="0"/>
+              </a:rPr>
+              <a:t>’).  value(val_7, '1975').</a:t>
+            </a:r>
+          </a:p>
+          <a:p>
+            <a:pPr marL="412737" indent="-412737"/>
+            <a:r>
+              <a:rPr lang="en-US" sz="1800" dirty="0">
+                <a:latin typeface="Consolas" panose="020B0609020204030204" pitchFamily="49" charset="0"/>
+              </a:rPr>
+              <a:t>value(val_2, 'Changing Order’).      value(val_5, 'H.M. Collins’).     value(val_8, '1985').</a:t>
+            </a:r>
+          </a:p>
+          <a:p>
+            <a:pPr marL="412737" indent="-412737"/>
+            <a:r>
+              <a:rPr lang="en-US" sz="1800" dirty="0">
+                <a:latin typeface="Consolas" panose="020B0609020204030204" pitchFamily="49" charset="0"/>
+              </a:rPr>
+              <a:t>value(val_3, 'Exceeding our Grasp’). value(val_6, 'P. Kyle Stanford’). value(val_9, '2006').</a:t>
+            </a:r>
+          </a:p>
+          <a:p>
+            <a:pPr marL="412737" indent="-412737"/>
+            <a:endParaRPr lang="en-US" sz="1800" dirty="0">
+              <a:latin typeface="Consolas" panose="020B0609020204030204" pitchFamily="49" charset="0"/>
+            </a:endParaRPr>
+          </a:p>
+          <a:p>
+            <a:pPr marL="412737" indent="-412737"/>
+            <a:r>
+              <a:rPr lang="en-US" sz="1800" dirty="0">
+                <a:latin typeface="Consolas" panose="020B0609020204030204" pitchFamily="49" charset="0"/>
+              </a:rPr>
+              <a:t>% </a:t>
+            </a:r>
+            <a:r>
+              <a:rPr lang="en-US" sz="1800" dirty="0" err="1">
+                <a:latin typeface="Consolas" panose="020B0609020204030204" pitchFamily="49" charset="0"/>
+              </a:rPr>
+              <a:t>column_schema</a:t>
+            </a:r>
+            <a:r>
+              <a:rPr lang="en-US" sz="1800" dirty="0">
+                <a:latin typeface="Consolas" panose="020B0609020204030204" pitchFamily="49" charset="0"/>
+              </a:rPr>
+              <a:t>(</a:t>
+            </a:r>
+            <a:r>
+              <a:rPr lang="en-US" sz="1800" dirty="0" err="1">
+                <a:latin typeface="Consolas" panose="020B0609020204030204" pitchFamily="49" charset="0"/>
+              </a:rPr>
+              <a:t>ColSchemaId</a:t>
+            </a:r>
+            <a:r>
+              <a:rPr lang="en-US" sz="1800" dirty="0">
+                <a:latin typeface="Consolas" panose="020B0609020204030204" pitchFamily="49" charset="0"/>
+              </a:rPr>
+              <a:t>, </a:t>
+            </a:r>
+            <a:r>
+              <a:rPr lang="en-US" sz="1800" dirty="0" err="1">
+                <a:latin typeface="Consolas" panose="020B0609020204030204" pitchFamily="49" charset="0"/>
+              </a:rPr>
+              <a:t>ColId</a:t>
+            </a:r>
+            <a:r>
+              <a:rPr lang="en-US" sz="1800" dirty="0">
+                <a:latin typeface="Consolas" panose="020B0609020204030204" pitchFamily="49" charset="0"/>
+              </a:rPr>
+              <a:t>, </a:t>
+            </a:r>
+            <a:r>
+              <a:rPr lang="en-US" sz="1800" dirty="0" err="1">
+                <a:latin typeface="Consolas" panose="020B0609020204030204" pitchFamily="49" charset="0"/>
+              </a:rPr>
+              <a:t>StateId</a:t>
+            </a:r>
+            <a:r>
+              <a:rPr lang="en-US" sz="1800" dirty="0">
+                <a:latin typeface="Consolas" panose="020B0609020204030204" pitchFamily="49" charset="0"/>
+              </a:rPr>
+              <a:t>, </a:t>
+            </a:r>
+            <a:r>
+              <a:rPr lang="en-US" sz="1800" dirty="0" err="1">
+                <a:latin typeface="Consolas" panose="020B0609020204030204" pitchFamily="49" charset="0"/>
+              </a:rPr>
+              <a:t>ColType</a:t>
+            </a:r>
+            <a:r>
+              <a:rPr lang="en-US" sz="1800" dirty="0">
+                <a:latin typeface="Consolas" panose="020B0609020204030204" pitchFamily="49" charset="0"/>
+              </a:rPr>
+              <a:t>, </a:t>
+            </a:r>
+            <a:r>
+              <a:rPr lang="en-US" sz="1800" dirty="0" err="1">
+                <a:latin typeface="Consolas" panose="020B0609020204030204" pitchFamily="49" charset="0"/>
+              </a:rPr>
+              <a:t>ColName</a:t>
+            </a:r>
+            <a:r>
+              <a:rPr lang="en-US" sz="1800" dirty="0">
+                <a:latin typeface="Consolas" panose="020B0609020204030204" pitchFamily="49" charset="0"/>
+              </a:rPr>
+              <a:t>, </a:t>
+            </a:r>
+            <a:r>
+              <a:rPr lang="en-US" sz="1800" dirty="0" err="1">
+                <a:latin typeface="Consolas" panose="020B0609020204030204" pitchFamily="49" charset="0"/>
+              </a:rPr>
+              <a:t>PrevColId</a:t>
+            </a:r>
+            <a:r>
+              <a:rPr lang="en-US" sz="1800" dirty="0">
+                <a:latin typeface="Consolas" panose="020B0609020204030204" pitchFamily="49" charset="0"/>
+              </a:rPr>
+              <a:t>, </a:t>
+            </a:r>
+            <a:r>
+              <a:rPr lang="en-US" sz="1800" dirty="0" err="1">
+                <a:latin typeface="Consolas" panose="020B0609020204030204" pitchFamily="49" charset="0"/>
+              </a:rPr>
+              <a:t>PrevColSchemaId</a:t>
+            </a:r>
+            <a:r>
+              <a:rPr lang="en-US" sz="1800" dirty="0">
+                <a:latin typeface="Consolas" panose="020B0609020204030204" pitchFamily="49" charset="0"/>
+              </a:rPr>
+              <a:t>).</a:t>
+            </a:r>
+          </a:p>
+          <a:p>
+            <a:pPr marL="412737" indent="-412737"/>
+            <a:r>
+              <a:rPr lang="en-US" sz="1800" dirty="0" err="1">
+                <a:latin typeface="Consolas" panose="020B0609020204030204" pitchFamily="49" charset="0"/>
+              </a:rPr>
+              <a:t>column_schema</a:t>
+            </a:r>
+            <a:r>
+              <a:rPr lang="en-US" sz="1800" dirty="0">
+                <a:latin typeface="Consolas" panose="020B0609020204030204" pitchFamily="49" charset="0"/>
+              </a:rPr>
+              <a:t>(col_schema_1, col_1, state_1, 'string', 'Book Title’, nil, nil).</a:t>
+            </a:r>
+          </a:p>
+          <a:p>
+            <a:pPr marL="412737" indent="-412737"/>
+            <a:r>
+              <a:rPr lang="en-US" sz="1800" dirty="0" err="1">
+                <a:latin typeface="Consolas" panose="020B0609020204030204" pitchFamily="49" charset="0"/>
+              </a:rPr>
+              <a:t>column_schema</a:t>
+            </a:r>
+            <a:r>
+              <a:rPr lang="en-US" sz="1800" dirty="0">
+                <a:latin typeface="Consolas" panose="020B0609020204030204" pitchFamily="49" charset="0"/>
+              </a:rPr>
+              <a:t>(col_schema_2, col_2, state_1, 'string’, 'Author’,   col_1, nil).</a:t>
+            </a:r>
+          </a:p>
+          <a:p>
+            <a:pPr marL="412737" indent="-412737"/>
+            <a:r>
+              <a:rPr lang="en-US" sz="1800" dirty="0" err="1">
+                <a:latin typeface="Consolas" panose="020B0609020204030204" pitchFamily="49" charset="0"/>
+              </a:rPr>
+              <a:t>column_schema</a:t>
+            </a:r>
+            <a:r>
+              <a:rPr lang="en-US" sz="1800" dirty="0">
+                <a:latin typeface="Consolas" panose="020B0609020204030204" pitchFamily="49" charset="0"/>
+              </a:rPr>
+              <a:t>(col_schema_3, col_3, state_1, 'string’, 'Date’,     col_2, nil).</a:t>
+            </a:r>
+          </a:p>
+          <a:p>
+            <a:pPr marL="412737" indent="-412737"/>
+            <a:endParaRPr lang="en-US" sz="1800" dirty="0">
+              <a:latin typeface="Consolas" panose="020B0609020204030204" pitchFamily="49" charset="0"/>
+            </a:endParaRPr>
+          </a:p>
+          <a:p>
+            <a:pPr marL="412737" indent="-412737"/>
+            <a:r>
+              <a:rPr lang="en-US" sz="1800" dirty="0">
+                <a:latin typeface="Consolas" panose="020B0609020204030204" pitchFamily="49" charset="0"/>
+              </a:rPr>
+              <a:t>% </a:t>
+            </a:r>
+            <a:r>
+              <a:rPr lang="en-US" sz="1800" dirty="0" err="1">
+                <a:latin typeface="Consolas" panose="020B0609020204030204" pitchFamily="49" charset="0"/>
+              </a:rPr>
+              <a:t>row_position</a:t>
+            </a:r>
+            <a:r>
+              <a:rPr lang="en-US" sz="1800" dirty="0">
+                <a:latin typeface="Consolas" panose="020B0609020204030204" pitchFamily="49" charset="0"/>
+              </a:rPr>
+              <a:t>(</a:t>
+            </a:r>
+            <a:r>
+              <a:rPr lang="en-US" sz="1800" dirty="0" err="1">
+                <a:latin typeface="Consolas" panose="020B0609020204030204" pitchFamily="49" charset="0"/>
+              </a:rPr>
+              <a:t>RowPosId</a:t>
+            </a:r>
+            <a:r>
+              <a:rPr lang="en-US" sz="1800" dirty="0">
+                <a:latin typeface="Consolas" panose="020B0609020204030204" pitchFamily="49" charset="0"/>
+              </a:rPr>
+              <a:t>, </a:t>
+            </a:r>
+            <a:r>
+              <a:rPr lang="en-US" sz="1800" dirty="0" err="1">
+                <a:latin typeface="Consolas" panose="020B0609020204030204" pitchFamily="49" charset="0"/>
+              </a:rPr>
+              <a:t>RowId</a:t>
+            </a:r>
+            <a:r>
+              <a:rPr lang="en-US" sz="1800" dirty="0">
+                <a:latin typeface="Consolas" panose="020B0609020204030204" pitchFamily="49" charset="0"/>
+              </a:rPr>
+              <a:t>, </a:t>
+            </a:r>
+            <a:r>
+              <a:rPr lang="en-US" sz="1800" dirty="0" err="1">
+                <a:latin typeface="Consolas" panose="020B0609020204030204" pitchFamily="49" charset="0"/>
+              </a:rPr>
+              <a:t>StateId</a:t>
+            </a:r>
+            <a:r>
+              <a:rPr lang="en-US" sz="1800" dirty="0">
+                <a:latin typeface="Consolas" panose="020B0609020204030204" pitchFamily="49" charset="0"/>
+              </a:rPr>
+              <a:t>, </a:t>
+            </a:r>
+            <a:r>
+              <a:rPr lang="en-US" sz="1800" dirty="0" err="1">
+                <a:latin typeface="Consolas" panose="020B0609020204030204" pitchFamily="49" charset="0"/>
+              </a:rPr>
+              <a:t>PrevRowId</a:t>
+            </a:r>
+            <a:r>
+              <a:rPr lang="en-US" sz="1800" dirty="0">
+                <a:latin typeface="Consolas" panose="020B0609020204030204" pitchFamily="49" charset="0"/>
+              </a:rPr>
+              <a:t>).</a:t>
+            </a:r>
+          </a:p>
+          <a:p>
+            <a:pPr marL="412737" indent="-412737"/>
+            <a:r>
+              <a:rPr lang="en-US" sz="1800" dirty="0" err="1">
+                <a:latin typeface="Consolas" panose="020B0609020204030204" pitchFamily="49" charset="0"/>
+              </a:rPr>
+              <a:t>row_position</a:t>
+            </a:r>
+            <a:r>
+              <a:rPr lang="en-US" sz="1800" dirty="0">
+                <a:latin typeface="Consolas" panose="020B0609020204030204" pitchFamily="49" charset="0"/>
+              </a:rPr>
+              <a:t>(row_pos_1, row_1, state_1, nil).</a:t>
+            </a:r>
+          </a:p>
+          <a:p>
+            <a:pPr marL="412737" indent="-412737"/>
+            <a:r>
+              <a:rPr lang="en-US" sz="1800" dirty="0" err="1">
+                <a:latin typeface="Consolas" panose="020B0609020204030204" pitchFamily="49" charset="0"/>
+              </a:rPr>
+              <a:t>row_position</a:t>
+            </a:r>
+            <a:r>
+              <a:rPr lang="en-US" sz="1800" dirty="0">
+                <a:latin typeface="Consolas" panose="020B0609020204030204" pitchFamily="49" charset="0"/>
+              </a:rPr>
+              <a:t>(row_pos_2, row_2, state_1, row_1).</a:t>
+            </a:r>
+          </a:p>
+          <a:p>
+            <a:pPr marL="412737" indent="-412737"/>
+            <a:r>
+              <a:rPr lang="en-US" sz="1800" dirty="0" err="1">
+                <a:latin typeface="Consolas" panose="020B0609020204030204" pitchFamily="49" charset="0"/>
+              </a:rPr>
+              <a:t>row_position</a:t>
+            </a:r>
+            <a:r>
+              <a:rPr lang="en-US" sz="1800" dirty="0">
+                <a:latin typeface="Consolas" panose="020B0609020204030204" pitchFamily="49" charset="0"/>
+              </a:rPr>
+              <a:t>(row_pos_3, row_3, state_1, row_2).</a:t>
+            </a:r>
+          </a:p>
+          <a:p>
+            <a:pPr marL="412737" indent="-412737"/>
+            <a:endParaRPr lang="en-US" sz="1800" dirty="0">
+              <a:latin typeface="Consolas" panose="020B0609020204030204" pitchFamily="49" charset="0"/>
+            </a:endParaRPr>
+          </a:p>
+          <a:p>
+            <a:pPr marL="412737" indent="-412737"/>
+            <a:r>
+              <a:rPr lang="en-US" sz="1800" dirty="0">
+                <a:latin typeface="Consolas" panose="020B0609020204030204" pitchFamily="49" charset="0"/>
+              </a:rPr>
+              <a:t>%%%% Rename column 1 from ‘Book title’ to ‘Title’ %%%%%</a:t>
+            </a:r>
+          </a:p>
+          <a:p>
+            <a:pPr marL="412737" indent="-412737"/>
+            <a:endParaRPr lang="en-US" sz="1800" dirty="0">
+              <a:latin typeface="Consolas" panose="020B0609020204030204" pitchFamily="49" charset="0"/>
+            </a:endParaRPr>
+          </a:p>
+          <a:p>
+            <a:pPr marL="412737" indent="-412737"/>
+            <a:r>
+              <a:rPr lang="en-US" sz="1800" dirty="0">
+                <a:latin typeface="Consolas" panose="020B0609020204030204" pitchFamily="49" charset="0"/>
+              </a:rPr>
+              <a:t>state(state_2, array_1, state_1).</a:t>
+            </a:r>
+          </a:p>
+          <a:p>
+            <a:pPr marL="412737" indent="-412737"/>
+            <a:r>
+              <a:rPr lang="it-IT" sz="1800" dirty="0">
+                <a:latin typeface="Consolas" panose="020B0609020204030204" pitchFamily="49" charset="0"/>
+              </a:rPr>
+              <a:t>column_schema(col_schema_4, col_1, state_2, 'string', 'Title', nil, col_schema_1).</a:t>
+            </a:r>
+          </a:p>
+          <a:p>
+            <a:pPr marL="412737" indent="-412737"/>
+            <a:endParaRPr lang="en-US" sz="1800" dirty="0"/>
+          </a:p>
+          <a:p>
+            <a:pPr marL="412737" indent="-412737"/>
+            <a:r>
+              <a:rPr lang="en-US" sz="1800" dirty="0">
+                <a:latin typeface="Consolas" panose="020B0609020204030204" pitchFamily="49" charset="0"/>
+              </a:rPr>
+              <a:t>%%%% Place surname first and abbreviate given names to initials in Author column %%%%%</a:t>
+            </a:r>
+          </a:p>
+          <a:p>
+            <a:pPr marL="412737" indent="-412737"/>
+            <a:endParaRPr lang="en-US" sz="1800" dirty="0">
+              <a:latin typeface="Consolas" panose="020B0609020204030204" pitchFamily="49" charset="0"/>
+            </a:endParaRPr>
+          </a:p>
+          <a:p>
+            <a:pPr marL="412737" indent="-412737"/>
+            <a:r>
+              <a:rPr lang="en-US" sz="1800" dirty="0">
+                <a:latin typeface="Consolas" panose="020B0609020204030204" pitchFamily="49" charset="0"/>
+              </a:rPr>
+              <a:t>state(state_3, array_1, state_2).</a:t>
+            </a:r>
+          </a:p>
+          <a:p>
+            <a:pPr marL="412737" indent="-412737"/>
+            <a:r>
+              <a:rPr lang="en-US" sz="1800" dirty="0">
+                <a:latin typeface="Consolas" panose="020B0609020204030204" pitchFamily="49" charset="0"/>
+              </a:rPr>
+              <a:t>value(val_10, '</a:t>
+            </a:r>
+            <a:r>
+              <a:rPr lang="en-US" sz="1800" dirty="0" err="1">
+                <a:latin typeface="Consolas" panose="020B0609020204030204" pitchFamily="49" charset="0"/>
+              </a:rPr>
+              <a:t>Feyerabend</a:t>
+            </a:r>
+            <a:r>
+              <a:rPr lang="en-US" sz="1800" dirty="0">
+                <a:latin typeface="Consolas" panose="020B0609020204030204" pitchFamily="49" charset="0"/>
+              </a:rPr>
+              <a:t>, P.’).</a:t>
+            </a:r>
+          </a:p>
+          <a:p>
+            <a:pPr marL="412737" indent="-412737"/>
+            <a:r>
+              <a:rPr lang="en-US" sz="1800" dirty="0">
+                <a:latin typeface="Consolas" panose="020B0609020204030204" pitchFamily="49" charset="0"/>
+              </a:rPr>
+              <a:t>value(val_11, 'Collins, H.M.’).</a:t>
+            </a:r>
+            <a:endParaRPr lang="it-IT" sz="1800" dirty="0">
+              <a:latin typeface="Consolas" panose="020B0609020204030204" pitchFamily="49" charset="0"/>
+            </a:endParaRPr>
+          </a:p>
+          <a:p>
+            <a:pPr marL="412737" indent="-412737"/>
+            <a:r>
+              <a:rPr lang="en-US" sz="1800" dirty="0">
+                <a:latin typeface="Consolas" panose="020B0609020204030204" pitchFamily="49" charset="0"/>
+              </a:rPr>
+              <a:t>value(val_12, 'Stanford, P.K.’).</a:t>
+            </a:r>
+          </a:p>
+          <a:p>
+            <a:pPr marL="412737" indent="-412737"/>
+            <a:r>
+              <a:rPr lang="en-US" sz="1800" dirty="0">
+                <a:latin typeface="Consolas" panose="020B0609020204030204" pitchFamily="49" charset="0"/>
+              </a:rPr>
+              <a:t>content(content_20, cell_4, state_3, val_10, content_14).</a:t>
+            </a:r>
+          </a:p>
+          <a:p>
+            <a:pPr marL="412737" indent="-412737"/>
+            <a:r>
+              <a:rPr lang="en-US" sz="1800" dirty="0">
+                <a:latin typeface="Consolas" panose="020B0609020204030204" pitchFamily="49" charset="0"/>
+              </a:rPr>
+              <a:t>content(content_21, cell_5, state_3, val_11, content_15).</a:t>
+            </a:r>
+          </a:p>
+          <a:p>
+            <a:pPr marL="412737" indent="-412737"/>
+            <a:r>
+              <a:rPr lang="en-US" sz="1800" dirty="0">
+                <a:latin typeface="Consolas" panose="020B0609020204030204" pitchFamily="49" charset="0"/>
+              </a:rPr>
+              <a:t>content(content_22, cell_6, state_3, val_12, content_16).</a:t>
+            </a:r>
+          </a:p>
+          <a:p>
+            <a:pPr marL="412737" indent="-412737"/>
+            <a:endParaRPr lang="en-US" sz="1800" dirty="0"/>
+          </a:p>
+          <a:p>
+            <a:pPr marL="412737" indent="-412737"/>
+            <a:r>
+              <a:rPr lang="en-US" sz="1800" dirty="0">
+                <a:latin typeface="Consolas" panose="020B0609020204030204" pitchFamily="49" charset="0"/>
+              </a:rPr>
+              <a:t>%%%% Sort rows by Author %%%%%</a:t>
+            </a:r>
+          </a:p>
+          <a:p>
+            <a:pPr marL="412737" indent="-412737"/>
+            <a:endParaRPr lang="en-US" sz="1800" dirty="0">
+              <a:latin typeface="Consolas" panose="020B0609020204030204" pitchFamily="49" charset="0"/>
+            </a:endParaRPr>
+          </a:p>
+          <a:p>
+            <a:pPr marL="412737" indent="-412737"/>
+            <a:r>
+              <a:rPr lang="en-US" sz="1800" dirty="0">
+                <a:latin typeface="Consolas" panose="020B0609020204030204" pitchFamily="49" charset="0"/>
+              </a:rPr>
+              <a:t>state(state_4, array_1, state_3).</a:t>
+            </a:r>
+          </a:p>
+          <a:p>
+            <a:pPr marL="412737" indent="-412737"/>
+            <a:r>
+              <a:rPr lang="en-US" sz="1800" dirty="0" err="1">
+                <a:latin typeface="Consolas" panose="020B0609020204030204" pitchFamily="49" charset="0"/>
+              </a:rPr>
+              <a:t>row_position</a:t>
+            </a:r>
+            <a:r>
+              <a:rPr lang="en-US" sz="1800" dirty="0">
+                <a:latin typeface="Consolas" panose="020B0609020204030204" pitchFamily="49" charset="0"/>
+              </a:rPr>
+              <a:t>(row_pos_5, row_2, state_4, nil).</a:t>
+            </a:r>
+          </a:p>
+          <a:p>
+            <a:pPr marL="412737" indent="-412737"/>
+            <a:r>
+              <a:rPr lang="en-US" sz="1800" dirty="0" err="1">
+                <a:latin typeface="Consolas" panose="020B0609020204030204" pitchFamily="49" charset="0"/>
+              </a:rPr>
+              <a:t>row_position</a:t>
+            </a:r>
+            <a:r>
+              <a:rPr lang="en-US" sz="1800" dirty="0">
+                <a:latin typeface="Consolas" panose="020B0609020204030204" pitchFamily="49" charset="0"/>
+              </a:rPr>
+              <a:t>(row_pos_4, row_1, state_4, row_2).</a:t>
+            </a:r>
+          </a:p>
+          <a:p>
+            <a:pPr marL="412737" indent="-412737"/>
+            <a:r>
+              <a:rPr lang="en-US" sz="1800" dirty="0" err="1">
+                <a:latin typeface="Consolas" panose="020B0609020204030204" pitchFamily="49" charset="0"/>
+              </a:rPr>
+              <a:t>row_position</a:t>
+            </a:r>
+            <a:r>
+              <a:rPr lang="en-US" sz="1800" dirty="0">
+                <a:latin typeface="Consolas" panose="020B0609020204030204" pitchFamily="49" charset="0"/>
+              </a:rPr>
+              <a:t>(row_pos_6, row_3, state_4, row_1).</a:t>
+            </a:r>
+            <a:endParaRPr lang="en-US" sz="1800" dirty="0"/>
+          </a:p>
+          <a:p>
+            <a:pPr marL="412737" indent="-412737"/>
+            <a:endParaRPr lang="en-US" sz="1800" dirty="0"/>
+          </a:p>
+          <a:p>
+            <a:pPr marL="412737" indent="-412737"/>
+            <a:r>
+              <a:rPr lang="en-US" sz="1800" dirty="0">
+                <a:latin typeface="Consolas" panose="020B0609020204030204" pitchFamily="49" charset="0"/>
+              </a:rPr>
+              <a:t>%%%% Swap order of second and third columns %%%%%</a:t>
+            </a:r>
+          </a:p>
+          <a:p>
+            <a:pPr marL="412737" indent="-412737"/>
+            <a:endParaRPr lang="en-US" sz="1800" dirty="0">
+              <a:latin typeface="Consolas" panose="020B0609020204030204" pitchFamily="49" charset="0"/>
+            </a:endParaRPr>
+          </a:p>
+          <a:p>
+            <a:pPr marL="412737" indent="-412737"/>
+            <a:r>
+              <a:rPr lang="en-US" sz="1800" dirty="0">
+                <a:latin typeface="Consolas" panose="020B0609020204030204" pitchFamily="49" charset="0"/>
+              </a:rPr>
+              <a:t>state(state_5, array_1, state_4).</a:t>
+            </a:r>
+          </a:p>
+          <a:p>
+            <a:pPr marL="412737" indent="-412737"/>
+            <a:r>
+              <a:rPr lang="en-US" sz="1800" dirty="0" err="1">
+                <a:latin typeface="Consolas" panose="020B0609020204030204" pitchFamily="49" charset="0"/>
+              </a:rPr>
+              <a:t>column_schema</a:t>
+            </a:r>
+            <a:r>
+              <a:rPr lang="en-US" sz="1800" dirty="0">
+                <a:latin typeface="Consolas" panose="020B0609020204030204" pitchFamily="49" charset="0"/>
+              </a:rPr>
+              <a:t>(col_schema_6, col_3, state_5, 'string’, 'Date’,   col_1, nil).</a:t>
+            </a:r>
+          </a:p>
+          <a:p>
+            <a:pPr marL="412737" indent="-412737"/>
+            <a:r>
+              <a:rPr lang="en-US" sz="1800" dirty="0" err="1">
+                <a:latin typeface="Consolas" panose="020B0609020204030204" pitchFamily="49" charset="0"/>
+              </a:rPr>
+              <a:t>column_schema</a:t>
+            </a:r>
+            <a:r>
+              <a:rPr lang="en-US" sz="1800" dirty="0">
+                <a:latin typeface="Consolas" panose="020B0609020204030204" pitchFamily="49" charset="0"/>
+              </a:rPr>
+              <a:t>(col_schema_5, col_2, state_5, 'string’, 'Author’, col_3, nil).</a:t>
+            </a:r>
+          </a:p>
+          <a:p>
+            <a:pPr marL="412737" indent="-412737"/>
+            <a:endParaRPr lang="en-US" sz="1800" dirty="0"/>
+          </a:p>
+          <a:p>
+            <a:pPr marL="412737" indent="-412737"/>
+            <a:endParaRPr lang="en-US" sz="1800" dirty="0"/>
+          </a:p>
+          <a:p>
+            <a:pPr marL="412737" indent="-412737"/>
+            <a:endParaRPr lang="en-US" sz="1800" dirty="0"/>
+          </a:p>
+          <a:p>
+            <a:pPr marL="412737" indent="-412737"/>
+            <a:endParaRPr lang="en-US" sz="1800" dirty="0"/>
+          </a:p>
+          <a:p>
+            <a:pPr marL="412737" indent="-412737"/>
+            <a:endParaRPr lang="en-US" sz="1800" dirty="0"/>
+          </a:p>
+          <a:p>
+            <a:pPr marL="412737" indent="-412737"/>
+            <a:endParaRPr lang="en-US" sz="1800" dirty="0"/>
           </a:p>
         </p:txBody>
       </p:sp>

</xml_diff>

<commit_message>
rearranged poster and made more room for example
</commit_message>
<xml_diff>
--- a/tapp2019/poster/tapp2019-poster.pptx
+++ b/tapp2019/poster/tapp2019-poster.pptx
@@ -7270,7 +7270,7 @@
         <p:spPr bwMode="auto">
           <a:xfrm>
             <a:off x="304800" y="4595524"/>
-            <a:ext cx="9448800" cy="17426276"/>
+            <a:ext cx="9377381" cy="15749876"/>
           </a:xfrm>
           <a:prstGeom prst="rect">
             <a:avLst/>
@@ -7319,127 +7319,127 @@
               </a:spcBef>
             </a:pPr>
             <a:r>
-              <a:rPr lang="en-US" altLang="zh-CN" sz="3200" dirty="0"/>
+              <a:rPr lang="en-US" altLang="zh-CN" sz="2800" dirty="0"/>
               <a:t>Revealing the steps taken to clean a data set is critical to making any research using the data transparent and reproducible. </a:t>
             </a:r>
             <a:r>
-              <a:rPr lang="en-US" altLang="zh-CN" sz="3200" dirty="0" err="1"/>
+              <a:rPr lang="en-US" altLang="zh-CN" sz="2800" dirty="0" err="1"/>
               <a:t>OpenRefine</a:t>
             </a:r>
             <a:r>
-              <a:rPr lang="en-US" altLang="zh-CN" sz="3200" baseline="30000" dirty="0"/>
+              <a:rPr lang="en-US" altLang="zh-CN" sz="2800" baseline="30000" dirty="0"/>
               <a:t>[1]</a:t>
             </a:r>
             <a:r>
-              <a:rPr lang="zh-CN" altLang="en-US" sz="3200" dirty="0"/>
-              <a:t> </a:t>
-            </a:r>
-            <a:r>
-              <a:rPr lang="en-US" altLang="zh-CN" sz="3200" dirty="0"/>
+              <a:rPr lang="zh-CN" altLang="en-US" sz="2800" dirty="0"/>
+              <a:t> </a:t>
+            </a:r>
+            <a:r>
+              <a:rPr lang="en-US" altLang="zh-CN" sz="2800" dirty="0"/>
               <a:t>is</a:t>
             </a:r>
             <a:r>
-              <a:rPr lang="zh-CN" altLang="en-US" sz="3200" dirty="0"/>
-              <a:t> </a:t>
-            </a:r>
-            <a:r>
-              <a:rPr lang="en-US" altLang="zh-CN" sz="3200" dirty="0"/>
+              <a:rPr lang="zh-CN" altLang="en-US" sz="2800" dirty="0"/>
+              <a:t> </a:t>
+            </a:r>
+            <a:r>
+              <a:rPr lang="en-US" altLang="zh-CN" sz="2800" dirty="0"/>
               <a:t>a</a:t>
             </a:r>
             <a:r>
-              <a:rPr lang="zh-CN" altLang="en-US" sz="3200" dirty="0"/>
-              <a:t> </a:t>
-            </a:r>
-            <a:r>
-              <a:rPr lang="en-US" altLang="zh-CN" sz="3200" dirty="0"/>
+              <a:rPr lang="zh-CN" altLang="en-US" sz="2800" dirty="0"/>
+              <a:t> </a:t>
+            </a:r>
+            <a:r>
+              <a:rPr lang="en-US" altLang="zh-CN" sz="2800" dirty="0"/>
               <a:t>popular</a:t>
             </a:r>
             <a:r>
-              <a:rPr lang="zh-CN" altLang="en-US" sz="3200" dirty="0"/>
-              <a:t> </a:t>
-            </a:r>
-            <a:r>
-              <a:rPr lang="en-US" altLang="zh-CN" sz="3200" dirty="0"/>
+              <a:rPr lang="zh-CN" altLang="en-US" sz="2800" dirty="0"/>
+              <a:t> </a:t>
+            </a:r>
+            <a:r>
+              <a:rPr lang="en-US" altLang="zh-CN" sz="2800" dirty="0"/>
               <a:t>tool</a:t>
             </a:r>
             <a:r>
-              <a:rPr lang="zh-CN" altLang="en-US" sz="3200" dirty="0"/>
-              <a:t> </a:t>
-            </a:r>
-            <a:r>
-              <a:rPr lang="en-US" altLang="zh-CN" sz="3200" dirty="0"/>
+              <a:rPr lang="zh-CN" altLang="en-US" sz="2800" dirty="0"/>
+              <a:t> </a:t>
+            </a:r>
+            <a:r>
+              <a:rPr lang="en-US" altLang="zh-CN" sz="2800" dirty="0"/>
               <a:t>for</a:t>
             </a:r>
             <a:r>
-              <a:rPr lang="zh-CN" altLang="en-US" sz="3200" dirty="0"/>
-              <a:t> </a:t>
-            </a:r>
-            <a:r>
-              <a:rPr lang="en-US" altLang="zh-CN" sz="3200" dirty="0"/>
+              <a:rPr lang="zh-CN" altLang="en-US" sz="2800" dirty="0"/>
+              <a:t> </a:t>
+            </a:r>
+            <a:r>
+              <a:rPr lang="en-US" altLang="zh-CN" sz="2800" dirty="0"/>
               <a:t>exploring,</a:t>
             </a:r>
             <a:r>
-              <a:rPr lang="zh-CN" altLang="en-US" sz="3200" dirty="0"/>
-              <a:t> </a:t>
-            </a:r>
-            <a:r>
-              <a:rPr lang="en-US" altLang="zh-CN" sz="3200" dirty="0"/>
+              <a:rPr lang="zh-CN" altLang="en-US" sz="2800" dirty="0"/>
+              <a:t> </a:t>
+            </a:r>
+            <a:r>
+              <a:rPr lang="en-US" altLang="zh-CN" sz="2800" dirty="0"/>
               <a:t>profiling,</a:t>
             </a:r>
             <a:r>
-              <a:rPr lang="zh-CN" altLang="en-US" sz="3200" dirty="0"/>
-              <a:t> </a:t>
-            </a:r>
-            <a:r>
-              <a:rPr lang="en-US" altLang="zh-CN" sz="3200" dirty="0"/>
+              <a:rPr lang="zh-CN" altLang="en-US" sz="2800" dirty="0"/>
+              <a:t> </a:t>
+            </a:r>
+            <a:r>
+              <a:rPr lang="en-US" altLang="zh-CN" sz="2800" dirty="0"/>
               <a:t>and</a:t>
             </a:r>
             <a:r>
-              <a:rPr lang="zh-CN" altLang="en-US" sz="3200" dirty="0"/>
-              <a:t> </a:t>
-            </a:r>
-            <a:r>
-              <a:rPr lang="en-US" altLang="zh-CN" sz="3200" dirty="0"/>
+              <a:rPr lang="zh-CN" altLang="en-US" sz="2800" dirty="0"/>
+              <a:t> </a:t>
+            </a:r>
+            <a:r>
+              <a:rPr lang="en-US" altLang="zh-CN" sz="2800" dirty="0"/>
               <a:t>cleaning</a:t>
             </a:r>
             <a:r>
-              <a:rPr lang="zh-CN" altLang="en-US" sz="3200" dirty="0"/>
-              <a:t> </a:t>
-            </a:r>
-            <a:r>
-              <a:rPr lang="en-US" altLang="zh-CN" sz="3200" dirty="0"/>
+              <a:rPr lang="zh-CN" altLang="en-US" sz="2800" dirty="0"/>
+              <a:t> </a:t>
+            </a:r>
+            <a:r>
+              <a:rPr lang="en-US" altLang="zh-CN" sz="2800" dirty="0"/>
               <a:t>datasets</a:t>
             </a:r>
             <a:r>
-              <a:rPr lang="zh-CN" altLang="en-US" sz="3200" dirty="0"/>
-              <a:t> </a:t>
-            </a:r>
-            <a:r>
-              <a:rPr lang="en-US" altLang="zh-CN" sz="3200" dirty="0"/>
+              <a:rPr lang="zh-CN" altLang="en-US" sz="2800" dirty="0"/>
+              <a:t> </a:t>
+            </a:r>
+            <a:r>
+              <a:rPr lang="en-US" altLang="zh-CN" sz="2800" dirty="0"/>
               <a:t>using</a:t>
             </a:r>
             <a:r>
-              <a:rPr lang="zh-CN" altLang="en-US" sz="3200" dirty="0"/>
-              <a:t> </a:t>
-            </a:r>
-            <a:r>
-              <a:rPr lang="en-US" altLang="zh-CN" sz="3200" dirty="0"/>
+              <a:rPr lang="zh-CN" altLang="en-US" sz="2800" dirty="0"/>
+              <a:t> </a:t>
+            </a:r>
+            <a:r>
+              <a:rPr lang="en-US" altLang="zh-CN" sz="2800" dirty="0"/>
               <a:t>a spreadsheet-like</a:t>
             </a:r>
             <a:r>
-              <a:rPr lang="zh-CN" altLang="en-US" sz="3200" dirty="0"/>
-              <a:t> </a:t>
-            </a:r>
-            <a:r>
-              <a:rPr lang="en-US" altLang="zh-CN" sz="3200" dirty="0"/>
+              <a:rPr lang="zh-CN" altLang="en-US" sz="2800" dirty="0"/>
+              <a:t> </a:t>
+            </a:r>
+            <a:r>
+              <a:rPr lang="en-US" altLang="zh-CN" sz="2800" dirty="0"/>
               <a:t>interface. Here we report early results from an investigation into how the records captured by </a:t>
             </a:r>
             <a:r>
-              <a:rPr lang="en-US" altLang="zh-CN" sz="3200" dirty="0" err="1"/>
+              <a:rPr lang="en-US" altLang="zh-CN" sz="2800" dirty="0" err="1"/>
               <a:t>OpenRefine</a:t>
             </a:r>
             <a:r>
-              <a:rPr lang="en-US" altLang="zh-CN" sz="3200" dirty="0"/>
+              <a:rPr lang="en-US" altLang="zh-CN" sz="2800" dirty="0"/>
               <a:t> can:</a:t>
             </a:r>
           </a:p>
@@ -7451,7 +7451,7 @@
               <a:buAutoNum type="arabicPeriod"/>
             </a:pPr>
             <a:r>
-              <a:rPr lang="en-US" altLang="zh-CN" sz="3200" dirty="0"/>
+              <a:rPr lang="en-US" altLang="zh-CN" sz="2800" dirty="0"/>
               <a:t>Facilitate reproduction of complete, real-world data cleaning workflows.</a:t>
             </a:r>
           </a:p>
@@ -7463,7 +7463,7 @@
               <a:buAutoNum type="arabicPeriod"/>
             </a:pPr>
             <a:r>
-              <a:rPr lang="en-US" altLang="zh-CN" sz="3200" dirty="0"/>
+              <a:rPr lang="en-US" altLang="zh-CN" sz="2800" dirty="0"/>
               <a:t>Support queries and visualizations of the provenance of cleaned data sets for review.</a:t>
             </a:r>
           </a:p>
@@ -7473,7 +7473,7 @@
                 <a:spcPct val="50000"/>
               </a:spcBef>
             </a:pPr>
-            <a:endParaRPr lang="en-US" sz="4333" b="1" dirty="0">
+            <a:endParaRPr lang="en-US" sz="2800" b="1" dirty="0">
               <a:solidFill>
                 <a:srgbClr val="CC3300"/>
               </a:solidFill>
@@ -7481,36 +7481,36 @@
           </a:p>
           <a:p>
             <a:r>
-              <a:rPr lang="en-US" sz="3033" b="1" dirty="0"/>
+              <a:rPr lang="en-US" sz="2800" b="1" dirty="0"/>
               <a:t> </a:t>
             </a:r>
           </a:p>
           <a:p>
-            <a:endParaRPr lang="en-US" sz="3033" b="1" dirty="0"/>
-          </a:p>
-          <a:p>
-            <a:endParaRPr lang="en-US" sz="3033" b="1" dirty="0"/>
-          </a:p>
-          <a:p>
-            <a:endParaRPr lang="en-US" sz="3033" b="1" dirty="0"/>
-          </a:p>
-          <a:p>
-            <a:endParaRPr lang="en-US" sz="3033" b="1" dirty="0"/>
-          </a:p>
-          <a:p>
-            <a:endParaRPr lang="en-US" sz="3033" b="1" dirty="0"/>
-          </a:p>
-          <a:p>
-            <a:endParaRPr lang="en-US" sz="3033" b="1" dirty="0"/>
-          </a:p>
-          <a:p>
-            <a:endParaRPr lang="en-US" sz="3033" b="1" dirty="0"/>
-          </a:p>
-          <a:p>
-            <a:endParaRPr lang="en-US" sz="3033" b="1" dirty="0"/>
-          </a:p>
-          <a:p>
-            <a:endParaRPr lang="en-US" sz="3033" b="1" dirty="0"/>
+            <a:endParaRPr lang="en-US" sz="2800" b="1" dirty="0"/>
+          </a:p>
+          <a:p>
+            <a:endParaRPr lang="en-US" sz="2800" b="1" dirty="0"/>
+          </a:p>
+          <a:p>
+            <a:endParaRPr lang="en-US" sz="2800" b="1" dirty="0"/>
+          </a:p>
+          <a:p>
+            <a:endParaRPr lang="en-US" sz="2800" b="1" dirty="0"/>
+          </a:p>
+          <a:p>
+            <a:endParaRPr lang="en-US" sz="2800" b="1" dirty="0"/>
+          </a:p>
+          <a:p>
+            <a:endParaRPr lang="en-US" sz="2800" b="1" dirty="0"/>
+          </a:p>
+          <a:p>
+            <a:endParaRPr lang="en-US" sz="2800" b="1" dirty="0"/>
+          </a:p>
+          <a:p>
+            <a:endParaRPr lang="en-US" sz="2800" b="1" dirty="0"/>
+          </a:p>
+          <a:p>
+            <a:endParaRPr lang="en-US" sz="2800" b="1" dirty="0"/>
           </a:p>
           <a:p>
             <a:pPr>
@@ -7526,83 +7526,99 @@
                 <a:spcPct val="50000"/>
               </a:spcBef>
             </a:pPr>
-            <a:r>
-              <a:rPr lang="en-US" altLang="zh-CN" sz="2800" b="1" dirty="0"/>
+            <a:endParaRPr lang="en-US" altLang="zh-CN" sz="2400" b="1" dirty="0"/>
+          </a:p>
+          <a:p>
+            <a:pPr>
+              <a:spcBef>
+                <a:spcPct val="50000"/>
+              </a:spcBef>
+            </a:pPr>
+            <a:endParaRPr lang="en-US" altLang="zh-CN" sz="2400" b="1" dirty="0"/>
+          </a:p>
+          <a:p>
+            <a:pPr>
+              <a:spcBef>
+                <a:spcPct val="50000"/>
+              </a:spcBef>
+            </a:pPr>
+            <a:r>
+              <a:rPr lang="en-US" altLang="zh-CN" sz="2400" b="1" dirty="0"/>
               <a:t>Fig 1.</a:t>
             </a:r>
             <a:r>
-              <a:rPr lang="zh-CN" altLang="en-US" sz="2800" i="1" dirty="0"/>
-              <a:t> </a:t>
-            </a:r>
-            <a:r>
-              <a:rPr lang="en-US" altLang="zh-CN" sz="2800" i="1" dirty="0" err="1"/>
+              <a:rPr lang="zh-CN" altLang="en-US" sz="2400" i="1" dirty="0"/>
+              <a:t> </a:t>
+            </a:r>
+            <a:r>
+              <a:rPr lang="en-US" altLang="zh-CN" sz="2400" i="1" dirty="0" err="1"/>
               <a:t>OpenRefine</a:t>
             </a:r>
             <a:r>
-              <a:rPr lang="en-US" altLang="zh-CN" sz="2800" i="1" dirty="0"/>
+              <a:rPr lang="en-US" altLang="zh-CN" sz="2400" i="1" dirty="0"/>
               <a:t> stores records of operations carried out by a researcher in the process of transforming input</a:t>
             </a:r>
             <a:r>
-              <a:rPr lang="zh-CN" altLang="en-US" sz="2800" i="1" dirty="0"/>
-              <a:t> </a:t>
-            </a:r>
-            <a:r>
-              <a:rPr lang="en-US" altLang="zh-CN" sz="2800" i="1" dirty="0"/>
+              <a:rPr lang="zh-CN" altLang="en-US" sz="2400" i="1" dirty="0"/>
+              <a:t> </a:t>
+            </a:r>
+            <a:r>
+              <a:rPr lang="en-US" altLang="zh-CN" sz="2400" i="1" dirty="0"/>
               <a:t>dataset</a:t>
             </a:r>
             <a:r>
-              <a:rPr lang="zh-CN" altLang="en-US" sz="2800" i="1" dirty="0"/>
-              <a:t> </a:t>
-            </a:r>
-            <a:r>
-              <a:rPr lang="en-US" altLang="zh-CN" sz="2800" i="1" dirty="0"/>
+              <a:rPr lang="zh-CN" altLang="en-US" sz="2400" i="1" dirty="0"/>
+              <a:t> </a:t>
+            </a:r>
+            <a:r>
+              <a:rPr lang="en-US" altLang="zh-CN" sz="2400" i="1" dirty="0"/>
               <a:t>D</a:t>
             </a:r>
             <a:r>
-              <a:rPr lang="zh-CN" altLang="en-US" sz="2800" i="1" dirty="0"/>
-              <a:t> </a:t>
-            </a:r>
-            <a:r>
-              <a:rPr lang="en-US" altLang="zh-CN" sz="2800" i="1" dirty="0"/>
+              <a:rPr lang="zh-CN" altLang="en-US" sz="2400" i="1" dirty="0"/>
+              <a:t> </a:t>
+            </a:r>
+            <a:r>
+              <a:rPr lang="en-US" altLang="zh-CN" sz="2400" i="1" dirty="0"/>
               <a:t>to yield cleaned data set</a:t>
             </a:r>
             <a:r>
-              <a:rPr lang="zh-CN" altLang="en-US" sz="2800" i="1" dirty="0"/>
-              <a:t> </a:t>
-            </a:r>
-            <a:r>
-              <a:rPr lang="en-US" altLang="zh-CN" sz="2800" i="1" dirty="0"/>
+              <a:rPr lang="zh-CN" altLang="en-US" sz="2400" i="1" dirty="0"/>
+              <a:t> </a:t>
+            </a:r>
+            <a:r>
+              <a:rPr lang="en-US" altLang="zh-CN" sz="2400" i="1" dirty="0"/>
               <a:t>D’. It exposes these records as a browsable</a:t>
             </a:r>
             <a:r>
-              <a:rPr lang="zh-CN" altLang="en-US" sz="2800" i="1" dirty="0"/>
-              <a:t> </a:t>
-            </a:r>
-            <a:r>
-              <a:rPr lang="en-US" altLang="zh-CN" sz="2800" dirty="0"/>
+              <a:rPr lang="zh-CN" altLang="en-US" sz="2400" i="1" dirty="0"/>
+              <a:t> </a:t>
+            </a:r>
+            <a:r>
+              <a:rPr lang="en-US" altLang="zh-CN" sz="2400" dirty="0"/>
               <a:t>operation history </a:t>
             </a:r>
             <a:r>
-              <a:rPr lang="en-US" altLang="zh-CN" sz="2800" i="1" dirty="0"/>
+              <a:rPr lang="en-US" altLang="zh-CN" sz="2400" i="1" dirty="0"/>
               <a:t>that serves as the interface to its </a:t>
             </a:r>
             <a:r>
-              <a:rPr lang="en-US" altLang="zh-CN" sz="2800" dirty="0"/>
+              <a:rPr lang="en-US" altLang="zh-CN" sz="2400" dirty="0"/>
               <a:t>undo/redo feature</a:t>
             </a:r>
             <a:r>
-              <a:rPr lang="en-US" altLang="zh-CN" sz="2800" i="1" dirty="0"/>
+              <a:rPr lang="en-US" altLang="zh-CN" sz="2400" i="1" dirty="0"/>
               <a:t>; and as exportable </a:t>
             </a:r>
             <a:r>
-              <a:rPr lang="en-US" altLang="zh-CN" sz="2800" dirty="0"/>
+              <a:rPr lang="en-US" altLang="zh-CN" sz="2400" dirty="0"/>
               <a:t>recipes </a:t>
             </a:r>
             <a:r>
-              <a:rPr lang="en-US" altLang="zh-CN" sz="2800" i="1" dirty="0"/>
+              <a:rPr lang="en-US" altLang="zh-CN" sz="2400" i="1" dirty="0"/>
               <a:t>that can be reused to clean other data sets.</a:t>
             </a:r>
-            <a:endParaRPr lang="en-AU" sz="2800" i="1" dirty="0"/>
+            <a:endParaRPr lang="en-AU" sz="2400" i="1" dirty="0"/>
           </a:p>
         </p:txBody>
       </p:sp>
@@ -7616,8 +7632,8 @@
         </p:nvSpPr>
         <p:spPr bwMode="auto">
           <a:xfrm>
-            <a:off x="9914352" y="4586223"/>
-            <a:ext cx="10638733" cy="20864578"/>
+            <a:off x="22868454" y="4595525"/>
+            <a:ext cx="12390375" cy="14454476"/>
           </a:xfrm>
           <a:prstGeom prst="rect">
             <a:avLst/>
@@ -7647,7 +7663,7 @@
                   <a:srgbClr val="CC3300"/>
                 </a:solidFill>
               </a:rPr>
-              <a:t>Approach</a:t>
+              <a:t>Strategies</a:t>
             </a:r>
             <a:endParaRPr lang="en-GB" sz="4400" b="1" dirty="0">
               <a:solidFill>
@@ -7662,7 +7678,7 @@
               </a:spcBef>
             </a:pPr>
             <a:r>
-              <a:rPr lang="en-US" altLang="zh-CN" sz="3200" b="1" dirty="0">
+              <a:rPr lang="en-US" altLang="zh-CN" sz="2800" b="1" dirty="0">
                 <a:solidFill>
                   <a:srgbClr val="CC3200"/>
                 </a:solidFill>
@@ -7670,18 +7686,18 @@
               <a:t>Extract, transform, load. </a:t>
             </a:r>
             <a:r>
-              <a:rPr lang="en-US" sz="3200" dirty="0"/>
+              <a:rPr lang="en-US" sz="2800" dirty="0"/>
               <a:t>We extract the data cleaning records captured by </a:t>
             </a:r>
             <a:r>
-              <a:rPr lang="en-US" sz="3200" dirty="0" err="1"/>
+              <a:rPr lang="en-US" sz="2800" dirty="0" err="1"/>
               <a:t>OpenRefine</a:t>
             </a:r>
             <a:r>
-              <a:rPr lang="en-US" sz="3200" dirty="0"/>
+              <a:rPr lang="en-US" sz="2800" dirty="0"/>
               <a:t> and store them using a relational schema more amenable to query and visualization.</a:t>
             </a:r>
-            <a:endParaRPr lang="en-US" sz="3200" b="1" dirty="0"/>
+            <a:endParaRPr lang="en-US" sz="2800" b="1" dirty="0"/>
           </a:p>
           <a:p>
             <a:pPr>
@@ -7690,7 +7706,7 @@
               </a:spcBef>
             </a:pPr>
             <a:r>
-              <a:rPr lang="en-US" sz="3200" b="1" dirty="0">
+              <a:rPr lang="en-US" sz="2800" b="1" dirty="0">
                 <a:solidFill>
                   <a:srgbClr val="CC3200"/>
                 </a:solidFill>
@@ -7698,7 +7714,7 @@
               <a:t>Objects with identities.  </a:t>
             </a:r>
             <a:r>
-              <a:rPr lang="en-US" sz="3200" dirty="0"/>
+              <a:rPr lang="en-US" sz="2800" dirty="0"/>
               <a:t>Queries useful to researchers are posed and interpreted in light of the meanings of columns, rows, cells, and values in a data set. We support such meaningful queries by assigning to these objects identifiers that persist as they are rearranged, renamed, reformatted, copied, transformed, corrected, and edited, And we associate each update of an object with the state at which the change was introduced.</a:t>
             </a:r>
           </a:p>
@@ -7709,7 +7725,7 @@
               </a:spcBef>
             </a:pPr>
             <a:r>
-              <a:rPr lang="en-US" sz="3200" b="1" dirty="0">
+              <a:rPr lang="en-US" sz="2800" b="1" dirty="0">
                 <a:solidFill>
                   <a:srgbClr val="CC3200"/>
                 </a:solidFill>
@@ -7717,11 +7733,11 @@
               <a:t>Views of data set states. </a:t>
             </a:r>
             <a:r>
-              <a:rPr lang="en-US" sz="3200" dirty="0" err="1"/>
+              <a:rPr lang="en-US" sz="2800" dirty="0" err="1"/>
               <a:t>OpenRefine</a:t>
             </a:r>
             <a:r>
-              <a:rPr lang="en-US" sz="3200" dirty="0"/>
+              <a:rPr lang="en-US" sz="2800" dirty="0"/>
               <a:t> natively provides access to past data set states only by undoing all changes made subsequent to the state of interest. Our schema supports views and queries over multiple past states concurrently—without storing a complete snapshot of the data set at each state.</a:t>
             </a:r>
           </a:p>
@@ -7732,18 +7748,18 @@
               </a:spcBef>
             </a:pPr>
             <a:r>
-              <a:rPr lang="en-US" sz="3200" b="1" dirty="0">
+              <a:rPr lang="en-US" sz="2800" b="1" dirty="0">
                 <a:solidFill>
                   <a:srgbClr val="CC3200"/>
                 </a:solidFill>
               </a:rPr>
-              <a:t>Separation of concerns.  </a:t>
-            </a:r>
-            <a:r>
-              <a:rPr lang="en-US" sz="3200" dirty="0"/>
+              <a:t>Separate concerns.  </a:t>
+            </a:r>
+            <a:r>
+              <a:rPr lang="en-US" sz="2800" dirty="0"/>
               <a:t>The schema we use to represent the data-cleaning history of a data set is independent of the columns, rows, and values comprising the data set. A researcher neither needs to understand the schema representing the history, nor take into account the queries of interest to them prior to cleaning a data set.</a:t>
             </a:r>
-            <a:endParaRPr lang="en-US" sz="3200" b="1" dirty="0">
+            <a:endParaRPr lang="en-US" sz="2800" b="1" dirty="0">
               <a:solidFill>
                 <a:srgbClr val="CC3200"/>
               </a:solidFill>
@@ -7756,7 +7772,7 @@
               </a:spcBef>
             </a:pPr>
             <a:r>
-              <a:rPr lang="en-US" sz="3200" b="1" dirty="0">
+              <a:rPr lang="en-US" sz="2800" b="1" dirty="0">
                 <a:solidFill>
                   <a:srgbClr val="CC3200"/>
                 </a:solidFill>
@@ -7764,15 +7780,15 @@
               <a:t>Logic programming.  </a:t>
             </a:r>
             <a:r>
-              <a:rPr lang="en-US" sz="3200" dirty="0"/>
+              <a:rPr lang="en-US" sz="2800" dirty="0"/>
               <a:t>We support rapid experimentation and prototyping by representing data cleaning histories in formats easily queried using logic programming languages such as </a:t>
             </a:r>
             <a:r>
-              <a:rPr lang="en-US" sz="3200" dirty="0" err="1"/>
+              <a:rPr lang="en-US" sz="2800" dirty="0" err="1"/>
               <a:t>Datalog</a:t>
             </a:r>
             <a:r>
-              <a:rPr lang="en-US" sz="3200" dirty="0"/>
+              <a:rPr lang="en-US" sz="2800" dirty="0"/>
               <a:t> and Prolog.  </a:t>
             </a:r>
           </a:p>
@@ -7783,7 +7799,7 @@
               </a:spcBef>
             </a:pPr>
             <a:r>
-              <a:rPr lang="en-US" sz="3200" b="1" dirty="0">
+              <a:rPr lang="en-US" sz="2800" b="1" dirty="0">
                 <a:solidFill>
                   <a:srgbClr val="CC3200"/>
                 </a:solidFill>
@@ -7791,7 +7807,7 @@
               <a:t>Reproducible reproducibility research.  </a:t>
             </a:r>
             <a:r>
-              <a:rPr lang="en-US" sz="3200" dirty="0"/>
+              <a:rPr lang="en-US" sz="2800" dirty="0"/>
               <a:t>Research into provenance and reproducibility should be held to the highest standards of reproducibility and transparency.  To this end we employ reproducible computing environments, and we aim to make it easy for other researchers easily to repeat our observations and to evaluate our claims.</a:t>
             </a:r>
           </a:p>
@@ -7831,8 +7847,8 @@
         </p:nvSpPr>
         <p:spPr bwMode="auto">
           <a:xfrm>
-            <a:off x="20785254" y="32842630"/>
-            <a:ext cx="14781575" cy="2666570"/>
+            <a:off x="22868453" y="33927093"/>
+            <a:ext cx="12466575" cy="1322149"/>
           </a:xfrm>
           <a:prstGeom prst="rect">
             <a:avLst/>
@@ -7885,8 +7901,8 @@
         </p:blipFill>
         <p:spPr>
           <a:xfrm>
-            <a:off x="26336852" y="33419208"/>
-            <a:ext cx="8317381" cy="1423988"/>
+            <a:off x="30277481" y="34175146"/>
+            <a:ext cx="4981348" cy="852838"/>
           </a:xfrm>
           <a:prstGeom prst="rect">
             <a:avLst/>
@@ -7915,7 +7931,7 @@
         </p:blipFill>
         <p:spPr>
           <a:xfrm>
-            <a:off x="609600" y="12395003"/>
+            <a:off x="727164" y="11331222"/>
             <a:ext cx="8458199" cy="6121597"/>
           </a:xfrm>
           <a:prstGeom prst="rect">
@@ -7939,8 +7955,8 @@
         </p:nvSpPr>
         <p:spPr bwMode="auto">
           <a:xfrm>
-            <a:off x="266700" y="22277220"/>
-            <a:ext cx="9525000" cy="12565975"/>
+            <a:off x="304799" y="20528137"/>
+            <a:ext cx="9377381" cy="10462656"/>
           </a:xfrm>
           <a:prstGeom prst="rect">
             <a:avLst/>
@@ -7996,7 +8012,7 @@
               </a:spcBef>
             </a:pPr>
             <a:r>
-              <a:rPr lang="en-US" altLang="zh-CN" sz="3200" b="1" dirty="0">
+              <a:rPr lang="en-US" altLang="zh-CN" sz="2800" b="1" dirty="0">
                 <a:solidFill>
                   <a:srgbClr val="CC3200"/>
                 </a:solidFill>
@@ -8004,19 +8020,19 @@
               <a:t>Modeling.  </a:t>
             </a:r>
             <a:r>
-              <a:rPr lang="en-US" altLang="zh-CN" sz="3200" dirty="0" err="1"/>
+              <a:rPr lang="en-US" altLang="zh-CN" sz="2800" dirty="0" err="1"/>
               <a:t>OpenRefine</a:t>
             </a:r>
             <a:r>
-              <a:rPr lang="en-US" altLang="zh-CN" sz="3200" dirty="0"/>
+              <a:rPr lang="en-US" altLang="zh-CN" sz="2800" dirty="0"/>
               <a:t> has its own idiosyncratic terminology for describing the records it keeps and the capabilities it provides using them. We are mapping the </a:t>
             </a:r>
             <a:r>
-              <a:rPr lang="en-US" altLang="zh-CN" sz="3200" dirty="0" err="1"/>
+              <a:rPr lang="en-US" altLang="zh-CN" sz="2800" dirty="0" err="1"/>
               <a:t>OpenRefine</a:t>
             </a:r>
             <a:r>
-              <a:rPr lang="en-US" altLang="zh-CN" sz="3200" dirty="0"/>
+              <a:rPr lang="en-US" altLang="zh-CN" sz="2800" dirty="0"/>
               <a:t> concepts of data, operations, and recipes to those of the reproducible research and provenance communities.</a:t>
             </a:r>
           </a:p>
@@ -8027,7 +8043,7 @@
               </a:spcBef>
             </a:pPr>
             <a:r>
-              <a:rPr lang="en-US" altLang="zh-CN" sz="3200" b="1" dirty="0">
+              <a:rPr lang="en-US" altLang="zh-CN" sz="2800" b="1" dirty="0">
                 <a:solidFill>
                   <a:srgbClr val="CC3200"/>
                 </a:solidFill>
@@ -8035,30 +8051,30 @@
               <a:t>Reproducibility.</a:t>
             </a:r>
             <a:r>
-              <a:rPr lang="zh-CN" altLang="en-US" sz="3200" dirty="0"/>
+              <a:rPr lang="zh-CN" altLang="en-US" sz="2800" dirty="0"/>
               <a:t>  </a:t>
             </a:r>
             <a:r>
-              <a:rPr lang="en-US" altLang="zh-CN" sz="3200" dirty="0"/>
+              <a:rPr lang="en-US" altLang="zh-CN" sz="2800" dirty="0"/>
               <a:t>Recipes exported from </a:t>
             </a:r>
             <a:r>
-              <a:rPr lang="en-US" altLang="zh-CN" sz="3200" dirty="0" err="1"/>
+              <a:rPr lang="en-US" altLang="zh-CN" sz="2800" dirty="0" err="1"/>
               <a:t>OpenRefine</a:t>
             </a:r>
             <a:r>
-              <a:rPr lang="en-US" altLang="zh-CN" sz="3200" dirty="0"/>
+              <a:rPr lang="en-US" altLang="zh-CN" sz="2800" dirty="0"/>
               <a:t> include neither the initial data import step, nor any edits made manually to individual cells. We are providing means to use the records kept by </a:t>
             </a:r>
             <a:r>
-              <a:rPr lang="en-US" altLang="zh-CN" sz="3200" dirty="0" err="1"/>
+              <a:rPr lang="en-US" altLang="zh-CN" sz="2800" dirty="0" err="1"/>
               <a:t>OpenRefine</a:t>
             </a:r>
             <a:r>
-              <a:rPr lang="en-US" altLang="zh-CN" sz="3200" dirty="0"/>
+              <a:rPr lang="en-US" altLang="zh-CN" sz="2800" dirty="0"/>
               <a:t> to facilitate end-to-end reproducibility of data cleaning workflows.</a:t>
             </a:r>
-            <a:endParaRPr lang="en-AU" altLang="zh-CN" sz="3200" dirty="0"/>
+            <a:endParaRPr lang="en-AU" altLang="zh-CN" sz="2800" dirty="0"/>
           </a:p>
           <a:p>
             <a:pPr>
@@ -8067,7 +8083,7 @@
               </a:spcBef>
             </a:pPr>
             <a:r>
-              <a:rPr lang="en-US" altLang="zh-CN" sz="3200" b="1" dirty="0">
+              <a:rPr lang="en-US" altLang="zh-CN" sz="2800" b="1" dirty="0">
                 <a:solidFill>
                   <a:srgbClr val="CC3200"/>
                 </a:solidFill>
@@ -8075,147 +8091,9 @@
               <a:t>Transparency.  </a:t>
             </a:r>
             <a:r>
-              <a:rPr lang="en-US" altLang="zh-CN" sz="3200" dirty="0"/>
+              <a:rPr lang="en-US" altLang="zh-CN" sz="2800" dirty="0"/>
               <a:t>Displaying lists of operations and the ability to revisit past states one at a time provide limited means for interrogating how data was cleaned. We aim to make data cleaning workflows and their products easy to query — prospectively and retrospectively — to answer any questions researchers may have about the provenance of cleaned data sets.</a:t>
             </a:r>
-          </a:p>
-        </p:txBody>
-      </p:sp>
-      <p:sp>
-        <p:nvSpPr>
-          <p:cNvPr id="60" name="Rectangle 34">
-            <a:extLst>
-              <a:ext uri="{FF2B5EF4-FFF2-40B4-BE49-F238E27FC236}">
-                <a16:creationId xmlns:a16="http://schemas.microsoft.com/office/drawing/2014/main" id="{66B3782D-FBEF-9F48-A045-31621320540A}"/>
-              </a:ext>
-            </a:extLst>
-          </p:cNvPr>
-          <p:cNvSpPr>
-            <a:spLocks noChangeArrowheads="1"/>
-          </p:cNvSpPr>
-          <p:nvPr/>
-        </p:nvSpPr>
-        <p:spPr bwMode="auto">
-          <a:xfrm>
-            <a:off x="-14367136" y="9586942"/>
-            <a:ext cx="14781577" cy="4199031"/>
-          </a:xfrm>
-          <a:prstGeom prst="rect">
-            <a:avLst/>
-          </a:prstGeom>
-          <a:solidFill>
-            <a:schemeClr val="bg1"/>
-          </a:solidFill>
-          <a:ln>
-            <a:noFill/>
-          </a:ln>
-          <a:extLst>
-            <a:ext uri="{91240B29-F687-4f45-9708-019B960494DF}">
-              <a14:hiddenLine xmlns:mc="http://schemas.openxmlformats.org/markup-compatibility/2006" xmlns:mv="urn:schemas-microsoft-com:mac:vml" xmlns:a14="http://schemas.microsoft.com/office/drawing/2010/main" xmlns="" w="9525">
-                <a:solidFill>
-                  <a:srgbClr val="000000"/>
-                </a:solidFill>
-                <a:miter lim="800000"/>
-                <a:headEnd/>
-                <a:tailEnd/>
-              </a14:hiddenLine>
-            </a:ext>
-          </a:extLst>
-        </p:spPr>
-        <p:txBody>
-          <a:bodyPr lIns="390000" tIns="390000" rIns="390000" bIns="390000"/>
-          <a:lstStyle/>
-          <a:p>
-            <a:pPr>
-              <a:spcBef>
-                <a:spcPct val="50000"/>
-              </a:spcBef>
-            </a:pPr>
-            <a:r>
-              <a:rPr lang="en-GB" sz="4333" b="1" dirty="0">
-                <a:solidFill>
-                  <a:srgbClr val="CC3300"/>
-                </a:solidFill>
-              </a:rPr>
-              <a:t>Acknowledgments</a:t>
-            </a:r>
-            <a:r>
-              <a:rPr lang="zh-CN" altLang="en-US" sz="4333" b="1" dirty="0">
-                <a:solidFill>
-                  <a:srgbClr val="CC3300"/>
-                </a:solidFill>
-              </a:rPr>
-              <a:t> </a:t>
-            </a:r>
-            <a:endParaRPr lang="en-US" altLang="zh-CN" sz="4333" b="1" dirty="0">
-              <a:solidFill>
-                <a:srgbClr val="CC3300"/>
-              </a:solidFill>
-            </a:endParaRPr>
-          </a:p>
-          <a:p>
-            <a:pPr>
-              <a:spcBef>
-                <a:spcPct val="50000"/>
-              </a:spcBef>
-            </a:pPr>
-            <a:r>
-              <a:rPr lang="en-US" altLang="zh-CN" sz="3033" dirty="0"/>
-              <a:t>Research reported in this poster was supported in The Whole Tale program and NSF (National Science Foundation). And the author wishes to thank for Prof. Bertram Ludäscher and Qian Zhang guidance and support during Summer 2018, to Yi-Yun Cheng and Santiago Núñez-Corrales , for their collaborate with user story construction.</a:t>
-            </a:r>
-            <a:endParaRPr lang="en-US" altLang="zh-CN" sz="4333" b="1" dirty="0">
-              <a:solidFill>
-                <a:srgbClr val="CC3300"/>
-              </a:solidFill>
-            </a:endParaRPr>
-          </a:p>
-          <a:p>
-            <a:pPr algn="ctr">
-              <a:spcBef>
-                <a:spcPct val="50000"/>
-              </a:spcBef>
-            </a:pPr>
-            <a:endParaRPr lang="en-US" altLang="zh-CN" sz="3033" dirty="0"/>
-          </a:p>
-          <a:p>
-            <a:pPr algn="ctr">
-              <a:spcBef>
-                <a:spcPct val="50000"/>
-              </a:spcBef>
-            </a:pPr>
-            <a:endParaRPr lang="en-US" altLang="zh-CN" sz="3033" dirty="0"/>
-          </a:p>
-          <a:p>
-            <a:pPr algn="ctr">
-              <a:spcBef>
-                <a:spcPct val="50000"/>
-              </a:spcBef>
-            </a:pPr>
-            <a:endParaRPr lang="en-US" altLang="zh-CN" sz="3033" dirty="0"/>
-          </a:p>
-          <a:p>
-            <a:pPr algn="ctr">
-              <a:spcBef>
-                <a:spcPct val="50000"/>
-              </a:spcBef>
-            </a:pPr>
-            <a:endParaRPr lang="en-US" altLang="zh-CN" sz="3033" dirty="0"/>
-          </a:p>
-          <a:p>
-            <a:pPr algn="ctr">
-              <a:spcBef>
-                <a:spcPct val="50000"/>
-              </a:spcBef>
-            </a:pPr>
-            <a:endParaRPr lang="en-US" altLang="zh-CN" sz="3033" dirty="0"/>
-          </a:p>
-          <a:p>
-            <a:pPr algn="ctr">
-              <a:spcBef>
-                <a:spcPct val="50000"/>
-              </a:spcBef>
-            </a:pPr>
-            <a:endParaRPr lang="en-US" altLang="zh-CN" sz="3033" dirty="0"/>
           </a:p>
         </p:txBody>
       </p:sp>
@@ -8248,8 +8126,8 @@
         </p:blipFill>
         <p:spPr bwMode="auto">
           <a:xfrm>
-            <a:off x="21015802" y="33030810"/>
-            <a:ext cx="2279339" cy="2290793"/>
+            <a:off x="26643263" y="33962321"/>
+            <a:ext cx="1245989" cy="1252250"/>
           </a:xfrm>
           <a:prstGeom prst="rect">
             <a:avLst/>
@@ -8295,8 +8173,8 @@
         </p:blipFill>
         <p:spPr bwMode="auto">
           <a:xfrm>
-            <a:off x="23639076" y="32926109"/>
-            <a:ext cx="2127452" cy="2241234"/>
+            <a:off x="28435896" y="33927094"/>
+            <a:ext cx="1188676" cy="1252250"/>
           </a:xfrm>
           <a:prstGeom prst="rect">
             <a:avLst/>
@@ -8329,8 +8207,8 @@
         </p:nvSpPr>
         <p:spPr bwMode="auto">
           <a:xfrm>
-            <a:off x="-14637528" y="14873103"/>
-            <a:ext cx="14781576" cy="3676553"/>
+            <a:off x="22868454" y="26194729"/>
+            <a:ext cx="12390375" cy="7511106"/>
           </a:xfrm>
           <a:prstGeom prst="rect">
             <a:avLst/>
@@ -8374,193 +8252,193 @@
           </a:p>
           <a:p>
             <a:r>
-              <a:rPr lang="en-US" altLang="zh-CN" sz="3033" dirty="0"/>
+              <a:rPr lang="en-US" altLang="zh-CN" sz="2800" dirty="0"/>
               <a:t>[1]</a:t>
             </a:r>
             <a:r>
-              <a:rPr lang="zh-CN" altLang="en-US" sz="3033" dirty="0"/>
-              <a:t> </a:t>
-            </a:r>
-            <a:r>
-              <a:rPr lang="en-US" altLang="zh-CN" sz="3033" dirty="0"/>
+              <a:rPr lang="zh-CN" altLang="en-US" sz="2800" dirty="0"/>
+              <a:t> </a:t>
+            </a:r>
+            <a:r>
+              <a:rPr lang="en-US" altLang="zh-CN" sz="2800" dirty="0"/>
               <a:t>OpenRefine:</a:t>
             </a:r>
             <a:r>
-              <a:rPr lang="zh-CN" altLang="en-US" sz="3033" dirty="0"/>
-              <a:t> </a:t>
-            </a:r>
-            <a:r>
-              <a:rPr lang="en-US" altLang="zh-CN" sz="3033" dirty="0"/>
+              <a:rPr lang="zh-CN" altLang="en-US" sz="2800" dirty="0"/>
+              <a:t> </a:t>
+            </a:r>
+            <a:r>
+              <a:rPr lang="en-US" altLang="zh-CN" sz="2800" dirty="0"/>
               <a:t>A</a:t>
             </a:r>
             <a:r>
-              <a:rPr lang="zh-CN" altLang="en-US" sz="3033" dirty="0"/>
-              <a:t> </a:t>
-            </a:r>
-            <a:r>
-              <a:rPr lang="en-US" altLang="zh-CN" sz="3033" dirty="0"/>
+              <a:rPr lang="zh-CN" altLang="en-US" sz="2800" dirty="0"/>
+              <a:t> </a:t>
+            </a:r>
+            <a:r>
+              <a:rPr lang="en-US" altLang="zh-CN" sz="2800" dirty="0"/>
               <a:t>free,</a:t>
             </a:r>
             <a:r>
-              <a:rPr lang="zh-CN" altLang="en-US" sz="3033" dirty="0"/>
-              <a:t> </a:t>
-            </a:r>
-            <a:r>
-              <a:rPr lang="en-US" altLang="zh-CN" sz="3033" dirty="0"/>
+              <a:rPr lang="zh-CN" altLang="en-US" sz="2800" dirty="0"/>
+              <a:t> </a:t>
+            </a:r>
+            <a:r>
+              <a:rPr lang="en-US" altLang="zh-CN" sz="2800" dirty="0"/>
               <a:t>open</a:t>
             </a:r>
             <a:r>
-              <a:rPr lang="zh-CN" altLang="en-US" sz="3033" dirty="0"/>
-              <a:t> </a:t>
-            </a:r>
-            <a:r>
-              <a:rPr lang="en-US" altLang="zh-CN" sz="3033" dirty="0"/>
+              <a:rPr lang="zh-CN" altLang="en-US" sz="2800" dirty="0"/>
+              <a:t> </a:t>
+            </a:r>
+            <a:r>
+              <a:rPr lang="en-US" altLang="zh-CN" sz="2800" dirty="0"/>
               <a:t>source,</a:t>
             </a:r>
             <a:r>
-              <a:rPr lang="zh-CN" altLang="en-US" sz="3033" dirty="0"/>
-              <a:t> </a:t>
-            </a:r>
-            <a:r>
-              <a:rPr lang="en-US" altLang="zh-CN" sz="3033" dirty="0"/>
+              <a:rPr lang="zh-CN" altLang="en-US" sz="2800" dirty="0"/>
+              <a:t> </a:t>
+            </a:r>
+            <a:r>
+              <a:rPr lang="en-US" altLang="zh-CN" sz="2800" dirty="0"/>
               <a:t>powerful</a:t>
             </a:r>
             <a:r>
-              <a:rPr lang="zh-CN" altLang="en-US" sz="3033" dirty="0"/>
-              <a:t> </a:t>
-            </a:r>
-            <a:r>
-              <a:rPr lang="en-US" altLang="zh-CN" sz="3033" dirty="0"/>
+              <a:rPr lang="zh-CN" altLang="en-US" sz="2800" dirty="0"/>
+              <a:t> </a:t>
+            </a:r>
+            <a:r>
+              <a:rPr lang="en-US" altLang="zh-CN" sz="2800" dirty="0"/>
               <a:t>tool</a:t>
             </a:r>
             <a:r>
-              <a:rPr lang="zh-CN" altLang="en-US" sz="3033" dirty="0"/>
-              <a:t> </a:t>
-            </a:r>
-            <a:r>
-              <a:rPr lang="en-US" altLang="zh-CN" sz="3033" dirty="0"/>
+              <a:rPr lang="zh-CN" altLang="en-US" sz="2800" dirty="0"/>
+              <a:t> </a:t>
+            </a:r>
+            <a:r>
+              <a:rPr lang="en-US" altLang="zh-CN" sz="2800" dirty="0"/>
               <a:t>for</a:t>
             </a:r>
             <a:r>
-              <a:rPr lang="zh-CN" altLang="en-US" sz="3033" dirty="0"/>
-              <a:t> </a:t>
-            </a:r>
-            <a:r>
-              <a:rPr lang="en-US" altLang="zh-CN" sz="3033" dirty="0"/>
+              <a:rPr lang="zh-CN" altLang="en-US" sz="2800" dirty="0"/>
+              <a:t> </a:t>
+            </a:r>
+            <a:r>
+              <a:rPr lang="en-US" altLang="zh-CN" sz="2800" dirty="0"/>
               <a:t>working</a:t>
             </a:r>
             <a:r>
-              <a:rPr lang="zh-CN" altLang="en-US" sz="3033" dirty="0"/>
-              <a:t> </a:t>
-            </a:r>
-            <a:r>
-              <a:rPr lang="en-US" altLang="zh-CN" sz="3033" dirty="0"/>
+              <a:rPr lang="zh-CN" altLang="en-US" sz="2800" dirty="0"/>
+              <a:t> </a:t>
+            </a:r>
+            <a:r>
+              <a:rPr lang="en-US" altLang="zh-CN" sz="2800" dirty="0"/>
               <a:t>with</a:t>
             </a:r>
             <a:r>
-              <a:rPr lang="zh-CN" altLang="en-US" sz="3033" dirty="0"/>
-              <a:t> </a:t>
-            </a:r>
-            <a:r>
-              <a:rPr lang="en-US" altLang="zh-CN" sz="3033" dirty="0"/>
+              <a:rPr lang="zh-CN" altLang="en-US" sz="2800" dirty="0"/>
+              <a:t> </a:t>
+            </a:r>
+            <a:r>
+              <a:rPr lang="en-US" altLang="zh-CN" sz="2800" dirty="0"/>
               <a:t>messy</a:t>
             </a:r>
             <a:r>
-              <a:rPr lang="zh-CN" altLang="en-US" sz="3033" dirty="0"/>
-              <a:t> </a:t>
-            </a:r>
-            <a:r>
-              <a:rPr lang="en-US" altLang="zh-CN" sz="3033" dirty="0"/>
+              <a:rPr lang="zh-CN" altLang="en-US" sz="2800" dirty="0"/>
+              <a:t> </a:t>
+            </a:r>
+            <a:r>
+              <a:rPr lang="en-US" altLang="zh-CN" sz="2800" dirty="0"/>
               <a:t>data.</a:t>
             </a:r>
             <a:r>
-              <a:rPr lang="zh-CN" altLang="en-US" sz="3033" dirty="0"/>
-              <a:t> </a:t>
-            </a:r>
-            <a:r>
-              <a:rPr lang="en-US" altLang="zh-CN" sz="3033" dirty="0">
+              <a:rPr lang="zh-CN" altLang="en-US" sz="2800" dirty="0"/>
+              <a:t> </a:t>
+            </a:r>
+            <a:r>
+              <a:rPr lang="en-US" altLang="zh-CN" sz="2800" dirty="0">
                 <a:hlinkClick r:id="rId7"/>
               </a:rPr>
               <a:t>http://openrefine.org/</a:t>
             </a:r>
             <a:r>
-              <a:rPr lang="zh-CN" altLang="en-US" sz="3033" dirty="0"/>
-              <a:t> </a:t>
-            </a:r>
-            <a:r>
-              <a:rPr lang="en-US" altLang="zh-CN" sz="3033" dirty="0"/>
+              <a:rPr lang="zh-CN" altLang="en-US" sz="2800" dirty="0"/>
+              <a:t> </a:t>
+            </a:r>
+            <a:r>
+              <a:rPr lang="en-US" altLang="zh-CN" sz="2800" dirty="0"/>
               <a:t>(2018)</a:t>
             </a:r>
           </a:p>
           <a:p>
             <a:r>
-              <a:rPr lang="en-US" altLang="zh-CN" sz="3033" dirty="0"/>
+              <a:rPr lang="en-US" altLang="zh-CN" sz="2800" dirty="0"/>
               <a:t>[2] 2. Makepeace, P., Lohmeier, F.: OpenRefine Python client library.</a:t>
             </a:r>
             <a:r>
-              <a:rPr lang="zh-CN" altLang="en-US" sz="3033" dirty="0"/>
-              <a:t> </a:t>
-            </a:r>
-            <a:r>
-              <a:rPr lang="en-US" altLang="zh-CN" sz="3033" dirty="0">
+              <a:rPr lang="zh-CN" altLang="en-US" sz="2800" dirty="0"/>
+              <a:t> </a:t>
+            </a:r>
+            <a:r>
+              <a:rPr lang="en-US" altLang="zh-CN" sz="2800" dirty="0">
                 <a:hlinkClick r:id="rId8"/>
               </a:rPr>
               <a:t>https://github.com/opencultureconsulting/openrefine-client/</a:t>
             </a:r>
             <a:r>
-              <a:rPr lang="zh-CN" altLang="en-US" sz="3033" dirty="0"/>
-              <a:t> </a:t>
-            </a:r>
-            <a:r>
-              <a:rPr lang="en-US" altLang="zh-CN" sz="3033" dirty="0"/>
+              <a:rPr lang="zh-CN" altLang="en-US" sz="2800" dirty="0"/>
+              <a:t> </a:t>
+            </a:r>
+            <a:r>
+              <a:rPr lang="en-US" altLang="zh-CN" sz="2800" dirty="0"/>
               <a:t>(2018)</a:t>
             </a:r>
           </a:p>
           <a:p>
             <a:r>
-              <a:rPr lang="en-US" altLang="zh-CN" sz="3033" dirty="0"/>
+              <a:rPr lang="en-US" altLang="zh-CN" sz="2800" dirty="0"/>
               <a:t>[3] What’s</a:t>
             </a:r>
             <a:r>
-              <a:rPr lang="zh-CN" altLang="en-US" sz="3033" dirty="0"/>
-              <a:t> </a:t>
-            </a:r>
-            <a:r>
-              <a:rPr lang="en-US" altLang="zh-CN" sz="3033" dirty="0"/>
+              <a:rPr lang="zh-CN" altLang="en-US" sz="2800" dirty="0"/>
+              <a:t> </a:t>
+            </a:r>
+            <a:r>
+              <a:rPr lang="en-US" altLang="zh-CN" sz="2800" dirty="0"/>
               <a:t>on</a:t>
             </a:r>
             <a:r>
-              <a:rPr lang="zh-CN" altLang="en-US" sz="3033" dirty="0"/>
-              <a:t> </a:t>
-            </a:r>
-            <a:r>
-              <a:rPr lang="en-US" altLang="zh-CN" sz="3033" dirty="0"/>
+              <a:rPr lang="zh-CN" altLang="en-US" sz="2800" dirty="0"/>
+              <a:t> </a:t>
+            </a:r>
+            <a:r>
+              <a:rPr lang="en-US" altLang="zh-CN" sz="2800" dirty="0"/>
               <a:t>the</a:t>
             </a:r>
             <a:r>
-              <a:rPr lang="zh-CN" altLang="en-US" sz="3033" dirty="0"/>
-              <a:t> </a:t>
-            </a:r>
-            <a:r>
-              <a:rPr lang="en-US" altLang="zh-CN" sz="3033" dirty="0"/>
+              <a:rPr lang="zh-CN" altLang="en-US" sz="2800" dirty="0"/>
+              <a:t> </a:t>
+            </a:r>
+            <a:r>
+              <a:rPr lang="en-US" altLang="zh-CN" sz="2800" dirty="0"/>
               <a:t>Menu?</a:t>
             </a:r>
             <a:r>
-              <a:rPr lang="zh-CN" altLang="en-US" sz="3033" dirty="0"/>
-              <a:t> </a:t>
-            </a:r>
-            <a:r>
-              <a:rPr lang="en-US" altLang="zh-CN" sz="3033" dirty="0">
+              <a:rPr lang="zh-CN" altLang="en-US" sz="2800" dirty="0"/>
+              <a:t> </a:t>
+            </a:r>
+            <a:r>
+              <a:rPr lang="en-US" altLang="zh-CN" sz="2800" dirty="0">
                 <a:hlinkClick r:id="rId9"/>
               </a:rPr>
               <a:t>http://menus.nypl.org/data</a:t>
             </a:r>
             <a:r>
-              <a:rPr lang="zh-CN" altLang="en-US" sz="3033" dirty="0"/>
-              <a:t> </a:t>
-            </a:r>
-            <a:r>
-              <a:rPr lang="en-US" altLang="zh-CN" sz="3033" dirty="0"/>
+              <a:rPr lang="zh-CN" altLang="en-US" sz="2800" dirty="0"/>
+              <a:t> </a:t>
+            </a:r>
+            <a:r>
+              <a:rPr lang="en-US" altLang="zh-CN" sz="2800" dirty="0"/>
               <a:t>(03/16/2019)</a:t>
             </a:r>
           </a:p>
@@ -8656,8 +8534,8 @@
         </p:nvSpPr>
         <p:spPr bwMode="auto">
           <a:xfrm>
-            <a:off x="20785254" y="28575000"/>
-            <a:ext cx="14781576" cy="4080033"/>
+            <a:off x="304800" y="31851600"/>
+            <a:ext cx="9362141" cy="3256724"/>
           </a:xfrm>
           <a:prstGeom prst="rect">
             <a:avLst/>
@@ -8700,44 +8578,47 @@
             </a:r>
           </a:p>
           <a:p>
-            <a:r>
-              <a:rPr lang="en-US" altLang="zh-CN" sz="3033" b="1" dirty="0"/>
+            <a:endParaRPr lang="en-US" altLang="zh-CN" sz="2400" b="1" dirty="0"/>
+          </a:p>
+          <a:p>
+            <a:r>
+              <a:rPr lang="en-US" altLang="zh-CN" sz="2400" b="1" dirty="0"/>
               <a:t>Email:  </a:t>
             </a:r>
             <a:r>
-              <a:rPr lang="en-US" altLang="zh-CN" sz="3033" dirty="0">
+              <a:rPr lang="en-US" altLang="zh-CN" sz="2400" dirty="0">
                 <a:hlinkClick r:id="rId10"/>
               </a:rPr>
               <a:t>tmcphill@illinois.edu</a:t>
             </a:r>
-            <a:endParaRPr lang="en-US" altLang="zh-CN" sz="3033" dirty="0"/>
-          </a:p>
-          <a:p>
-            <a:endParaRPr lang="en-US" altLang="zh-CN" sz="3033" b="1" dirty="0"/>
-          </a:p>
-          <a:p>
-            <a:r>
-              <a:rPr lang="en-US" altLang="zh-CN" sz="3033" b="1" dirty="0"/>
+            <a:endParaRPr lang="en-US" altLang="zh-CN" sz="2400" dirty="0"/>
+          </a:p>
+          <a:p>
+            <a:endParaRPr lang="en-US" altLang="zh-CN" sz="2400" b="1" dirty="0"/>
+          </a:p>
+          <a:p>
+            <a:r>
+              <a:rPr lang="en-US" altLang="zh-CN" sz="2400" b="1" dirty="0"/>
               <a:t>GitHub Project Repositories:</a:t>
             </a:r>
           </a:p>
           <a:p>
             <a:r>
-              <a:rPr lang="en-US" sz="3200" dirty="0">
+              <a:rPr lang="en-US" sz="2400" dirty="0">
                 <a:hlinkClick r:id="rId11"/>
               </a:rPr>
               <a:t>https://github.com/idaks/openrefine-provenance</a:t>
             </a:r>
-            <a:endParaRPr lang="en-US" sz="3200" dirty="0"/>
-          </a:p>
-          <a:p>
-            <a:r>
-              <a:rPr lang="en-US" sz="3200" dirty="0">
+            <a:endParaRPr lang="en-US" sz="2400" dirty="0"/>
+          </a:p>
+          <a:p>
+            <a:r>
+              <a:rPr lang="en-US" sz="2400" dirty="0">
                 <a:hlinkClick r:id="rId12"/>
               </a:rPr>
               <a:t>https://github.com/idaks/openrefine-reproducibility</a:t>
             </a:r>
-            <a:endParaRPr lang="en-US" altLang="zh-CN" sz="3200" b="1" dirty="0"/>
+            <a:endParaRPr lang="en-US" altLang="zh-CN" sz="2400" b="1" dirty="0"/>
           </a:p>
           <a:p>
             <a:endParaRPr lang="en-US" altLang="zh-CN" sz="3033" b="1" dirty="0"/>
@@ -8784,29 +8665,6 @@
           </a:p>
         </p:txBody>
       </p:sp>
-      <p:pic>
-        <p:nvPicPr>
-          <p:cNvPr id="6" name="Picture 5"/>
-          <p:cNvPicPr>
-            <a:picLocks noChangeAspect="1"/>
-          </p:cNvPicPr>
-          <p:nvPr/>
-        </p:nvPicPr>
-        <p:blipFill rotWithShape="1">
-          <a:blip r:embed="rId13"/>
-          <a:srcRect l="20477" t="26092" r="16652" b="20045"/>
-          <a:stretch/>
-        </p:blipFill>
-        <p:spPr>
-          <a:xfrm>
-            <a:off x="31465916" y="28588911"/>
-            <a:ext cx="3163415" cy="3510241"/>
-          </a:xfrm>
-          <a:prstGeom prst="rect">
-            <a:avLst/>
-          </a:prstGeom>
-        </p:spPr>
-      </p:pic>
       <p:sp>
         <p:nvSpPr>
           <p:cNvPr id="26" name="Rectangle 33">
@@ -8823,8 +8681,8 @@
         </p:nvSpPr>
         <p:spPr bwMode="auto">
           <a:xfrm>
-            <a:off x="9914351" y="25603200"/>
-            <a:ext cx="10638733" cy="9239994"/>
+            <a:off x="22835046" y="19298054"/>
+            <a:ext cx="12390375" cy="6517419"/>
           </a:xfrm>
           <a:prstGeom prst="rect">
             <a:avLst/>
@@ -8880,7 +8738,7 @@
               </a:spcBef>
             </a:pPr>
             <a:r>
-              <a:rPr lang="en-US" altLang="zh-CN" sz="3200" b="1" dirty="0" err="1">
+              <a:rPr lang="en-US" altLang="zh-CN" sz="2800" b="1" dirty="0" err="1">
                 <a:solidFill>
                   <a:srgbClr val="CC3200"/>
                 </a:solidFill>
@@ -8888,7 +8746,7 @@
               <a:t>OpenRefine</a:t>
             </a:r>
             <a:r>
-              <a:rPr lang="en-US" altLang="zh-CN" sz="3200" b="1" dirty="0">
+              <a:rPr lang="en-US" altLang="zh-CN" sz="2800" b="1" dirty="0">
                 <a:solidFill>
                   <a:srgbClr val="CC3200"/>
                 </a:solidFill>
@@ -8896,31 +8754,31 @@
               <a:t>. </a:t>
             </a:r>
             <a:r>
-              <a:rPr lang="en-US" altLang="zh-CN" sz="3200" dirty="0"/>
+              <a:rPr lang="en-US" altLang="zh-CN" sz="2800" dirty="0"/>
               <a:t>We carry out our experiments on </a:t>
             </a:r>
             <a:r>
-              <a:rPr lang="en-US" altLang="zh-CN" sz="3200" dirty="0" err="1"/>
+              <a:rPr lang="en-US" altLang="zh-CN" sz="2800" dirty="0" err="1"/>
               <a:t>OpenRefine</a:t>
             </a:r>
             <a:r>
-              <a:rPr lang="en-US" altLang="zh-CN" sz="3200" dirty="0"/>
+              <a:rPr lang="en-US" altLang="zh-CN" sz="2800" dirty="0"/>
               <a:t> version 3.1 [7] in Java 8 environments on multiple platforms. We automate interactions with </a:t>
             </a:r>
             <a:r>
-              <a:rPr lang="en-US" altLang="zh-CN" sz="3200" dirty="0" err="1"/>
+              <a:rPr lang="en-US" altLang="zh-CN" sz="2800" dirty="0" err="1"/>
               <a:t>OpenRefine</a:t>
             </a:r>
             <a:r>
-              <a:rPr lang="en-US" altLang="zh-CN" sz="3200" dirty="0"/>
+              <a:rPr lang="en-US" altLang="zh-CN" sz="2800" dirty="0"/>
               <a:t> via its native HTTP API by using and extending the </a:t>
             </a:r>
             <a:r>
-              <a:rPr lang="en-US" altLang="zh-CN" sz="3200" dirty="0" err="1"/>
+              <a:rPr lang="en-US" altLang="zh-CN" sz="2800" dirty="0" err="1"/>
               <a:t>OpenRefine</a:t>
             </a:r>
             <a:r>
-              <a:rPr lang="en-US" altLang="zh-CN" sz="3200" dirty="0"/>
+              <a:rPr lang="en-US" altLang="zh-CN" sz="2800" dirty="0"/>
               <a:t> Python Client Library [3].</a:t>
             </a:r>
           </a:p>
@@ -8931,7 +8789,7 @@
               </a:spcBef>
             </a:pPr>
             <a:r>
-              <a:rPr lang="en-US" altLang="zh-CN" sz="3200" b="1" dirty="0">
+              <a:rPr lang="en-US" altLang="zh-CN" sz="2800" b="1" dirty="0">
                 <a:solidFill>
                   <a:srgbClr val="CC3200"/>
                 </a:solidFill>
@@ -8939,23 +8797,23 @@
               <a:t>Queries. </a:t>
             </a:r>
             <a:r>
-              <a:rPr lang="en-US" altLang="zh-CN" sz="3200" dirty="0"/>
+              <a:rPr lang="en-US" altLang="zh-CN" sz="2800" dirty="0"/>
               <a:t>We employ XSB Prolog [9] for expressing and performing </a:t>
             </a:r>
             <a:r>
-              <a:rPr lang="en-US" altLang="zh-CN" sz="3200" dirty="0" err="1"/>
+              <a:rPr lang="en-US" altLang="zh-CN" sz="2800" dirty="0" err="1"/>
               <a:t>Datalog</a:t>
             </a:r>
             <a:r>
-              <a:rPr lang="en-US" altLang="zh-CN" sz="3200" dirty="0"/>
+              <a:rPr lang="en-US" altLang="zh-CN" sz="2800" dirty="0"/>
               <a:t>-style graph and provenance queries, and </a:t>
             </a:r>
             <a:r>
-              <a:rPr lang="en-US" altLang="zh-CN" sz="3200" dirty="0" err="1"/>
+              <a:rPr lang="en-US" altLang="zh-CN" sz="2800" dirty="0" err="1"/>
               <a:t>Graphviz</a:t>
             </a:r>
             <a:r>
-              <a:rPr lang="en-US" altLang="zh-CN" sz="3200" dirty="0"/>
+              <a:rPr lang="en-US" altLang="zh-CN" sz="2800" dirty="0"/>
               <a:t> for rendering visualizations of query results.</a:t>
             </a:r>
           </a:p>
@@ -8966,7 +8824,7 @@
               </a:spcBef>
             </a:pPr>
             <a:r>
-              <a:rPr lang="en-US" altLang="zh-CN" sz="3200" b="1" dirty="0">
+              <a:rPr lang="en-US" altLang="zh-CN" sz="2800" b="1" dirty="0">
                 <a:solidFill>
                   <a:srgbClr val="CC3200"/>
                 </a:solidFill>
@@ -8974,7 +8832,7 @@
               <a:t>Reproducible computing. </a:t>
             </a:r>
             <a:r>
-              <a:rPr lang="en-US" altLang="zh-CN" sz="3200" dirty="0"/>
+              <a:rPr lang="en-US" altLang="zh-CN" sz="2800" dirty="0"/>
               <a:t>We depend on Ansible, Vagrant, and Docker for making research environments reproducible across coauthors’ computers and for enabling other researchers to repeat our experiments on their own systems.</a:t>
             </a:r>
           </a:p>
@@ -8996,8 +8854,8 @@
         </p:nvSpPr>
         <p:spPr bwMode="auto">
           <a:xfrm>
-            <a:off x="20800494" y="4586223"/>
-            <a:ext cx="14594406" cy="23815091"/>
+            <a:off x="10104544" y="4595525"/>
+            <a:ext cx="12390375" cy="22455476"/>
           </a:xfrm>
           <a:prstGeom prst="rect">
             <a:avLst/>
@@ -9027,7 +8885,7 @@
                   <a:srgbClr val="CC3300"/>
                 </a:solidFill>
               </a:rPr>
-              <a:t>Example Data Cleaning History – Work in Progress</a:t>
+              <a:t>Example – Work in Progress</a:t>
             </a:r>
             <a:endParaRPr lang="en-GB" sz="4400" b="1" dirty="0">
               <a:solidFill>
@@ -9043,6 +8901,9 @@
             <a:pPr marL="412737" indent="-412737"/>
             <a:r>
               <a:rPr lang="en-US" sz="1800" dirty="0">
+                <a:solidFill>
+                  <a:srgbClr val="00B050"/>
+                </a:solidFill>
                 <a:latin typeface="Consolas" panose="020B0609020204030204" pitchFamily="49" charset="0"/>
               </a:rPr>
               <a:t>%%%% STATE AFTER INITIAL IMPORT STEP %%%%%</a:t>
@@ -9058,42 +8919,84 @@
             <a:pPr marL="412737" indent="-412737"/>
             <a:r>
               <a:rPr lang="en-US" sz="1800" dirty="0">
+                <a:solidFill>
+                  <a:schemeClr val="tx1">
+                    <a:lumMod val="65000"/>
+                    <a:lumOff val="35000"/>
+                  </a:schemeClr>
+                </a:solidFill>
                 <a:latin typeface="Consolas" panose="020B0609020204030204" pitchFamily="49" charset="0"/>
               </a:rPr>
               <a:t>% source(</a:t>
             </a:r>
             <a:r>
               <a:rPr lang="en-US" sz="1800" dirty="0" err="1">
+                <a:solidFill>
+                  <a:schemeClr val="tx1">
+                    <a:lumMod val="65000"/>
+                    <a:lumOff val="35000"/>
+                  </a:schemeClr>
+                </a:solidFill>
                 <a:latin typeface="Consolas" panose="020B0609020204030204" pitchFamily="49" charset="0"/>
               </a:rPr>
               <a:t>SourceId</a:t>
             </a:r>
             <a:r>
               <a:rPr lang="en-US" sz="1800" dirty="0">
+                <a:solidFill>
+                  <a:schemeClr val="tx1">
+                    <a:lumMod val="65000"/>
+                    <a:lumOff val="35000"/>
+                  </a:schemeClr>
+                </a:solidFill>
                 <a:latin typeface="Consolas" panose="020B0609020204030204" pitchFamily="49" charset="0"/>
               </a:rPr>
               <a:t>, </a:t>
             </a:r>
             <a:r>
               <a:rPr lang="en-US" sz="1800" dirty="0" err="1">
+                <a:solidFill>
+                  <a:schemeClr val="tx1">
+                    <a:lumMod val="65000"/>
+                    <a:lumOff val="35000"/>
+                  </a:schemeClr>
+                </a:solidFill>
                 <a:latin typeface="Consolas" panose="020B0609020204030204" pitchFamily="49" charset="0"/>
               </a:rPr>
               <a:t>SourceUri</a:t>
             </a:r>
             <a:r>
               <a:rPr lang="en-US" sz="1800" dirty="0">
+                <a:solidFill>
+                  <a:schemeClr val="tx1">
+                    <a:lumMod val="65000"/>
+                    <a:lumOff val="35000"/>
+                  </a:schemeClr>
+                </a:solidFill>
                 <a:latin typeface="Consolas" panose="020B0609020204030204" pitchFamily="49" charset="0"/>
               </a:rPr>
               <a:t>, </a:t>
             </a:r>
             <a:r>
               <a:rPr lang="en-US" sz="1800" dirty="0" err="1">
+                <a:solidFill>
+                  <a:schemeClr val="tx1">
+                    <a:lumMod val="65000"/>
+                    <a:lumOff val="35000"/>
+                  </a:schemeClr>
+                </a:solidFill>
                 <a:latin typeface="Consolas" panose="020B0609020204030204" pitchFamily="49" charset="0"/>
               </a:rPr>
               <a:t>SourceFormat</a:t>
             </a:r>
             <a:r>
               <a:rPr lang="en-US" sz="1800" dirty="0">
+                <a:solidFill>
+                  <a:schemeClr val="tx1">
+                    <a:lumMod val="65000"/>
+                    <a:lumOff val="35000"/>
+                  </a:schemeClr>
+                </a:solidFill>
                 <a:latin typeface="Consolas" panose="020B0609020204030204" pitchFamily="49" charset="0"/>
               </a:rPr>
               <a:t>).</a:t>
@@ -9103,6 +9006,9 @@
             <a:pPr marL="412737" indent="-412737"/>
             <a:r>
               <a:rPr lang="en-US" sz="1800" dirty="0">
+                <a:solidFill>
+                  <a:srgbClr val="0070C0"/>
+                </a:solidFill>
                 <a:latin typeface="Consolas" panose="020B0609020204030204" pitchFamily="49" charset="0"/>
               </a:rPr>
               <a:t>source(source_1, 'biblio.csv', 'text/csv').</a:t>
@@ -9118,42 +9024,84 @@
             <a:pPr marL="412737" indent="-412737"/>
             <a:r>
               <a:rPr lang="en-US" sz="1800" dirty="0">
+                <a:solidFill>
+                  <a:schemeClr val="tx1">
+                    <a:lumMod val="65000"/>
+                    <a:lumOff val="35000"/>
+                  </a:schemeClr>
+                </a:solidFill>
                 <a:latin typeface="Consolas" panose="020B0609020204030204" pitchFamily="49" charset="0"/>
               </a:rPr>
               <a:t>% dataset(</a:t>
             </a:r>
             <a:r>
               <a:rPr lang="en-US" sz="1800" dirty="0" err="1">
+                <a:solidFill>
+                  <a:schemeClr val="tx1">
+                    <a:lumMod val="65000"/>
+                    <a:lumOff val="35000"/>
+                  </a:schemeClr>
+                </a:solidFill>
                 <a:latin typeface="Consolas" panose="020B0609020204030204" pitchFamily="49" charset="0"/>
               </a:rPr>
               <a:t>DatasetId</a:t>
             </a:r>
             <a:r>
               <a:rPr lang="en-US" sz="1800" dirty="0">
+                <a:solidFill>
+                  <a:schemeClr val="tx1">
+                    <a:lumMod val="65000"/>
+                    <a:lumOff val="35000"/>
+                  </a:schemeClr>
+                </a:solidFill>
                 <a:latin typeface="Consolas" panose="020B0609020204030204" pitchFamily="49" charset="0"/>
               </a:rPr>
               <a:t>, </a:t>
             </a:r>
             <a:r>
               <a:rPr lang="en-US" sz="1800" dirty="0" err="1">
+                <a:solidFill>
+                  <a:schemeClr val="tx1">
+                    <a:lumMod val="65000"/>
+                    <a:lumOff val="35000"/>
+                  </a:schemeClr>
+                </a:solidFill>
                 <a:latin typeface="Consolas" panose="020B0609020204030204" pitchFamily="49" charset="0"/>
               </a:rPr>
               <a:t>SourceId</a:t>
             </a:r>
             <a:r>
               <a:rPr lang="en-US" sz="1800" dirty="0">
+                <a:solidFill>
+                  <a:schemeClr val="tx1">
+                    <a:lumMod val="65000"/>
+                    <a:lumOff val="35000"/>
+                  </a:schemeClr>
+                </a:solidFill>
                 <a:latin typeface="Consolas" panose="020B0609020204030204" pitchFamily="49" charset="0"/>
               </a:rPr>
               <a:t>, </a:t>
             </a:r>
             <a:r>
               <a:rPr lang="en-US" sz="1800" dirty="0" err="1">
+                <a:solidFill>
+                  <a:schemeClr val="tx1">
+                    <a:lumMod val="65000"/>
+                    <a:lumOff val="35000"/>
+                  </a:schemeClr>
+                </a:solidFill>
                 <a:latin typeface="Consolas" panose="020B0609020204030204" pitchFamily="49" charset="0"/>
               </a:rPr>
               <a:t>ArrayId</a:t>
             </a:r>
             <a:r>
               <a:rPr lang="en-US" sz="1800" dirty="0">
+                <a:solidFill>
+                  <a:schemeClr val="tx1">
+                    <a:lumMod val="65000"/>
+                    <a:lumOff val="35000"/>
+                  </a:schemeClr>
+                </a:solidFill>
                 <a:latin typeface="Consolas" panose="020B0609020204030204" pitchFamily="49" charset="0"/>
               </a:rPr>
               <a:t>).</a:t>
@@ -9163,6 +9111,9 @@
             <a:pPr marL="412737" indent="-412737"/>
             <a:r>
               <a:rPr lang="en-US" sz="1800" dirty="0">
+                <a:solidFill>
+                  <a:srgbClr val="0070C0"/>
+                </a:solidFill>
                 <a:latin typeface="Consolas" panose="020B0609020204030204" pitchFamily="49" charset="0"/>
               </a:rPr>
               <a:t>dataset(dataset_1, source_1, array_9).</a:t>
@@ -9178,30 +9129,60 @@
             <a:pPr marL="412737" indent="-412737"/>
             <a:r>
               <a:rPr lang="en-US" sz="1800" dirty="0">
+                <a:solidFill>
+                  <a:schemeClr val="tx1">
+                    <a:lumMod val="65000"/>
+                    <a:lumOff val="35000"/>
+                  </a:schemeClr>
+                </a:solidFill>
                 <a:latin typeface="Consolas" panose="020B0609020204030204" pitchFamily="49" charset="0"/>
               </a:rPr>
               <a:t>% array(</a:t>
             </a:r>
             <a:r>
               <a:rPr lang="en-US" sz="1800" dirty="0" err="1">
+                <a:solidFill>
+                  <a:schemeClr val="tx1">
+                    <a:lumMod val="65000"/>
+                    <a:lumOff val="35000"/>
+                  </a:schemeClr>
+                </a:solidFill>
                 <a:latin typeface="Consolas" panose="020B0609020204030204" pitchFamily="49" charset="0"/>
               </a:rPr>
               <a:t>ArrayId</a:t>
             </a:r>
             <a:r>
               <a:rPr lang="en-US" sz="1800" dirty="0">
+                <a:solidFill>
+                  <a:schemeClr val="tx1">
+                    <a:lumMod val="65000"/>
+                    <a:lumOff val="35000"/>
+                  </a:schemeClr>
+                </a:solidFill>
                 <a:latin typeface="Consolas" panose="020B0609020204030204" pitchFamily="49" charset="0"/>
               </a:rPr>
               <a:t>, </a:t>
             </a:r>
             <a:r>
               <a:rPr lang="en-US" sz="1800" dirty="0" err="1">
+                <a:solidFill>
+                  <a:schemeClr val="tx1">
+                    <a:lumMod val="65000"/>
+                    <a:lumOff val="35000"/>
+                  </a:schemeClr>
+                </a:solidFill>
                 <a:latin typeface="Consolas" panose="020B0609020204030204" pitchFamily="49" charset="0"/>
               </a:rPr>
               <a:t>DatasetId</a:t>
             </a:r>
             <a:r>
               <a:rPr lang="en-US" sz="1800" dirty="0">
+                <a:solidFill>
+                  <a:schemeClr val="tx1">
+                    <a:lumMod val="65000"/>
+                    <a:lumOff val="35000"/>
+                  </a:schemeClr>
+                </a:solidFill>
                 <a:latin typeface="Consolas" panose="020B0609020204030204" pitchFamily="49" charset="0"/>
               </a:rPr>
               <a:t>).</a:t>
@@ -9211,6 +9192,9 @@
             <a:pPr marL="412737" indent="-412737"/>
             <a:r>
               <a:rPr lang="en-US" sz="1800" dirty="0">
+                <a:solidFill>
+                  <a:srgbClr val="0070C0"/>
+                </a:solidFill>
                 <a:latin typeface="Consolas" panose="020B0609020204030204" pitchFamily="49" charset="0"/>
               </a:rPr>
               <a:t>array(array_1, dataset_1).</a:t>
@@ -9226,30 +9210,60 @@
             <a:pPr marL="412737" indent="-412737"/>
             <a:r>
               <a:rPr lang="en-US" sz="1800" dirty="0">
+                <a:solidFill>
+                  <a:schemeClr val="tx1">
+                    <a:lumMod val="65000"/>
+                    <a:lumOff val="35000"/>
+                  </a:schemeClr>
+                </a:solidFill>
                 <a:latin typeface="Consolas" panose="020B0609020204030204" pitchFamily="49" charset="0"/>
               </a:rPr>
               <a:t>% column(</a:t>
             </a:r>
             <a:r>
               <a:rPr lang="en-US" sz="1800" dirty="0" err="1">
+                <a:solidFill>
+                  <a:schemeClr val="tx1">
+                    <a:lumMod val="65000"/>
+                    <a:lumOff val="35000"/>
+                  </a:schemeClr>
+                </a:solidFill>
                 <a:latin typeface="Consolas" panose="020B0609020204030204" pitchFamily="49" charset="0"/>
               </a:rPr>
               <a:t>ColId</a:t>
             </a:r>
             <a:r>
               <a:rPr lang="en-US" sz="1800" dirty="0">
+                <a:solidFill>
+                  <a:schemeClr val="tx1">
+                    <a:lumMod val="65000"/>
+                    <a:lumOff val="35000"/>
+                  </a:schemeClr>
+                </a:solidFill>
                 <a:latin typeface="Consolas" panose="020B0609020204030204" pitchFamily="49" charset="0"/>
               </a:rPr>
               <a:t>, </a:t>
             </a:r>
             <a:r>
               <a:rPr lang="en-US" sz="1800" dirty="0" err="1">
+                <a:solidFill>
+                  <a:schemeClr val="tx1">
+                    <a:lumMod val="65000"/>
+                    <a:lumOff val="35000"/>
+                  </a:schemeClr>
+                </a:solidFill>
                 <a:latin typeface="Consolas" panose="020B0609020204030204" pitchFamily="49" charset="0"/>
               </a:rPr>
               <a:t>ArrayId</a:t>
             </a:r>
             <a:r>
               <a:rPr lang="en-US" sz="1800" dirty="0">
+                <a:solidFill>
+                  <a:schemeClr val="tx1">
+                    <a:lumMod val="65000"/>
+                    <a:lumOff val="35000"/>
+                  </a:schemeClr>
+                </a:solidFill>
                 <a:latin typeface="Consolas" panose="020B0609020204030204" pitchFamily="49" charset="0"/>
               </a:rPr>
               <a:t>).</a:t>
@@ -9259,6 +9273,9 @@
             <a:pPr marL="412737" indent="-412737"/>
             <a:r>
               <a:rPr lang="en-US" sz="1800" dirty="0">
+                <a:solidFill>
+                  <a:srgbClr val="0070C0"/>
+                </a:solidFill>
                 <a:latin typeface="Consolas" panose="020B0609020204030204" pitchFamily="49" charset="0"/>
               </a:rPr>
               <a:t>column(col_1, array_1).  column(col_2, array_1).  column(col_3, array_1).</a:t>
@@ -9274,30 +9291,60 @@
             <a:pPr marL="412737" indent="-412737"/>
             <a:r>
               <a:rPr lang="en-US" sz="1800" dirty="0">
+                <a:solidFill>
+                  <a:schemeClr val="tx1">
+                    <a:lumMod val="65000"/>
+                    <a:lumOff val="35000"/>
+                  </a:schemeClr>
+                </a:solidFill>
                 <a:latin typeface="Consolas" panose="020B0609020204030204" pitchFamily="49" charset="0"/>
               </a:rPr>
               <a:t>% row(</a:t>
             </a:r>
             <a:r>
               <a:rPr lang="en-US" sz="1800" dirty="0" err="1">
+                <a:solidFill>
+                  <a:schemeClr val="tx1">
+                    <a:lumMod val="65000"/>
+                    <a:lumOff val="35000"/>
+                  </a:schemeClr>
+                </a:solidFill>
                 <a:latin typeface="Consolas" panose="020B0609020204030204" pitchFamily="49" charset="0"/>
               </a:rPr>
               <a:t>RowId</a:t>
             </a:r>
             <a:r>
               <a:rPr lang="en-US" sz="1800" dirty="0">
+                <a:solidFill>
+                  <a:schemeClr val="tx1">
+                    <a:lumMod val="65000"/>
+                    <a:lumOff val="35000"/>
+                  </a:schemeClr>
+                </a:solidFill>
                 <a:latin typeface="Consolas" panose="020B0609020204030204" pitchFamily="49" charset="0"/>
               </a:rPr>
               <a:t>, </a:t>
             </a:r>
             <a:r>
               <a:rPr lang="en-US" sz="1800" dirty="0" err="1">
+                <a:solidFill>
+                  <a:schemeClr val="tx1">
+                    <a:lumMod val="65000"/>
+                    <a:lumOff val="35000"/>
+                  </a:schemeClr>
+                </a:solidFill>
                 <a:latin typeface="Consolas" panose="020B0609020204030204" pitchFamily="49" charset="0"/>
               </a:rPr>
               <a:t>ArrayId</a:t>
             </a:r>
             <a:r>
               <a:rPr lang="en-US" sz="1800" dirty="0">
+                <a:solidFill>
+                  <a:schemeClr val="tx1">
+                    <a:lumMod val="65000"/>
+                    <a:lumOff val="35000"/>
+                  </a:schemeClr>
+                </a:solidFill>
                 <a:latin typeface="Consolas" panose="020B0609020204030204" pitchFamily="49" charset="0"/>
               </a:rPr>
               <a:t>).</a:t>
@@ -9307,6 +9354,9 @@
             <a:pPr marL="412737" indent="-412737"/>
             <a:r>
               <a:rPr lang="en-US" sz="1800" dirty="0">
+                <a:solidFill>
+                  <a:srgbClr val="0070C0"/>
+                </a:solidFill>
                 <a:latin typeface="Consolas" panose="020B0609020204030204" pitchFamily="49" charset="0"/>
               </a:rPr>
               <a:t>row(row_1, array_1). </a:t>
@@ -9316,6 +9366,9 @@
             <a:pPr marL="412737" indent="-412737"/>
             <a:r>
               <a:rPr lang="en-US" sz="1800" dirty="0">
+                <a:solidFill>
+                  <a:srgbClr val="0070C0"/>
+                </a:solidFill>
                 <a:latin typeface="Consolas" panose="020B0609020204030204" pitchFamily="49" charset="0"/>
               </a:rPr>
               <a:t>row(row_2, array_1). </a:t>
@@ -9325,6 +9378,9 @@
             <a:pPr marL="412737" indent="-412737"/>
             <a:r>
               <a:rPr lang="en-US" sz="1800" dirty="0">
+                <a:solidFill>
+                  <a:srgbClr val="0070C0"/>
+                </a:solidFill>
                 <a:latin typeface="Consolas" panose="020B0609020204030204" pitchFamily="49" charset="0"/>
               </a:rPr>
               <a:t>row(row_3, array_1).</a:t>
@@ -9340,42 +9396,84 @@
             <a:pPr marL="412737" indent="-412737"/>
             <a:r>
               <a:rPr lang="en-US" sz="1800" dirty="0">
+                <a:solidFill>
+                  <a:schemeClr val="tx1">
+                    <a:lumMod val="65000"/>
+                    <a:lumOff val="35000"/>
+                  </a:schemeClr>
+                </a:solidFill>
                 <a:latin typeface="Consolas" panose="020B0609020204030204" pitchFamily="49" charset="0"/>
               </a:rPr>
               <a:t>% cell(</a:t>
             </a:r>
             <a:r>
               <a:rPr lang="en-US" sz="1800" dirty="0" err="1">
+                <a:solidFill>
+                  <a:schemeClr val="tx1">
+                    <a:lumMod val="65000"/>
+                    <a:lumOff val="35000"/>
+                  </a:schemeClr>
+                </a:solidFill>
                 <a:latin typeface="Consolas" panose="020B0609020204030204" pitchFamily="49" charset="0"/>
               </a:rPr>
               <a:t>CellId</a:t>
             </a:r>
             <a:r>
               <a:rPr lang="en-US" sz="1800" dirty="0">
+                <a:solidFill>
+                  <a:schemeClr val="tx1">
+                    <a:lumMod val="65000"/>
+                    <a:lumOff val="35000"/>
+                  </a:schemeClr>
+                </a:solidFill>
                 <a:latin typeface="Consolas" panose="020B0609020204030204" pitchFamily="49" charset="0"/>
               </a:rPr>
               <a:t>, </a:t>
             </a:r>
             <a:r>
               <a:rPr lang="en-US" sz="1800" dirty="0" err="1">
+                <a:solidFill>
+                  <a:schemeClr val="tx1">
+                    <a:lumMod val="65000"/>
+                    <a:lumOff val="35000"/>
+                  </a:schemeClr>
+                </a:solidFill>
                 <a:latin typeface="Consolas" panose="020B0609020204030204" pitchFamily="49" charset="0"/>
               </a:rPr>
               <a:t>ColId</a:t>
             </a:r>
             <a:r>
               <a:rPr lang="en-US" sz="1800" dirty="0">
+                <a:solidFill>
+                  <a:schemeClr val="tx1">
+                    <a:lumMod val="65000"/>
+                    <a:lumOff val="35000"/>
+                  </a:schemeClr>
+                </a:solidFill>
                 <a:latin typeface="Consolas" panose="020B0609020204030204" pitchFamily="49" charset="0"/>
               </a:rPr>
               <a:t>, </a:t>
             </a:r>
             <a:r>
               <a:rPr lang="en-US" sz="1800" dirty="0" err="1">
+                <a:solidFill>
+                  <a:schemeClr val="tx1">
+                    <a:lumMod val="65000"/>
+                    <a:lumOff val="35000"/>
+                  </a:schemeClr>
+                </a:solidFill>
                 <a:latin typeface="Consolas" panose="020B0609020204030204" pitchFamily="49" charset="0"/>
               </a:rPr>
               <a:t>RowId</a:t>
             </a:r>
             <a:r>
               <a:rPr lang="en-US" sz="1800" dirty="0">
+                <a:solidFill>
+                  <a:schemeClr val="tx1">
+                    <a:lumMod val="65000"/>
+                    <a:lumOff val="35000"/>
+                  </a:schemeClr>
+                </a:solidFill>
                 <a:latin typeface="Consolas" panose="020B0609020204030204" pitchFamily="49" charset="0"/>
               </a:rPr>
               <a:t>).</a:t>
@@ -9385,6 +9483,9 @@
             <a:pPr marL="412737" indent="-412737"/>
             <a:r>
               <a:rPr lang="en-US" sz="1800" dirty="0">
+                <a:solidFill>
+                  <a:srgbClr val="0070C0"/>
+                </a:solidFill>
                 <a:latin typeface="Consolas" panose="020B0609020204030204" pitchFamily="49" charset="0"/>
               </a:rPr>
               <a:t>cell(cell_1, col_1, row_1). cell(cell_4, col_2, row_1). cell(cell_7, col_3, row_1). </a:t>
@@ -9394,6 +9495,9 @@
             <a:pPr marL="412737" indent="-412737"/>
             <a:r>
               <a:rPr lang="en-US" sz="1800" dirty="0">
+                <a:solidFill>
+                  <a:srgbClr val="0070C0"/>
+                </a:solidFill>
                 <a:latin typeface="Consolas" panose="020B0609020204030204" pitchFamily="49" charset="0"/>
               </a:rPr>
               <a:t>cell(cell_2, col_1, row_2). cell(cell_5, col_2, row_2). cell(cell_8, col_3, row_2).</a:t>
@@ -9403,6 +9507,9 @@
             <a:pPr marL="412737" indent="-412737"/>
             <a:r>
               <a:rPr lang="en-US" sz="1800" dirty="0">
+                <a:solidFill>
+                  <a:srgbClr val="0070C0"/>
+                </a:solidFill>
                 <a:latin typeface="Consolas" panose="020B0609020204030204" pitchFamily="49" charset="0"/>
               </a:rPr>
               <a:t>cell(cell_3, col_1, row_3). cell(cell_6, col_2, row_3). cell(cell_9, col_3, row_3).</a:t>
@@ -9418,42 +9525,84 @@
             <a:pPr marL="412737" indent="-412737"/>
             <a:r>
               <a:rPr lang="en-US" sz="1800" dirty="0">
+                <a:solidFill>
+                  <a:schemeClr val="tx1">
+                    <a:lumMod val="65000"/>
+                    <a:lumOff val="35000"/>
+                  </a:schemeClr>
+                </a:solidFill>
                 <a:latin typeface="Consolas" panose="020B0609020204030204" pitchFamily="49" charset="0"/>
               </a:rPr>
               <a:t>% state(</a:t>
             </a:r>
             <a:r>
               <a:rPr lang="en-US" sz="1800" dirty="0" err="1">
+                <a:solidFill>
+                  <a:schemeClr val="tx1">
+                    <a:lumMod val="65000"/>
+                    <a:lumOff val="35000"/>
+                  </a:schemeClr>
+                </a:solidFill>
                 <a:latin typeface="Consolas" panose="020B0609020204030204" pitchFamily="49" charset="0"/>
               </a:rPr>
               <a:t>StateId</a:t>
             </a:r>
             <a:r>
               <a:rPr lang="en-US" sz="1800" dirty="0">
+                <a:solidFill>
+                  <a:schemeClr val="tx1">
+                    <a:lumMod val="65000"/>
+                    <a:lumOff val="35000"/>
+                  </a:schemeClr>
+                </a:solidFill>
                 <a:latin typeface="Consolas" panose="020B0609020204030204" pitchFamily="49" charset="0"/>
               </a:rPr>
               <a:t>, </a:t>
             </a:r>
             <a:r>
               <a:rPr lang="en-US" sz="1800" dirty="0" err="1">
+                <a:solidFill>
+                  <a:schemeClr val="tx1">
+                    <a:lumMod val="65000"/>
+                    <a:lumOff val="35000"/>
+                  </a:schemeClr>
+                </a:solidFill>
                 <a:latin typeface="Consolas" panose="020B0609020204030204" pitchFamily="49" charset="0"/>
               </a:rPr>
               <a:t>ArrayId</a:t>
             </a:r>
             <a:r>
               <a:rPr lang="en-US" sz="1800" dirty="0">
+                <a:solidFill>
+                  <a:schemeClr val="tx1">
+                    <a:lumMod val="65000"/>
+                    <a:lumOff val="35000"/>
+                  </a:schemeClr>
+                </a:solidFill>
                 <a:latin typeface="Consolas" panose="020B0609020204030204" pitchFamily="49" charset="0"/>
               </a:rPr>
               <a:t>, </a:t>
             </a:r>
             <a:r>
               <a:rPr lang="en-US" sz="1800" dirty="0" err="1">
-                <a:latin typeface="Consolas" panose="020B0609020204030204" pitchFamily="49" charset="0"/>
-              </a:rPr>
-              <a:t>PreviousStateId</a:t>
+                <a:solidFill>
+                  <a:schemeClr val="tx1">
+                    <a:lumMod val="65000"/>
+                    <a:lumOff val="35000"/>
+                  </a:schemeClr>
+                </a:solidFill>
+                <a:latin typeface="Consolas" panose="020B0609020204030204" pitchFamily="49" charset="0"/>
+              </a:rPr>
+              <a:t>PrevStateId</a:t>
             </a:r>
             <a:r>
               <a:rPr lang="en-US" sz="1800" dirty="0">
+                <a:solidFill>
+                  <a:schemeClr val="tx1">
+                    <a:lumMod val="65000"/>
+                    <a:lumOff val="35000"/>
+                  </a:schemeClr>
+                </a:solidFill>
                 <a:latin typeface="Consolas" panose="020B0609020204030204" pitchFamily="49" charset="0"/>
               </a:rPr>
               <a:t>).</a:t>
@@ -9463,6 +9612,9 @@
             <a:pPr marL="412737" indent="-412737"/>
             <a:r>
               <a:rPr lang="en-US" sz="1800" dirty="0">
+                <a:solidFill>
+                  <a:srgbClr val="0070C0"/>
+                </a:solidFill>
                 <a:latin typeface="Consolas" panose="020B0609020204030204" pitchFamily="49" charset="0"/>
               </a:rPr>
               <a:t>state(state_1, array_9, nil).</a:t>
@@ -9478,66 +9630,132 @@
             <a:pPr marL="412737" indent="-412737"/>
             <a:r>
               <a:rPr lang="en-US" sz="1800" dirty="0">
+                <a:solidFill>
+                  <a:schemeClr val="tx1">
+                    <a:lumMod val="65000"/>
+                    <a:lumOff val="35000"/>
+                  </a:schemeClr>
+                </a:solidFill>
                 <a:latin typeface="Consolas" panose="020B0609020204030204" pitchFamily="49" charset="0"/>
               </a:rPr>
               <a:t>% content(</a:t>
             </a:r>
             <a:r>
               <a:rPr lang="en-US" sz="1800" dirty="0" err="1">
+                <a:solidFill>
+                  <a:schemeClr val="tx1">
+                    <a:lumMod val="65000"/>
+                    <a:lumOff val="35000"/>
+                  </a:schemeClr>
+                </a:solidFill>
                 <a:latin typeface="Consolas" panose="020B0609020204030204" pitchFamily="49" charset="0"/>
               </a:rPr>
               <a:t>ContentId</a:t>
             </a:r>
             <a:r>
               <a:rPr lang="en-US" sz="1800" dirty="0">
+                <a:solidFill>
+                  <a:schemeClr val="tx1">
+                    <a:lumMod val="65000"/>
+                    <a:lumOff val="35000"/>
+                  </a:schemeClr>
+                </a:solidFill>
                 <a:latin typeface="Consolas" panose="020B0609020204030204" pitchFamily="49" charset="0"/>
               </a:rPr>
               <a:t>, </a:t>
             </a:r>
             <a:r>
               <a:rPr lang="en-US" sz="1800" dirty="0" err="1">
+                <a:solidFill>
+                  <a:schemeClr val="tx1">
+                    <a:lumMod val="65000"/>
+                    <a:lumOff val="35000"/>
+                  </a:schemeClr>
+                </a:solidFill>
                 <a:latin typeface="Consolas" panose="020B0609020204030204" pitchFamily="49" charset="0"/>
               </a:rPr>
               <a:t>CellId</a:t>
             </a:r>
             <a:r>
               <a:rPr lang="en-US" sz="1800" dirty="0">
+                <a:solidFill>
+                  <a:schemeClr val="tx1">
+                    <a:lumMod val="65000"/>
+                    <a:lumOff val="35000"/>
+                  </a:schemeClr>
+                </a:solidFill>
                 <a:latin typeface="Consolas" panose="020B0609020204030204" pitchFamily="49" charset="0"/>
               </a:rPr>
               <a:t>, </a:t>
             </a:r>
             <a:r>
               <a:rPr lang="en-US" sz="1800" dirty="0" err="1">
+                <a:solidFill>
+                  <a:schemeClr val="tx1">
+                    <a:lumMod val="65000"/>
+                    <a:lumOff val="35000"/>
+                  </a:schemeClr>
+                </a:solidFill>
                 <a:latin typeface="Consolas" panose="020B0609020204030204" pitchFamily="49" charset="0"/>
               </a:rPr>
               <a:t>StateId</a:t>
             </a:r>
             <a:r>
               <a:rPr lang="en-US" sz="1800" dirty="0">
+                <a:solidFill>
+                  <a:schemeClr val="tx1">
+                    <a:lumMod val="65000"/>
+                    <a:lumOff val="35000"/>
+                  </a:schemeClr>
+                </a:solidFill>
                 <a:latin typeface="Consolas" panose="020B0609020204030204" pitchFamily="49" charset="0"/>
               </a:rPr>
               <a:t>, </a:t>
             </a:r>
             <a:r>
               <a:rPr lang="en-US" sz="1800" dirty="0" err="1">
+                <a:solidFill>
+                  <a:schemeClr val="tx1">
+                    <a:lumMod val="65000"/>
+                    <a:lumOff val="35000"/>
+                  </a:schemeClr>
+                </a:solidFill>
                 <a:latin typeface="Consolas" panose="020B0609020204030204" pitchFamily="49" charset="0"/>
               </a:rPr>
               <a:t>ValId</a:t>
             </a:r>
             <a:r>
               <a:rPr lang="en-US" sz="1800" dirty="0">
+                <a:solidFill>
+                  <a:schemeClr val="tx1">
+                    <a:lumMod val="65000"/>
+                    <a:lumOff val="35000"/>
+                  </a:schemeClr>
+                </a:solidFill>
                 <a:latin typeface="Consolas" panose="020B0609020204030204" pitchFamily="49" charset="0"/>
               </a:rPr>
               <a:t>, </a:t>
             </a:r>
             <a:r>
               <a:rPr lang="en-US" sz="1800" dirty="0" err="1">
+                <a:solidFill>
+                  <a:schemeClr val="tx1">
+                    <a:lumMod val="65000"/>
+                    <a:lumOff val="35000"/>
+                  </a:schemeClr>
+                </a:solidFill>
                 <a:latin typeface="Consolas" panose="020B0609020204030204" pitchFamily="49" charset="0"/>
               </a:rPr>
               <a:t>PrevContentId</a:t>
             </a:r>
             <a:r>
               <a:rPr lang="en-US" sz="1800" dirty="0">
+                <a:solidFill>
+                  <a:schemeClr val="tx1">
+                    <a:lumMod val="65000"/>
+                    <a:lumOff val="35000"/>
+                  </a:schemeClr>
+                </a:solidFill>
                 <a:latin typeface="Consolas" panose="020B0609020204030204" pitchFamily="49" charset="0"/>
               </a:rPr>
               <a:t>).</a:t>
@@ -9547,81 +9765,108 @@
             <a:pPr marL="412737" indent="-412737"/>
             <a:r>
               <a:rPr lang="en-US" sz="1800" dirty="0">
-                <a:latin typeface="Consolas" panose="020B0609020204030204" pitchFamily="49" charset="0"/>
-              </a:rPr>
-              <a:t>content(content_11, cell_1, state_1, val_1, nil).</a:t>
+                <a:solidFill>
+                  <a:srgbClr val="0070C0"/>
+                </a:solidFill>
+                <a:latin typeface="Consolas" panose="020B0609020204030204" pitchFamily="49" charset="0"/>
+              </a:rPr>
+              <a:t>content(content_1, cell_1, state_1, val_1, nil).</a:t>
             </a:r>
           </a:p>
           <a:p>
             <a:pPr marL="412737" indent="-412737"/>
             <a:r>
               <a:rPr lang="en-US" sz="1800" dirty="0">
-                <a:latin typeface="Consolas" panose="020B0609020204030204" pitchFamily="49" charset="0"/>
-              </a:rPr>
-              <a:t>content(content_12, cell_2, state_1, val_2, nil).</a:t>
+                <a:solidFill>
+                  <a:srgbClr val="0070C0"/>
+                </a:solidFill>
+                <a:latin typeface="Consolas" panose="020B0609020204030204" pitchFamily="49" charset="0"/>
+              </a:rPr>
+              <a:t>content(content_2, cell_2, state_1, val_2, nil).</a:t>
             </a:r>
           </a:p>
           <a:p>
             <a:pPr marL="412737" indent="-412737"/>
             <a:r>
               <a:rPr lang="en-US" sz="1800" dirty="0">
-                <a:latin typeface="Consolas" panose="020B0609020204030204" pitchFamily="49" charset="0"/>
-              </a:rPr>
-              <a:t>content(content_13, cell_3, state_1, val_3, nil).</a:t>
+                <a:solidFill>
+                  <a:srgbClr val="0070C0"/>
+                </a:solidFill>
+                <a:latin typeface="Consolas" panose="020B0609020204030204" pitchFamily="49" charset="0"/>
+              </a:rPr>
+              <a:t>content(content_3, cell_3, state_1, val_3, nil).</a:t>
             </a:r>
           </a:p>
           <a:p>
             <a:pPr marL="412737" indent="-412737"/>
             <a:r>
               <a:rPr lang="en-US" sz="1800" dirty="0">
-                <a:latin typeface="Consolas" panose="020B0609020204030204" pitchFamily="49" charset="0"/>
-              </a:rPr>
-              <a:t>content(content_14, cell_4, state_1, val_4, nil).</a:t>
+                <a:solidFill>
+                  <a:srgbClr val="0070C0"/>
+                </a:solidFill>
+                <a:latin typeface="Consolas" panose="020B0609020204030204" pitchFamily="49" charset="0"/>
+              </a:rPr>
+              <a:t>content(content_4, cell_4, state_1, val_4, nil).</a:t>
             </a:r>
           </a:p>
           <a:p>
             <a:pPr marL="412737" indent="-412737"/>
             <a:r>
               <a:rPr lang="en-US" sz="1800" dirty="0">
-                <a:latin typeface="Consolas" panose="020B0609020204030204" pitchFamily="49" charset="0"/>
-              </a:rPr>
-              <a:t>content(content_15, cell_5, state_1, val_5, nil).</a:t>
+                <a:solidFill>
+                  <a:srgbClr val="0070C0"/>
+                </a:solidFill>
+                <a:latin typeface="Consolas" panose="020B0609020204030204" pitchFamily="49" charset="0"/>
+              </a:rPr>
+              <a:t>content(content_5, cell_5, state_1, val_5, nil).</a:t>
             </a:r>
           </a:p>
           <a:p>
             <a:pPr marL="412737" indent="-412737"/>
             <a:r>
               <a:rPr lang="en-US" sz="1800" dirty="0">
-                <a:latin typeface="Consolas" panose="020B0609020204030204" pitchFamily="49" charset="0"/>
-              </a:rPr>
-              <a:t>content(content_16, cell_6, state_1, val_6, nil).</a:t>
+                <a:solidFill>
+                  <a:srgbClr val="0070C0"/>
+                </a:solidFill>
+                <a:latin typeface="Consolas" panose="020B0609020204030204" pitchFamily="49" charset="0"/>
+              </a:rPr>
+              <a:t>content(content_6, cell_6, state_1, val_6, nil).</a:t>
             </a:r>
           </a:p>
           <a:p>
             <a:pPr marL="412737" indent="-412737"/>
             <a:r>
               <a:rPr lang="en-US" sz="1800" dirty="0">
-                <a:latin typeface="Consolas" panose="020B0609020204030204" pitchFamily="49" charset="0"/>
-              </a:rPr>
-              <a:t>content(content_17, cell_7, state_1, val_7, nil).</a:t>
+                <a:solidFill>
+                  <a:srgbClr val="0070C0"/>
+                </a:solidFill>
+                <a:latin typeface="Consolas" panose="020B0609020204030204" pitchFamily="49" charset="0"/>
+              </a:rPr>
+              <a:t>content(content_7, cell_7, state_1, val_7, nil).</a:t>
             </a:r>
           </a:p>
           <a:p>
             <a:pPr marL="412737" indent="-412737"/>
             <a:r>
               <a:rPr lang="en-US" sz="1800" dirty="0">
-                <a:latin typeface="Consolas" panose="020B0609020204030204" pitchFamily="49" charset="0"/>
-              </a:rPr>
-              <a:t>content(content_18, cell_8, state_1, val_8, nil).</a:t>
+                <a:solidFill>
+                  <a:srgbClr val="0070C0"/>
+                </a:solidFill>
+                <a:latin typeface="Consolas" panose="020B0609020204030204" pitchFamily="49" charset="0"/>
+              </a:rPr>
+              <a:t>content(content_8, cell_8, state_1, val_8, nil).</a:t>
             </a:r>
           </a:p>
           <a:p>
             <a:pPr marL="412737" indent="-412737"/>
             <a:r>
               <a:rPr lang="en-US" sz="1800" dirty="0">
-                <a:latin typeface="Consolas" panose="020B0609020204030204" pitchFamily="49" charset="0"/>
-              </a:rPr>
-              <a:t>content(content_19, cell_9, state_1, val_9, nil).</a:t>
+                <a:solidFill>
+                  <a:srgbClr val="0070C0"/>
+                </a:solidFill>
+                <a:latin typeface="Consolas" panose="020B0609020204030204" pitchFamily="49" charset="0"/>
+              </a:rPr>
+              <a:t>content(content_9, cell_9, state_1, val_9, nil).</a:t>
             </a:r>
           </a:p>
           <a:p>
@@ -9634,30 +9879,60 @@
             <a:pPr marL="412737" indent="-412737"/>
             <a:r>
               <a:rPr lang="en-US" sz="1800" dirty="0">
+                <a:solidFill>
+                  <a:schemeClr val="tx1">
+                    <a:lumMod val="65000"/>
+                    <a:lumOff val="35000"/>
+                  </a:schemeClr>
+                </a:solidFill>
                 <a:latin typeface="Consolas" panose="020B0609020204030204" pitchFamily="49" charset="0"/>
               </a:rPr>
               <a:t>% value(</a:t>
             </a:r>
             <a:r>
               <a:rPr lang="en-US" sz="1800" dirty="0" err="1">
+                <a:solidFill>
+                  <a:schemeClr val="tx1">
+                    <a:lumMod val="65000"/>
+                    <a:lumOff val="35000"/>
+                  </a:schemeClr>
+                </a:solidFill>
                 <a:latin typeface="Consolas" panose="020B0609020204030204" pitchFamily="49" charset="0"/>
               </a:rPr>
               <a:t>ValId</a:t>
             </a:r>
             <a:r>
               <a:rPr lang="en-US" sz="1800" dirty="0">
+                <a:solidFill>
+                  <a:schemeClr val="tx1">
+                    <a:lumMod val="65000"/>
+                    <a:lumOff val="35000"/>
+                  </a:schemeClr>
+                </a:solidFill>
                 <a:latin typeface="Consolas" panose="020B0609020204030204" pitchFamily="49" charset="0"/>
               </a:rPr>
               <a:t>, </a:t>
             </a:r>
             <a:r>
               <a:rPr lang="en-US" sz="1800" dirty="0" err="1">
+                <a:solidFill>
+                  <a:schemeClr val="tx1">
+                    <a:lumMod val="65000"/>
+                    <a:lumOff val="35000"/>
+                  </a:schemeClr>
+                </a:solidFill>
                 <a:latin typeface="Consolas" panose="020B0609020204030204" pitchFamily="49" charset="0"/>
               </a:rPr>
               <a:t>ValText</a:t>
             </a:r>
             <a:r>
               <a:rPr lang="en-US" sz="1800" dirty="0">
+                <a:solidFill>
+                  <a:schemeClr val="tx1">
+                    <a:lumMod val="65000"/>
+                    <a:lumOff val="35000"/>
+                  </a:schemeClr>
+                </a:solidFill>
                 <a:latin typeface="Consolas" panose="020B0609020204030204" pitchFamily="49" charset="0"/>
               </a:rPr>
               <a:t>).</a:t>
@@ -9667,18 +9942,27 @@
             <a:pPr marL="412737" indent="-412737"/>
             <a:r>
               <a:rPr lang="en-US" sz="1800" dirty="0">
+                <a:solidFill>
+                  <a:srgbClr val="0070C0"/>
+                </a:solidFill>
                 <a:latin typeface="Consolas" panose="020B0609020204030204" pitchFamily="49" charset="0"/>
               </a:rPr>
               <a:t>value(val_1, 'Against Method’).      value(val_4, 'Paul </a:t>
             </a:r>
             <a:r>
               <a:rPr lang="en-US" sz="1800" dirty="0" err="1">
+                <a:solidFill>
+                  <a:srgbClr val="0070C0"/>
+                </a:solidFill>
                 <a:latin typeface="Consolas" panose="020B0609020204030204" pitchFamily="49" charset="0"/>
               </a:rPr>
               <a:t>Feyerabend</a:t>
             </a:r>
             <a:r>
               <a:rPr lang="en-US" sz="1800" dirty="0">
+                <a:solidFill>
+                  <a:srgbClr val="0070C0"/>
+                </a:solidFill>
                 <a:latin typeface="Consolas" panose="020B0609020204030204" pitchFamily="49" charset="0"/>
               </a:rPr>
               <a:t>’).  value(val_7, '1975').</a:t>
@@ -9688,6 +9972,9 @@
             <a:pPr marL="412737" indent="-412737"/>
             <a:r>
               <a:rPr lang="en-US" sz="1800" dirty="0">
+                <a:solidFill>
+                  <a:srgbClr val="0070C0"/>
+                </a:solidFill>
                 <a:latin typeface="Consolas" panose="020B0609020204030204" pitchFamily="49" charset="0"/>
               </a:rPr>
               <a:t>value(val_2, 'Changing Order’).      value(val_5, 'H.M. Collins’).     value(val_8, '1985').</a:t>
@@ -9697,6 +9984,9 @@
             <a:pPr marL="412737" indent="-412737"/>
             <a:r>
               <a:rPr lang="en-US" sz="1800" dirty="0">
+                <a:solidFill>
+                  <a:srgbClr val="0070C0"/>
+                </a:solidFill>
                 <a:latin typeface="Consolas" panose="020B0609020204030204" pitchFamily="49" charset="0"/>
               </a:rPr>
               <a:t>value(val_3, 'Exceeding our Grasp’). value(val_6, 'P. Kyle Stanford’). value(val_9, '2006').</a:t>
@@ -9712,102 +10002,204 @@
             <a:pPr marL="412737" indent="-412737"/>
             <a:r>
               <a:rPr lang="en-US" sz="1800" dirty="0">
+                <a:solidFill>
+                  <a:schemeClr val="tx1">
+                    <a:lumMod val="65000"/>
+                    <a:lumOff val="35000"/>
+                  </a:schemeClr>
+                </a:solidFill>
                 <a:latin typeface="Consolas" panose="020B0609020204030204" pitchFamily="49" charset="0"/>
               </a:rPr>
               <a:t>% </a:t>
             </a:r>
             <a:r>
               <a:rPr lang="en-US" sz="1800" dirty="0" err="1">
+                <a:solidFill>
+                  <a:schemeClr val="tx1">
+                    <a:lumMod val="65000"/>
+                    <a:lumOff val="35000"/>
+                  </a:schemeClr>
+                </a:solidFill>
                 <a:latin typeface="Consolas" panose="020B0609020204030204" pitchFamily="49" charset="0"/>
               </a:rPr>
               <a:t>column_schema</a:t>
             </a:r>
             <a:r>
               <a:rPr lang="en-US" sz="1800" dirty="0">
+                <a:solidFill>
+                  <a:schemeClr val="tx1">
+                    <a:lumMod val="65000"/>
+                    <a:lumOff val="35000"/>
+                  </a:schemeClr>
+                </a:solidFill>
                 <a:latin typeface="Consolas" panose="020B0609020204030204" pitchFamily="49" charset="0"/>
               </a:rPr>
               <a:t>(</a:t>
             </a:r>
             <a:r>
               <a:rPr lang="en-US" sz="1800" dirty="0" err="1">
+                <a:solidFill>
+                  <a:schemeClr val="tx1">
+                    <a:lumMod val="65000"/>
+                    <a:lumOff val="35000"/>
+                  </a:schemeClr>
+                </a:solidFill>
                 <a:latin typeface="Consolas" panose="020B0609020204030204" pitchFamily="49" charset="0"/>
               </a:rPr>
               <a:t>ColSchemaId</a:t>
             </a:r>
             <a:r>
               <a:rPr lang="en-US" sz="1800" dirty="0">
+                <a:solidFill>
+                  <a:schemeClr val="tx1">
+                    <a:lumMod val="65000"/>
+                    <a:lumOff val="35000"/>
+                  </a:schemeClr>
+                </a:solidFill>
                 <a:latin typeface="Consolas" panose="020B0609020204030204" pitchFamily="49" charset="0"/>
               </a:rPr>
               <a:t>, </a:t>
             </a:r>
             <a:r>
               <a:rPr lang="en-US" sz="1800" dirty="0" err="1">
+                <a:solidFill>
+                  <a:schemeClr val="tx1">
+                    <a:lumMod val="65000"/>
+                    <a:lumOff val="35000"/>
+                  </a:schemeClr>
+                </a:solidFill>
                 <a:latin typeface="Consolas" panose="020B0609020204030204" pitchFamily="49" charset="0"/>
               </a:rPr>
               <a:t>ColId</a:t>
             </a:r>
             <a:r>
               <a:rPr lang="en-US" sz="1800" dirty="0">
+                <a:solidFill>
+                  <a:schemeClr val="tx1">
+                    <a:lumMod val="65000"/>
+                    <a:lumOff val="35000"/>
+                  </a:schemeClr>
+                </a:solidFill>
                 <a:latin typeface="Consolas" panose="020B0609020204030204" pitchFamily="49" charset="0"/>
               </a:rPr>
               <a:t>, </a:t>
             </a:r>
             <a:r>
               <a:rPr lang="en-US" sz="1800" dirty="0" err="1">
+                <a:solidFill>
+                  <a:schemeClr val="tx1">
+                    <a:lumMod val="65000"/>
+                    <a:lumOff val="35000"/>
+                  </a:schemeClr>
+                </a:solidFill>
                 <a:latin typeface="Consolas" panose="020B0609020204030204" pitchFamily="49" charset="0"/>
               </a:rPr>
               <a:t>StateId</a:t>
             </a:r>
             <a:r>
               <a:rPr lang="en-US" sz="1800" dirty="0">
+                <a:solidFill>
+                  <a:schemeClr val="tx1">
+                    <a:lumMod val="65000"/>
+                    <a:lumOff val="35000"/>
+                  </a:schemeClr>
+                </a:solidFill>
                 <a:latin typeface="Consolas" panose="020B0609020204030204" pitchFamily="49" charset="0"/>
               </a:rPr>
               <a:t>, </a:t>
             </a:r>
             <a:r>
               <a:rPr lang="en-US" sz="1800" dirty="0" err="1">
+                <a:solidFill>
+                  <a:schemeClr val="tx1">
+                    <a:lumMod val="65000"/>
+                    <a:lumOff val="35000"/>
+                  </a:schemeClr>
+                </a:solidFill>
                 <a:latin typeface="Consolas" panose="020B0609020204030204" pitchFamily="49" charset="0"/>
               </a:rPr>
               <a:t>ColType</a:t>
             </a:r>
             <a:r>
               <a:rPr lang="en-US" sz="1800" dirty="0">
+                <a:solidFill>
+                  <a:schemeClr val="tx1">
+                    <a:lumMod val="65000"/>
+                    <a:lumOff val="35000"/>
+                  </a:schemeClr>
+                </a:solidFill>
                 <a:latin typeface="Consolas" panose="020B0609020204030204" pitchFamily="49" charset="0"/>
               </a:rPr>
               <a:t>, </a:t>
             </a:r>
             <a:r>
               <a:rPr lang="en-US" sz="1800" dirty="0" err="1">
+                <a:solidFill>
+                  <a:schemeClr val="tx1">
+                    <a:lumMod val="65000"/>
+                    <a:lumOff val="35000"/>
+                  </a:schemeClr>
+                </a:solidFill>
                 <a:latin typeface="Consolas" panose="020B0609020204030204" pitchFamily="49" charset="0"/>
               </a:rPr>
               <a:t>ColName</a:t>
             </a:r>
             <a:r>
               <a:rPr lang="en-US" sz="1800" dirty="0">
+                <a:solidFill>
+                  <a:schemeClr val="tx1">
+                    <a:lumMod val="65000"/>
+                    <a:lumOff val="35000"/>
+                  </a:schemeClr>
+                </a:solidFill>
                 <a:latin typeface="Consolas" panose="020B0609020204030204" pitchFamily="49" charset="0"/>
               </a:rPr>
               <a:t>, </a:t>
             </a:r>
             <a:r>
               <a:rPr lang="en-US" sz="1800" dirty="0" err="1">
+                <a:solidFill>
+                  <a:schemeClr val="tx1">
+                    <a:lumMod val="65000"/>
+                    <a:lumOff val="35000"/>
+                  </a:schemeClr>
+                </a:solidFill>
                 <a:latin typeface="Consolas" panose="020B0609020204030204" pitchFamily="49" charset="0"/>
               </a:rPr>
               <a:t>PrevColId</a:t>
             </a:r>
             <a:r>
               <a:rPr lang="en-US" sz="1800" dirty="0">
+                <a:solidFill>
+                  <a:schemeClr val="tx1">
+                    <a:lumMod val="65000"/>
+                    <a:lumOff val="35000"/>
+                  </a:schemeClr>
+                </a:solidFill>
                 <a:latin typeface="Consolas" panose="020B0609020204030204" pitchFamily="49" charset="0"/>
               </a:rPr>
               <a:t>, </a:t>
             </a:r>
             <a:r>
               <a:rPr lang="en-US" sz="1800" dirty="0" err="1">
+                <a:solidFill>
+                  <a:schemeClr val="tx1">
+                    <a:lumMod val="65000"/>
+                    <a:lumOff val="35000"/>
+                  </a:schemeClr>
+                </a:solidFill>
                 <a:latin typeface="Consolas" panose="020B0609020204030204" pitchFamily="49" charset="0"/>
               </a:rPr>
               <a:t>PrevColSchemaId</a:t>
             </a:r>
             <a:r>
               <a:rPr lang="en-US" sz="1800" dirty="0">
+                <a:solidFill>
+                  <a:schemeClr val="tx1">
+                    <a:lumMod val="65000"/>
+                    <a:lumOff val="35000"/>
+                  </a:schemeClr>
+                </a:solidFill>
                 <a:latin typeface="Consolas" panose="020B0609020204030204" pitchFamily="49" charset="0"/>
               </a:rPr>
               <a:t>).</a:t>
@@ -9817,12 +10209,18 @@
             <a:pPr marL="412737" indent="-412737"/>
             <a:r>
               <a:rPr lang="en-US" sz="1800" dirty="0" err="1">
+                <a:solidFill>
+                  <a:srgbClr val="0070C0"/>
+                </a:solidFill>
                 <a:latin typeface="Consolas" panose="020B0609020204030204" pitchFamily="49" charset="0"/>
               </a:rPr>
               <a:t>column_schema</a:t>
             </a:r>
             <a:r>
               <a:rPr lang="en-US" sz="1800" dirty="0">
+                <a:solidFill>
+                  <a:srgbClr val="0070C0"/>
+                </a:solidFill>
                 <a:latin typeface="Consolas" panose="020B0609020204030204" pitchFamily="49" charset="0"/>
               </a:rPr>
               <a:t>(col_schema_1, col_1, state_1, 'string', 'Book Title’, nil, nil).</a:t>
@@ -9832,12 +10230,18 @@
             <a:pPr marL="412737" indent="-412737"/>
             <a:r>
               <a:rPr lang="en-US" sz="1800" dirty="0" err="1">
+                <a:solidFill>
+                  <a:srgbClr val="0070C0"/>
+                </a:solidFill>
                 <a:latin typeface="Consolas" panose="020B0609020204030204" pitchFamily="49" charset="0"/>
               </a:rPr>
               <a:t>column_schema</a:t>
             </a:r>
             <a:r>
               <a:rPr lang="en-US" sz="1800" dirty="0">
+                <a:solidFill>
+                  <a:srgbClr val="0070C0"/>
+                </a:solidFill>
                 <a:latin typeface="Consolas" panose="020B0609020204030204" pitchFamily="49" charset="0"/>
               </a:rPr>
               <a:t>(col_schema_2, col_2, state_1, 'string’, 'Author’,   col_1, nil).</a:t>
@@ -9847,12 +10251,18 @@
             <a:pPr marL="412737" indent="-412737"/>
             <a:r>
               <a:rPr lang="en-US" sz="1800" dirty="0" err="1">
+                <a:solidFill>
+                  <a:srgbClr val="0070C0"/>
+                </a:solidFill>
                 <a:latin typeface="Consolas" panose="020B0609020204030204" pitchFamily="49" charset="0"/>
               </a:rPr>
               <a:t>column_schema</a:t>
             </a:r>
             <a:r>
               <a:rPr lang="en-US" sz="1800" dirty="0">
+                <a:solidFill>
+                  <a:srgbClr val="0070C0"/>
+                </a:solidFill>
                 <a:latin typeface="Consolas" panose="020B0609020204030204" pitchFamily="49" charset="0"/>
               </a:rPr>
               <a:t>(col_schema_3, col_3, state_1, 'string’, 'Date’,     col_2, nil).</a:t>
@@ -9868,66 +10278,132 @@
             <a:pPr marL="412737" indent="-412737"/>
             <a:r>
               <a:rPr lang="en-US" sz="1800" dirty="0">
+                <a:solidFill>
+                  <a:schemeClr val="tx1">
+                    <a:lumMod val="65000"/>
+                    <a:lumOff val="35000"/>
+                  </a:schemeClr>
+                </a:solidFill>
                 <a:latin typeface="Consolas" panose="020B0609020204030204" pitchFamily="49" charset="0"/>
               </a:rPr>
               <a:t>% </a:t>
             </a:r>
             <a:r>
               <a:rPr lang="en-US" sz="1800" dirty="0" err="1">
+                <a:solidFill>
+                  <a:schemeClr val="tx1">
+                    <a:lumMod val="65000"/>
+                    <a:lumOff val="35000"/>
+                  </a:schemeClr>
+                </a:solidFill>
                 <a:latin typeface="Consolas" panose="020B0609020204030204" pitchFamily="49" charset="0"/>
               </a:rPr>
               <a:t>row_position</a:t>
             </a:r>
             <a:r>
               <a:rPr lang="en-US" sz="1800" dirty="0">
+                <a:solidFill>
+                  <a:schemeClr val="tx1">
+                    <a:lumMod val="65000"/>
+                    <a:lumOff val="35000"/>
+                  </a:schemeClr>
+                </a:solidFill>
                 <a:latin typeface="Consolas" panose="020B0609020204030204" pitchFamily="49" charset="0"/>
               </a:rPr>
               <a:t>(</a:t>
             </a:r>
             <a:r>
               <a:rPr lang="en-US" sz="1800" dirty="0" err="1">
+                <a:solidFill>
+                  <a:schemeClr val="tx1">
+                    <a:lumMod val="65000"/>
+                    <a:lumOff val="35000"/>
+                  </a:schemeClr>
+                </a:solidFill>
                 <a:latin typeface="Consolas" panose="020B0609020204030204" pitchFamily="49" charset="0"/>
               </a:rPr>
               <a:t>RowPosId</a:t>
             </a:r>
             <a:r>
               <a:rPr lang="en-US" sz="1800" dirty="0">
+                <a:solidFill>
+                  <a:schemeClr val="tx1">
+                    <a:lumMod val="65000"/>
+                    <a:lumOff val="35000"/>
+                  </a:schemeClr>
+                </a:solidFill>
                 <a:latin typeface="Consolas" panose="020B0609020204030204" pitchFamily="49" charset="0"/>
               </a:rPr>
               <a:t>, </a:t>
             </a:r>
             <a:r>
               <a:rPr lang="en-US" sz="1800" dirty="0" err="1">
+                <a:solidFill>
+                  <a:schemeClr val="tx1">
+                    <a:lumMod val="65000"/>
+                    <a:lumOff val="35000"/>
+                  </a:schemeClr>
+                </a:solidFill>
                 <a:latin typeface="Consolas" panose="020B0609020204030204" pitchFamily="49" charset="0"/>
               </a:rPr>
               <a:t>RowId</a:t>
             </a:r>
             <a:r>
               <a:rPr lang="en-US" sz="1800" dirty="0">
+                <a:solidFill>
+                  <a:schemeClr val="tx1">
+                    <a:lumMod val="65000"/>
+                    <a:lumOff val="35000"/>
+                  </a:schemeClr>
+                </a:solidFill>
                 <a:latin typeface="Consolas" panose="020B0609020204030204" pitchFamily="49" charset="0"/>
               </a:rPr>
               <a:t>, </a:t>
             </a:r>
             <a:r>
               <a:rPr lang="en-US" sz="1800" dirty="0" err="1">
+                <a:solidFill>
+                  <a:schemeClr val="tx1">
+                    <a:lumMod val="65000"/>
+                    <a:lumOff val="35000"/>
+                  </a:schemeClr>
+                </a:solidFill>
                 <a:latin typeface="Consolas" panose="020B0609020204030204" pitchFamily="49" charset="0"/>
               </a:rPr>
               <a:t>StateId</a:t>
             </a:r>
             <a:r>
               <a:rPr lang="en-US" sz="1800" dirty="0">
+                <a:solidFill>
+                  <a:schemeClr val="tx1">
+                    <a:lumMod val="65000"/>
+                    <a:lumOff val="35000"/>
+                  </a:schemeClr>
+                </a:solidFill>
                 <a:latin typeface="Consolas" panose="020B0609020204030204" pitchFamily="49" charset="0"/>
               </a:rPr>
               <a:t>, </a:t>
             </a:r>
             <a:r>
               <a:rPr lang="en-US" sz="1800" dirty="0" err="1">
+                <a:solidFill>
+                  <a:schemeClr val="tx1">
+                    <a:lumMod val="65000"/>
+                    <a:lumOff val="35000"/>
+                  </a:schemeClr>
+                </a:solidFill>
                 <a:latin typeface="Consolas" panose="020B0609020204030204" pitchFamily="49" charset="0"/>
               </a:rPr>
               <a:t>PrevRowId</a:t>
             </a:r>
             <a:r>
               <a:rPr lang="en-US" sz="1800" dirty="0">
+                <a:solidFill>
+                  <a:schemeClr val="tx1">
+                    <a:lumMod val="65000"/>
+                    <a:lumOff val="35000"/>
+                  </a:schemeClr>
+                </a:solidFill>
                 <a:latin typeface="Consolas" panose="020B0609020204030204" pitchFamily="49" charset="0"/>
               </a:rPr>
               <a:t>).</a:t>
@@ -9937,12 +10413,18 @@
             <a:pPr marL="412737" indent="-412737"/>
             <a:r>
               <a:rPr lang="en-US" sz="1800" dirty="0" err="1">
+                <a:solidFill>
+                  <a:srgbClr val="0070C0"/>
+                </a:solidFill>
                 <a:latin typeface="Consolas" panose="020B0609020204030204" pitchFamily="49" charset="0"/>
               </a:rPr>
               <a:t>row_position</a:t>
             </a:r>
             <a:r>
               <a:rPr lang="en-US" sz="1800" dirty="0">
+                <a:solidFill>
+                  <a:srgbClr val="0070C0"/>
+                </a:solidFill>
                 <a:latin typeface="Consolas" panose="020B0609020204030204" pitchFamily="49" charset="0"/>
               </a:rPr>
               <a:t>(row_pos_1, row_1, state_1, nil).</a:t>
@@ -9952,12 +10434,18 @@
             <a:pPr marL="412737" indent="-412737"/>
             <a:r>
               <a:rPr lang="en-US" sz="1800" dirty="0" err="1">
+                <a:solidFill>
+                  <a:srgbClr val="0070C0"/>
+                </a:solidFill>
                 <a:latin typeface="Consolas" panose="020B0609020204030204" pitchFamily="49" charset="0"/>
               </a:rPr>
               <a:t>row_position</a:t>
             </a:r>
             <a:r>
               <a:rPr lang="en-US" sz="1800" dirty="0">
+                <a:solidFill>
+                  <a:srgbClr val="0070C0"/>
+                </a:solidFill>
                 <a:latin typeface="Consolas" panose="020B0609020204030204" pitchFamily="49" charset="0"/>
               </a:rPr>
               <a:t>(row_pos_2, row_2, state_1, row_1).</a:t>
@@ -9967,12 +10455,18 @@
             <a:pPr marL="412737" indent="-412737"/>
             <a:r>
               <a:rPr lang="en-US" sz="1800" dirty="0" err="1">
+                <a:solidFill>
+                  <a:srgbClr val="0070C0"/>
+                </a:solidFill>
                 <a:latin typeface="Consolas" panose="020B0609020204030204" pitchFamily="49" charset="0"/>
               </a:rPr>
               <a:t>row_position</a:t>
             </a:r>
             <a:r>
               <a:rPr lang="en-US" sz="1800" dirty="0">
+                <a:solidFill>
+                  <a:srgbClr val="0070C0"/>
+                </a:solidFill>
                 <a:latin typeface="Consolas" panose="020B0609020204030204" pitchFamily="49" charset="0"/>
               </a:rPr>
               <a:t>(row_pos_3, row_3, state_1, row_2).</a:t>
@@ -9988,13 +10482,13 @@
             <a:pPr marL="412737" indent="-412737"/>
             <a:r>
               <a:rPr lang="en-US" sz="1800" dirty="0">
+                <a:solidFill>
+                  <a:srgbClr val="00B050"/>
+                </a:solidFill>
                 <a:latin typeface="Consolas" panose="020B0609020204030204" pitchFamily="49" charset="0"/>
               </a:rPr>
               <a:t>%%%% Rename column 1 from ‘Book title’ to ‘Title’ %%%%%</a:t>
             </a:r>
-          </a:p>
-          <a:p>
-            <a:pPr marL="412737" indent="-412737"/>
             <a:endParaRPr lang="en-US" sz="1800" dirty="0">
               <a:latin typeface="Consolas" panose="020B0609020204030204" pitchFamily="49" charset="0"/>
             </a:endParaRPr>
@@ -10003,6 +10497,9 @@
             <a:pPr marL="412737" indent="-412737"/>
             <a:r>
               <a:rPr lang="en-US" sz="1800" dirty="0">
+                <a:solidFill>
+                  <a:srgbClr val="0070C0"/>
+                </a:solidFill>
                 <a:latin typeface="Consolas" panose="020B0609020204030204" pitchFamily="49" charset="0"/>
               </a:rPr>
               <a:t>state(state_2, array_1, state_1).</a:t>
@@ -10012,6 +10509,9 @@
             <a:pPr marL="412737" indent="-412737"/>
             <a:r>
               <a:rPr lang="it-IT" sz="1800" dirty="0">
+                <a:solidFill>
+                  <a:srgbClr val="0070C0"/>
+                </a:solidFill>
                 <a:latin typeface="Consolas" panose="020B0609020204030204" pitchFamily="49" charset="0"/>
               </a:rPr>
               <a:t>column_schema(col_schema_4, col_1, state_2, 'string', 'Title', nil, col_schema_1).</a:t>
@@ -10025,13 +10525,13 @@
             <a:pPr marL="412737" indent="-412737"/>
             <a:r>
               <a:rPr lang="en-US" sz="1800" dirty="0">
+                <a:solidFill>
+                  <a:srgbClr val="00B050"/>
+                </a:solidFill>
                 <a:latin typeface="Consolas" panose="020B0609020204030204" pitchFamily="49" charset="0"/>
               </a:rPr>
               <a:t>%%%% Place surname first and abbreviate given names to initials in Author column %%%%%</a:t>
             </a:r>
-          </a:p>
-          <a:p>
-            <a:pPr marL="412737" indent="-412737"/>
             <a:endParaRPr lang="en-US" sz="1800" dirty="0">
               <a:latin typeface="Consolas" panose="020B0609020204030204" pitchFamily="49" charset="0"/>
             </a:endParaRPr>
@@ -10040,6 +10540,9 @@
             <a:pPr marL="412737" indent="-412737"/>
             <a:r>
               <a:rPr lang="en-US" sz="1800" dirty="0">
+                <a:solidFill>
+                  <a:srgbClr val="0070C0"/>
+                </a:solidFill>
                 <a:latin typeface="Consolas" panose="020B0609020204030204" pitchFamily="49" charset="0"/>
               </a:rPr>
               <a:t>state(state_3, array_1, state_2).</a:t>
@@ -10049,18 +10552,27 @@
             <a:pPr marL="412737" indent="-412737"/>
             <a:r>
               <a:rPr lang="en-US" sz="1800" dirty="0">
+                <a:solidFill>
+                  <a:srgbClr val="0070C0"/>
+                </a:solidFill>
                 <a:latin typeface="Consolas" panose="020B0609020204030204" pitchFamily="49" charset="0"/>
               </a:rPr>
               <a:t>value(val_10, '</a:t>
             </a:r>
             <a:r>
               <a:rPr lang="en-US" sz="1800" dirty="0" err="1">
+                <a:solidFill>
+                  <a:srgbClr val="0070C0"/>
+                </a:solidFill>
                 <a:latin typeface="Consolas" panose="020B0609020204030204" pitchFamily="49" charset="0"/>
               </a:rPr>
               <a:t>Feyerabend</a:t>
             </a:r>
             <a:r>
               <a:rPr lang="en-US" sz="1800" dirty="0">
+                <a:solidFill>
+                  <a:srgbClr val="0070C0"/>
+                </a:solidFill>
                 <a:latin typeface="Consolas" panose="020B0609020204030204" pitchFamily="49" charset="0"/>
               </a:rPr>
               <a:t>, P.’).</a:t>
@@ -10070,11 +10582,17 @@
             <a:pPr marL="412737" indent="-412737"/>
             <a:r>
               <a:rPr lang="en-US" sz="1800" dirty="0">
+                <a:solidFill>
+                  <a:srgbClr val="0070C0"/>
+                </a:solidFill>
                 <a:latin typeface="Consolas" panose="020B0609020204030204" pitchFamily="49" charset="0"/>
               </a:rPr>
               <a:t>value(val_11, 'Collins, H.M.’).</a:t>
             </a:r>
             <a:endParaRPr lang="it-IT" sz="1800" dirty="0">
+              <a:solidFill>
+                <a:srgbClr val="0070C0"/>
+              </a:solidFill>
               <a:latin typeface="Consolas" panose="020B0609020204030204" pitchFamily="49" charset="0"/>
             </a:endParaRPr>
           </a:p>
@@ -10082,6 +10600,9 @@
             <a:pPr marL="412737" indent="-412737"/>
             <a:r>
               <a:rPr lang="en-US" sz="1800" dirty="0">
+                <a:solidFill>
+                  <a:srgbClr val="0070C0"/>
+                </a:solidFill>
                 <a:latin typeface="Consolas" panose="020B0609020204030204" pitchFamily="49" charset="0"/>
               </a:rPr>
               <a:t>value(val_12, 'Stanford, P.K.’).</a:t>
@@ -10091,27 +10612,36 @@
             <a:pPr marL="412737" indent="-412737"/>
             <a:r>
               <a:rPr lang="en-US" sz="1800" dirty="0">
-                <a:latin typeface="Consolas" panose="020B0609020204030204" pitchFamily="49" charset="0"/>
-              </a:rPr>
-              <a:t>content(content_20, cell_4, state_3, val_10, content_14).</a:t>
+                <a:solidFill>
+                  <a:srgbClr val="0070C0"/>
+                </a:solidFill>
+                <a:latin typeface="Consolas" panose="020B0609020204030204" pitchFamily="49" charset="0"/>
+              </a:rPr>
+              <a:t>content(content_10, cell_4, state_3, val_10, content_4).</a:t>
             </a:r>
           </a:p>
           <a:p>
             <a:pPr marL="412737" indent="-412737"/>
             <a:r>
               <a:rPr lang="en-US" sz="1800" dirty="0">
-                <a:latin typeface="Consolas" panose="020B0609020204030204" pitchFamily="49" charset="0"/>
-              </a:rPr>
-              <a:t>content(content_21, cell_5, state_3, val_11, content_15).</a:t>
+                <a:solidFill>
+                  <a:srgbClr val="0070C0"/>
+                </a:solidFill>
+                <a:latin typeface="Consolas" panose="020B0609020204030204" pitchFamily="49" charset="0"/>
+              </a:rPr>
+              <a:t>content(content_11, cell_5, state_3, val_11, content_5).</a:t>
             </a:r>
           </a:p>
           <a:p>
             <a:pPr marL="412737" indent="-412737"/>
             <a:r>
               <a:rPr lang="en-US" sz="1800" dirty="0">
-                <a:latin typeface="Consolas" panose="020B0609020204030204" pitchFamily="49" charset="0"/>
-              </a:rPr>
-              <a:t>content(content_22, cell_6, state_3, val_12, content_16).</a:t>
+                <a:solidFill>
+                  <a:srgbClr val="0070C0"/>
+                </a:solidFill>
+                <a:latin typeface="Consolas" panose="020B0609020204030204" pitchFamily="49" charset="0"/>
+              </a:rPr>
+              <a:t>content(content_12, cell_6, state_3, val_12, content_6).</a:t>
             </a:r>
           </a:p>
           <a:p>
@@ -10122,13 +10652,13 @@
             <a:pPr marL="412737" indent="-412737"/>
             <a:r>
               <a:rPr lang="en-US" sz="1800" dirty="0">
+                <a:solidFill>
+                  <a:srgbClr val="00B050"/>
+                </a:solidFill>
                 <a:latin typeface="Consolas" panose="020B0609020204030204" pitchFamily="49" charset="0"/>
               </a:rPr>
               <a:t>%%%% Sort rows by Author %%%%%</a:t>
             </a:r>
-          </a:p>
-          <a:p>
-            <a:pPr marL="412737" indent="-412737"/>
             <a:endParaRPr lang="en-US" sz="1800" dirty="0">
               <a:latin typeface="Consolas" panose="020B0609020204030204" pitchFamily="49" charset="0"/>
             </a:endParaRPr>
@@ -10137,6 +10667,9 @@
             <a:pPr marL="412737" indent="-412737"/>
             <a:r>
               <a:rPr lang="en-US" sz="1800" dirty="0">
+                <a:solidFill>
+                  <a:srgbClr val="0070C0"/>
+                </a:solidFill>
                 <a:latin typeface="Consolas" panose="020B0609020204030204" pitchFamily="49" charset="0"/>
               </a:rPr>
               <a:t>state(state_4, array_1, state_3).</a:t>
@@ -10146,12 +10679,18 @@
             <a:pPr marL="412737" indent="-412737"/>
             <a:r>
               <a:rPr lang="en-US" sz="1800" dirty="0" err="1">
+                <a:solidFill>
+                  <a:srgbClr val="0070C0"/>
+                </a:solidFill>
                 <a:latin typeface="Consolas" panose="020B0609020204030204" pitchFamily="49" charset="0"/>
               </a:rPr>
               <a:t>row_position</a:t>
             </a:r>
             <a:r>
               <a:rPr lang="en-US" sz="1800" dirty="0">
+                <a:solidFill>
+                  <a:srgbClr val="0070C0"/>
+                </a:solidFill>
                 <a:latin typeface="Consolas" panose="020B0609020204030204" pitchFamily="49" charset="0"/>
               </a:rPr>
               <a:t>(row_pos_5, row_2, state_4, nil).</a:t>
@@ -10161,12 +10700,18 @@
             <a:pPr marL="412737" indent="-412737"/>
             <a:r>
               <a:rPr lang="en-US" sz="1800" dirty="0" err="1">
+                <a:solidFill>
+                  <a:srgbClr val="0070C0"/>
+                </a:solidFill>
                 <a:latin typeface="Consolas" panose="020B0609020204030204" pitchFamily="49" charset="0"/>
               </a:rPr>
               <a:t>row_position</a:t>
             </a:r>
             <a:r>
               <a:rPr lang="en-US" sz="1800" dirty="0">
+                <a:solidFill>
+                  <a:srgbClr val="0070C0"/>
+                </a:solidFill>
                 <a:latin typeface="Consolas" panose="020B0609020204030204" pitchFamily="49" charset="0"/>
               </a:rPr>
               <a:t>(row_pos_4, row_1, state_4, row_2).</a:t>
@@ -10176,17 +10721,22 @@
             <a:pPr marL="412737" indent="-412737"/>
             <a:r>
               <a:rPr lang="en-US" sz="1800" dirty="0" err="1">
+                <a:solidFill>
+                  <a:srgbClr val="0070C0"/>
+                </a:solidFill>
                 <a:latin typeface="Consolas" panose="020B0609020204030204" pitchFamily="49" charset="0"/>
               </a:rPr>
               <a:t>row_position</a:t>
             </a:r>
             <a:r>
               <a:rPr lang="en-US" sz="1800" dirty="0">
+                <a:solidFill>
+                  <a:srgbClr val="0070C0"/>
+                </a:solidFill>
                 <a:latin typeface="Consolas" panose="020B0609020204030204" pitchFamily="49" charset="0"/>
               </a:rPr>
               <a:t>(row_pos_6, row_3, state_4, row_1).</a:t>
             </a:r>
-            <a:endParaRPr lang="en-US" sz="1800" dirty="0"/>
           </a:p>
           <a:p>
             <a:pPr marL="412737" indent="-412737"/>
@@ -10196,13 +10746,13 @@
             <a:pPr marL="412737" indent="-412737"/>
             <a:r>
               <a:rPr lang="en-US" sz="1800" dirty="0">
+                <a:solidFill>
+                  <a:srgbClr val="00B050"/>
+                </a:solidFill>
                 <a:latin typeface="Consolas" panose="020B0609020204030204" pitchFamily="49" charset="0"/>
               </a:rPr>
               <a:t>%%%% Swap order of second and third columns %%%%%</a:t>
             </a:r>
-          </a:p>
-          <a:p>
-            <a:pPr marL="412737" indent="-412737"/>
             <a:endParaRPr lang="en-US" sz="1800" dirty="0">
               <a:latin typeface="Consolas" panose="020B0609020204030204" pitchFamily="49" charset="0"/>
             </a:endParaRPr>
@@ -10211,6 +10761,9 @@
             <a:pPr marL="412737" indent="-412737"/>
             <a:r>
               <a:rPr lang="en-US" sz="1800" dirty="0">
+                <a:solidFill>
+                  <a:srgbClr val="0070C0"/>
+                </a:solidFill>
                 <a:latin typeface="Consolas" panose="020B0609020204030204" pitchFamily="49" charset="0"/>
               </a:rPr>
               <a:t>state(state_5, array_1, state_4).</a:t>
@@ -10220,12 +10773,18 @@
             <a:pPr marL="412737" indent="-412737"/>
             <a:r>
               <a:rPr lang="en-US" sz="1800" dirty="0" err="1">
+                <a:solidFill>
+                  <a:srgbClr val="0070C0"/>
+                </a:solidFill>
                 <a:latin typeface="Consolas" panose="020B0609020204030204" pitchFamily="49" charset="0"/>
               </a:rPr>
               <a:t>column_schema</a:t>
             </a:r>
             <a:r>
               <a:rPr lang="en-US" sz="1800" dirty="0">
+                <a:solidFill>
+                  <a:srgbClr val="0070C0"/>
+                </a:solidFill>
                 <a:latin typeface="Consolas" panose="020B0609020204030204" pitchFamily="49" charset="0"/>
               </a:rPr>
               <a:t>(col_schema_6, col_3, state_5, 'string’, 'Date’,   col_1, nil).</a:t>
@@ -10235,12 +10794,18 @@
             <a:pPr marL="412737" indent="-412737"/>
             <a:r>
               <a:rPr lang="en-US" sz="1800" dirty="0" err="1">
+                <a:solidFill>
+                  <a:srgbClr val="0070C0"/>
+                </a:solidFill>
                 <a:latin typeface="Consolas" panose="020B0609020204030204" pitchFamily="49" charset="0"/>
               </a:rPr>
               <a:t>column_schema</a:t>
             </a:r>
             <a:r>
               <a:rPr lang="en-US" sz="1800" dirty="0">
+                <a:solidFill>
+                  <a:srgbClr val="0070C0"/>
+                </a:solidFill>
                 <a:latin typeface="Consolas" panose="020B0609020204030204" pitchFamily="49" charset="0"/>
               </a:rPr>
               <a:t>(col_schema_5, col_2, state_5, 'string’, 'Author’, col_3, nil).</a:t>

</xml_diff>

<commit_message>
added figure showing data cleaning example
</commit_message>
<xml_diff>
--- a/tapp2019/poster/tapp2019-poster.pptx
+++ b/tapp2019/poster/tapp2019-poster.pptx
@@ -4803,6 +4803,13 @@
             <a:headEnd/>
             <a:tailEnd/>
           </a:ln>
+          <a:scene3d>
+            <a:camera prst="orthographicFront"/>
+            <a:lightRig rig="threePt" dir="t"/>
+          </a:scene3d>
+          <a:sp3d>
+            <a:bevelT/>
+          </a:sp3d>
         </p:spPr>
         <p:txBody>
           <a:bodyPr lIns="480000" tIns="480000" rIns="480000" bIns="480000"/>
@@ -4964,7 +4971,7 @@
             </a:r>
             <a:r>
               <a:rPr lang="en-US" sz="3000" dirty="0"/>
-              <a:t>Research into provenance and reproducibility should be held to the highest standards of reproducibility and transparency.  To this end we employ reproducible computing environments, and we aim to make it easy for other researchers easily to repeat our observations and to evaluate our claims.</a:t>
+              <a:t>Research into provenance and reproducibility should be held to the highest standards of reproducibility and transparency. To this end we employ reproducible computing environments, and we aim to make it easy for other researchers easily to repeat our observations and to evaluate our claims.</a:t>
             </a:r>
           </a:p>
           <a:p>
@@ -5903,7 +5910,7 @@
         <p:spPr bwMode="auto">
           <a:xfrm>
             <a:off x="9063162" y="4572000"/>
-            <a:ext cx="13852636" cy="24923108"/>
+            <a:ext cx="13852636" cy="25603200"/>
           </a:xfrm>
           <a:prstGeom prst="rect">
             <a:avLst/>
@@ -5950,7 +5957,10 @@
             <a:r>
               <a:rPr lang="en-US" sz="2000" dirty="0">
                 <a:solidFill>
-                  <a:srgbClr val="00B050"/>
+                  <a:schemeClr val="tx1">
+                    <a:lumMod val="65000"/>
+                    <a:lumOff val="35000"/>
+                  </a:schemeClr>
                 </a:solidFill>
                 <a:latin typeface="Consolas" panose="020B0609020204030204" pitchFamily="49" charset="0"/>
               </a:rPr>
@@ -6053,7 +6063,7 @@
           <a:p>
             <a:pPr marL="508010" indent="-508010"/>
             <a:r>
-              <a:rPr lang="en-US" sz="2000" dirty="0">
+              <a:rPr lang="en-US" sz="2000" b="1" dirty="0">
                 <a:solidFill>
                   <a:srgbClr val="0070C0"/>
                 </a:solidFill>
@@ -6158,13 +6168,13 @@
           <a:p>
             <a:pPr marL="508010" indent="-508010"/>
             <a:r>
-              <a:rPr lang="en-US" sz="2000" dirty="0">
+              <a:rPr lang="en-US" sz="2000" b="1" dirty="0">
                 <a:solidFill>
                   <a:srgbClr val="0070C0"/>
                 </a:solidFill>
                 <a:latin typeface="Consolas" panose="020B0609020204030204" pitchFamily="49" charset="0"/>
               </a:rPr>
-              <a:t>dataset(dataset_1, source_1, array_9).</a:t>
+              <a:t>dataset(dataset_1, source_1, array_1).</a:t>
             </a:r>
           </a:p>
           <a:p>
@@ -6239,7 +6249,7 @@
           <a:p>
             <a:pPr marL="508010" indent="-508010"/>
             <a:r>
-              <a:rPr lang="en-US" sz="2000" dirty="0">
+              <a:rPr lang="en-US" sz="2000" b="1" dirty="0">
                 <a:solidFill>
                   <a:srgbClr val="0070C0"/>
                 </a:solidFill>
@@ -6320,13 +6330,37 @@
           <a:p>
             <a:pPr marL="508010" indent="-508010"/>
             <a:r>
-              <a:rPr lang="en-US" sz="2000" dirty="0">
+              <a:rPr lang="en-US" sz="2000" b="1" dirty="0">
                 <a:solidFill>
                   <a:srgbClr val="0070C0"/>
                 </a:solidFill>
                 <a:latin typeface="Consolas" panose="020B0609020204030204" pitchFamily="49" charset="0"/>
               </a:rPr>
-              <a:t>column(col_1, array_1).  column(col_2, array_1).  column(col_3, array_1).</a:t>
+              <a:t>column(col_1, array_1).  </a:t>
+            </a:r>
+          </a:p>
+          <a:p>
+            <a:pPr marL="508010" indent="-508010"/>
+            <a:r>
+              <a:rPr lang="en-US" sz="2000" b="1" dirty="0">
+                <a:solidFill>
+                  <a:srgbClr val="0070C0"/>
+                </a:solidFill>
+                <a:latin typeface="Consolas" panose="020B0609020204030204" pitchFamily="49" charset="0"/>
+              </a:rPr>
+              <a:t>column(col_2, array_1).  </a:t>
+            </a:r>
+          </a:p>
+          <a:p>
+            <a:pPr marL="508010" indent="-508010"/>
+            <a:r>
+              <a:rPr lang="en-US" sz="2000" b="1" dirty="0">
+                <a:solidFill>
+                  <a:srgbClr val="0070C0"/>
+                </a:solidFill>
+                <a:latin typeface="Consolas" panose="020B0609020204030204" pitchFamily="49" charset="0"/>
+              </a:rPr>
+              <a:t>column(col_3, array_1).</a:t>
             </a:r>
           </a:p>
           <a:p>
@@ -6401,7 +6435,7 @@
           <a:p>
             <a:pPr marL="508010" indent="-508010"/>
             <a:r>
-              <a:rPr lang="en-US" sz="2000" dirty="0">
+              <a:rPr lang="en-US" sz="2000" b="1" dirty="0">
                 <a:solidFill>
                   <a:srgbClr val="0070C0"/>
                 </a:solidFill>
@@ -6413,7 +6447,7 @@
           <a:p>
             <a:pPr marL="508010" indent="-508010"/>
             <a:r>
-              <a:rPr lang="en-US" sz="2000" dirty="0">
+              <a:rPr lang="en-US" sz="2000" b="1" dirty="0">
                 <a:solidFill>
                   <a:srgbClr val="0070C0"/>
                 </a:solidFill>
@@ -6425,7 +6459,7 @@
           <a:p>
             <a:pPr marL="508010" indent="-508010"/>
             <a:r>
-              <a:rPr lang="en-US" sz="2000" dirty="0">
+              <a:rPr lang="en-US" sz="2000" b="1" dirty="0">
                 <a:solidFill>
                   <a:srgbClr val="0070C0"/>
                 </a:solidFill>
@@ -6530,7 +6564,7 @@
           <a:p>
             <a:pPr marL="508010" indent="-508010"/>
             <a:r>
-              <a:rPr lang="en-US" sz="2000" dirty="0">
+              <a:rPr lang="en-US" sz="2000" b="1" dirty="0">
                 <a:solidFill>
                   <a:srgbClr val="0070C0"/>
                 </a:solidFill>
@@ -6542,7 +6576,7 @@
           <a:p>
             <a:pPr marL="508010" indent="-508010"/>
             <a:r>
-              <a:rPr lang="en-US" sz="2000" dirty="0">
+              <a:rPr lang="en-US" sz="2000" b="1" dirty="0">
                 <a:solidFill>
                   <a:srgbClr val="0070C0"/>
                 </a:solidFill>
@@ -6554,7 +6588,7 @@
           <a:p>
             <a:pPr marL="508010" indent="-508010"/>
             <a:r>
-              <a:rPr lang="en-US" sz="2000" dirty="0">
+              <a:rPr lang="en-US" sz="2000" b="1" dirty="0">
                 <a:solidFill>
                   <a:srgbClr val="0070C0"/>
                 </a:solidFill>
@@ -6661,11 +6695,29 @@
             <a:r>
               <a:rPr lang="en-US" sz="2000" dirty="0">
                 <a:solidFill>
-                  <a:srgbClr val="0070C0"/>
-                </a:solidFill>
-                <a:latin typeface="Consolas" panose="020B0609020204030204" pitchFamily="49" charset="0"/>
-              </a:rPr>
-              <a:t>state(state_1, array_9, nil).</a:t>
+                  <a:srgbClr val="C00000"/>
+                </a:solidFill>
+                <a:latin typeface="Consolas" panose="020B0609020204030204" pitchFamily="49" charset="0"/>
+              </a:rPr>
+              <a:t>state(</a:t>
+            </a:r>
+            <a:r>
+              <a:rPr lang="en-US" sz="2000" b="1" dirty="0">
+                <a:solidFill>
+                  <a:srgbClr val="C00000"/>
+                </a:solidFill>
+                <a:latin typeface="Consolas" panose="020B0609020204030204" pitchFamily="49" charset="0"/>
+              </a:rPr>
+              <a:t>state_1</a:t>
+            </a:r>
+            <a:r>
+              <a:rPr lang="en-US" sz="2000" dirty="0">
+                <a:solidFill>
+                  <a:srgbClr val="C00000"/>
+                </a:solidFill>
+                <a:latin typeface="Consolas" panose="020B0609020204030204" pitchFamily="49" charset="0"/>
+              </a:rPr>
+              <a:t>, array_1, nil).</a:t>
             </a:r>
           </a:p>
           <a:p>
@@ -6812,109 +6864,271 @@
           <a:p>
             <a:pPr marL="508010" indent="-508010"/>
             <a:r>
-              <a:rPr lang="en-US" sz="2000" dirty="0">
+              <a:rPr lang="en-US" sz="2000" b="1" dirty="0">
                 <a:solidFill>
                   <a:srgbClr val="0070C0"/>
                 </a:solidFill>
                 <a:latin typeface="Consolas" panose="020B0609020204030204" pitchFamily="49" charset="0"/>
               </a:rPr>
-              <a:t>content(content_1, cell_1, _1, val_1, nil).</a:t>
+              <a:t>content(content_1, cell_1, </a:t>
+            </a:r>
+            <a:r>
+              <a:rPr lang="en-US" sz="2000" b="1" dirty="0">
+                <a:solidFill>
+                  <a:srgbClr val="C00000"/>
+                </a:solidFill>
+                <a:latin typeface="Consolas" panose="020B0609020204030204" pitchFamily="49" charset="0"/>
+              </a:rPr>
+              <a:t>state_1</a:t>
+            </a:r>
+            <a:r>
+              <a:rPr lang="en-US" sz="2000" b="1" dirty="0">
+                <a:solidFill>
+                  <a:srgbClr val="0070C0"/>
+                </a:solidFill>
+                <a:latin typeface="Consolas" panose="020B0609020204030204" pitchFamily="49" charset="0"/>
+              </a:rPr>
+              <a:t>, val_1, nil).</a:t>
             </a:r>
           </a:p>
           <a:p>
             <a:pPr marL="508010" indent="-508010"/>
             <a:r>
-              <a:rPr lang="en-US" sz="2000" dirty="0">
+              <a:rPr lang="en-US" sz="2000" b="1" dirty="0">
                 <a:solidFill>
                   <a:srgbClr val="0070C0"/>
                 </a:solidFill>
                 <a:latin typeface="Consolas" panose="020B0609020204030204" pitchFamily="49" charset="0"/>
               </a:rPr>
-              <a:t>content(content_2, cell_2, ststateate_1, val_2, nil).</a:t>
+              <a:t>content(content_2, cell_2, </a:t>
+            </a:r>
+            <a:r>
+              <a:rPr lang="en-US" sz="2000" b="1" dirty="0">
+                <a:solidFill>
+                  <a:srgbClr val="C00000"/>
+                </a:solidFill>
+                <a:latin typeface="Consolas" panose="020B0609020204030204" pitchFamily="49" charset="0"/>
+              </a:rPr>
+              <a:t>state_1</a:t>
+            </a:r>
+            <a:r>
+              <a:rPr lang="en-US" sz="2000" b="1" dirty="0">
+                <a:solidFill>
+                  <a:srgbClr val="0070C0"/>
+                </a:solidFill>
+                <a:latin typeface="Consolas" panose="020B0609020204030204" pitchFamily="49" charset="0"/>
+              </a:rPr>
+              <a:t>, val_2, nil).</a:t>
             </a:r>
           </a:p>
           <a:p>
             <a:pPr marL="508010" indent="-508010"/>
             <a:r>
-              <a:rPr lang="en-US" sz="2000" dirty="0">
+              <a:rPr lang="en-US" sz="2000" b="1" dirty="0">
                 <a:solidFill>
                   <a:srgbClr val="0070C0"/>
                 </a:solidFill>
                 <a:latin typeface="Consolas" panose="020B0609020204030204" pitchFamily="49" charset="0"/>
               </a:rPr>
-              <a:t>content(content_3, cell_3, state_1, val_3, nil).</a:t>
+              <a:t>content(content_3, cell_3, </a:t>
+            </a:r>
+            <a:r>
+              <a:rPr lang="en-US" sz="2000" b="1" dirty="0">
+                <a:solidFill>
+                  <a:srgbClr val="C00000"/>
+                </a:solidFill>
+                <a:latin typeface="Consolas" panose="020B0609020204030204" pitchFamily="49" charset="0"/>
+              </a:rPr>
+              <a:t>state_1</a:t>
+            </a:r>
+            <a:r>
+              <a:rPr lang="en-US" sz="2000" b="1" dirty="0">
+                <a:solidFill>
+                  <a:srgbClr val="0070C0"/>
+                </a:solidFill>
+                <a:latin typeface="Consolas" panose="020B0609020204030204" pitchFamily="49" charset="0"/>
+              </a:rPr>
+              <a:t>, val_3, nil).</a:t>
             </a:r>
           </a:p>
           <a:p>
             <a:pPr marL="508010" indent="-508010"/>
             <a:r>
-              <a:rPr lang="en-US" sz="2000" dirty="0">
+              <a:rPr lang="en-US" sz="2000" b="1" dirty="0">
                 <a:solidFill>
                   <a:srgbClr val="0070C0"/>
                 </a:solidFill>
                 <a:latin typeface="Consolas" panose="020B0609020204030204" pitchFamily="49" charset="0"/>
               </a:rPr>
-              <a:t>content(content_4, cell_4, state_1, val_4, nil).</a:t>
+              <a:t>content(content_4, cell_4, </a:t>
+            </a:r>
+            <a:r>
+              <a:rPr lang="en-US" sz="2000" b="1" dirty="0">
+                <a:solidFill>
+                  <a:srgbClr val="C00000"/>
+                </a:solidFill>
+                <a:latin typeface="Consolas" panose="020B0609020204030204" pitchFamily="49" charset="0"/>
+              </a:rPr>
+              <a:t>state_1</a:t>
+            </a:r>
+            <a:r>
+              <a:rPr lang="en-US" sz="2000" b="1" dirty="0">
+                <a:solidFill>
+                  <a:srgbClr val="0070C0"/>
+                </a:solidFill>
+                <a:latin typeface="Consolas" panose="020B0609020204030204" pitchFamily="49" charset="0"/>
+              </a:rPr>
+              <a:t>, val_4, nil).</a:t>
             </a:r>
           </a:p>
           <a:p>
             <a:pPr marL="508010" indent="-508010"/>
             <a:r>
-              <a:rPr lang="en-US" sz="2000" dirty="0">
+              <a:rPr lang="en-US" sz="2000" b="1" dirty="0">
                 <a:solidFill>
                   <a:srgbClr val="0070C0"/>
                 </a:solidFill>
                 <a:latin typeface="Consolas" panose="020B0609020204030204" pitchFamily="49" charset="0"/>
               </a:rPr>
-              <a:t>content(content_5, cell_5, state_1, val_5, nil).</a:t>
+              <a:t>content(content_5, cell_5, </a:t>
+            </a:r>
+            <a:r>
+              <a:rPr lang="en-US" sz="2000" b="1" dirty="0">
+                <a:solidFill>
+                  <a:srgbClr val="C00000"/>
+                </a:solidFill>
+                <a:latin typeface="Consolas" panose="020B0609020204030204" pitchFamily="49" charset="0"/>
+              </a:rPr>
+              <a:t>state_1</a:t>
+            </a:r>
+            <a:r>
+              <a:rPr lang="en-US" sz="2000" b="1" dirty="0">
+                <a:solidFill>
+                  <a:srgbClr val="0070C0"/>
+                </a:solidFill>
+                <a:latin typeface="Consolas" panose="020B0609020204030204" pitchFamily="49" charset="0"/>
+              </a:rPr>
+              <a:t>, val_5, nil).</a:t>
             </a:r>
           </a:p>
           <a:p>
             <a:pPr marL="508010" indent="-508010"/>
             <a:r>
-              <a:rPr lang="en-US" sz="2000" dirty="0">
+              <a:rPr lang="en-US" sz="2000" b="1" dirty="0">
                 <a:solidFill>
                   <a:srgbClr val="0070C0"/>
                 </a:solidFill>
                 <a:latin typeface="Consolas" panose="020B0609020204030204" pitchFamily="49" charset="0"/>
               </a:rPr>
-              <a:t>content(content_6, cell_6, state_1, val_6, nil).</a:t>
+              <a:t>content(content_6, cell_6, </a:t>
+            </a:r>
+            <a:r>
+              <a:rPr lang="en-US" sz="2000" b="1" dirty="0">
+                <a:solidFill>
+                  <a:srgbClr val="C00000"/>
+                </a:solidFill>
+                <a:latin typeface="Consolas" panose="020B0609020204030204" pitchFamily="49" charset="0"/>
+              </a:rPr>
+              <a:t>state_1</a:t>
+            </a:r>
+            <a:r>
+              <a:rPr lang="en-US" sz="2000" b="1" dirty="0">
+                <a:solidFill>
+                  <a:srgbClr val="0070C0"/>
+                </a:solidFill>
+                <a:latin typeface="Consolas" panose="020B0609020204030204" pitchFamily="49" charset="0"/>
+              </a:rPr>
+              <a:t>, val_6, nil).</a:t>
             </a:r>
           </a:p>
           <a:p>
             <a:pPr marL="508010" indent="-508010"/>
             <a:r>
-              <a:rPr lang="en-US" sz="2000" dirty="0">
+              <a:rPr lang="en-US" sz="2000" b="1" dirty="0">
                 <a:solidFill>
                   <a:srgbClr val="0070C0"/>
                 </a:solidFill>
                 <a:latin typeface="Consolas" panose="020B0609020204030204" pitchFamily="49" charset="0"/>
               </a:rPr>
-              <a:t>content(content_7, cell_7, state_1, val_7, nil).</a:t>
+              <a:t>content(content_7, cell_7, </a:t>
+            </a:r>
+            <a:r>
+              <a:rPr lang="en-US" sz="2000" b="1" dirty="0">
+                <a:solidFill>
+                  <a:srgbClr val="C00000"/>
+                </a:solidFill>
+                <a:latin typeface="Consolas" panose="020B0609020204030204" pitchFamily="49" charset="0"/>
+              </a:rPr>
+              <a:t>state_1</a:t>
+            </a:r>
+            <a:r>
+              <a:rPr lang="en-US" sz="2000" b="1" dirty="0">
+                <a:solidFill>
+                  <a:srgbClr val="0070C0"/>
+                </a:solidFill>
+                <a:latin typeface="Consolas" panose="020B0609020204030204" pitchFamily="49" charset="0"/>
+              </a:rPr>
+              <a:t>, val_7, nil).</a:t>
             </a:r>
           </a:p>
           <a:p>
             <a:pPr marL="508010" indent="-508010"/>
             <a:r>
-              <a:rPr lang="en-US" sz="2000" dirty="0">
+              <a:rPr lang="en-US" sz="2000" b="1" dirty="0">
                 <a:solidFill>
                   <a:srgbClr val="0070C0"/>
                 </a:solidFill>
                 <a:latin typeface="Consolas" panose="020B0609020204030204" pitchFamily="49" charset="0"/>
               </a:rPr>
-              <a:t>content(content_8, cell_8, state_1, val_8, nil).</a:t>
+              <a:t>content(content_8, cell_8, </a:t>
+            </a:r>
+            <a:r>
+              <a:rPr lang="en-US" sz="2000" b="1" dirty="0">
+                <a:solidFill>
+                  <a:srgbClr val="C00000"/>
+                </a:solidFill>
+                <a:latin typeface="Consolas" panose="020B0609020204030204" pitchFamily="49" charset="0"/>
+              </a:rPr>
+              <a:t>state_1</a:t>
+            </a:r>
+            <a:r>
+              <a:rPr lang="en-US" sz="2000" b="1" dirty="0">
+                <a:solidFill>
+                  <a:srgbClr val="0070C0"/>
+                </a:solidFill>
+                <a:latin typeface="Consolas" panose="020B0609020204030204" pitchFamily="49" charset="0"/>
+              </a:rPr>
+              <a:t>, val_8, nil).</a:t>
             </a:r>
           </a:p>
           <a:p>
             <a:pPr marL="508010" indent="-508010"/>
             <a:r>
-              <a:rPr lang="en-US" sz="2000" dirty="0">
+              <a:rPr lang="en-US" sz="2000" b="1" dirty="0">
                 <a:solidFill>
                   <a:srgbClr val="0070C0"/>
                 </a:solidFill>
                 <a:latin typeface="Consolas" panose="020B0609020204030204" pitchFamily="49" charset="0"/>
               </a:rPr>
-              <a:t>content(content_9, cell_9, state_1, val_9, nil).</a:t>
+              <a:t>content(content_9, cell_9, </a:t>
+            </a:r>
+            <a:r>
+              <a:rPr lang="en-US" sz="2000" b="1" dirty="0">
+                <a:solidFill>
+                  <a:srgbClr val="C00000"/>
+                </a:solidFill>
+                <a:latin typeface="Consolas" panose="020B0609020204030204" pitchFamily="49" charset="0"/>
+              </a:rPr>
+              <a:t>state_1</a:t>
+            </a:r>
+            <a:r>
+              <a:rPr lang="en-US" sz="2000" b="1" dirty="0">
+                <a:solidFill>
+                  <a:srgbClr val="0070C0"/>
+                </a:solidFill>
+                <a:latin typeface="Consolas" panose="020B0609020204030204" pitchFamily="49" charset="0"/>
+              </a:rPr>
+              <a:t>, val_9, nil).</a:t>
             </a:r>
           </a:p>
           <a:p>
@@ -6989,7 +7203,7 @@
           <a:p>
             <a:pPr marL="508010" indent="-508010"/>
             <a:r>
-              <a:rPr lang="en-US" sz="2000" dirty="0">
+              <a:rPr lang="en-US" sz="2000" b="1" dirty="0">
                 <a:solidFill>
                   <a:srgbClr val="0070C0"/>
                 </a:solidFill>
@@ -6998,7 +7212,7 @@
               <a:t>value(val_1, 'Against Method’).      value(val_4, 'Paul </a:t>
             </a:r>
             <a:r>
-              <a:rPr lang="en-US" sz="2000" dirty="0" err="1">
+              <a:rPr lang="en-US" sz="2000" b="1" dirty="0" err="1">
                 <a:solidFill>
                   <a:srgbClr val="0070C0"/>
                 </a:solidFill>
@@ -7007,7 +7221,7 @@
               <a:t>Feyerabend</a:t>
             </a:r>
             <a:r>
-              <a:rPr lang="en-US" sz="2000" dirty="0">
+              <a:rPr lang="en-US" sz="2000" b="1" dirty="0">
                 <a:solidFill>
                   <a:srgbClr val="0070C0"/>
                 </a:solidFill>
@@ -7019,7 +7233,7 @@
           <a:p>
             <a:pPr marL="508010" indent="-508010"/>
             <a:r>
-              <a:rPr lang="en-US" sz="2000" dirty="0">
+              <a:rPr lang="en-US" sz="2000" b="1" dirty="0">
                 <a:solidFill>
                   <a:srgbClr val="0070C0"/>
                 </a:solidFill>
@@ -7031,7 +7245,7 @@
           <a:p>
             <a:pPr marL="508010" indent="-508010"/>
             <a:r>
-              <a:rPr lang="en-US" sz="2000" dirty="0">
+              <a:rPr lang="en-US" sz="2000" b="1" dirty="0">
                 <a:solidFill>
                   <a:srgbClr val="0070C0"/>
                 </a:solidFill>
@@ -7256,7 +7470,7 @@
           <a:p>
             <a:pPr marL="508010" indent="-508010"/>
             <a:r>
-              <a:rPr lang="en-US" sz="2000" dirty="0" err="1">
+              <a:rPr lang="en-US" sz="2000" b="1" dirty="0" err="1">
                 <a:solidFill>
                   <a:srgbClr val="0070C0"/>
                 </a:solidFill>
@@ -7265,19 +7479,37 @@
               <a:t>column_schema</a:t>
             </a:r>
             <a:r>
-              <a:rPr lang="en-US" sz="2000" dirty="0">
+              <a:rPr lang="en-US" sz="2000" b="1" dirty="0">
                 <a:solidFill>
                   <a:srgbClr val="0070C0"/>
                 </a:solidFill>
                 <a:latin typeface="Consolas" panose="020B0609020204030204" pitchFamily="49" charset="0"/>
               </a:rPr>
-              <a:t>(col_schema_1, col_1, state_1, 'string', 'Book Title’, nil, nil).</a:t>
+              <a:t>(col_schema_1, col_1, </a:t>
+            </a:r>
+            <a:r>
+              <a:rPr lang="en-US" sz="2000" b="1" dirty="0">
+                <a:solidFill>
+                  <a:srgbClr val="C00000"/>
+                </a:solidFill>
+                <a:latin typeface="Consolas" panose="020B0609020204030204" pitchFamily="49" charset="0"/>
+              </a:rPr>
+              <a:t>state_1</a:t>
+            </a:r>
+            <a:r>
+              <a:rPr lang="en-US" sz="2000" b="1" dirty="0">
+                <a:solidFill>
+                  <a:srgbClr val="0070C0"/>
+                </a:solidFill>
+                <a:latin typeface="Consolas" panose="020B0609020204030204" pitchFamily="49" charset="0"/>
+              </a:rPr>
+              <a:t>, 'string', 'Book Title’, nil, nil).</a:t>
             </a:r>
           </a:p>
           <a:p>
             <a:pPr marL="508010" indent="-508010"/>
             <a:r>
-              <a:rPr lang="en-US" sz="2000" dirty="0" err="1">
+              <a:rPr lang="en-US" sz="2000" b="1" dirty="0" err="1">
                 <a:solidFill>
                   <a:srgbClr val="0070C0"/>
                 </a:solidFill>
@@ -7286,19 +7518,37 @@
               <a:t>column_schema</a:t>
             </a:r>
             <a:r>
-              <a:rPr lang="en-US" sz="2000" dirty="0">
+              <a:rPr lang="en-US" sz="2000" b="1" dirty="0">
                 <a:solidFill>
                   <a:srgbClr val="0070C0"/>
                 </a:solidFill>
                 <a:latin typeface="Consolas" panose="020B0609020204030204" pitchFamily="49" charset="0"/>
               </a:rPr>
-              <a:t>(col_schema_2, col_2, state_1, 'string’, 'Author’,   col_1, nil).</a:t>
+              <a:t>(col_schema_2, col_2, </a:t>
+            </a:r>
+            <a:r>
+              <a:rPr lang="en-US" sz="2000" b="1" dirty="0">
+                <a:solidFill>
+                  <a:srgbClr val="C00000"/>
+                </a:solidFill>
+                <a:latin typeface="Consolas" panose="020B0609020204030204" pitchFamily="49" charset="0"/>
+              </a:rPr>
+              <a:t>state_1</a:t>
+            </a:r>
+            <a:r>
+              <a:rPr lang="en-US" sz="2000" b="1" dirty="0">
+                <a:solidFill>
+                  <a:srgbClr val="0070C0"/>
+                </a:solidFill>
+                <a:latin typeface="Consolas" panose="020B0609020204030204" pitchFamily="49" charset="0"/>
+              </a:rPr>
+              <a:t>, 'string’, 'Author’,   col_1, nil).</a:t>
             </a:r>
           </a:p>
           <a:p>
             <a:pPr marL="508010" indent="-508010"/>
             <a:r>
-              <a:rPr lang="en-US" sz="2000" dirty="0" err="1">
+              <a:rPr lang="en-US" sz="2000" b="1" dirty="0" err="1">
                 <a:solidFill>
                   <a:srgbClr val="0070C0"/>
                 </a:solidFill>
@@ -7307,13 +7557,31 @@
               <a:t>column_schema</a:t>
             </a:r>
             <a:r>
-              <a:rPr lang="en-US" sz="2000" dirty="0">
+              <a:rPr lang="en-US" sz="2000" b="1" dirty="0">
                 <a:solidFill>
                   <a:srgbClr val="0070C0"/>
                 </a:solidFill>
                 <a:latin typeface="Consolas" panose="020B0609020204030204" pitchFamily="49" charset="0"/>
               </a:rPr>
-              <a:t>(col_schema_3, col_3, state_1, 'string’, 'Date’,     col_2, nil).3</a:t>
+              <a:t>(col_schema_3, col_3, </a:t>
+            </a:r>
+            <a:r>
+              <a:rPr lang="en-US" sz="2000" b="1" dirty="0">
+                <a:solidFill>
+                  <a:srgbClr val="C00000"/>
+                </a:solidFill>
+                <a:latin typeface="Consolas" panose="020B0609020204030204" pitchFamily="49" charset="0"/>
+              </a:rPr>
+              <a:t>state_1</a:t>
+            </a:r>
+            <a:r>
+              <a:rPr lang="en-US" sz="2000" b="1" dirty="0">
+                <a:solidFill>
+                  <a:srgbClr val="0070C0"/>
+                </a:solidFill>
+                <a:latin typeface="Consolas" panose="020B0609020204030204" pitchFamily="49" charset="0"/>
+              </a:rPr>
+              <a:t>, 'string’, 'Date’,     col_2, nil).</a:t>
             </a:r>
           </a:p>
           <a:p>
@@ -7460,7 +7728,7 @@
           <a:p>
             <a:pPr marL="508010" indent="-508010"/>
             <a:r>
-              <a:rPr lang="en-US" sz="2000" dirty="0" err="1">
+              <a:rPr lang="en-US" sz="2000" b="1" dirty="0" err="1">
                 <a:solidFill>
                   <a:srgbClr val="0070C0"/>
                 </a:solidFill>
@@ -7469,19 +7737,37 @@
               <a:t>row_position</a:t>
             </a:r>
             <a:r>
-              <a:rPr lang="en-US" sz="2000" dirty="0">
+              <a:rPr lang="en-US" sz="2000" b="1" dirty="0">
                 <a:solidFill>
                   <a:srgbClr val="0070C0"/>
                 </a:solidFill>
                 <a:latin typeface="Consolas" panose="020B0609020204030204" pitchFamily="49" charset="0"/>
               </a:rPr>
-              <a:t>(row_pos_1, row_1, state_1, nil).</a:t>
+              <a:t>(row_pos_1, row_1, </a:t>
+            </a:r>
+            <a:r>
+              <a:rPr lang="en-US" sz="2000" b="1" dirty="0">
+                <a:solidFill>
+                  <a:srgbClr val="C00000"/>
+                </a:solidFill>
+                <a:latin typeface="Consolas" panose="020B0609020204030204" pitchFamily="49" charset="0"/>
+              </a:rPr>
+              <a:t>state_1</a:t>
+            </a:r>
+            <a:r>
+              <a:rPr lang="en-US" sz="2000" b="1" dirty="0">
+                <a:solidFill>
+                  <a:srgbClr val="0070C0"/>
+                </a:solidFill>
+                <a:latin typeface="Consolas" panose="020B0609020204030204" pitchFamily="49" charset="0"/>
+              </a:rPr>
+              <a:t>, nil).</a:t>
             </a:r>
           </a:p>
           <a:p>
             <a:pPr marL="508010" indent="-508010"/>
             <a:r>
-              <a:rPr lang="en-US" sz="2000" dirty="0" err="1">
+              <a:rPr lang="en-US" sz="2000" b="1" dirty="0" err="1">
                 <a:solidFill>
                   <a:srgbClr val="0070C0"/>
                 </a:solidFill>
@@ -7490,19 +7776,37 @@
               <a:t>row_position</a:t>
             </a:r>
             <a:r>
-              <a:rPr lang="en-US" sz="2000" dirty="0">
+              <a:rPr lang="en-US" sz="2000" b="1" dirty="0">
                 <a:solidFill>
                   <a:srgbClr val="0070C0"/>
                 </a:solidFill>
                 <a:latin typeface="Consolas" panose="020B0609020204030204" pitchFamily="49" charset="0"/>
               </a:rPr>
-              <a:t>(row_pos_2, row_2, state_1, row_1).</a:t>
+              <a:t>(row_pos_2, row_2, </a:t>
+            </a:r>
+            <a:r>
+              <a:rPr lang="en-US" sz="2000" b="1" dirty="0">
+                <a:solidFill>
+                  <a:srgbClr val="C00000"/>
+                </a:solidFill>
+                <a:latin typeface="Consolas" panose="020B0609020204030204" pitchFamily="49" charset="0"/>
+              </a:rPr>
+              <a:t>state_1</a:t>
+            </a:r>
+            <a:r>
+              <a:rPr lang="en-US" sz="2000" b="1" dirty="0">
+                <a:solidFill>
+                  <a:srgbClr val="0070C0"/>
+                </a:solidFill>
+                <a:latin typeface="Consolas" panose="020B0609020204030204" pitchFamily="49" charset="0"/>
+              </a:rPr>
+              <a:t>, row_1).</a:t>
             </a:r>
           </a:p>
           <a:p>
             <a:pPr marL="508010" indent="-508010"/>
             <a:r>
-              <a:rPr lang="en-US" sz="2000" dirty="0" err="1">
+              <a:rPr lang="en-US" sz="2000" b="1" dirty="0" err="1">
                 <a:solidFill>
                   <a:srgbClr val="0070C0"/>
                 </a:solidFill>
@@ -7511,13 +7815,31 @@
               <a:t>row_position</a:t>
             </a:r>
             <a:r>
-              <a:rPr lang="en-US" sz="2000" dirty="0">
+              <a:rPr lang="en-US" sz="2000" b="1" dirty="0">
                 <a:solidFill>
                   <a:srgbClr val="0070C0"/>
                 </a:solidFill>
                 <a:latin typeface="Consolas" panose="020B0609020204030204" pitchFamily="49" charset="0"/>
               </a:rPr>
-              <a:t>(row_pos_3, row_3, state_1, row_2).</a:t>
+              <a:t>(row_pos_3, row_3, </a:t>
+            </a:r>
+            <a:r>
+              <a:rPr lang="en-US" sz="2000" b="1" dirty="0">
+                <a:solidFill>
+                  <a:srgbClr val="C00000"/>
+                </a:solidFill>
+                <a:latin typeface="Consolas" panose="020B0609020204030204" pitchFamily="49" charset="0"/>
+              </a:rPr>
+              <a:t>state_1</a:t>
+            </a:r>
+            <a:r>
+              <a:rPr lang="en-US" sz="2000" b="1" dirty="0">
+                <a:solidFill>
+                  <a:srgbClr val="0070C0"/>
+                </a:solidFill>
+                <a:latin typeface="Consolas" panose="020B0609020204030204" pitchFamily="49" charset="0"/>
+              </a:rPr>
+              <a:t>, row_2).</a:t>
             </a:r>
           </a:p>
           <a:p>
@@ -7531,38 +7853,74 @@
             <a:r>
               <a:rPr lang="en-US" sz="2000" dirty="0">
                 <a:solidFill>
-                  <a:srgbClr val="00B050"/>
+                  <a:schemeClr val="tx1">
+                    <a:lumMod val="65000"/>
+                    <a:lumOff val="35000"/>
+                  </a:schemeClr>
                 </a:solidFill>
                 <a:latin typeface="Consolas" panose="020B0609020204030204" pitchFamily="49" charset="0"/>
               </a:rPr>
               <a:t>%%%% Rename column 1 from Book Title to Title %%%%%</a:t>
             </a:r>
-            <a:endParaRPr lang="en-US" sz="2000" dirty="0">
-              <a:latin typeface="Consolas" panose="020B0609020204030204" pitchFamily="49" charset="0"/>
-            </a:endParaRPr>
           </a:p>
           <a:p>
             <a:pPr marL="508010" indent="-508010"/>
             <a:r>
               <a:rPr lang="en-US" sz="2000" dirty="0">
                 <a:solidFill>
+                  <a:srgbClr val="C00000"/>
+                </a:solidFill>
+                <a:latin typeface="Consolas" panose="020B0609020204030204" pitchFamily="49" charset="0"/>
+              </a:rPr>
+              <a:t>state(</a:t>
+            </a:r>
+            <a:r>
+              <a:rPr lang="en-US" sz="2000" b="1" dirty="0">
+                <a:solidFill>
+                  <a:srgbClr val="C00000"/>
+                </a:solidFill>
+                <a:latin typeface="Consolas" panose="020B0609020204030204" pitchFamily="49" charset="0"/>
+              </a:rPr>
+              <a:t>state_2</a:t>
+            </a:r>
+            <a:r>
+              <a:rPr lang="en-US" sz="2000" dirty="0">
+                <a:solidFill>
+                  <a:srgbClr val="C00000"/>
+                </a:solidFill>
+                <a:latin typeface="Consolas" panose="020B0609020204030204" pitchFamily="49" charset="0"/>
+              </a:rPr>
+              <a:t>, array_1, state_1).</a:t>
+            </a:r>
+          </a:p>
+          <a:p>
+            <a:pPr marL="508010" indent="-508010"/>
+            <a:r>
+              <a:rPr lang="it-IT" sz="2000" b="1" dirty="0">
+                <a:solidFill>
                   <a:srgbClr val="0070C0"/>
                 </a:solidFill>
                 <a:latin typeface="Consolas" panose="020B0609020204030204" pitchFamily="49" charset="0"/>
               </a:rPr>
-              <a:t>state(state_2, array_1, state_1).</a:t>
-            </a:r>
-          </a:p>
-          <a:p>
-            <a:pPr marL="508010" indent="-508010"/>
-            <a:r>
-              <a:rPr lang="it-IT" sz="2000" dirty="0">
+              <a:t>column_schema(col_schema_4, col_1, </a:t>
+            </a:r>
+            <a:r>
+              <a:rPr lang="it-IT" sz="2000" b="1" dirty="0">
+                <a:solidFill>
+                  <a:srgbClr val="C00000"/>
+                </a:solidFill>
+                <a:latin typeface="Consolas" panose="020B0609020204030204" pitchFamily="49" charset="0"/>
+              </a:rPr>
+              <a:t>state_2</a:t>
+            </a:r>
+            <a:r>
+              <a:rPr lang="it-IT" sz="2000" b="1" dirty="0">
                 <a:solidFill>
                   <a:srgbClr val="0070C0"/>
                 </a:solidFill>
                 <a:latin typeface="Consolas" panose="020B0609020204030204" pitchFamily="49" charset="0"/>
               </a:rPr>
-              <a:t>column_schema(col_schema_4, col_1, state_2, 'string', 'Title', nil, col_schema_1).</a:t>
+              <a:t>, 'string', 'Title', nil, col_schema_1).</a:t>
             </a:r>
           </a:p>
           <a:p>
@@ -7574,70 +7932,88 @@
             <a:r>
               <a:rPr lang="en-US" sz="2000" dirty="0">
                 <a:solidFill>
-                  <a:srgbClr val="00B050"/>
+                  <a:schemeClr val="tx1">
+                    <a:lumMod val="65000"/>
+                    <a:lumOff val="35000"/>
+                  </a:schemeClr>
                 </a:solidFill>
                 <a:latin typeface="Consolas" panose="020B0609020204030204" pitchFamily="49" charset="0"/>
               </a:rPr>
               <a:t>%%%% Place surname first and abbreviate given names to initials in Author column %%%%%</a:t>
             </a:r>
-            <a:endParaRPr lang="en-US" sz="2000" dirty="0">
-              <a:latin typeface="Consolas" panose="020B0609020204030204" pitchFamily="49" charset="0"/>
-            </a:endParaRPr>
           </a:p>
           <a:p>
             <a:pPr marL="508010" indent="-508010"/>
             <a:r>
               <a:rPr lang="en-US" sz="2000" dirty="0">
                 <a:solidFill>
+                  <a:srgbClr val="C00000"/>
+                </a:solidFill>
+                <a:latin typeface="Consolas" panose="020B0609020204030204" pitchFamily="49" charset="0"/>
+              </a:rPr>
+              <a:t>state(</a:t>
+            </a:r>
+            <a:r>
+              <a:rPr lang="en-US" sz="2000" b="1" dirty="0">
+                <a:solidFill>
+                  <a:srgbClr val="C00000"/>
+                </a:solidFill>
+                <a:latin typeface="Consolas" panose="020B0609020204030204" pitchFamily="49" charset="0"/>
+              </a:rPr>
+              <a:t>state_3</a:t>
+            </a:r>
+            <a:r>
+              <a:rPr lang="en-US" sz="2000" dirty="0">
+                <a:solidFill>
+                  <a:srgbClr val="C00000"/>
+                </a:solidFill>
+                <a:latin typeface="Consolas" panose="020B0609020204030204" pitchFamily="49" charset="0"/>
+              </a:rPr>
+              <a:t>, array_1, state_2).</a:t>
+            </a:r>
+          </a:p>
+          <a:p>
+            <a:pPr marL="508010" indent="-508010"/>
+            <a:r>
+              <a:rPr lang="en-US" sz="2000" b="1" dirty="0">
+                <a:solidFill>
                   <a:srgbClr val="0070C0"/>
                 </a:solidFill>
                 <a:latin typeface="Consolas" panose="020B0609020204030204" pitchFamily="49" charset="0"/>
               </a:rPr>
-              <a:t>state(state_3, array_1, state_2).</a:t>
+              <a:t>value(val_10, '</a:t>
+            </a:r>
+            <a:r>
+              <a:rPr lang="en-US" sz="2000" b="1" dirty="0" err="1">
+                <a:solidFill>
+                  <a:srgbClr val="0070C0"/>
+                </a:solidFill>
+                <a:latin typeface="Consolas" panose="020B0609020204030204" pitchFamily="49" charset="0"/>
+              </a:rPr>
+              <a:t>Feyerabend</a:t>
+            </a:r>
+            <a:r>
+              <a:rPr lang="en-US" sz="2000" b="1" dirty="0">
+                <a:solidFill>
+                  <a:srgbClr val="0070C0"/>
+                </a:solidFill>
+                <a:latin typeface="Consolas" panose="020B0609020204030204" pitchFamily="49" charset="0"/>
+              </a:rPr>
+              <a:t>, P.’).</a:t>
             </a:r>
           </a:p>
           <a:p>
             <a:pPr marL="508010" indent="-508010"/>
             <a:r>
-              <a:rPr lang="en-US" sz="2000" dirty="0">
+              <a:rPr lang="en-US" sz="2000" b="1" dirty="0">
                 <a:solidFill>
                   <a:srgbClr val="0070C0"/>
                 </a:solidFill>
                 <a:latin typeface="Consolas" panose="020B0609020204030204" pitchFamily="49" charset="0"/>
               </a:rPr>
-              <a:t>value(val_10, '</a:t>
-            </a:r>
-            <a:r>
-              <a:rPr lang="en-US" sz="2000" dirty="0" err="1">
-                <a:solidFill>
-                  <a:srgbClr val="0070C0"/>
-                </a:solidFill>
-                <a:latin typeface="Consolas" panose="020B0609020204030204" pitchFamily="49" charset="0"/>
-              </a:rPr>
-              <a:t>Feyerabend</a:t>
-            </a:r>
-            <a:r>
-              <a:rPr lang="en-US" sz="2000" dirty="0">
-                <a:solidFill>
-                  <a:srgbClr val="0070C0"/>
-                </a:solidFill>
-                <a:latin typeface="Consolas" panose="020B0609020204030204" pitchFamily="49" charset="0"/>
-              </a:rPr>
-              <a:t>, P.’).</a:t>
-            </a:r>
-          </a:p>
-          <a:p>
-            <a:pPr marL="508010" indent="-508010"/>
-            <a:r>
-              <a:rPr lang="en-US" sz="2000" dirty="0">
-                <a:solidFill>
-                  <a:srgbClr val="0070C0"/>
-                </a:solidFill>
-                <a:latin typeface="Consolas" panose="020B0609020204030204" pitchFamily="49" charset="0"/>
-              </a:rPr>
               <a:t>value(val_11, 'Collins, H.M.’).</a:t>
             </a:r>
-            <a:endParaRPr lang="it-IT" sz="2000" dirty="0">
+            <a:endParaRPr lang="it-IT" sz="2000" b="1" dirty="0">
               <a:solidFill>
                 <a:srgbClr val="0070C0"/>
               </a:solidFill>
@@ -7647,7 +8023,7 @@
           <a:p>
             <a:pPr marL="508010" indent="-508010"/>
             <a:r>
-              <a:rPr lang="en-US" sz="2000" dirty="0">
+              <a:rPr lang="en-US" sz="2000" b="1" dirty="0">
                 <a:solidFill>
                   <a:srgbClr val="0070C0"/>
                 </a:solidFill>
@@ -7659,37 +8035,91 @@
           <a:p>
             <a:pPr marL="508010" indent="-508010"/>
             <a:r>
-              <a:rPr lang="en-US" sz="2000" dirty="0">
+              <a:rPr lang="en-US" sz="2000" b="1" dirty="0">
                 <a:solidFill>
                   <a:srgbClr val="0070C0"/>
                 </a:solidFill>
                 <a:latin typeface="Consolas" panose="020B0609020204030204" pitchFamily="49" charset="0"/>
               </a:rPr>
-              <a:t>content(content_10, cell_4, state_3, val_10, content_4).</a:t>
+              <a:t>content(content_10, cell_4, </a:t>
+            </a:r>
+            <a:r>
+              <a:rPr lang="en-US" sz="2000" b="1" dirty="0">
+                <a:solidFill>
+                  <a:srgbClr val="C00000"/>
+                </a:solidFill>
+                <a:latin typeface="Consolas" panose="020B0609020204030204" pitchFamily="49" charset="0"/>
+              </a:rPr>
+              <a:t>state_3</a:t>
+            </a:r>
+            <a:r>
+              <a:rPr lang="en-US" sz="2000" b="1" dirty="0">
+                <a:solidFill>
+                  <a:srgbClr val="0070C0"/>
+                </a:solidFill>
+                <a:latin typeface="Consolas" panose="020B0609020204030204" pitchFamily="49" charset="0"/>
+              </a:rPr>
+              <a:t>, val_10, content_4).</a:t>
             </a:r>
           </a:p>
           <a:p>
             <a:pPr marL="508010" indent="-508010"/>
             <a:r>
-              <a:rPr lang="en-US" sz="2000" dirty="0">
+              <a:rPr lang="en-US" sz="2000" b="1" dirty="0">
                 <a:solidFill>
                   <a:srgbClr val="0070C0"/>
                 </a:solidFill>
                 <a:latin typeface="Consolas" panose="020B0609020204030204" pitchFamily="49" charset="0"/>
               </a:rPr>
-              <a:t>content(content_11, cell_5, state_3, val_11, content_5).</a:t>
+              <a:t>content(content_11, cell_5, </a:t>
+            </a:r>
+            <a:r>
+              <a:rPr lang="en-US" sz="2000" b="1" dirty="0">
+                <a:solidFill>
+                  <a:srgbClr val="C00000"/>
+                </a:solidFill>
+                <a:latin typeface="Consolas" panose="020B0609020204030204" pitchFamily="49" charset="0"/>
+              </a:rPr>
+              <a:t>state_3</a:t>
+            </a:r>
+            <a:r>
+              <a:rPr lang="en-US" sz="2000" b="1" dirty="0">
+                <a:solidFill>
+                  <a:srgbClr val="0070C0"/>
+                </a:solidFill>
+                <a:latin typeface="Consolas" panose="020B0609020204030204" pitchFamily="49" charset="0"/>
+              </a:rPr>
+              <a:t>, val_11, content_5).</a:t>
             </a:r>
           </a:p>
           <a:p>
             <a:pPr marL="508010" indent="-508010"/>
             <a:r>
-              <a:rPr lang="en-US" sz="2000" dirty="0">
+              <a:rPr lang="en-US" sz="2000" b="1" dirty="0">
                 <a:solidFill>
                   <a:srgbClr val="0070C0"/>
                 </a:solidFill>
                 <a:latin typeface="Consolas" panose="020B0609020204030204" pitchFamily="49" charset="0"/>
               </a:rPr>
-              <a:t>content(content_12, cell_6, state_3, val_12, content_6).</a:t>
+              <a:t>content(content_12, cell_6, </a:t>
+            </a:r>
+            <a:r>
+              <a:rPr lang="en-US" sz="2000" b="1" dirty="0">
+                <a:solidFill>
+                  <a:srgbClr val="C00000"/>
+                </a:solidFill>
+                <a:latin typeface="Consolas" panose="020B0609020204030204" pitchFamily="49" charset="0"/>
+              </a:rPr>
+              <a:t>state_3</a:t>
+            </a:r>
+            <a:r>
+              <a:rPr lang="en-US" sz="2000" b="1" dirty="0">
+                <a:solidFill>
+                  <a:srgbClr val="0070C0"/>
+                </a:solidFill>
+                <a:latin typeface="Consolas" panose="020B0609020204030204" pitchFamily="49" charset="0"/>
+              </a:rPr>
+              <a:t>, val_12, content_6).</a:t>
             </a:r>
           </a:p>
           <a:p>
@@ -7701,32 +8131,89 @@
             <a:r>
               <a:rPr lang="en-US" sz="2000" dirty="0">
                 <a:solidFill>
-                  <a:srgbClr val="00B050"/>
+                  <a:schemeClr val="tx1">
+                    <a:lumMod val="65000"/>
+                    <a:lumOff val="35000"/>
+                  </a:schemeClr>
                 </a:solidFill>
                 <a:latin typeface="Consolas" panose="020B0609020204030204" pitchFamily="49" charset="0"/>
               </a:rPr>
               <a:t>%%%% Sort rows by Author %%%%%</a:t>
             </a:r>
-            <a:endParaRPr lang="en-US" sz="2000" dirty="0">
-              <a:latin typeface="Consolas" panose="020B0609020204030204" pitchFamily="49" charset="0"/>
-            </a:endParaRPr>
           </a:p>
           <a:p>
             <a:pPr marL="508010" indent="-508010"/>
             <a:r>
               <a:rPr lang="en-US" sz="2000" dirty="0">
                 <a:solidFill>
+                  <a:srgbClr val="C00000"/>
+                </a:solidFill>
+                <a:latin typeface="Consolas" panose="020B0609020204030204" pitchFamily="49" charset="0"/>
+              </a:rPr>
+              <a:t>state(</a:t>
+            </a:r>
+            <a:r>
+              <a:rPr lang="en-US" sz="2000" b="1" dirty="0">
+                <a:solidFill>
+                  <a:srgbClr val="C00000"/>
+                </a:solidFill>
+                <a:latin typeface="Consolas" panose="020B0609020204030204" pitchFamily="49" charset="0"/>
+              </a:rPr>
+              <a:t>state_4</a:t>
+            </a:r>
+            <a:r>
+              <a:rPr lang="en-US" sz="2000" dirty="0">
+                <a:solidFill>
+                  <a:srgbClr val="C00000"/>
+                </a:solidFill>
+                <a:latin typeface="Consolas" panose="020B0609020204030204" pitchFamily="49" charset="0"/>
+              </a:rPr>
+              <a:t>, array_1, state_3).</a:t>
+            </a:r>
+          </a:p>
+          <a:p>
+            <a:pPr marL="508010" indent="-508010"/>
+            <a:r>
+              <a:rPr lang="en-US" sz="2000" b="1" dirty="0" err="1">
+                <a:solidFill>
                   <a:srgbClr val="0070C0"/>
                 </a:solidFill>
                 <a:latin typeface="Consolas" panose="020B0609020204030204" pitchFamily="49" charset="0"/>
               </a:rPr>
-              <a:t>state(state_4, array_1, state_3).</a:t>
+              <a:t>row_position</a:t>
+            </a:r>
+            <a:r>
+              <a:rPr lang="en-US" sz="2000" b="1" dirty="0">
+                <a:solidFill>
+                  <a:srgbClr val="0070C0"/>
+                </a:solidFill>
+                <a:latin typeface="Consolas" panose="020B0609020204030204" pitchFamily="49" charset="0"/>
+              </a:rPr>
+              <a:t>(row_pos_5, row_2, </a:t>
+            </a:r>
+            <a:r>
+              <a:rPr lang="en-US" sz="2000" b="1" dirty="0">
+                <a:solidFill>
+                  <a:srgbClr val="C00000"/>
+                </a:solidFill>
+                <a:latin typeface="Consolas" panose="020B0609020204030204" pitchFamily="49" charset="0"/>
+              </a:rPr>
+              <a:t>state_4</a:t>
+            </a:r>
+            <a:r>
+              <a:rPr lang="en-US" sz="2000" b="1" dirty="0">
+                <a:solidFill>
+                  <a:srgbClr val="0070C0"/>
+                </a:solidFill>
+                <a:latin typeface="Consolas" panose="020B0609020204030204" pitchFamily="49" charset="0"/>
+              </a:rPr>
+              <a:t>, nil).</a:t>
             </a:r>
           </a:p>
           <a:p>
             <a:pPr marL="508010" indent="-508010"/>
             <a:r>
-              <a:rPr lang="en-US" sz="2000" dirty="0" err="1">
+              <a:rPr lang="en-US" sz="2000" b="1" dirty="0" err="1">
                 <a:solidFill>
                   <a:srgbClr val="0070C0"/>
                 </a:solidFill>
@@ -7735,19 +8222,37 @@
               <a:t>row_position</a:t>
             </a:r>
             <a:r>
-              <a:rPr lang="en-US" sz="2000" dirty="0">
+              <a:rPr lang="en-US" sz="2000" b="1" dirty="0">
                 <a:solidFill>
                   <a:srgbClr val="0070C0"/>
                 </a:solidFill>
                 <a:latin typeface="Consolas" panose="020B0609020204030204" pitchFamily="49" charset="0"/>
               </a:rPr>
-              <a:t>(row_pos_5, row_2, state_4, nil).</a:t>
+              <a:t>(row_pos_4, row_1, </a:t>
+            </a:r>
+            <a:r>
+              <a:rPr lang="en-US" sz="2000" b="1" dirty="0">
+                <a:solidFill>
+                  <a:srgbClr val="C00000"/>
+                </a:solidFill>
+                <a:latin typeface="Consolas" panose="020B0609020204030204" pitchFamily="49" charset="0"/>
+              </a:rPr>
+              <a:t>state_4</a:t>
+            </a:r>
+            <a:r>
+              <a:rPr lang="en-US" sz="2000" b="1" dirty="0">
+                <a:solidFill>
+                  <a:srgbClr val="0070C0"/>
+                </a:solidFill>
+                <a:latin typeface="Consolas" panose="020B0609020204030204" pitchFamily="49" charset="0"/>
+              </a:rPr>
+              <a:t>, row_2).</a:t>
             </a:r>
           </a:p>
           <a:p>
             <a:pPr marL="508010" indent="-508010"/>
             <a:r>
-              <a:rPr lang="en-US" sz="2000" dirty="0" err="1">
+              <a:rPr lang="en-US" sz="2000" b="1" dirty="0" err="1">
                 <a:solidFill>
                   <a:srgbClr val="0070C0"/>
                 </a:solidFill>
@@ -7756,34 +8261,31 @@
               <a:t>row_position</a:t>
             </a:r>
             <a:r>
-              <a:rPr lang="en-US" sz="2000" dirty="0">
+              <a:rPr lang="en-US" sz="2000" b="1" dirty="0">
                 <a:solidFill>
                   <a:srgbClr val="0070C0"/>
                 </a:solidFill>
                 <a:latin typeface="Consolas" panose="020B0609020204030204" pitchFamily="49" charset="0"/>
               </a:rPr>
-              <a:t>(row_pos_4, row_1, state_4, row_2).</a:t>
-            </a:r>
-          </a:p>
-          <a:p>
-            <a:pPr marL="508010" indent="-508010"/>
-            <a:r>
-              <a:rPr lang="en-US" sz="2000" dirty="0" err="1">
+              <a:t>(row_pos_6, row_3, </a:t>
+            </a:r>
+            <a:r>
+              <a:rPr lang="en-US" sz="2000" b="1" dirty="0">
+                <a:solidFill>
+                  <a:srgbClr val="C00000"/>
+                </a:solidFill>
+                <a:latin typeface="Consolas" panose="020B0609020204030204" pitchFamily="49" charset="0"/>
+              </a:rPr>
+              <a:t>state_4</a:t>
+            </a:r>
+            <a:r>
+              <a:rPr lang="en-US" sz="2000" b="1" dirty="0">
                 <a:solidFill>
                   <a:srgbClr val="0070C0"/>
                 </a:solidFill>
                 <a:latin typeface="Consolas" panose="020B0609020204030204" pitchFamily="49" charset="0"/>
               </a:rPr>
-              <a:t>row_position</a:t>
-            </a:r>
-            <a:r>
-              <a:rPr lang="en-US" sz="2000" dirty="0">
-                <a:solidFill>
-                  <a:srgbClr val="0070C0"/>
-                </a:solidFill>
-                <a:latin typeface="Consolas" panose="020B0609020204030204" pitchFamily="49" charset="0"/>
-              </a:rPr>
-              <a:t>(row_pos_6, row_3, state_4, row_1).</a:t>
+              <a:t>, row_1).</a:t>
             </a:r>
           </a:p>
           <a:p>
@@ -7795,32 +8297,89 @@
             <a:r>
               <a:rPr lang="en-US" sz="2000" dirty="0">
                 <a:solidFill>
-                  <a:srgbClr val="00B050"/>
+                  <a:schemeClr val="tx1">
+                    <a:lumMod val="65000"/>
+                    <a:lumOff val="35000"/>
+                  </a:schemeClr>
                 </a:solidFill>
                 <a:latin typeface="Consolas" panose="020B0609020204030204" pitchFamily="49" charset="0"/>
               </a:rPr>
               <a:t>%%%% Swap order of second and third columns %%%%%</a:t>
             </a:r>
-            <a:endParaRPr lang="en-US" sz="2000" dirty="0">
-              <a:latin typeface="Consolas" panose="020B0609020204030204" pitchFamily="49" charset="0"/>
-            </a:endParaRPr>
           </a:p>
           <a:p>
             <a:pPr marL="508010" indent="-508010"/>
             <a:r>
               <a:rPr lang="en-US" sz="2000" dirty="0">
                 <a:solidFill>
+                  <a:srgbClr val="C00000"/>
+                </a:solidFill>
+                <a:latin typeface="Consolas" panose="020B0609020204030204" pitchFamily="49" charset="0"/>
+              </a:rPr>
+              <a:t>state(</a:t>
+            </a:r>
+            <a:r>
+              <a:rPr lang="en-US" sz="2000" b="1" dirty="0">
+                <a:solidFill>
+                  <a:srgbClr val="C00000"/>
+                </a:solidFill>
+                <a:latin typeface="Consolas" panose="020B0609020204030204" pitchFamily="49" charset="0"/>
+              </a:rPr>
+              <a:t>state_5</a:t>
+            </a:r>
+            <a:r>
+              <a:rPr lang="en-US" sz="2000" dirty="0">
+                <a:solidFill>
+                  <a:srgbClr val="C00000"/>
+                </a:solidFill>
+                <a:latin typeface="Consolas" panose="020B0609020204030204" pitchFamily="49" charset="0"/>
+              </a:rPr>
+              <a:t>, array_1, state_4).</a:t>
+            </a:r>
+          </a:p>
+          <a:p>
+            <a:pPr marL="508010" indent="-508010"/>
+            <a:r>
+              <a:rPr lang="en-US" sz="2000" b="1" dirty="0" err="1">
+                <a:solidFill>
                   <a:srgbClr val="0070C0"/>
                 </a:solidFill>
                 <a:latin typeface="Consolas" panose="020B0609020204030204" pitchFamily="49" charset="0"/>
               </a:rPr>
-              <a:t>state(state_5, array_1, state_4).</a:t>
+              <a:t>column_schema</a:t>
+            </a:r>
+            <a:r>
+              <a:rPr lang="en-US" sz="2000" b="1" dirty="0">
+                <a:solidFill>
+                  <a:srgbClr val="0070C0"/>
+                </a:solidFill>
+                <a:latin typeface="Consolas" panose="020B0609020204030204" pitchFamily="49" charset="0"/>
+              </a:rPr>
+              <a:t>(col_schema_5, col_3, </a:t>
+            </a:r>
+            <a:r>
+              <a:rPr lang="en-US" sz="2000" b="1" dirty="0">
+                <a:solidFill>
+                  <a:srgbClr val="C00000"/>
+                </a:solidFill>
+                <a:latin typeface="Consolas" panose="020B0609020204030204" pitchFamily="49" charset="0"/>
+              </a:rPr>
+              <a:t>state_5</a:t>
+            </a:r>
+            <a:r>
+              <a:rPr lang="en-US" sz="2000" b="1" dirty="0">
+                <a:solidFill>
+                  <a:srgbClr val="0070C0"/>
+                </a:solidFill>
+                <a:latin typeface="Consolas" panose="020B0609020204030204" pitchFamily="49" charset="0"/>
+              </a:rPr>
+              <a:t>, 'string’, 'Date’,   col_1, col_schema_3).</a:t>
             </a:r>
           </a:p>
           <a:p>
             <a:pPr marL="508010" indent="-508010"/>
             <a:r>
-              <a:rPr lang="en-US" sz="2000" dirty="0" err="1">
+              <a:rPr lang="en-US" sz="2000" b="1" dirty="0" err="1">
                 <a:solidFill>
                   <a:srgbClr val="0070C0"/>
                 </a:solidFill>
@@ -7829,38 +8388,247 @@
               <a:t>column_schema</a:t>
             </a:r>
             <a:r>
-              <a:rPr lang="en-US" sz="2000" dirty="0">
+              <a:rPr lang="en-US" sz="2000" b="1" dirty="0">
                 <a:solidFill>
                   <a:srgbClr val="0070C0"/>
                 </a:solidFill>
                 <a:latin typeface="Consolas" panose="020B0609020204030204" pitchFamily="49" charset="0"/>
               </a:rPr>
-              <a:t>(col_schema_5, col_3, state_5, 'string’, 'Date’,   col_1, col_schema_3).</a:t>
-            </a:r>
-          </a:p>
-          <a:p>
-            <a:pPr marL="508010" indent="-508010"/>
-            <a:r>
-              <a:rPr lang="en-US" sz="2000" dirty="0" err="1">
+              <a:t>(col_schema_6, col_2, </a:t>
+            </a:r>
+            <a:r>
+              <a:rPr lang="en-US" sz="2000" b="1" dirty="0">
+                <a:solidFill>
+                  <a:srgbClr val="C00000"/>
+                </a:solidFill>
+                <a:latin typeface="Consolas" panose="020B0609020204030204" pitchFamily="49" charset="0"/>
+              </a:rPr>
+              <a:t>state_5</a:t>
+            </a:r>
+            <a:r>
+              <a:rPr lang="en-US" sz="2000" b="1" dirty="0">
                 <a:solidFill>
                   <a:srgbClr val="0070C0"/>
                 </a:solidFill>
                 <a:latin typeface="Consolas" panose="020B0609020204030204" pitchFamily="49" charset="0"/>
               </a:rPr>
-              <a:t>column_schema</a:t>
-            </a:r>
-            <a:r>
-              <a:rPr lang="en-US" sz="2000" dirty="0">
-                <a:solidFill>
-                  <a:srgbClr val="0070C0"/>
-                </a:solidFill>
-                <a:latin typeface="Consolas" panose="020B0609020204030204" pitchFamily="49" charset="0"/>
-              </a:rPr>
-              <a:t>(col_schema_6, col_2, state_5, 'string’, 'Author’, col_3, col_schema_2).</a:t>
+              <a:t>, 'string’, 'Author’, col_3, col_schema_2).</a:t>
             </a:r>
           </a:p>
         </p:txBody>
       </p:sp>
+      <p:grpSp>
+        <p:nvGrpSpPr>
+          <p:cNvPr id="16" name="Group 15">
+            <a:extLst>
+              <a:ext uri="{FF2B5EF4-FFF2-40B4-BE49-F238E27FC236}">
+                <a16:creationId xmlns:a16="http://schemas.microsoft.com/office/drawing/2014/main" id="{F75495E5-D344-42D8-B49C-6955EB489E4B}"/>
+              </a:ext>
+            </a:extLst>
+          </p:cNvPr>
+          <p:cNvGrpSpPr/>
+          <p:nvPr/>
+        </p:nvGrpSpPr>
+        <p:grpSpPr>
+          <a:xfrm>
+            <a:off x="15765379" y="6379774"/>
+            <a:ext cx="6934200" cy="5486400"/>
+            <a:chOff x="15773400" y="6096000"/>
+            <a:chExt cx="6934200" cy="5486400"/>
+          </a:xfrm>
+          <a:effectLst>
+            <a:outerShdw blurRad="50800" dist="101600" dir="3360000" sx="101000" sy="101000" algn="ctr" rotWithShape="0">
+              <a:srgbClr val="000000">
+                <a:alpha val="21000"/>
+              </a:srgbClr>
+            </a:outerShdw>
+          </a:effectLst>
+        </p:grpSpPr>
+        <p:sp>
+          <p:nvSpPr>
+            <p:cNvPr id="14" name="Rectangle 13">
+              <a:extLst>
+                <a:ext uri="{FF2B5EF4-FFF2-40B4-BE49-F238E27FC236}">
+                  <a16:creationId xmlns:a16="http://schemas.microsoft.com/office/drawing/2014/main" id="{13772B36-FE24-437C-956D-8802B9C0C6C9}"/>
+                </a:ext>
+              </a:extLst>
+            </p:cNvPr>
+            <p:cNvSpPr/>
+            <p:nvPr/>
+          </p:nvSpPr>
+          <p:spPr>
+            <a:xfrm>
+              <a:off x="15773400" y="6096000"/>
+              <a:ext cx="6934200" cy="5486400"/>
+            </a:xfrm>
+            <a:prstGeom prst="rect">
+              <a:avLst/>
+            </a:prstGeom>
+            <a:scene3d>
+              <a:camera prst="orthographicFront"/>
+              <a:lightRig rig="threePt" dir="t"/>
+            </a:scene3d>
+            <a:sp3d>
+              <a:bevelB/>
+            </a:sp3d>
+          </p:spPr>
+          <p:style>
+            <a:lnRef idx="1">
+              <a:schemeClr val="accent1"/>
+            </a:lnRef>
+            <a:fillRef idx="3">
+              <a:schemeClr val="accent1"/>
+            </a:fillRef>
+            <a:effectRef idx="2">
+              <a:schemeClr val="accent1"/>
+            </a:effectRef>
+            <a:fontRef idx="minor">
+              <a:schemeClr val="lt1"/>
+            </a:fontRef>
+          </p:style>
+          <p:txBody>
+            <a:bodyPr rtlCol="0" anchor="ctr"/>
+            <a:lstStyle/>
+            <a:p>
+              <a:pPr algn="ctr"/>
+              <a:endParaRPr lang="en-US"/>
+            </a:p>
+          </p:txBody>
+        </p:sp>
+        <p:pic>
+          <p:nvPicPr>
+            <p:cNvPr id="7" name="Picture 6">
+              <a:extLst>
+                <a:ext uri="{FF2B5EF4-FFF2-40B4-BE49-F238E27FC236}">
+                  <a16:creationId xmlns:a16="http://schemas.microsoft.com/office/drawing/2014/main" id="{7ECB86EE-D4CF-4F71-AF3B-A33A21850428}"/>
+                </a:ext>
+              </a:extLst>
+            </p:cNvPr>
+            <p:cNvPicPr>
+              <a:picLocks noChangeAspect="1"/>
+            </p:cNvPicPr>
+            <p:nvPr/>
+          </p:nvPicPr>
+          <p:blipFill>
+            <a:blip r:embed="rId12"/>
+            <a:stretch>
+              <a:fillRect/>
+            </a:stretch>
+          </p:blipFill>
+          <p:spPr>
+            <a:xfrm>
+              <a:off x="15925800" y="6327674"/>
+              <a:ext cx="6652806" cy="1819571"/>
+            </a:xfrm>
+            <a:prstGeom prst="rect">
+              <a:avLst/>
+            </a:prstGeom>
+            <a:scene3d>
+              <a:camera prst="orthographicFront"/>
+              <a:lightRig rig="threePt" dir="t"/>
+            </a:scene3d>
+            <a:sp3d>
+              <a:bevelB/>
+            </a:sp3d>
+          </p:spPr>
+        </p:pic>
+        <p:sp>
+          <p:nvSpPr>
+            <p:cNvPr id="12" name="Arrow: Down 11">
+              <a:extLst>
+                <a:ext uri="{FF2B5EF4-FFF2-40B4-BE49-F238E27FC236}">
+                  <a16:creationId xmlns:a16="http://schemas.microsoft.com/office/drawing/2014/main" id="{6CF1D82F-652B-4F35-BF3C-61B75EE661DA}"/>
+                </a:ext>
+              </a:extLst>
+            </p:cNvPr>
+            <p:cNvSpPr/>
+            <p:nvPr/>
+          </p:nvSpPr>
+          <p:spPr>
+            <a:xfrm>
+              <a:off x="18276375" y="8286680"/>
+              <a:ext cx="1660744" cy="1066800"/>
+            </a:xfrm>
+            <a:prstGeom prst="downArrow">
+              <a:avLst/>
+            </a:prstGeom>
+            <a:solidFill>
+              <a:schemeClr val="dk1">
+                <a:alpha val="50000"/>
+              </a:schemeClr>
+            </a:solidFill>
+            <a:ln>
+              <a:noFill/>
+            </a:ln>
+            <a:scene3d>
+              <a:camera prst="orthographicFront"/>
+              <a:lightRig rig="threePt" dir="t"/>
+            </a:scene3d>
+            <a:sp3d>
+              <a:bevelB/>
+            </a:sp3d>
+          </p:spPr>
+          <p:style>
+            <a:lnRef idx="0">
+              <a:scrgbClr r="0" g="0" b="0"/>
+            </a:lnRef>
+            <a:fillRef idx="0">
+              <a:scrgbClr r="0" g="0" b="0"/>
+            </a:fillRef>
+            <a:effectRef idx="0">
+              <a:scrgbClr r="0" g="0" b="0"/>
+            </a:effectRef>
+            <a:fontRef idx="minor">
+              <a:schemeClr val="lt1"/>
+            </a:fontRef>
+          </p:style>
+          <p:txBody>
+            <a:bodyPr rtlCol="0" anchor="ctr"/>
+            <a:lstStyle/>
+            <a:p>
+              <a:pPr algn="ctr"/>
+              <a:endParaRPr lang="en-US"/>
+            </a:p>
+          </p:txBody>
+        </p:sp>
+        <p:pic>
+          <p:nvPicPr>
+            <p:cNvPr id="13" name="Picture 12">
+              <a:extLst>
+                <a:ext uri="{FF2B5EF4-FFF2-40B4-BE49-F238E27FC236}">
+                  <a16:creationId xmlns:a16="http://schemas.microsoft.com/office/drawing/2014/main" id="{98B5BF94-B3B5-4EB1-B02A-1BAF112770AA}"/>
+                </a:ext>
+              </a:extLst>
+            </p:cNvPr>
+            <p:cNvPicPr>
+              <a:picLocks noChangeAspect="1"/>
+            </p:cNvPicPr>
+            <p:nvPr/>
+          </p:nvPicPr>
+          <p:blipFill>
+            <a:blip r:embed="rId13"/>
+            <a:stretch>
+              <a:fillRect/>
+            </a:stretch>
+          </p:blipFill>
+          <p:spPr>
+            <a:xfrm>
+              <a:off x="16081771" y="9525000"/>
+              <a:ext cx="6397229" cy="1819571"/>
+            </a:xfrm>
+            <a:prstGeom prst="rect">
+              <a:avLst/>
+            </a:prstGeom>
+            <a:scene3d>
+              <a:camera prst="orthographicFront"/>
+              <a:lightRig rig="threePt" dir="t"/>
+            </a:scene3d>
+            <a:sp3d>
+              <a:bevelB/>
+            </a:sp3d>
+          </p:spPr>
+        </p:pic>
+      </p:grpSp>
     </p:spTree>
   </p:cSld>
   <p:clrMapOvr>

</xml_diff>

<commit_message>
finished first draft of poster
</commit_message>
<xml_diff>
--- a/tapp2019/poster/tapp2019-poster.pptx
+++ b/tapp2019/poster/tapp2019-poster.pptx
@@ -4453,8 +4453,8 @@
         </p:nvSpPr>
         <p:spPr bwMode="auto">
           <a:xfrm>
-            <a:off x="276912" y="4259349"/>
-            <a:ext cx="8506603" cy="16869879"/>
+            <a:off x="276912" y="4640349"/>
+            <a:ext cx="8506603" cy="16695651"/>
           </a:xfrm>
           <a:prstGeom prst="rect">
             <a:avLst/>
@@ -4511,12 +4511,12 @@
               <a:t>OpenRefine</a:t>
             </a:r>
             <a:r>
-              <a:rPr lang="en-US" altLang="zh-CN" sz="3000" baseline="30000" dirty="0"/>
-              <a:t>[1]</a:t>
-            </a:r>
-            <a:r>
-              <a:rPr lang="zh-CN" altLang="en-US" sz="3000" dirty="0"/>
+              <a:rPr lang="en-US" altLang="zh-CN" sz="2800" baseline="30000" dirty="0"/>
               <a:t> </a:t>
+            </a:r>
+            <a:r>
+              <a:rPr lang="en-US" altLang="zh-CN" sz="2800" dirty="0"/>
+              <a:t>[1] </a:t>
             </a:r>
             <a:r>
               <a:rPr lang="en-US" altLang="zh-CN" sz="3000" dirty="0"/>
@@ -4788,7 +4788,7 @@
         </p:nvSpPr>
         <p:spPr bwMode="auto">
           <a:xfrm>
-            <a:off x="23088600" y="4572000"/>
+            <a:off x="23169512" y="4572000"/>
             <a:ext cx="9525000" cy="20955000"/>
           </a:xfrm>
           <a:prstGeom prst="rect">
@@ -5010,8 +5010,8 @@
         </p:nvSpPr>
         <p:spPr bwMode="auto">
           <a:xfrm>
-            <a:off x="23151657" y="41912641"/>
-            <a:ext cx="9525000" cy="1627260"/>
+            <a:off x="23164801" y="42035340"/>
+            <a:ext cx="9529712" cy="1627260"/>
           </a:xfrm>
           <a:prstGeom prst="rect">
             <a:avLst/>
@@ -5064,7 +5064,7 @@
         </p:blipFill>
         <p:spPr>
           <a:xfrm>
-            <a:off x="26409518" y="42285215"/>
+            <a:off x="25684112" y="42308978"/>
             <a:ext cx="6038539" cy="1033836"/>
           </a:xfrm>
           <a:prstGeom prst="rect">
@@ -5094,7 +5094,7 @@
         </p:blipFill>
         <p:spPr>
           <a:xfrm>
-            <a:off x="1066800" y="11845555"/>
+            <a:off x="1066800" y="12257490"/>
             <a:ext cx="6498409" cy="5268510"/>
           </a:xfrm>
           <a:prstGeom prst="rect">
@@ -5118,7 +5118,7 @@
         </p:nvSpPr>
         <p:spPr bwMode="auto">
           <a:xfrm>
-            <a:off x="197955" y="21223164"/>
+            <a:off x="228600" y="21502796"/>
             <a:ext cx="8585560" cy="12528408"/>
           </a:xfrm>
           <a:prstGeom prst="rect">
@@ -5284,55 +5284,8 @@
         </p:blipFill>
         <p:spPr bwMode="auto">
           <a:xfrm>
-            <a:off x="23373520" y="42107037"/>
+            <a:off x="23906187" y="42130800"/>
             <a:ext cx="1383241" cy="1390192"/>
-          </a:xfrm>
-          <a:prstGeom prst="rect">
-            <a:avLst/>
-          </a:prstGeom>
-          <a:noFill/>
-          <a:extLst>
-            <a:ext uri="{909E8E84-426E-40DD-AFC4-6F175D3DCCD1}">
-              <a14:hiddenFill xmlns:a14="http://schemas.microsoft.com/office/drawing/2010/main">
-                <a:solidFill>
-                  <a:srgbClr val="FFFFFF"/>
-                </a:solidFill>
-              </a14:hiddenFill>
-            </a:ext>
-          </a:extLst>
-        </p:spPr>
-      </p:pic>
-      <p:pic>
-        <p:nvPicPr>
-          <p:cNvPr id="1028" name="Picture 4" descr="https://lh3.googleusercontent.com/WyexfoKyKWWHUei4wCYlNe_U7YLwY44GT-nasavyV1epU_oRcCTYpe31E7r-3N8c55N9intcVG3LfGl2P61pSVlwiAuGcVM_knt4N0W116lD6aS92oSO5Bd1vo0IwJpoLu3vO-hKajw">
-            <a:extLst>
-              <a:ext uri="{FF2B5EF4-FFF2-40B4-BE49-F238E27FC236}">
-                <a16:creationId xmlns:a16="http://schemas.microsoft.com/office/drawing/2014/main" id="{41631202-BB2F-B445-A923-E66525BA253E}"/>
-              </a:ext>
-            </a:extLst>
-          </p:cNvPr>
-          <p:cNvPicPr>
-            <a:picLocks noChangeAspect="1" noChangeArrowheads="1"/>
-          </p:cNvPicPr>
-          <p:nvPr/>
-        </p:nvPicPr>
-        <p:blipFill>
-          <a:blip r:embed="rId6">
-            <a:extLst>
-              <a:ext uri="{28A0092B-C50C-407E-A947-70E740481C1C}">
-                <a14:useLocalDpi xmlns:a14="http://schemas.microsoft.com/office/drawing/2010/main" val="0"/>
-              </a:ext>
-            </a:extLst>
-          </a:blip>
-          <a:srcRect/>
-          <a:stretch>
-            <a:fillRect/>
-          </a:stretch>
-        </p:blipFill>
-        <p:spPr bwMode="auto">
-          <a:xfrm>
-            <a:off x="24983156" y="42196687"/>
-            <a:ext cx="1193359" cy="1257184"/>
           </a:xfrm>
           <a:prstGeom prst="rect">
             <a:avLst/>
@@ -5365,8 +5318,8 @@
         </p:nvSpPr>
         <p:spPr bwMode="auto">
           <a:xfrm>
-            <a:off x="23088600" y="30022800"/>
-            <a:ext cx="9525000" cy="11635482"/>
+            <a:off x="23169512" y="33507218"/>
+            <a:ext cx="9533238" cy="8326582"/>
           </a:xfrm>
           <a:prstGeom prst="rect">
             <a:avLst/>
@@ -5407,294 +5360,285 @@
               </a:rPr>
               <a:t>References</a:t>
             </a:r>
-          </a:p>
-          <a:p>
-            <a:r>
-              <a:rPr lang="en-US" altLang="zh-CN" sz="2800" dirty="0"/>
-              <a:t>[1]</a:t>
-            </a:r>
-            <a:r>
-              <a:rPr lang="zh-CN" altLang="en-US" sz="2800" dirty="0"/>
-              <a:t> </a:t>
-            </a:r>
-            <a:r>
-              <a:rPr lang="en-US" altLang="zh-CN" sz="2800" dirty="0"/>
-              <a:t>OpenRefine:</a:t>
-            </a:r>
-            <a:r>
-              <a:rPr lang="zh-CN" altLang="en-US" sz="2800" dirty="0"/>
-              <a:t> </a:t>
-            </a:r>
-            <a:r>
-              <a:rPr lang="en-US" altLang="zh-CN" sz="2800" dirty="0"/>
-              <a:t>A</a:t>
-            </a:r>
-            <a:r>
-              <a:rPr lang="zh-CN" altLang="en-US" sz="2800" dirty="0"/>
-              <a:t> </a:t>
-            </a:r>
-            <a:r>
-              <a:rPr lang="en-US" altLang="zh-CN" sz="2800" dirty="0"/>
-              <a:t>free,</a:t>
-            </a:r>
-            <a:r>
-              <a:rPr lang="zh-CN" altLang="en-US" sz="2800" dirty="0"/>
-              <a:t> </a:t>
-            </a:r>
-            <a:r>
-              <a:rPr lang="en-US" altLang="zh-CN" sz="2800" dirty="0"/>
-              <a:t>open</a:t>
-            </a:r>
-            <a:r>
-              <a:rPr lang="zh-CN" altLang="en-US" sz="2800" dirty="0"/>
-              <a:t> </a:t>
-            </a:r>
-            <a:r>
-              <a:rPr lang="en-US" altLang="zh-CN" sz="2800" dirty="0"/>
-              <a:t>source,</a:t>
-            </a:r>
-            <a:r>
-              <a:rPr lang="zh-CN" altLang="en-US" sz="2800" dirty="0"/>
-              <a:t> </a:t>
-            </a:r>
-            <a:r>
-              <a:rPr lang="en-US" altLang="zh-CN" sz="2800" dirty="0"/>
-              <a:t>powerful</a:t>
-            </a:r>
-            <a:r>
-              <a:rPr lang="zh-CN" altLang="en-US" sz="2800" dirty="0"/>
-              <a:t> </a:t>
-            </a:r>
-            <a:r>
-              <a:rPr lang="en-US" altLang="zh-CN" sz="2800" dirty="0"/>
-              <a:t>tool</a:t>
-            </a:r>
-            <a:r>
-              <a:rPr lang="zh-CN" altLang="en-US" sz="2800" dirty="0"/>
-              <a:t> </a:t>
-            </a:r>
-            <a:r>
-              <a:rPr lang="en-US" altLang="zh-CN" sz="2800" dirty="0"/>
-              <a:t>for</a:t>
-            </a:r>
-            <a:r>
-              <a:rPr lang="zh-CN" altLang="en-US" sz="2800" dirty="0"/>
-              <a:t> </a:t>
-            </a:r>
-            <a:r>
-              <a:rPr lang="en-US" altLang="zh-CN" sz="2800" dirty="0"/>
-              <a:t>working</a:t>
-            </a:r>
-            <a:r>
-              <a:rPr lang="zh-CN" altLang="en-US" sz="2800" dirty="0"/>
-              <a:t> </a:t>
-            </a:r>
-            <a:r>
-              <a:rPr lang="en-US" altLang="zh-CN" sz="2800" dirty="0"/>
-              <a:t>with</a:t>
-            </a:r>
-            <a:r>
-              <a:rPr lang="zh-CN" altLang="en-US" sz="2800" dirty="0"/>
-              <a:t> </a:t>
-            </a:r>
-            <a:r>
-              <a:rPr lang="en-US" altLang="zh-CN" sz="2800" dirty="0"/>
-              <a:t>messy</a:t>
-            </a:r>
-            <a:r>
-              <a:rPr lang="zh-CN" altLang="en-US" sz="2800" dirty="0"/>
-              <a:t> </a:t>
-            </a:r>
-            <a:r>
-              <a:rPr lang="en-US" altLang="zh-CN" sz="2800" dirty="0"/>
-              <a:t>data.</a:t>
-            </a:r>
-            <a:r>
-              <a:rPr lang="zh-CN" altLang="en-US" sz="2800" dirty="0"/>
-              <a:t> </a:t>
-            </a:r>
-            <a:r>
-              <a:rPr lang="en-US" altLang="zh-CN" sz="2800" dirty="0">
-                <a:hlinkClick r:id="rId7"/>
-              </a:rPr>
-              <a:t>http://openrefine.org/</a:t>
-            </a:r>
-            <a:r>
-              <a:rPr lang="zh-CN" altLang="en-US" sz="2800" dirty="0"/>
-              <a:t> </a:t>
-            </a:r>
-            <a:r>
-              <a:rPr lang="en-US" altLang="zh-CN" sz="2800" dirty="0"/>
-              <a:t>(2018)</a:t>
-            </a:r>
-          </a:p>
-          <a:p>
-            <a:r>
-              <a:rPr lang="en-US" altLang="zh-CN" sz="2800" dirty="0"/>
-              <a:t>[2] 2. Makepeace, P., Lohmeier, F.: OpenRefine Python client library.</a:t>
-            </a:r>
-            <a:r>
-              <a:rPr lang="zh-CN" altLang="en-US" sz="2800" dirty="0"/>
-              <a:t> </a:t>
-            </a:r>
-            <a:r>
-              <a:rPr lang="en-US" altLang="zh-CN" sz="2800" dirty="0">
-                <a:hlinkClick r:id="rId8"/>
-              </a:rPr>
-              <a:t>https://github.com/opencultureconsulting/openrefine-client/</a:t>
-            </a:r>
-            <a:r>
-              <a:rPr lang="zh-CN" altLang="en-US" sz="2800" dirty="0"/>
-              <a:t> </a:t>
-            </a:r>
-            <a:r>
-              <a:rPr lang="en-US" altLang="zh-CN" sz="2800" dirty="0"/>
-              <a:t>(2018)</a:t>
-            </a:r>
-          </a:p>
-          <a:p>
-            <a:r>
-              <a:rPr lang="en-US" altLang="zh-CN" sz="2800" dirty="0"/>
-              <a:t>[3] What’s</a:t>
-            </a:r>
-            <a:r>
-              <a:rPr lang="zh-CN" altLang="en-US" sz="2800" dirty="0"/>
-              <a:t> </a:t>
-            </a:r>
-            <a:r>
-              <a:rPr lang="en-US" altLang="zh-CN" sz="2800" dirty="0"/>
-              <a:t>on</a:t>
-            </a:r>
-            <a:r>
-              <a:rPr lang="zh-CN" altLang="en-US" sz="2800" dirty="0"/>
-              <a:t> </a:t>
-            </a:r>
-            <a:r>
-              <a:rPr lang="en-US" altLang="zh-CN" sz="2800" dirty="0"/>
-              <a:t>the</a:t>
-            </a:r>
-            <a:r>
-              <a:rPr lang="zh-CN" altLang="en-US" sz="2800" dirty="0"/>
-              <a:t> </a:t>
-            </a:r>
-            <a:r>
-              <a:rPr lang="en-US" altLang="zh-CN" sz="2800" dirty="0"/>
-              <a:t>Menu?</a:t>
-            </a:r>
-            <a:r>
-              <a:rPr lang="zh-CN" altLang="en-US" sz="2800" dirty="0"/>
-              <a:t> </a:t>
-            </a:r>
-            <a:r>
-              <a:rPr lang="en-US" altLang="zh-CN" sz="2800" dirty="0">
-                <a:hlinkClick r:id="rId9"/>
-              </a:rPr>
-              <a:t>http://menus.nypl.org/data</a:t>
-            </a:r>
-            <a:r>
-              <a:rPr lang="zh-CN" altLang="en-US" sz="2800" dirty="0"/>
-              <a:t> </a:t>
-            </a:r>
-            <a:r>
-              <a:rPr lang="en-US" altLang="zh-CN" sz="2800" dirty="0"/>
-              <a:t>(03/16/2019)</a:t>
-            </a:r>
-          </a:p>
-          <a:p>
-            <a:r>
-              <a:rPr lang="en-US" altLang="zh-CN" sz="2800" dirty="0"/>
-              <a:t>[LLM98] </a:t>
-            </a:r>
-            <a:r>
-              <a:rPr lang="en-US" altLang="zh-CN" sz="2800" dirty="0" err="1"/>
-              <a:t>Lausen</a:t>
-            </a:r>
-            <a:r>
-              <a:rPr lang="en-US" altLang="zh-CN" sz="2800" dirty="0"/>
-              <a:t>, Georg ; Ludäscher, Bertram ; May, Wolfgang. On Active Deductive Databases: The </a:t>
-            </a:r>
-            <a:r>
-              <a:rPr lang="en-US" altLang="zh-CN" sz="2800" dirty="0" err="1"/>
-              <a:t>Statelog</a:t>
-            </a:r>
-            <a:r>
-              <a:rPr lang="en-US" altLang="zh-CN" sz="2800" dirty="0"/>
-              <a:t> Approach. In: Transactions and Change in Logic Databases, Springer LNCS 1472, 1998, pp. 69–106.</a:t>
-            </a:r>
-          </a:p>
-          <a:p>
-            <a:r>
-              <a:rPr lang="en-US" altLang="zh-CN" sz="2800" dirty="0"/>
-              <a:t>Hellerstein, Joseph M. "The declarative imperative: experiences and conjectures in distributed logic." ACM SIGMOD Record 39.1 (2010): 5-19.</a:t>
-            </a:r>
-          </a:p>
-          <a:p>
-            <a:r>
-              <a:rPr lang="en-US" sz="2800" dirty="0">
-                <a:hlinkClick r:id="rId10"/>
-              </a:rPr>
-              <a:t>https://github.com/idaks/openrefine-provenance</a:t>
-            </a:r>
-            <a:endParaRPr lang="en-US" sz="2800" dirty="0"/>
-          </a:p>
-          <a:p>
-            <a:r>
-              <a:rPr lang="en-US" sz="2800" dirty="0">
-                <a:hlinkClick r:id="rId11"/>
-              </a:rPr>
-              <a:t>https://github.com/idaks/openrefine-reproducibility</a:t>
-            </a:r>
-            <a:endParaRPr lang="en-US" altLang="zh-CN" sz="2800" b="1" dirty="0"/>
-          </a:p>
-          <a:p>
             <a:endParaRPr lang="en-US" altLang="zh-CN" sz="2800" dirty="0"/>
           </a:p>
           <a:p>
-            <a:pPr algn="ctr">
+            <a:pPr>
               <a:spcBef>
                 <a:spcPct val="50000"/>
               </a:spcBef>
             </a:pPr>
-            <a:endParaRPr lang="en-US" altLang="zh-CN" sz="2800" dirty="0"/>
-          </a:p>
-          <a:p>
-            <a:pPr algn="ctr">
+            <a:r>
+              <a:rPr lang="en-US" altLang="zh-CN" sz="2500" dirty="0"/>
+              <a:t>[1]</a:t>
+            </a:r>
+            <a:r>
+              <a:rPr lang="zh-CN" altLang="en-US" sz="2500" dirty="0"/>
+              <a:t> </a:t>
+            </a:r>
+            <a:r>
+              <a:rPr lang="en-US" altLang="zh-CN" sz="2500" dirty="0" err="1"/>
+              <a:t>OpenRefine</a:t>
+            </a:r>
+            <a:r>
+              <a:rPr lang="en-US" altLang="zh-CN" sz="2500" dirty="0"/>
+              <a:t>:</a:t>
+            </a:r>
+            <a:r>
+              <a:rPr lang="zh-CN" altLang="en-US" sz="2500" dirty="0"/>
+              <a:t> </a:t>
+            </a:r>
+            <a:r>
+              <a:rPr lang="en-US" altLang="zh-CN" sz="2500" dirty="0"/>
+              <a:t>A</a:t>
+            </a:r>
+            <a:r>
+              <a:rPr lang="zh-CN" altLang="en-US" sz="2500" dirty="0"/>
+              <a:t> </a:t>
+            </a:r>
+            <a:r>
+              <a:rPr lang="en-US" altLang="zh-CN" sz="2500" dirty="0"/>
+              <a:t>free,</a:t>
+            </a:r>
+            <a:r>
+              <a:rPr lang="zh-CN" altLang="en-US" sz="2500" dirty="0"/>
+              <a:t> </a:t>
+            </a:r>
+            <a:r>
+              <a:rPr lang="en-US" altLang="zh-CN" sz="2500" dirty="0"/>
+              <a:t>open</a:t>
+            </a:r>
+            <a:r>
+              <a:rPr lang="zh-CN" altLang="en-US" sz="2500" dirty="0"/>
+              <a:t> </a:t>
+            </a:r>
+            <a:r>
+              <a:rPr lang="en-US" altLang="zh-CN" sz="2500" dirty="0"/>
+              <a:t>source,</a:t>
+            </a:r>
+            <a:r>
+              <a:rPr lang="zh-CN" altLang="en-US" sz="2500" dirty="0"/>
+              <a:t> </a:t>
+            </a:r>
+            <a:r>
+              <a:rPr lang="en-US" altLang="zh-CN" sz="2500" dirty="0"/>
+              <a:t>powerful</a:t>
+            </a:r>
+            <a:r>
+              <a:rPr lang="zh-CN" altLang="en-US" sz="2500" dirty="0"/>
+              <a:t> </a:t>
+            </a:r>
+            <a:r>
+              <a:rPr lang="en-US" altLang="zh-CN" sz="2500" dirty="0"/>
+              <a:t>tool</a:t>
+            </a:r>
+            <a:r>
+              <a:rPr lang="zh-CN" altLang="en-US" sz="2500" dirty="0"/>
+              <a:t> </a:t>
+            </a:r>
+            <a:r>
+              <a:rPr lang="en-US" altLang="zh-CN" sz="2500" dirty="0"/>
+              <a:t>for</a:t>
+            </a:r>
+            <a:r>
+              <a:rPr lang="zh-CN" altLang="en-US" sz="2500" dirty="0"/>
+              <a:t> </a:t>
+            </a:r>
+            <a:r>
+              <a:rPr lang="en-US" altLang="zh-CN" sz="2500" dirty="0"/>
+              <a:t>working</a:t>
+            </a:r>
+            <a:r>
+              <a:rPr lang="zh-CN" altLang="en-US" sz="2500" dirty="0"/>
+              <a:t> </a:t>
+            </a:r>
+            <a:r>
+              <a:rPr lang="en-US" altLang="zh-CN" sz="2500" dirty="0"/>
+              <a:t>with</a:t>
+            </a:r>
+            <a:r>
+              <a:rPr lang="zh-CN" altLang="en-US" sz="2500" dirty="0"/>
+              <a:t> </a:t>
+            </a:r>
+            <a:r>
+              <a:rPr lang="en-US" altLang="zh-CN" sz="2500" dirty="0"/>
+              <a:t>messy</a:t>
+            </a:r>
+            <a:r>
+              <a:rPr lang="zh-CN" altLang="en-US" sz="2500" dirty="0"/>
+              <a:t> </a:t>
+            </a:r>
+            <a:r>
+              <a:rPr lang="en-US" altLang="zh-CN" sz="2500" dirty="0"/>
+              <a:t>data. (2018)</a:t>
+            </a:r>
+            <a:r>
+              <a:rPr lang="zh-CN" altLang="en-US" sz="2500" dirty="0"/>
+              <a:t> </a:t>
+            </a:r>
+            <a:r>
+              <a:rPr lang="en-US" altLang="zh-CN" sz="2500" dirty="0">
+                <a:hlinkClick r:id="rId6">
+                  <a:extLst>
+                    <a:ext uri="{A12FA001-AC4F-418D-AE19-62706E023703}">
+                      <ahyp:hlinkClr xmlns:ahyp="http://schemas.microsoft.com/office/drawing/2018/hyperlinkcolor" val="tx"/>
+                    </a:ext>
+                  </a:extLst>
+                </a:hlinkClick>
+              </a:rPr>
+              <a:t>http://openrefine.org/</a:t>
+            </a:r>
+            <a:r>
+              <a:rPr lang="zh-CN" altLang="en-US" sz="2500" dirty="0"/>
+              <a:t> </a:t>
+            </a:r>
+            <a:r>
+              <a:rPr lang="en-US" altLang="zh-CN" sz="2500" dirty="0"/>
+              <a:t>(2018)</a:t>
+            </a:r>
+          </a:p>
+          <a:p>
+            <a:pPr>
               <a:spcBef>
                 <a:spcPct val="50000"/>
               </a:spcBef>
             </a:pPr>
-            <a:endParaRPr lang="en-US" altLang="zh-CN" sz="2800" dirty="0"/>
-          </a:p>
-          <a:p>
-            <a:pPr algn="ctr">
+            <a:r>
+              <a:rPr lang="en-US" altLang="zh-CN" sz="2500" dirty="0"/>
+              <a:t>[2] Makepeace, P., Lohmeier, F. (2018) </a:t>
+            </a:r>
+            <a:r>
+              <a:rPr lang="en-US" altLang="zh-CN" sz="2500" dirty="0" err="1"/>
+              <a:t>OpenRefine</a:t>
+            </a:r>
+            <a:r>
+              <a:rPr lang="en-US" altLang="zh-CN" sz="2500" dirty="0"/>
+              <a:t> Python client library (2018)</a:t>
+            </a:r>
+            <a:r>
+              <a:rPr lang="zh-CN" altLang="en-US" sz="2500" dirty="0"/>
+              <a:t> </a:t>
+            </a:r>
+            <a:r>
+              <a:rPr lang="en-US" altLang="zh-CN" sz="2500" dirty="0">
+                <a:hlinkClick r:id="rId7">
+                  <a:extLst>
+                    <a:ext uri="{A12FA001-AC4F-418D-AE19-62706E023703}">
+                      <ahyp:hlinkClr xmlns:ahyp="http://schemas.microsoft.com/office/drawing/2018/hyperlinkcolor" val="tx"/>
+                    </a:ext>
+                  </a:extLst>
+                </a:hlinkClick>
+              </a:rPr>
+              <a:t>https://github.com/opencultureconsulting/openrefine-client/</a:t>
+            </a:r>
+            <a:r>
+              <a:rPr lang="zh-CN" altLang="en-US" sz="2500" dirty="0"/>
+              <a:t> </a:t>
+            </a:r>
+            <a:endParaRPr lang="en-US" altLang="zh-CN" sz="2500" dirty="0"/>
+          </a:p>
+          <a:p>
+            <a:pPr>
               <a:spcBef>
                 <a:spcPct val="50000"/>
               </a:spcBef>
             </a:pPr>
-            <a:endParaRPr lang="en-US" altLang="zh-CN" sz="2800" dirty="0"/>
-          </a:p>
-          <a:p>
-            <a:pPr algn="ctr">
+            <a:r>
+              <a:rPr lang="en-US" altLang="zh-CN" sz="2500" dirty="0"/>
+              <a:t>[3] The XSB logic programming system, version 3.7 (2017).</a:t>
+            </a:r>
+          </a:p>
+          <a:p>
+            <a:pPr>
               <a:spcBef>
                 <a:spcPct val="50000"/>
               </a:spcBef>
             </a:pPr>
-            <a:endParaRPr lang="en-US" altLang="zh-CN" sz="2800" dirty="0"/>
-          </a:p>
-          <a:p>
-            <a:pPr algn="ctr">
+            <a:r>
+              <a:rPr lang="en-US" altLang="zh-CN" sz="2500" dirty="0"/>
+              <a:t>[4] </a:t>
+            </a:r>
+            <a:r>
+              <a:rPr lang="en-US" altLang="zh-CN" sz="2500" dirty="0" err="1"/>
+              <a:t>Lausen</a:t>
+            </a:r>
+            <a:r>
+              <a:rPr lang="en-US" altLang="zh-CN" sz="2500" dirty="0"/>
+              <a:t>, Georg ; Ludäscher, Bertram ; May, Wolfgang. On Active Deductive Databases: The </a:t>
+            </a:r>
+            <a:r>
+              <a:rPr lang="en-US" altLang="zh-CN" sz="2500" dirty="0" err="1"/>
+              <a:t>Statelog</a:t>
+            </a:r>
+            <a:r>
+              <a:rPr lang="en-US" altLang="zh-CN" sz="2500" dirty="0"/>
+              <a:t> Approach. In: Transactions and Change in Logic Databases, Springer LNCS 1472, 1998, pp. 69–106.</a:t>
+            </a:r>
+          </a:p>
+          <a:p>
+            <a:pPr>
               <a:spcBef>
                 <a:spcPct val="50000"/>
               </a:spcBef>
             </a:pPr>
-            <a:endParaRPr lang="en-US" altLang="zh-CN" sz="2800" dirty="0"/>
-          </a:p>
-          <a:p>
-            <a:pPr algn="ctr">
+            <a:r>
+              <a:rPr lang="en-US" altLang="zh-CN" sz="2500" dirty="0"/>
+              <a:t>[5] Hellerstein, Joseph M. "The declarative imperative: experiences and conjectures in distributed logic." ACM SIGMOD Record 39.1 (2010): 5-19.</a:t>
+            </a:r>
+          </a:p>
+          <a:p>
+            <a:pPr>
               <a:spcBef>
                 <a:spcPct val="50000"/>
               </a:spcBef>
             </a:pPr>
+            <a:r>
+              <a:rPr lang="en-US" altLang="zh-CN" sz="2500" dirty="0"/>
+              <a:t>[6] </a:t>
+            </a:r>
+            <a:r>
+              <a:rPr lang="en-US" sz="2500" dirty="0">
+                <a:hlinkClick r:id="rId8">
+                  <a:extLst>
+                    <a:ext uri="{A12FA001-AC4F-418D-AE19-62706E023703}">
+                      <ahyp:hlinkClr xmlns:ahyp="http://schemas.microsoft.com/office/drawing/2018/hyperlinkcolor" val="tx"/>
+                    </a:ext>
+                  </a:extLst>
+                </a:hlinkClick>
+              </a:rPr>
+              <a:t>https://github.com/idaks/openrefine-provenance</a:t>
+            </a:r>
+            <a:r>
+              <a:rPr lang="en-US" sz="2500" dirty="0"/>
+              <a:t> (2019).</a:t>
+            </a:r>
+          </a:p>
+          <a:p>
+            <a:pPr>
+              <a:spcBef>
+                <a:spcPct val="50000"/>
+              </a:spcBef>
+            </a:pPr>
+            <a:r>
+              <a:rPr lang="en-US" sz="2500" dirty="0"/>
+              <a:t>[7] </a:t>
+            </a:r>
+            <a:r>
+              <a:rPr lang="en-US" sz="2500" dirty="0">
+                <a:hlinkClick r:id="rId9">
+                  <a:extLst>
+                    <a:ext uri="{A12FA001-AC4F-418D-AE19-62706E023703}">
+                      <ahyp:hlinkClr xmlns:ahyp="http://schemas.microsoft.com/office/drawing/2018/hyperlinkcolor" val="tx"/>
+                    </a:ext>
+                  </a:extLst>
+                </a:hlinkClick>
+              </a:rPr>
+              <a:t>https://github.com/idaks/openrefine-reproducibility</a:t>
+            </a:r>
+            <a:r>
+              <a:rPr lang="en-US" sz="2500" dirty="0"/>
+              <a:t> (2019).</a:t>
+            </a:r>
             <a:endParaRPr lang="en-US" altLang="zh-CN" sz="2800" dirty="0"/>
           </a:p>
         </p:txBody>
@@ -5741,8 +5685,8 @@
         </p:nvSpPr>
         <p:spPr bwMode="auto">
           <a:xfrm>
-            <a:off x="265189" y="33832800"/>
-            <a:ext cx="8535911" cy="9862507"/>
+            <a:off x="197955" y="34198001"/>
+            <a:ext cx="8603146" cy="9497306"/>
           </a:xfrm>
           <a:prstGeom prst="rect">
             <a:avLst/>
@@ -5774,7 +5718,7 @@
           <a:p>
             <a:pPr>
               <a:spcBef>
-                <a:spcPct val="50000"/>
+                <a:spcPts val="1200"/>
               </a:spcBef>
             </a:pPr>
             <a:r>
@@ -5818,7 +5762,23 @@
             </a:r>
             <a:r>
               <a:rPr lang="en-US" altLang="zh-CN" sz="3000" dirty="0"/>
-              <a:t> version 3.1 [7] in Java 8 environments on multiple platforms. We automate interactions with </a:t>
+              <a:t> version 3.1 </a:t>
+            </a:r>
+            <a:r>
+              <a:rPr lang="en-US" altLang="zh-CN" sz="3200" baseline="30000" dirty="0"/>
+              <a:t> </a:t>
+            </a:r>
+            <a:r>
+              <a:rPr lang="en-US" altLang="zh-CN" sz="2800" dirty="0"/>
+              <a:t>[1]</a:t>
+            </a:r>
+            <a:r>
+              <a:rPr lang="en-US" altLang="zh-CN" sz="3200" dirty="0"/>
+              <a:t> </a:t>
+            </a:r>
+            <a:r>
+              <a:rPr lang="en-US" altLang="zh-CN" sz="3000" dirty="0"/>
+              <a:t>in Java 8 environments on multiple platforms. We automate interactions with </a:t>
             </a:r>
             <a:r>
               <a:rPr lang="en-US" altLang="zh-CN" sz="3000" dirty="0" err="1"/>
@@ -5834,8 +5794,17 @@
             </a:r>
             <a:r>
               <a:rPr lang="en-US" altLang="zh-CN" sz="3000" dirty="0"/>
-              <a:t> Python Client Library [3].</a:t>
-            </a:r>
+              <a:t> Python Client Library </a:t>
+            </a:r>
+            <a:r>
+              <a:rPr lang="en-US" altLang="zh-CN" sz="2800" dirty="0"/>
+              <a:t>[2]</a:t>
+            </a:r>
+            <a:r>
+              <a:rPr lang="en-US" altLang="zh-CN" sz="3200" dirty="0"/>
+              <a:t>.</a:t>
+            </a:r>
+            <a:endParaRPr lang="en-US" altLang="zh-CN" sz="3000" dirty="0"/>
           </a:p>
           <a:p>
             <a:pPr>
@@ -5853,7 +5822,15 @@
             </a:r>
             <a:r>
               <a:rPr lang="en-US" altLang="zh-CN" sz="3000" dirty="0"/>
-              <a:t>We employ XSB Prolog [9] for expressing and performing </a:t>
+              <a:t>We employ XSB Prolog </a:t>
+            </a:r>
+            <a:r>
+              <a:rPr lang="en-US" altLang="zh-CN" sz="2800" dirty="0"/>
+              <a:t>[3]</a:t>
+            </a:r>
+            <a:r>
+              <a:rPr lang="en-US" altLang="zh-CN" sz="3000" dirty="0"/>
+              <a:t> for expressing and performing </a:t>
             </a:r>
             <a:r>
               <a:rPr lang="en-US" altLang="zh-CN" sz="3000" dirty="0" err="1"/>
@@ -5879,12 +5856,20 @@
               </a:spcBef>
             </a:pPr>
             <a:r>
+              <a:rPr lang="en-US" altLang="zh-CN" sz="3000" b="1" dirty="0" err="1">
+                <a:solidFill>
+                  <a:srgbClr val="CC3200"/>
+                </a:solidFill>
+              </a:rPr>
+              <a:t>Reproducibile</a:t>
+            </a:r>
+            <a:r>
               <a:rPr lang="en-US" altLang="zh-CN" sz="3000" b="1" dirty="0">
                 <a:solidFill>
                   <a:srgbClr val="CC3200"/>
                 </a:solidFill>
               </a:rPr>
-              <a:t>Reproducibility. </a:t>
+              <a:t> computing environments. </a:t>
             </a:r>
             <a:r>
               <a:rPr lang="en-US" altLang="zh-CN" sz="3000" dirty="0"/>
@@ -8510,7 +8495,7 @@
             <p:nvPr/>
           </p:nvPicPr>
           <p:blipFill>
-            <a:blip r:embed="rId12"/>
+            <a:blip r:embed="rId10"/>
             <a:stretch>
               <a:fillRect/>
             </a:stretch>
@@ -8606,7 +8591,7 @@
             <p:nvPr/>
           </p:nvPicPr>
           <p:blipFill>
-            <a:blip r:embed="rId13"/>
+            <a:blip r:embed="rId11"/>
             <a:stretch>
               <a:fillRect/>
             </a:stretch>
@@ -8629,6 +8614,470 @@
           </p:spPr>
         </p:pic>
       </p:grpSp>
+      <p:sp>
+        <p:nvSpPr>
+          <p:cNvPr id="39" name="Rectangle 33">
+            <a:extLst>
+              <a:ext uri="{FF2B5EF4-FFF2-40B4-BE49-F238E27FC236}">
+                <a16:creationId xmlns:a16="http://schemas.microsoft.com/office/drawing/2014/main" id="{E5768C87-0F0A-4DA4-B111-B8E0DC969A40}"/>
+              </a:ext>
+            </a:extLst>
+          </p:cNvPr>
+          <p:cNvSpPr>
+            <a:spLocks noChangeArrowheads="1"/>
+          </p:cNvSpPr>
+          <p:nvPr/>
+        </p:nvSpPr>
+        <p:spPr bwMode="auto">
+          <a:xfrm>
+            <a:off x="9063162" y="30409411"/>
+            <a:ext cx="13852636" cy="7102015"/>
+          </a:xfrm>
+          <a:prstGeom prst="rect">
+            <a:avLst/>
+          </a:prstGeom>
+          <a:solidFill>
+            <a:schemeClr val="bg1"/>
+          </a:solidFill>
+          <a:ln>
+            <a:solidFill>
+              <a:schemeClr val="accent1"/>
+            </a:solidFill>
+          </a:ln>
+          <a:extLst>
+            <a:ext uri="{91240B29-F687-4f45-9708-019B960494DF}">
+              <a14:hiddenLine xmlns:mc="http://schemas.openxmlformats.org/markup-compatibility/2006" xmlns:mv="urn:schemas-microsoft-com:mac:vml" xmlns:a14="http://schemas.microsoft.com/office/drawing/2010/main" xmlns="" w="9525">
+                <a:solidFill>
+                  <a:srgbClr val="000000"/>
+                </a:solidFill>
+                <a:miter lim="800000"/>
+                <a:headEnd/>
+                <a:tailEnd/>
+              </a14:hiddenLine>
+            </a:ext>
+          </a:extLst>
+        </p:spPr>
+        <p:txBody>
+          <a:bodyPr lIns="480000" tIns="480000" rIns="480000" bIns="480000"/>
+          <a:lstStyle/>
+          <a:p>
+            <a:pPr>
+              <a:spcBef>
+                <a:spcPct val="50000"/>
+              </a:spcBef>
+            </a:pPr>
+            <a:r>
+              <a:rPr lang="en-US" altLang="zh-CN" sz="4400" b="1" dirty="0">
+                <a:solidFill>
+                  <a:srgbClr val="CC3300"/>
+                </a:solidFill>
+              </a:rPr>
+              <a:t>Queries and Reports – A Beginning</a:t>
+            </a:r>
+          </a:p>
+          <a:p>
+            <a:pPr marL="514350" indent="-514350">
+              <a:spcBef>
+                <a:spcPts val="1000"/>
+              </a:spcBef>
+              <a:buAutoNum type="arabicPeriod"/>
+            </a:pPr>
+            <a:r>
+              <a:rPr lang="en-US" altLang="zh-CN" sz="3000" dirty="0"/>
+              <a:t>What columns in the original data set were renamed?</a:t>
+            </a:r>
+          </a:p>
+          <a:p>
+            <a:pPr marL="514350" indent="-514350">
+              <a:spcBef>
+                <a:spcPts val="1000"/>
+              </a:spcBef>
+              <a:buAutoNum type="arabicPeriod"/>
+            </a:pPr>
+            <a:r>
+              <a:rPr lang="en-US" altLang="zh-CN" sz="3000" dirty="0"/>
+              <a:t>What columns in the final data set contain cells with updated values?</a:t>
+            </a:r>
+          </a:p>
+          <a:p>
+            <a:pPr marL="514350" indent="-514350">
+              <a:spcBef>
+                <a:spcPts val="1000"/>
+              </a:spcBef>
+              <a:buAutoNum type="arabicPeriod"/>
+            </a:pPr>
+            <a:r>
+              <a:rPr lang="en-US" altLang="zh-CN" sz="3000" dirty="0"/>
+              <a:t>What cells were assigned new values during the same step?</a:t>
+            </a:r>
+          </a:p>
+          <a:p>
+            <a:pPr marL="514350" indent="-514350">
+              <a:spcBef>
+                <a:spcPts val="1000"/>
+              </a:spcBef>
+              <a:buAutoNum type="arabicPeriod"/>
+            </a:pPr>
+            <a:r>
+              <a:rPr lang="en-US" altLang="zh-CN" sz="3000" dirty="0"/>
+              <a:t>What fraction of columns had their schemas changed or contain values with updated cells?</a:t>
+            </a:r>
+          </a:p>
+          <a:p>
+            <a:pPr marL="514350" indent="-514350">
+              <a:spcBef>
+                <a:spcPts val="1000"/>
+              </a:spcBef>
+              <a:buAutoNum type="arabicPeriod"/>
+            </a:pPr>
+            <a:r>
+              <a:rPr lang="en-US" altLang="zh-CN" sz="3000" dirty="0"/>
+              <a:t>What fraction of rows had cell values updated?</a:t>
+            </a:r>
+          </a:p>
+          <a:p>
+            <a:pPr marL="514350" indent="-514350">
+              <a:spcBef>
+                <a:spcPts val="1000"/>
+              </a:spcBef>
+              <a:buAutoNum type="arabicPeriod"/>
+            </a:pPr>
+            <a:r>
+              <a:rPr lang="en-US" altLang="zh-CN" sz="3000" dirty="0"/>
+              <a:t>What column had the highest fraction of cells updated to new values?</a:t>
+            </a:r>
+          </a:p>
+          <a:p>
+            <a:pPr marL="514350" indent="-514350">
+              <a:spcBef>
+                <a:spcPts val="1000"/>
+              </a:spcBef>
+              <a:buAutoNum type="arabicPeriod"/>
+            </a:pPr>
+            <a:r>
+              <a:rPr lang="en-US" altLang="zh-CN" sz="3000" dirty="0"/>
+              <a:t>Did any cell take on the same value at two or more different times?</a:t>
+            </a:r>
+          </a:p>
+          <a:p>
+            <a:pPr marL="514350" indent="-514350">
+              <a:spcBef>
+                <a:spcPts val="1000"/>
+              </a:spcBef>
+              <a:buAutoNum type="arabicPeriod"/>
+            </a:pPr>
+            <a:r>
+              <a:rPr lang="en-US" altLang="zh-CN" sz="3000" dirty="0"/>
+              <a:t>What new columns were created?</a:t>
+            </a:r>
+          </a:p>
+          <a:p>
+            <a:pPr marL="514350" indent="-514350">
+              <a:spcBef>
+                <a:spcPts val="1000"/>
+              </a:spcBef>
+              <a:buAutoNum type="arabicPeriod"/>
+            </a:pPr>
+            <a:r>
+              <a:rPr lang="en-US" altLang="zh-CN" sz="3000" dirty="0"/>
+              <a:t>What new rows were inserted, and which were deleted?</a:t>
+            </a:r>
+          </a:p>
+        </p:txBody>
+      </p:sp>
+      <p:sp>
+        <p:nvSpPr>
+          <p:cNvPr id="42" name="Rectangle 33">
+            <a:extLst>
+              <a:ext uri="{FF2B5EF4-FFF2-40B4-BE49-F238E27FC236}">
+                <a16:creationId xmlns:a16="http://schemas.microsoft.com/office/drawing/2014/main" id="{648CC5E0-2FA3-4D4D-BA80-E9B994DF2B23}"/>
+              </a:ext>
+            </a:extLst>
+          </p:cNvPr>
+          <p:cNvSpPr>
+            <a:spLocks noChangeArrowheads="1"/>
+          </p:cNvSpPr>
+          <p:nvPr/>
+        </p:nvSpPr>
+        <p:spPr bwMode="auto">
+          <a:xfrm>
+            <a:off x="9044420" y="37780837"/>
+            <a:ext cx="13852636" cy="5914470"/>
+          </a:xfrm>
+          <a:prstGeom prst="rect">
+            <a:avLst/>
+          </a:prstGeom>
+          <a:solidFill>
+            <a:schemeClr val="bg1"/>
+          </a:solidFill>
+          <a:ln>
+            <a:solidFill>
+              <a:schemeClr val="accent1"/>
+            </a:solidFill>
+          </a:ln>
+          <a:extLst>
+            <a:ext uri="{91240B29-F687-4f45-9708-019B960494DF}">
+              <a14:hiddenLine xmlns:mc="http://schemas.openxmlformats.org/markup-compatibility/2006" xmlns:mv="urn:schemas-microsoft-com:mac:vml" xmlns:a14="http://schemas.microsoft.com/office/drawing/2010/main" xmlns="" w="9525">
+                <a:solidFill>
+                  <a:srgbClr val="000000"/>
+                </a:solidFill>
+                <a:miter lim="800000"/>
+                <a:headEnd/>
+                <a:tailEnd/>
+              </a14:hiddenLine>
+            </a:ext>
+          </a:extLst>
+        </p:spPr>
+        <p:txBody>
+          <a:bodyPr lIns="480000" tIns="480000" rIns="480000" bIns="480000"/>
+          <a:lstStyle/>
+          <a:p>
+            <a:pPr>
+              <a:spcBef>
+                <a:spcPct val="50000"/>
+              </a:spcBef>
+            </a:pPr>
+            <a:r>
+              <a:rPr lang="en-US" altLang="zh-CN" sz="4400" b="1" dirty="0">
+                <a:solidFill>
+                  <a:srgbClr val="CC3300"/>
+                </a:solidFill>
+              </a:rPr>
+              <a:t>Future Work</a:t>
+            </a:r>
+          </a:p>
+          <a:p>
+            <a:pPr>
+              <a:spcBef>
+                <a:spcPct val="50000"/>
+              </a:spcBef>
+            </a:pPr>
+            <a:r>
+              <a:rPr lang="en-US" altLang="zh-CN" sz="3000" b="1" dirty="0">
+                <a:solidFill>
+                  <a:srgbClr val="CC3200"/>
+                </a:solidFill>
+              </a:rPr>
+              <a:t>Dependencies. </a:t>
+            </a:r>
+            <a:r>
+              <a:rPr lang="en-US" altLang="zh-CN" sz="3000" dirty="0"/>
+              <a:t>We plan to model and query data dependencies between data values in a data set, and on external databases used for reconciliation.</a:t>
+            </a:r>
+          </a:p>
+          <a:p>
+            <a:pPr>
+              <a:spcBef>
+                <a:spcPct val="50000"/>
+              </a:spcBef>
+            </a:pPr>
+            <a:r>
+              <a:rPr lang="en-US" altLang="zh-CN" sz="3000" b="1" dirty="0">
+                <a:solidFill>
+                  <a:srgbClr val="CC3200"/>
+                </a:solidFill>
+              </a:rPr>
+              <a:t>Parallel workflows. </a:t>
+            </a:r>
+            <a:r>
+              <a:rPr lang="en-US" altLang="zh-CN" sz="3000" dirty="0"/>
+              <a:t>Using multiple arrays per data set we expect to be able model data cleaning workflows that operate on different subsets of the data independently in parallel, while continuing to represent history accurately.</a:t>
+            </a:r>
+          </a:p>
+          <a:p>
+            <a:pPr>
+              <a:spcBef>
+                <a:spcPct val="50000"/>
+              </a:spcBef>
+            </a:pPr>
+            <a:r>
+              <a:rPr lang="en-US" altLang="zh-CN" sz="3000" b="1" dirty="0">
+                <a:solidFill>
+                  <a:srgbClr val="CC3200"/>
+                </a:solidFill>
+              </a:rPr>
+              <a:t>State-oriented logic languages.  </a:t>
+            </a:r>
+            <a:r>
+              <a:rPr lang="en-US" altLang="zh-CN" sz="3000" dirty="0"/>
+              <a:t>We will compare our explicit state management approach with designs enabled by state-oriented logic languages including the </a:t>
+            </a:r>
+            <a:r>
+              <a:rPr lang="en-US" altLang="zh-CN" sz="3000" dirty="0" err="1"/>
+              <a:t>Statelog</a:t>
+            </a:r>
+            <a:r>
+              <a:rPr lang="en-US" altLang="zh-CN" sz="3000" dirty="0"/>
+              <a:t> </a:t>
+            </a:r>
+            <a:r>
+              <a:rPr lang="en-US" altLang="zh-CN" sz="2800" dirty="0"/>
+              <a:t>[4]</a:t>
+            </a:r>
+            <a:r>
+              <a:rPr lang="en-US" altLang="zh-CN" sz="3000" dirty="0"/>
+              <a:t> and Dedalus </a:t>
+            </a:r>
+            <a:r>
+              <a:rPr lang="en-US" altLang="zh-CN" sz="2800" dirty="0"/>
+              <a:t>[5]</a:t>
+            </a:r>
+            <a:r>
+              <a:rPr lang="en-US" altLang="zh-CN" sz="3000" dirty="0"/>
+              <a:t> extensions to </a:t>
+            </a:r>
+            <a:r>
+              <a:rPr lang="en-US" altLang="zh-CN" sz="3000" dirty="0" err="1"/>
+              <a:t>Datalog</a:t>
+            </a:r>
+            <a:r>
+              <a:rPr lang="en-US" altLang="zh-CN" sz="3000" dirty="0"/>
+              <a:t>.</a:t>
+            </a:r>
+          </a:p>
+        </p:txBody>
+      </p:sp>
+      <p:sp>
+        <p:nvSpPr>
+          <p:cNvPr id="43" name="Rectangle 33">
+            <a:extLst>
+              <a:ext uri="{FF2B5EF4-FFF2-40B4-BE49-F238E27FC236}">
+                <a16:creationId xmlns:a16="http://schemas.microsoft.com/office/drawing/2014/main" id="{53A4FCBF-F085-4F2D-A62D-310B0811A784}"/>
+              </a:ext>
+            </a:extLst>
+          </p:cNvPr>
+          <p:cNvSpPr>
+            <a:spLocks noChangeArrowheads="1"/>
+          </p:cNvSpPr>
+          <p:nvPr/>
+        </p:nvSpPr>
+        <p:spPr bwMode="auto">
+          <a:xfrm>
+            <a:off x="23164800" y="25715368"/>
+            <a:ext cx="9525000" cy="7584032"/>
+          </a:xfrm>
+          <a:prstGeom prst="rect">
+            <a:avLst/>
+          </a:prstGeom>
+          <a:solidFill>
+            <a:schemeClr val="bg1"/>
+          </a:solidFill>
+          <a:ln>
+            <a:solidFill>
+              <a:schemeClr val="accent1"/>
+            </a:solidFill>
+          </a:ln>
+          <a:extLst>
+            <a:ext uri="{91240B29-F687-4f45-9708-019B960494DF}">
+              <a14:hiddenLine xmlns:mc="http://schemas.openxmlformats.org/markup-compatibility/2006" xmlns:mv="urn:schemas-microsoft-com:mac:vml" xmlns:a14="http://schemas.microsoft.com/office/drawing/2010/main" xmlns="" w="9525">
+                <a:solidFill>
+                  <a:srgbClr val="000000"/>
+                </a:solidFill>
+                <a:miter lim="800000"/>
+                <a:headEnd/>
+                <a:tailEnd/>
+              </a14:hiddenLine>
+            </a:ext>
+          </a:extLst>
+        </p:spPr>
+        <p:txBody>
+          <a:bodyPr lIns="480000" tIns="480000" rIns="480000" bIns="480000"/>
+          <a:lstStyle/>
+          <a:p>
+            <a:pPr>
+              <a:spcBef>
+                <a:spcPts val="1200"/>
+              </a:spcBef>
+            </a:pPr>
+            <a:r>
+              <a:rPr lang="en-US" altLang="zh-CN" sz="4400" b="1" dirty="0">
+                <a:solidFill>
+                  <a:srgbClr val="CC3300"/>
+                </a:solidFill>
+              </a:rPr>
+              <a:t>Demonstrations</a:t>
+            </a:r>
+          </a:p>
+          <a:p>
+            <a:pPr>
+              <a:spcBef>
+                <a:spcPct val="50000"/>
+              </a:spcBef>
+            </a:pPr>
+            <a:r>
+              <a:rPr lang="en-US" altLang="zh-CN" sz="3000" b="1" dirty="0">
+                <a:solidFill>
+                  <a:srgbClr val="CC3200"/>
+                </a:solidFill>
+              </a:rPr>
+              <a:t>Provenance queries. </a:t>
+            </a:r>
+            <a:r>
+              <a:rPr lang="en-US" altLang="zh-CN" sz="3000" dirty="0"/>
+              <a:t>The data cleaning example workflow shown here, associated provenance queries, and supporting rules are available in the </a:t>
+            </a:r>
+            <a:r>
+              <a:rPr lang="en-US" altLang="zh-CN" sz="3000" i="1" dirty="0" err="1"/>
+              <a:t>openrefine</a:t>
+            </a:r>
+            <a:r>
+              <a:rPr lang="en-US" altLang="zh-CN" sz="3000" i="1" dirty="0"/>
+              <a:t>-provenance</a:t>
+            </a:r>
+            <a:r>
+              <a:rPr lang="en-US" altLang="zh-CN" sz="3000" dirty="0"/>
+              <a:t> repository [6].</a:t>
+            </a:r>
+          </a:p>
+          <a:p>
+            <a:pPr>
+              <a:spcBef>
+                <a:spcPct val="50000"/>
+              </a:spcBef>
+            </a:pPr>
+            <a:r>
+              <a:rPr lang="en-US" altLang="zh-CN" sz="3000" b="1" dirty="0">
+                <a:solidFill>
+                  <a:srgbClr val="CC3200"/>
+                </a:solidFill>
+              </a:rPr>
+              <a:t>Reproducible data cleaning. </a:t>
+            </a:r>
+            <a:r>
+              <a:rPr lang="en-US" altLang="zh-CN" sz="3000" dirty="0"/>
+              <a:t>We additionally demonstrate progress supporting end-to-end reproducibility of data cleaning workflow in the </a:t>
+            </a:r>
+            <a:r>
+              <a:rPr lang="en-US" altLang="zh-CN" sz="3000" i="1" dirty="0" err="1"/>
+              <a:t>openrefine</a:t>
+            </a:r>
+            <a:r>
+              <a:rPr lang="en-US" altLang="zh-CN" sz="3000" i="1" dirty="0"/>
+              <a:t>-reproducibility</a:t>
+            </a:r>
+            <a:r>
+              <a:rPr lang="en-US" altLang="zh-CN" sz="3000" dirty="0"/>
+              <a:t> repository [7]. Our aim is to enable data cleaning workflows later to be repeated automatically in different instances of </a:t>
+            </a:r>
+            <a:r>
+              <a:rPr lang="en-US" altLang="zh-CN" sz="3000" dirty="0" err="1"/>
+              <a:t>OpenRefine</a:t>
+            </a:r>
+            <a:r>
+              <a:rPr lang="en-US" altLang="zh-CN" sz="3000" dirty="0"/>
+              <a:t> on the same or different data sets using information gathered by </a:t>
+            </a:r>
+            <a:r>
+              <a:rPr lang="en-US" altLang="zh-CN" sz="3000" dirty="0" err="1"/>
+              <a:t>OpenRefine</a:t>
+            </a:r>
+            <a:r>
+              <a:rPr lang="en-US" altLang="zh-CN" sz="3000" dirty="0"/>
+              <a:t> but not easily exported as recipes. </a:t>
+            </a:r>
+          </a:p>
+        </p:txBody>
+      </p:sp>
     </p:spTree>
   </p:cSld>
   <p:clrMapOvr>

</xml_diff>

<commit_message>
poster tweaks + acks
</commit_message>
<xml_diff>
--- a/tapp2019/poster/tapp2019-poster.pptx
+++ b/tapp2019/poster/tapp2019-poster.pptx
@@ -152,6 +152,9 @@
         </p15:guide>
       </p15:sldGuideLst>
     </p:ext>
+    <p:ext uri="{2D200454-40CA-4A62-9FC3-DE9A4176ACB9}">
+      <p15:notesGuideLst xmlns:p15="http://schemas.microsoft.com/office/powerpoint/2012/main"/>
+    </p:ext>
   </p:extLst>
 </p:presentation>
 </file>
@@ -257,7 +260,7 @@
             <a:fld id="{4515C850-977F-4425-946C-FDF18C8806C6}" type="datetime1">
               <a:rPr lang="en-US"/>
               <a:pPr/>
-              <a:t>5/28/2019</a:t>
+              <a:t>5/29/19</a:t>
             </a:fld>
             <a:endParaRPr lang="en-US"/>
           </a:p>
@@ -620,7 +623,7 @@
           </a:ln>
           <a:extLst>
             <a:ext uri="{909E8E84-426E-40dd-AFC4-6F175D3DCCD1}">
-              <a14:hiddenFill xmlns:mc="http://schemas.openxmlformats.org/markup-compatibility/2006" xmlns:mv="urn:schemas-microsoft-com:mac:vml" xmlns:a14="http://schemas.microsoft.com/office/drawing/2010/main" xmlns="">
+              <a14:hiddenFill xmlns="" xmlns:a14="http://schemas.microsoft.com/office/drawing/2010/main" xmlns:mv="urn:schemas-microsoft-com:mac:vml" xmlns:mc="http://schemas.openxmlformats.org/markup-compatibility/2006">
                 <a:solidFill>
                   <a:srgbClr val="FFFFFF"/>
                 </a:solidFill>
@@ -643,14 +646,14 @@
           <a:noFill/>
           <a:extLst>
             <a:ext uri="{909E8E84-426E-40dd-AFC4-6F175D3DCCD1}">
-              <a14:hiddenFill xmlns:mc="http://schemas.openxmlformats.org/markup-compatibility/2006" xmlns:mv="urn:schemas-microsoft-com:mac:vml" xmlns:a14="http://schemas.microsoft.com/office/drawing/2010/main" xmlns="">
+              <a14:hiddenFill xmlns="" xmlns:a14="http://schemas.microsoft.com/office/drawing/2010/main" xmlns:mv="urn:schemas-microsoft-com:mac:vml" xmlns:mc="http://schemas.openxmlformats.org/markup-compatibility/2006">
                 <a:solidFill>
                   <a:srgbClr val="FFFFFF"/>
                 </a:solidFill>
               </a14:hiddenFill>
             </a:ext>
             <a:ext uri="{91240B29-F687-4f45-9708-019B960494DF}">
-              <a14:hiddenLine xmlns:mc="http://schemas.openxmlformats.org/markup-compatibility/2006" xmlns:mv="urn:schemas-microsoft-com:mac:vml" xmlns:a14="http://schemas.microsoft.com/office/drawing/2010/main" xmlns="" w="9525">
+              <a14:hiddenLine xmlns="" xmlns:a14="http://schemas.microsoft.com/office/drawing/2010/main" xmlns:mv="urn:schemas-microsoft-com:mac:vml" xmlns:mc="http://schemas.openxmlformats.org/markup-compatibility/2006" w="9525">
                 <a:solidFill>
                   <a:srgbClr val="000000"/>
                 </a:solidFill>
@@ -1011,7 +1014,7 @@
             <a:fld id="{AA2AC842-8558-4AC8-B9E2-87B4AF0E5092}" type="datetime1">
               <a:rPr lang="en-US"/>
               <a:pPr/>
-              <a:t>5/28/2019</a:t>
+              <a:t>5/29/19</a:t>
             </a:fld>
             <a:endParaRPr lang="en-US"/>
           </a:p>
@@ -1193,7 +1196,7 @@
             <a:fld id="{DF378F2E-43CF-494D-8AA1-0E25E3A6D7E5}" type="datetime1">
               <a:rPr lang="en-US"/>
               <a:pPr/>
-              <a:t>5/28/2019</a:t>
+              <a:t>5/29/19</a:t>
             </a:fld>
             <a:endParaRPr lang="en-US"/>
           </a:p>
@@ -1385,7 +1388,7 @@
             <a:fld id="{FCAA0075-A89C-4CC4-8D44-BE21213EC665}" type="datetime1">
               <a:rPr lang="en-US"/>
               <a:pPr/>
-              <a:t>5/28/2019</a:t>
+              <a:t>5/29/19</a:t>
             </a:fld>
             <a:endParaRPr lang="en-US"/>
           </a:p>
@@ -1567,7 +1570,7 @@
             <a:fld id="{3FBD16BB-C81B-488C-A058-02DF1EBA30A9}" type="datetime1">
               <a:rPr lang="en-US"/>
               <a:pPr/>
-              <a:t>5/28/2019</a:t>
+              <a:t>5/29/19</a:t>
             </a:fld>
             <a:endParaRPr lang="en-US"/>
           </a:p>
@@ -1826,7 +1829,7 @@
             <a:fld id="{61D71B2D-85F4-4D1F-A97A-0F3FCF28FF78}" type="datetime1">
               <a:rPr lang="en-US"/>
               <a:pPr/>
-              <a:t>5/28/2019</a:t>
+              <a:t>5/29/19</a:t>
             </a:fld>
             <a:endParaRPr lang="en-US"/>
           </a:p>
@@ -2125,7 +2128,7 @@
             <a:fld id="{543EB801-F414-4E3F-810B-AB50C12F8E62}" type="datetime1">
               <a:rPr lang="en-US"/>
               <a:pPr/>
-              <a:t>5/28/2019</a:t>
+              <a:t>5/29/19</a:t>
             </a:fld>
             <a:endParaRPr lang="en-US"/>
           </a:p>
@@ -2563,7 +2566,7 @@
             <a:fld id="{8FB21926-4148-4271-A9EA-9B5C988855C5}" type="datetime1">
               <a:rPr lang="en-US"/>
               <a:pPr/>
-              <a:t>5/28/2019</a:t>
+              <a:t>5/29/19</a:t>
             </a:fld>
             <a:endParaRPr lang="en-US"/>
           </a:p>
@@ -2694,7 +2697,7 @@
             <a:fld id="{BAA8212A-8BC5-4403-9CF2-3B62135E8215}" type="datetime1">
               <a:rPr lang="en-US"/>
               <a:pPr/>
-              <a:t>5/28/2019</a:t>
+              <a:t>5/29/19</a:t>
             </a:fld>
             <a:endParaRPr lang="en-US"/>
           </a:p>
@@ -2803,7 +2806,7 @@
             <a:fld id="{DAB8904B-D74D-4D4C-AF9F-80D5C0011187}" type="datetime1">
               <a:rPr lang="en-US"/>
               <a:pPr/>
-              <a:t>5/28/2019</a:t>
+              <a:t>5/29/19</a:t>
             </a:fld>
             <a:endParaRPr lang="en-US"/>
           </a:p>
@@ -3092,7 +3095,7 @@
             <a:fld id="{5AFA53D8-5F34-42FF-A06B-C0EDA73AA4FC}" type="datetime1">
               <a:rPr lang="en-US"/>
               <a:pPr/>
-              <a:t>5/28/2019</a:t>
+              <a:t>5/29/19</a:t>
             </a:fld>
             <a:endParaRPr lang="en-US"/>
           </a:p>
@@ -3364,7 +3367,7 @@
             <a:fld id="{97FD32E0-1D5E-4345-BC8F-A88532F655AC}" type="datetime1">
               <a:rPr lang="en-US"/>
               <a:pPr/>
-              <a:t>5/28/2019</a:t>
+              <a:t>5/29/19</a:t>
             </a:fld>
             <a:endParaRPr lang="en-US"/>
           </a:p>
@@ -3480,14 +3483,14 @@
           </a:ln>
           <a:extLst>
             <a:ext uri="{909E8E84-426E-40dd-AFC4-6F175D3DCCD1}">
-              <a14:hiddenFill xmlns:mc="http://schemas.openxmlformats.org/markup-compatibility/2006" xmlns:mv="urn:schemas-microsoft-com:mac:vml" xmlns:a14="http://schemas.microsoft.com/office/drawing/2010/main" xmlns="">
+              <a14:hiddenFill xmlns="" xmlns:a14="http://schemas.microsoft.com/office/drawing/2010/main" xmlns:mv="urn:schemas-microsoft-com:mac:vml" xmlns:mc="http://schemas.openxmlformats.org/markup-compatibility/2006">
                 <a:solidFill>
                   <a:srgbClr val="FFFFFF"/>
                 </a:solidFill>
               </a14:hiddenFill>
             </a:ext>
             <a:ext uri="{91240B29-F687-4f45-9708-019B960494DF}">
-              <a14:hiddenLine xmlns:mc="http://schemas.openxmlformats.org/markup-compatibility/2006" xmlns:mv="urn:schemas-microsoft-com:mac:vml" xmlns:a14="http://schemas.microsoft.com/office/drawing/2010/main" xmlns="" w="9525">
+              <a14:hiddenLine xmlns="" xmlns:a14="http://schemas.microsoft.com/office/drawing/2010/main" xmlns:mv="urn:schemas-microsoft-com:mac:vml" xmlns:mc="http://schemas.openxmlformats.org/markup-compatibility/2006" w="9525">
                 <a:solidFill>
                   <a:srgbClr val="000000"/>
                 </a:solidFill>
@@ -3538,14 +3541,14 @@
           </a:ln>
           <a:extLst>
             <a:ext uri="{909E8E84-426E-40dd-AFC4-6F175D3DCCD1}">
-              <a14:hiddenFill xmlns:mc="http://schemas.openxmlformats.org/markup-compatibility/2006" xmlns:mv="urn:schemas-microsoft-com:mac:vml" xmlns:a14="http://schemas.microsoft.com/office/drawing/2010/main" xmlns="">
+              <a14:hiddenFill xmlns="" xmlns:a14="http://schemas.microsoft.com/office/drawing/2010/main" xmlns:mv="urn:schemas-microsoft-com:mac:vml" xmlns:mc="http://schemas.openxmlformats.org/markup-compatibility/2006">
                 <a:solidFill>
                   <a:srgbClr val="FFFFFF"/>
                 </a:solidFill>
               </a14:hiddenFill>
             </a:ext>
             <a:ext uri="{91240B29-F687-4f45-9708-019B960494DF}">
-              <a14:hiddenLine xmlns:mc="http://schemas.openxmlformats.org/markup-compatibility/2006" xmlns:mv="urn:schemas-microsoft-com:mac:vml" xmlns:a14="http://schemas.microsoft.com/office/drawing/2010/main" xmlns="" w="9525">
+              <a14:hiddenLine xmlns="" xmlns:a14="http://schemas.microsoft.com/office/drawing/2010/main" xmlns:mv="urn:schemas-microsoft-com:mac:vml" xmlns:mc="http://schemas.openxmlformats.org/markup-compatibility/2006" w="9525">
                 <a:solidFill>
                   <a:srgbClr val="000000"/>
                 </a:solidFill>
@@ -3638,7 +3641,7 @@
             <a:fld id="{CCA49F0C-5252-4983-9722-A40AADD52538}" type="datetime1">
               <a:rPr lang="en-US"/>
               <a:pPr/>
-              <a:t>5/28/2019</a:t>
+              <a:t>5/29/19</a:t>
             </a:fld>
             <a:endParaRPr lang="en-US"/>
           </a:p>
@@ -4197,14 +4200,14 @@
           </a:ln>
           <a:extLst>
             <a:ext uri="{909E8E84-426E-40dd-AFC4-6F175D3DCCD1}">
-              <a14:hiddenFill xmlns:mc="http://schemas.openxmlformats.org/markup-compatibility/2006" xmlns:mv="urn:schemas-microsoft-com:mac:vml" xmlns:a14="http://schemas.microsoft.com/office/drawing/2010/main" xmlns="">
+              <a14:hiddenFill xmlns="" xmlns:a14="http://schemas.microsoft.com/office/drawing/2010/main" xmlns:mv="urn:schemas-microsoft-com:mac:vml" xmlns:mc="http://schemas.openxmlformats.org/markup-compatibility/2006">
                 <a:solidFill>
                   <a:srgbClr val="FFFFFF"/>
                 </a:solidFill>
               </a14:hiddenFill>
             </a:ext>
             <a:ext uri="{91240B29-F687-4f45-9708-019B960494DF}">
-              <a14:hiddenLine xmlns:mc="http://schemas.openxmlformats.org/markup-compatibility/2006" xmlns:mv="urn:schemas-microsoft-com:mac:vml" xmlns:a14="http://schemas.microsoft.com/office/drawing/2010/main" xmlns="" w="9525">
+              <a14:hiddenLine xmlns="" xmlns:a14="http://schemas.microsoft.com/office/drawing/2010/main" xmlns:mv="urn:schemas-microsoft-com:mac:vml" xmlns:mc="http://schemas.openxmlformats.org/markup-compatibility/2006" w="9525">
                 <a:solidFill>
                   <a:srgbClr val="000000"/>
                 </a:solidFill>
@@ -4235,7 +4238,7 @@
             </a:br>
             <a:r>
               <a:rPr lang="en-US" sz="3733" dirty="0"/>
-              <a:t>School of Information Science, University of Illinois at Urbana-Champaign</a:t>
+              <a:t>School of Information Sciences, University of Illinois at Urbana-Champaign</a:t>
             </a:r>
           </a:p>
         </p:txBody>
@@ -4262,14 +4265,14 @@
           </a:ln>
           <a:extLst>
             <a:ext uri="{909E8E84-426E-40dd-AFC4-6F175D3DCCD1}">
-              <a14:hiddenFill xmlns:mc="http://schemas.openxmlformats.org/markup-compatibility/2006" xmlns:mv="urn:schemas-microsoft-com:mac:vml" xmlns:a14="http://schemas.microsoft.com/office/drawing/2010/main" xmlns="">
+              <a14:hiddenFill xmlns="" xmlns:a14="http://schemas.microsoft.com/office/drawing/2010/main" xmlns:mv="urn:schemas-microsoft-com:mac:vml" xmlns:mc="http://schemas.openxmlformats.org/markup-compatibility/2006">
                 <a:solidFill>
                   <a:srgbClr val="FFFFFF"/>
                 </a:solidFill>
               </a14:hiddenFill>
             </a:ext>
             <a:ext uri="{91240B29-F687-4f45-9708-019B960494DF}">
-              <a14:hiddenLine xmlns:mc="http://schemas.openxmlformats.org/markup-compatibility/2006" xmlns:mv="urn:schemas-microsoft-com:mac:vml" xmlns:a14="http://schemas.microsoft.com/office/drawing/2010/main" xmlns="" w="9525">
+              <a14:hiddenLine xmlns="" xmlns:a14="http://schemas.microsoft.com/office/drawing/2010/main" xmlns:mv="urn:schemas-microsoft-com:mac:vml" xmlns:mc="http://schemas.openxmlformats.org/markup-compatibility/2006" w="9525">
                 <a:solidFill>
                   <a:srgbClr val="000000"/>
                 </a:solidFill>
@@ -4465,7 +4468,7 @@
           </a:ln>
           <a:extLst>
             <a:ext uri="{91240B29-F687-4f45-9708-019B960494DF}">
-              <a14:hiddenLine xmlns:mc="http://schemas.openxmlformats.org/markup-compatibility/2006" xmlns:mv="urn:schemas-microsoft-com:mac:vml" xmlns:a14="http://schemas.microsoft.com/office/drawing/2010/main" xmlns="" w="9525">
+              <a14:hiddenLine xmlns="" xmlns:a14="http://schemas.microsoft.com/office/drawing/2010/main" xmlns:mv="urn:schemas-microsoft-com:mac:vml" xmlns:mc="http://schemas.openxmlformats.org/markup-compatibility/2006" w="9525">
                 <a:solidFill>
                   <a:srgbClr val="000000"/>
                 </a:solidFill>
@@ -4502,7 +4505,7 @@
             </a:pPr>
             <a:r>
               <a:rPr lang="en-US" altLang="zh-CN" sz="3000" dirty="0"/>
-              <a:t>Revealing the steps taken to clean a data set is critical to making any research using the data transparent and reproducible. </a:t>
+              <a:t>Revealing the steps taken to clean a dataset is critical to making any research using this data transparent and reproducible. </a:t>
             </a:r>
             <a:r>
               <a:rPr lang="en-US" altLang="zh-CN" sz="3000" dirty="0" err="1"/>
@@ -4614,7 +4617,7 @@
             </a:r>
             <a:r>
               <a:rPr lang="en-US" altLang="zh-CN" sz="3000" dirty="0"/>
-              <a:t>interface. Here we report early results from an investigation into how the records captured by </a:t>
+              <a:t>interface. We report early results from an investigation into how records captured by </a:t>
             </a:r>
             <a:r>
               <a:rPr lang="en-US" altLang="zh-CN" sz="3000" dirty="0" err="1"/>
@@ -4646,7 +4649,7 @@
             </a:pPr>
             <a:r>
               <a:rPr lang="en-US" altLang="zh-CN" sz="3000" dirty="0"/>
-              <a:t>Support queries and visualizations of the provenance of cleaned data sets for review.</a:t>
+              <a:t>Support queries and visualizations of the provenance of cleaned datasets for review.</a:t>
             </a:r>
           </a:p>
           <a:p>
@@ -4698,20 +4701,20 @@
               </a:spcBef>
             </a:pPr>
             <a:r>
-              <a:rPr lang="en-US" altLang="zh-CN" sz="2800" b="1" dirty="0"/>
-              <a:t>Fig 1.</a:t>
+              <a:rPr lang="en-US" altLang="zh-CN" sz="2800" i="1" dirty="0" err="1"/>
+              <a:t>OpenRefine</a:t>
+            </a:r>
+            <a:r>
+              <a:rPr lang="en-US" altLang="zh-CN" sz="2800" i="1" dirty="0"/>
+              <a:t> stores records of operations carried out by a researcher in the process of transforming dataset</a:t>
             </a:r>
             <a:r>
               <a:rPr lang="zh-CN" altLang="en-US" sz="2800" i="1" dirty="0"/>
               <a:t> </a:t>
             </a:r>
             <a:r>
-              <a:rPr lang="en-US" altLang="zh-CN" sz="2800" i="1" dirty="0" err="1"/>
-              <a:t>OpenRefine</a:t>
-            </a:r>
-            <a:r>
               <a:rPr lang="en-US" altLang="zh-CN" sz="2800" i="1" dirty="0"/>
-              <a:t> stores records of operations carried out by a researcher in the process of transforming input</a:t>
+              <a:t>D</a:t>
             </a:r>
             <a:r>
               <a:rPr lang="zh-CN" altLang="en-US" sz="2800" i="1" dirty="0"/>
@@ -4719,38 +4722,14 @@
             </a:r>
             <a:r>
               <a:rPr lang="en-US" altLang="zh-CN" sz="2800" i="1" dirty="0"/>
-              <a:t>dataset</a:t>
+              <a:t>to yield cleaned D’. It exposes these records as a browsable</a:t>
             </a:r>
             <a:r>
               <a:rPr lang="zh-CN" altLang="en-US" sz="2800" i="1" dirty="0"/>
               <a:t> </a:t>
             </a:r>
             <a:r>
-              <a:rPr lang="en-US" altLang="zh-CN" sz="2800" i="1" dirty="0"/>
-              <a:t>D</a:t>
-            </a:r>
-            <a:r>
-              <a:rPr lang="zh-CN" altLang="en-US" sz="2800" i="1" dirty="0"/>
-              <a:t> </a:t>
-            </a:r>
-            <a:r>
-              <a:rPr lang="en-US" altLang="zh-CN" sz="2800" i="1" dirty="0"/>
-              <a:t>to yield cleaned data set</a:t>
-            </a:r>
-            <a:r>
-              <a:rPr lang="zh-CN" altLang="en-US" sz="2800" i="1" dirty="0"/>
-              <a:t> </a:t>
-            </a:r>
-            <a:r>
-              <a:rPr lang="en-US" altLang="zh-CN" sz="2800" i="1" dirty="0"/>
-              <a:t>D’. It exposes these records as a browsable</a:t>
-            </a:r>
-            <a:r>
-              <a:rPr lang="zh-CN" altLang="en-US" sz="2800" i="1" dirty="0"/>
-              <a:t> </a:t>
-            </a:r>
-            <a:r>
-              <a:rPr lang="en-US" altLang="zh-CN" sz="2800" dirty="0"/>
+              <a:rPr lang="en-US" altLang="zh-CN" sz="2800" b="1" i="1" dirty="0"/>
               <a:t>operation history </a:t>
             </a:r>
             <a:r>
@@ -4758,7 +4737,7 @@
               <a:t>that serves as the interface to its </a:t>
             </a:r>
             <a:r>
-              <a:rPr lang="en-US" altLang="zh-CN" sz="2800" dirty="0"/>
+              <a:rPr lang="en-US" altLang="zh-CN" sz="2800" b="1" i="1" dirty="0"/>
               <a:t>undo/redo feature</a:t>
             </a:r>
             <a:r>
@@ -4766,12 +4745,12 @@
               <a:t>; and as exportable </a:t>
             </a:r>
             <a:r>
-              <a:rPr lang="en-US" altLang="zh-CN" sz="2800" dirty="0"/>
-              <a:t>recipes </a:t>
+              <a:rPr lang="en-US" altLang="zh-CN" sz="2800" b="1" i="1" dirty="0"/>
+              <a:t>recipes</a:t>
             </a:r>
             <a:r>
               <a:rPr lang="en-US" altLang="zh-CN" sz="2800" i="1" dirty="0"/>
-              <a:t>that can be reused to clean other data sets.</a:t>
+              <a:t> that can be reused for other datasets.</a:t>
             </a:r>
           </a:p>
         </p:txBody>
@@ -4876,7 +4855,7 @@
             </a:r>
             <a:r>
               <a:rPr lang="en-US" sz="3000" dirty="0"/>
-              <a:t>Queries useful to researchers are posed and interpreted in light of the meanings of columns, rows, cells, and values in a data set. We support such meaningful queries by assigning to these objects identifiers that persist as they are rearranged, renamed, reformatted, copied, transformed, corrected, and edited. And we associate each update of an object with the state at which the change was introduced.</a:t>
+              <a:t>Queries useful to researchers are posed and interpreted in light of the meanings of columns, rows, cells, and values in a dataset. We support such meaningful queries by assigning to these objects identifiers that persist as they are rearranged, renamed, reformatted, copied, transformed, corrected, and edited. And we associate each update of an object with the state at which the change was introduced.</a:t>
             </a:r>
           </a:p>
           <a:p>
@@ -4891,7 +4870,7 @@
                   <a:srgbClr val="CC3200"/>
                 </a:solidFill>
               </a:rPr>
-              <a:t>Views of data set states. </a:t>
+              <a:t>Views of dataset states. </a:t>
             </a:r>
             <a:r>
               <a:rPr lang="en-US" sz="3000" dirty="0" err="1"/>
@@ -4899,7 +4878,7 @@
             </a:r>
             <a:r>
               <a:rPr lang="en-US" sz="3000" dirty="0"/>
-              <a:t> natively provides access to past data set states only by undoing all changes made subsequent to the state of interest. Our schema supports views and queries over multiple past states concurrently—without storing a complete snapshot of the data set at each state.</a:t>
+              <a:t> natively provides access to past dataset states only by undoing all changes made subsequent to the state of interest. Our schema supports views and queries over multiple past states concurrently—without storing complete snapshots of the dataset for all states.</a:t>
             </a:r>
           </a:p>
           <a:p>
@@ -4918,7 +4897,7 @@
             </a:r>
             <a:r>
               <a:rPr lang="en-US" sz="3000" dirty="0"/>
-              <a:t>The schema we use to represent the data-cleaning history of a data set is independent of the columns, rows, and values comprising the data set. A researcher neither needs to understand the schema representing the history, nor take into account the queries of interest to them prior to cleaning a data set.</a:t>
+              <a:t>The schema we use to represent the data-cleaning history of a dataset is independent of the columns, rows, and values comprising the dataset. A researcher neither needs to understand the schema representing the history, nor take into account the queries of interest to them prior to cleaning a dataset.</a:t>
             </a:r>
             <a:endParaRPr lang="en-US" sz="3000" b="1" dirty="0">
               <a:solidFill>
@@ -4950,7 +4929,7 @@
             </a:r>
             <a:r>
               <a:rPr lang="en-US" sz="3000" dirty="0"/>
-              <a:t> and Prolog.  </a:t>
+              <a:t>, Answer Set Programs, and Prolog.  </a:t>
             </a:r>
           </a:p>
           <a:p>
@@ -4969,7 +4948,15 @@
             </a:r>
             <a:r>
               <a:rPr lang="en-US" sz="3000" dirty="0"/>
-              <a:t>Research into provenance and reproducibility should be held to the highest standards of reproducibility and transparency. To this end we employ reproducible computing environments, and we aim to make it easy for other researchers easily to repeat our observations and to evaluate our claims.</a:t>
+              <a:t>Research into provenance and reproducibility should be held to the highest standards of reproducibility and transparency. To this end we employ reproducible computing environments, and aim to make it easy for other </a:t>
+            </a:r>
+            <a:r>
+              <a:rPr lang="en-US" sz="3000"/>
+              <a:t>researchers to </a:t>
+            </a:r>
+            <a:r>
+              <a:rPr lang="en-US" sz="3000" dirty="0"/>
+              <a:t>repeat our observations and to evaluate our claims.</a:t>
             </a:r>
           </a:p>
           <a:p>
@@ -5022,7 +5009,7 @@
           </a:ln>
           <a:extLst>
             <a:ext uri="{91240B29-F687-4f45-9708-019B960494DF}">
-              <a14:hiddenLine xmlns:mc="http://schemas.openxmlformats.org/markup-compatibility/2006" xmlns:mv="urn:schemas-microsoft-com:mac:vml" xmlns:a14="http://schemas.microsoft.com/office/drawing/2010/main" xmlns="" w="9525">
+              <a14:hiddenLine xmlns="" xmlns:a14="http://schemas.microsoft.com/office/drawing/2010/main" xmlns:mv="urn:schemas-microsoft-com:mac:vml" xmlns:mc="http://schemas.openxmlformats.org/markup-compatibility/2006" w="9525">
                 <a:solidFill>
                   <a:srgbClr val="000000"/>
                 </a:solidFill>
@@ -5042,7 +5029,7 @@
                 <a:spcPct val="50000"/>
               </a:spcBef>
             </a:pPr>
-            <a:endParaRPr lang="en-US" sz="3733"/>
+            <a:endParaRPr lang="en-US" sz="2000" dirty="0"/>
           </a:p>
         </p:txBody>
       </p:sp>
@@ -5062,7 +5049,7 @@
         </p:blipFill>
         <p:spPr>
           <a:xfrm>
-            <a:off x="25684112" y="42308978"/>
+            <a:off x="23545800" y="42260845"/>
             <a:ext cx="6038539" cy="1033836"/>
           </a:xfrm>
           <a:prstGeom prst="rect">
@@ -5084,16 +5071,15 @@
           </p:cNvPicPr>
           <p:nvPr/>
         </p:nvPicPr>
-        <p:blipFill>
+        <p:blipFill rotWithShape="1">
           <a:blip r:embed="rId4"/>
-          <a:stretch>
-            <a:fillRect/>
-          </a:stretch>
+          <a:srcRect r="-2016"/>
+          <a:stretch/>
         </p:blipFill>
         <p:spPr>
           <a:xfrm>
-            <a:off x="1066800" y="12257490"/>
-            <a:ext cx="6498409" cy="5268510"/>
+            <a:off x="1143000" y="12192000"/>
+            <a:ext cx="6629400" cy="5268510"/>
           </a:xfrm>
           <a:prstGeom prst="rect">
             <a:avLst/>
@@ -5132,7 +5118,7 @@
           </a:ln>
           <a:extLst>
             <a:ext uri="{91240B29-F687-4f45-9708-019B960494DF}">
-              <a14:hiddenLine xmlns:mc="http://schemas.openxmlformats.org/markup-compatibility/2006" xmlns:mv="urn:schemas-microsoft-com:mac:vml" xmlns:a14="http://schemas.microsoft.com/office/drawing/2010/main" xmlns="" w="9525">
+              <a14:hiddenLine xmlns="" xmlns:a14="http://schemas.microsoft.com/office/drawing/2010/main" xmlns:mv="urn:schemas-microsoft-com:mac:vml" xmlns:mc="http://schemas.openxmlformats.org/markup-compatibility/2006" w="9525">
                 <a:solidFill>
                   <a:srgbClr val="000000"/>
                 </a:solidFill>
@@ -5211,8 +5197,12 @@
               <a:t>  </a:t>
             </a:r>
             <a:r>
+              <a:rPr lang="en-US" altLang="zh-CN" sz="3000" i="1" dirty="0"/>
+              <a:t>Recipes</a:t>
+            </a:r>
+            <a:r>
               <a:rPr lang="en-US" altLang="zh-CN" sz="3000" dirty="0"/>
-              <a:t>Recipes exported from </a:t>
+              <a:t> exported from </a:t>
             </a:r>
             <a:r>
               <a:rPr lang="en-US" altLang="zh-CN" sz="3000" dirty="0" err="1"/>
@@ -5220,7 +5210,23 @@
             </a:r>
             <a:r>
               <a:rPr lang="en-US" altLang="zh-CN" sz="3000" dirty="0"/>
-              <a:t> include neither the initial data import step, nor any edits made manually to individual cells. We are providing means to use the records kept by </a:t>
+              <a:t> include neither the initial data </a:t>
+            </a:r>
+            <a:r>
+              <a:rPr lang="en-US" altLang="zh-CN" sz="3000" i="1" dirty="0"/>
+              <a:t>import step</a:t>
+            </a:r>
+            <a:r>
+              <a:rPr lang="en-US" altLang="zh-CN" sz="3000" dirty="0"/>
+              <a:t>, nor any edits made manually to </a:t>
+            </a:r>
+            <a:r>
+              <a:rPr lang="en-US" altLang="zh-CN" sz="3000" i="1" dirty="0"/>
+              <a:t>individual cells</a:t>
+            </a:r>
+            <a:r>
+              <a:rPr lang="en-US" altLang="zh-CN" sz="3000" dirty="0"/>
+              <a:t>. We are providing means to use the records kept by </a:t>
             </a:r>
             <a:r>
               <a:rPr lang="en-US" altLang="zh-CN" sz="3000" dirty="0" err="1"/>
@@ -5248,7 +5254,39 @@
             </a:r>
             <a:r>
               <a:rPr lang="en-US" altLang="zh-CN" sz="3000" dirty="0"/>
-              <a:t>Displaying lists of operations and the ability to revisit past states one at a time provide limited means for interrogating how data was cleaned. We aim to make data cleaning workflows and their products easy to query — prospectively and retrospectively — to answer any questions researchers may have about the provenance of cleaned data sets.</a:t>
+              <a:t>Displaying lists of operations and the ability to revisit past states one at a time provide limited means for interrogating </a:t>
+            </a:r>
+            <a:r>
+              <a:rPr lang="en-US" altLang="zh-CN" sz="3000" i="1" dirty="0"/>
+              <a:t>how data was cleaned</a:t>
+            </a:r>
+            <a:r>
+              <a:rPr lang="en-US" altLang="zh-CN" sz="3000" dirty="0"/>
+              <a:t>. We aim to make data cleaning workflows and their products easy to </a:t>
+            </a:r>
+            <a:r>
+              <a:rPr lang="en-US" altLang="zh-CN" sz="3000" i="1" dirty="0"/>
+              <a:t>query</a:t>
+            </a:r>
+            <a:r>
+              <a:rPr lang="en-US" altLang="zh-CN" sz="3000" dirty="0"/>
+              <a:t> — </a:t>
+            </a:r>
+            <a:r>
+              <a:rPr lang="en-US" altLang="zh-CN" sz="3000" b="1" i="1" dirty="0"/>
+              <a:t>prospectively</a:t>
+            </a:r>
+            <a:r>
+              <a:rPr lang="en-US" altLang="zh-CN" sz="3000" dirty="0"/>
+              <a:t> and </a:t>
+            </a:r>
+            <a:r>
+              <a:rPr lang="en-US" altLang="zh-CN" sz="3000" b="1" i="1" dirty="0"/>
+              <a:t>retrospectively</a:t>
+            </a:r>
+            <a:r>
+              <a:rPr lang="en-US" altLang="zh-CN" sz="3000" dirty="0"/>
+              <a:t> — to answer any questions researchers may have about the provenance of cleaned datasets.</a:t>
             </a:r>
           </a:p>
         </p:txBody>
@@ -5282,7 +5320,7 @@
         </p:blipFill>
         <p:spPr bwMode="auto">
           <a:xfrm>
-            <a:off x="23906187" y="42130800"/>
+            <a:off x="30251400" y="42062400"/>
             <a:ext cx="1383241" cy="1390192"/>
           </a:xfrm>
           <a:prstGeom prst="rect">
@@ -5330,7 +5368,7 @@
           </a:ln>
           <a:extLst>
             <a:ext uri="{91240B29-F687-4f45-9708-019B960494DF}">
-              <a14:hiddenLine xmlns:mc="http://schemas.openxmlformats.org/markup-compatibility/2006" xmlns:mv="urn:schemas-microsoft-com:mac:vml" xmlns:a14="http://schemas.microsoft.com/office/drawing/2010/main" xmlns="" w="9525">
+              <a14:hiddenLine xmlns="" xmlns:a14="http://schemas.microsoft.com/office/drawing/2010/main" xmlns:mv="urn:schemas-microsoft-com:mac:vml" xmlns:mc="http://schemas.openxmlformats.org/markup-compatibility/2006" w="9525">
                 <a:solidFill>
                   <a:srgbClr val="000000"/>
                 </a:solidFill>
@@ -5565,7 +5603,7 @@
             </a:r>
             <a:r>
               <a:rPr lang="en-US" altLang="zh-CN" sz="2500" dirty="0"/>
-              <a:t>, Georg; Ludäscher, Bertram; May, Wolfgang. (1998) On Active Deductive Databases: The </a:t>
+              <a:t>, G., Ludäscher, B., May, W. (1998) On Active Deductive Databases: The </a:t>
             </a:r>
             <a:r>
               <a:rPr lang="en-US" altLang="zh-CN" sz="2500" dirty="0" err="1"/>
@@ -5573,7 +5611,15 @@
             </a:r>
             <a:r>
               <a:rPr lang="en-US" altLang="zh-CN" sz="2500" dirty="0"/>
-              <a:t> Approach. In: Transactions and Change in Logic Databases, Springer LNCS 1472, pp. 69–106.</a:t>
+              <a:t> Approach. </a:t>
+            </a:r>
+            <a:r>
+              <a:rPr lang="en-US" altLang="zh-CN" sz="2500" i="1" dirty="0"/>
+              <a:t>Transactions and Change in Logic Databases</a:t>
+            </a:r>
+            <a:r>
+              <a:rPr lang="en-US" altLang="zh-CN" sz="2500" dirty="0"/>
+              <a:t>, LNCS 1472: 69–106.</a:t>
             </a:r>
           </a:p>
           <a:p>
@@ -5584,7 +5630,15 @@
             </a:pPr>
             <a:r>
               <a:rPr lang="en-US" altLang="zh-CN" sz="2500" dirty="0"/>
-              <a:t>[5] Hellerstein, Joseph M. (2010) The declarative imperative: experiences and conjectures in distributed logic. ACM SIGMOD Record 39.1: 5-19.</a:t>
+              <a:t>[5] Hellerstein, J.  (2010) The declarative imperative: experiences and conjectures in distributed logic. </a:t>
+            </a:r>
+            <a:r>
+              <a:rPr lang="en-US" altLang="zh-CN" sz="2500" i="1" dirty="0"/>
+              <a:t>ACM SIGMOD Record </a:t>
+            </a:r>
+            <a:r>
+              <a:rPr lang="en-US" altLang="zh-CN" sz="2500" dirty="0"/>
+              <a:t>39.1: 5-19.</a:t>
             </a:r>
           </a:p>
           <a:p>
@@ -5702,7 +5756,7 @@
           </a:ln>
           <a:extLst>
             <a:ext uri="{91240B29-F687-4f45-9708-019B960494DF}">
-              <a14:hiddenLine xmlns:mc="http://schemas.openxmlformats.org/markup-compatibility/2006" xmlns:mv="urn:schemas-microsoft-com:mac:vml" xmlns:a14="http://schemas.microsoft.com/office/drawing/2010/main" xmlns="" w="9525">
+              <a14:hiddenLine xmlns="" xmlns:a14="http://schemas.microsoft.com/office/drawing/2010/main" xmlns:mv="urn:schemas-microsoft-com:mac:vml" xmlns:mc="http://schemas.openxmlformats.org/markup-compatibility/2006" w="9525">
                 <a:solidFill>
                   <a:srgbClr val="000000"/>
                 </a:solidFill>
@@ -8393,7 +8447,7 @@
         </p:nvGrpSpPr>
         <p:grpSpPr>
           <a:xfrm>
-            <a:off x="15765379" y="6379774"/>
+            <a:off x="15697200" y="6324568"/>
             <a:ext cx="6934200" cy="5486400"/>
             <a:chOff x="15773400" y="6096000"/>
             <a:chExt cx="6934200" cy="5486400"/>
@@ -8479,8 +8533,8 @@
           </p:blipFill>
           <p:spPr>
             <a:xfrm>
-              <a:off x="15925800" y="6327674"/>
-              <a:ext cx="6652806" cy="1819571"/>
+              <a:off x="15925800" y="6334868"/>
+              <a:ext cx="6652806" cy="1805182"/>
             </a:xfrm>
             <a:prstGeom prst="rect">
               <a:avLst/>
@@ -8575,8 +8629,8 @@
           </p:blipFill>
           <p:spPr>
             <a:xfrm>
-              <a:off x="16081771" y="9525000"/>
-              <a:ext cx="6397229" cy="1819571"/>
+              <a:off x="16081771" y="9544032"/>
+              <a:ext cx="6397229" cy="1781506"/>
             </a:xfrm>
             <a:prstGeom prst="rect">
               <a:avLst/>
@@ -8623,7 +8677,7 @@
           </a:ln>
           <a:extLst>
             <a:ext uri="{91240B29-F687-4f45-9708-019B960494DF}">
-              <a14:hiddenLine xmlns:mc="http://schemas.openxmlformats.org/markup-compatibility/2006" xmlns:mv="urn:schemas-microsoft-com:mac:vml" xmlns:a14="http://schemas.microsoft.com/office/drawing/2010/main" xmlns="" w="9525">
+              <a14:hiddenLine xmlns="" xmlns:a14="http://schemas.microsoft.com/office/drawing/2010/main" xmlns:mv="urn:schemas-microsoft-com:mac:vml" xmlns:mc="http://schemas.openxmlformats.org/markup-compatibility/2006" w="9525">
                 <a:solidFill>
                   <a:srgbClr val="000000"/>
                 </a:solidFill>
@@ -8649,7 +8703,7 @@
                   <a:srgbClr val="CC3300"/>
                 </a:solidFill>
               </a:rPr>
-              <a:t>Queries and Reports – A Beginning</a:t>
+              <a:t>Queries and Reports – Examples</a:t>
             </a:r>
           </a:p>
           <a:p>
@@ -8660,8 +8714,8 @@
               <a:buAutoNum type="arabicPeriod"/>
             </a:pPr>
             <a:r>
-              <a:rPr lang="en-US" altLang="zh-CN" sz="3000" dirty="0"/>
-              <a:t>What columns in the original data set were renamed?</a:t>
+              <a:rPr lang="en-US" altLang="zh-CN" sz="3000" i="1" dirty="0"/>
+              <a:t>What columns in the original dataset were renamed?</a:t>
             </a:r>
           </a:p>
           <a:p>
@@ -8672,8 +8726,8 @@
               <a:buAutoNum type="arabicPeriod"/>
             </a:pPr>
             <a:r>
-              <a:rPr lang="en-US" altLang="zh-CN" sz="3000" dirty="0"/>
-              <a:t>What columns in the final data set contain cells with updated values?</a:t>
+              <a:rPr lang="en-US" altLang="zh-CN" sz="3000" i="1" dirty="0"/>
+              <a:t>What columns in the final dataset contain cells with updated values?</a:t>
             </a:r>
           </a:p>
           <a:p>
@@ -8684,7 +8738,7 @@
               <a:buAutoNum type="arabicPeriod"/>
             </a:pPr>
             <a:r>
-              <a:rPr lang="en-US" altLang="zh-CN" sz="3000" dirty="0"/>
+              <a:rPr lang="en-US" altLang="zh-CN" sz="3000" i="1" dirty="0"/>
               <a:t>What cells were assigned new values during the same step?</a:t>
             </a:r>
           </a:p>
@@ -8696,7 +8750,7 @@
               <a:buAutoNum type="arabicPeriod"/>
             </a:pPr>
             <a:r>
-              <a:rPr lang="en-US" altLang="zh-CN" sz="3000" dirty="0"/>
+              <a:rPr lang="en-US" altLang="zh-CN" sz="3000" i="1" dirty="0"/>
               <a:t>What fraction of columns had their schemas changed or contain values with updated cells?</a:t>
             </a:r>
           </a:p>
@@ -8708,7 +8762,7 @@
               <a:buAutoNum type="arabicPeriod"/>
             </a:pPr>
             <a:r>
-              <a:rPr lang="en-US" altLang="zh-CN" sz="3000" dirty="0"/>
+              <a:rPr lang="en-US" altLang="zh-CN" sz="3000" i="1" dirty="0"/>
               <a:t>What fraction of rows had cell values updated?</a:t>
             </a:r>
           </a:p>
@@ -8720,7 +8774,7 @@
               <a:buAutoNum type="arabicPeriod"/>
             </a:pPr>
             <a:r>
-              <a:rPr lang="en-US" altLang="zh-CN" sz="3000" dirty="0"/>
+              <a:rPr lang="en-US" altLang="zh-CN" sz="3000" i="1" dirty="0"/>
               <a:t>What column had the highest fraction of cells updated to new values?</a:t>
             </a:r>
           </a:p>
@@ -8732,7 +8786,7 @@
               <a:buAutoNum type="arabicPeriod"/>
             </a:pPr>
             <a:r>
-              <a:rPr lang="en-US" altLang="zh-CN" sz="3000" dirty="0"/>
+              <a:rPr lang="en-US" altLang="zh-CN" sz="3000" i="1" dirty="0"/>
               <a:t>Did any cell take on the same value at two or more different times?</a:t>
             </a:r>
           </a:p>
@@ -8744,7 +8798,7 @@
               <a:buAutoNum type="arabicPeriod"/>
             </a:pPr>
             <a:r>
-              <a:rPr lang="en-US" altLang="zh-CN" sz="3000" dirty="0"/>
+              <a:rPr lang="en-US" altLang="zh-CN" sz="3000" i="1" dirty="0"/>
               <a:t>What new columns were created?</a:t>
             </a:r>
           </a:p>
@@ -8756,7 +8810,7 @@
               <a:buAutoNum type="arabicPeriod"/>
             </a:pPr>
             <a:r>
-              <a:rPr lang="en-US" altLang="zh-CN" sz="3000" dirty="0"/>
+              <a:rPr lang="en-US" altLang="zh-CN" sz="3000" i="1" dirty="0"/>
               <a:t>What new rows were inserted, and which were deleted?</a:t>
             </a:r>
           </a:p>
@@ -8794,7 +8848,7 @@
           </a:ln>
           <a:extLst>
             <a:ext uri="{91240B29-F687-4f45-9708-019B960494DF}">
-              <a14:hiddenLine xmlns:mc="http://schemas.openxmlformats.org/markup-compatibility/2006" xmlns:mv="urn:schemas-microsoft-com:mac:vml" xmlns:a14="http://schemas.microsoft.com/office/drawing/2010/main" xmlns="" w="9525">
+              <a14:hiddenLine xmlns="" xmlns:a14="http://schemas.microsoft.com/office/drawing/2010/main" xmlns:mv="urn:schemas-microsoft-com:mac:vml" xmlns:mc="http://schemas.openxmlformats.org/markup-compatibility/2006" w="9525">
                 <a:solidFill>
                   <a:srgbClr val="000000"/>
                 </a:solidFill>
@@ -8839,7 +8893,7 @@
             </a:r>
             <a:r>
               <a:rPr lang="en-US" altLang="zh-CN" sz="3000" dirty="0"/>
-              <a:t>We plan to model and query data dependencies between values in a data set, as well as on external databases used for reconciliation.</a:t>
+              <a:t>We plan to model and query data dependencies between values in a dataset, as well as on external databases used for reconciliation.</a:t>
             </a:r>
           </a:p>
           <a:p>
@@ -8858,7 +8912,7 @@
             </a:r>
             <a:r>
               <a:rPr lang="en-US" altLang="zh-CN" sz="3000" dirty="0"/>
-              <a:t>Using multiple arrays per data set we expect to be able model data cleaning workflows that operate on different subsets of the data independently in parallel, while continuing to represent history accurately.</a:t>
+              <a:t>Using multiple arrays per dataset we expect to be able model data cleaning workflows that operate on different subsets of the data independently in parallel, while continuing to represent history accurately.</a:t>
             </a:r>
           </a:p>
           <a:p>
@@ -8877,7 +8931,15 @@
             </a:r>
             <a:r>
               <a:rPr lang="en-US" altLang="zh-CN" sz="3000" dirty="0"/>
-              <a:t>We will compare our explicit state management approach with designs enabled by state-oriented logic languages including the </a:t>
+              <a:t>We will compare and analyze our explicit state management approach with designs enabled by state-oriented </a:t>
+            </a:r>
+            <a:r>
+              <a:rPr lang="en-US" altLang="zh-CN" sz="3000" dirty="0" err="1"/>
+              <a:t>Datalog</a:t>
+            </a:r>
+            <a:r>
+              <a:rPr lang="en-US" altLang="zh-CN" sz="3000" dirty="0"/>
+              <a:t> extensions such as </a:t>
             </a:r>
             <a:r>
               <a:rPr lang="en-US" altLang="zh-CN" sz="3000" dirty="0" err="1"/>
@@ -8898,14 +8960,6 @@
             <a:r>
               <a:rPr lang="en-US" altLang="zh-CN" sz="2800" dirty="0"/>
               <a:t>[5]</a:t>
-            </a:r>
-            <a:r>
-              <a:rPr lang="en-US" altLang="zh-CN" sz="3000" dirty="0"/>
-              <a:t> extensions to </a:t>
-            </a:r>
-            <a:r>
-              <a:rPr lang="en-US" altLang="zh-CN" sz="3000" dirty="0" err="1"/>
-              <a:t>Datalog</a:t>
             </a:r>
             <a:r>
               <a:rPr lang="en-US" altLang="zh-CN" sz="3000" dirty="0"/>
@@ -8946,7 +9000,7 @@
           </a:ln>
           <a:extLst>
             <a:ext uri="{91240B29-F687-4f45-9708-019B960494DF}">
-              <a14:hiddenLine xmlns:mc="http://schemas.openxmlformats.org/markup-compatibility/2006" xmlns:mv="urn:schemas-microsoft-com:mac:vml" xmlns:a14="http://schemas.microsoft.com/office/drawing/2010/main" xmlns="" w="9525">
+              <a14:hiddenLine xmlns="" xmlns:a14="http://schemas.microsoft.com/office/drawing/2010/main" xmlns:mv="urn:schemas-microsoft-com:mac:vml" xmlns:mc="http://schemas.openxmlformats.org/markup-compatibility/2006" w="9525">
                 <a:solidFill>
                   <a:srgbClr val="000000"/>
                 </a:solidFill>
@@ -9054,7 +9108,7 @@
             </a:r>
             <a:r>
               <a:rPr lang="en-US" altLang="zh-CN" sz="3000" dirty="0"/>
-              <a:t> on the same or different data set using information gathered by </a:t>
+              <a:t> on the same or different dataset using information gathered by </a:t>
             </a:r>
             <a:r>
               <a:rPr lang="en-US" altLang="zh-CN" sz="3000" dirty="0" err="1"/>
@@ -9063,6 +9117,45 @@
             <a:r>
               <a:rPr lang="en-US" altLang="zh-CN" sz="3000" dirty="0"/>
               <a:t> but not easily exported as recipes. </a:t>
+            </a:r>
+          </a:p>
+        </p:txBody>
+      </p:sp>
+      <p:sp>
+        <p:nvSpPr>
+          <p:cNvPr id="3" name="Rectangle 2">
+            <a:extLst>
+              <a:ext uri="{FF2B5EF4-FFF2-40B4-BE49-F238E27FC236}">
+                <a16:creationId xmlns:a16="http://schemas.microsoft.com/office/drawing/2014/main" id="{561D297A-EC1D-7841-B00A-103ED362E532}"/>
+              </a:ext>
+            </a:extLst>
+          </p:cNvPr>
+          <p:cNvSpPr/>
+          <p:nvPr/>
+        </p:nvSpPr>
+        <p:spPr>
+          <a:xfrm>
+            <a:off x="28500109" y="43337518"/>
+            <a:ext cx="4202641" cy="372409"/>
+          </a:xfrm>
+          <a:prstGeom prst="rect">
+            <a:avLst/>
+          </a:prstGeom>
+        </p:spPr>
+        <p:txBody>
+          <a:bodyPr wrap="square">
+            <a:spAutoFit/>
+          </a:bodyPr>
+          <a:lstStyle/>
+          <a:p>
+            <a:pPr algn="ctr">
+              <a:spcBef>
+                <a:spcPct val="50000"/>
+              </a:spcBef>
+            </a:pPr>
+            <a:r>
+              <a:rPr lang="en-US" sz="1600" dirty="0"/>
+              <a:t>Supported in part by NSF grant #1541450 </a:t>
             </a:r>
           </a:p>
         </p:txBody>

</xml_diff>

<commit_message>
final poster tweak (fig 1)
</commit_message>
<xml_diff>
--- a/tapp2019/poster/tapp2019-poster.pptx
+++ b/tapp2019/poster/tapp2019-poster.pptx
@@ -623,7 +623,7 @@
           </a:ln>
           <a:extLst>
             <a:ext uri="{909E8E84-426E-40dd-AFC4-6F175D3DCCD1}">
-              <a14:hiddenFill xmlns="" xmlns:a14="http://schemas.microsoft.com/office/drawing/2010/main" xmlns:mv="urn:schemas-microsoft-com:mac:vml" xmlns:mc="http://schemas.openxmlformats.org/markup-compatibility/2006">
+              <a14:hiddenFill xmlns:mc="http://schemas.openxmlformats.org/markup-compatibility/2006" xmlns:mv="urn:schemas-microsoft-com:mac:vml" xmlns:a14="http://schemas.microsoft.com/office/drawing/2010/main" xmlns="">
                 <a:solidFill>
                   <a:srgbClr val="FFFFFF"/>
                 </a:solidFill>
@@ -646,14 +646,14 @@
           <a:noFill/>
           <a:extLst>
             <a:ext uri="{909E8E84-426E-40dd-AFC4-6F175D3DCCD1}">
-              <a14:hiddenFill xmlns="" xmlns:a14="http://schemas.microsoft.com/office/drawing/2010/main" xmlns:mv="urn:schemas-microsoft-com:mac:vml" xmlns:mc="http://schemas.openxmlformats.org/markup-compatibility/2006">
+              <a14:hiddenFill xmlns:mc="http://schemas.openxmlformats.org/markup-compatibility/2006" xmlns:mv="urn:schemas-microsoft-com:mac:vml" xmlns:a14="http://schemas.microsoft.com/office/drawing/2010/main" xmlns="">
                 <a:solidFill>
                   <a:srgbClr val="FFFFFF"/>
                 </a:solidFill>
               </a14:hiddenFill>
             </a:ext>
             <a:ext uri="{91240B29-F687-4f45-9708-019B960494DF}">
-              <a14:hiddenLine xmlns="" xmlns:a14="http://schemas.microsoft.com/office/drawing/2010/main" xmlns:mv="urn:schemas-microsoft-com:mac:vml" xmlns:mc="http://schemas.openxmlformats.org/markup-compatibility/2006" w="9525">
+              <a14:hiddenLine xmlns:mc="http://schemas.openxmlformats.org/markup-compatibility/2006" xmlns:mv="urn:schemas-microsoft-com:mac:vml" xmlns:a14="http://schemas.microsoft.com/office/drawing/2010/main" xmlns="" w="9525">
                 <a:solidFill>
                   <a:srgbClr val="000000"/>
                 </a:solidFill>
@@ -3483,14 +3483,14 @@
           </a:ln>
           <a:extLst>
             <a:ext uri="{909E8E84-426E-40dd-AFC4-6F175D3DCCD1}">
-              <a14:hiddenFill xmlns="" xmlns:a14="http://schemas.microsoft.com/office/drawing/2010/main" xmlns:mv="urn:schemas-microsoft-com:mac:vml" xmlns:mc="http://schemas.openxmlformats.org/markup-compatibility/2006">
+              <a14:hiddenFill xmlns:mc="http://schemas.openxmlformats.org/markup-compatibility/2006" xmlns:mv="urn:schemas-microsoft-com:mac:vml" xmlns:a14="http://schemas.microsoft.com/office/drawing/2010/main" xmlns="">
                 <a:solidFill>
                   <a:srgbClr val="FFFFFF"/>
                 </a:solidFill>
               </a14:hiddenFill>
             </a:ext>
             <a:ext uri="{91240B29-F687-4f45-9708-019B960494DF}">
-              <a14:hiddenLine xmlns="" xmlns:a14="http://schemas.microsoft.com/office/drawing/2010/main" xmlns:mv="urn:schemas-microsoft-com:mac:vml" xmlns:mc="http://schemas.openxmlformats.org/markup-compatibility/2006" w="9525">
+              <a14:hiddenLine xmlns:mc="http://schemas.openxmlformats.org/markup-compatibility/2006" xmlns:mv="urn:schemas-microsoft-com:mac:vml" xmlns:a14="http://schemas.microsoft.com/office/drawing/2010/main" xmlns="" w="9525">
                 <a:solidFill>
                   <a:srgbClr val="000000"/>
                 </a:solidFill>
@@ -3541,14 +3541,14 @@
           </a:ln>
           <a:extLst>
             <a:ext uri="{909E8E84-426E-40dd-AFC4-6F175D3DCCD1}">
-              <a14:hiddenFill xmlns="" xmlns:a14="http://schemas.microsoft.com/office/drawing/2010/main" xmlns:mv="urn:schemas-microsoft-com:mac:vml" xmlns:mc="http://schemas.openxmlformats.org/markup-compatibility/2006">
+              <a14:hiddenFill xmlns:mc="http://schemas.openxmlformats.org/markup-compatibility/2006" xmlns:mv="urn:schemas-microsoft-com:mac:vml" xmlns:a14="http://schemas.microsoft.com/office/drawing/2010/main" xmlns="">
                 <a:solidFill>
                   <a:srgbClr val="FFFFFF"/>
                 </a:solidFill>
               </a14:hiddenFill>
             </a:ext>
             <a:ext uri="{91240B29-F687-4f45-9708-019B960494DF}">
-              <a14:hiddenLine xmlns="" xmlns:a14="http://schemas.microsoft.com/office/drawing/2010/main" xmlns:mv="urn:schemas-microsoft-com:mac:vml" xmlns:mc="http://schemas.openxmlformats.org/markup-compatibility/2006" w="9525">
+              <a14:hiddenLine xmlns:mc="http://schemas.openxmlformats.org/markup-compatibility/2006" xmlns:mv="urn:schemas-microsoft-com:mac:vml" xmlns:a14="http://schemas.microsoft.com/office/drawing/2010/main" xmlns="" w="9525">
                 <a:solidFill>
                   <a:srgbClr val="000000"/>
                 </a:solidFill>
@@ -4200,14 +4200,14 @@
           </a:ln>
           <a:extLst>
             <a:ext uri="{909E8E84-426E-40dd-AFC4-6F175D3DCCD1}">
-              <a14:hiddenFill xmlns="" xmlns:a14="http://schemas.microsoft.com/office/drawing/2010/main" xmlns:mv="urn:schemas-microsoft-com:mac:vml" xmlns:mc="http://schemas.openxmlformats.org/markup-compatibility/2006">
+              <a14:hiddenFill xmlns:mc="http://schemas.openxmlformats.org/markup-compatibility/2006" xmlns:mv="urn:schemas-microsoft-com:mac:vml" xmlns:a14="http://schemas.microsoft.com/office/drawing/2010/main" xmlns="">
                 <a:solidFill>
                   <a:srgbClr val="FFFFFF"/>
                 </a:solidFill>
               </a14:hiddenFill>
             </a:ext>
             <a:ext uri="{91240B29-F687-4f45-9708-019B960494DF}">
-              <a14:hiddenLine xmlns="" xmlns:a14="http://schemas.microsoft.com/office/drawing/2010/main" xmlns:mv="urn:schemas-microsoft-com:mac:vml" xmlns:mc="http://schemas.openxmlformats.org/markup-compatibility/2006" w="9525">
+              <a14:hiddenLine xmlns:mc="http://schemas.openxmlformats.org/markup-compatibility/2006" xmlns:mv="urn:schemas-microsoft-com:mac:vml" xmlns:a14="http://schemas.microsoft.com/office/drawing/2010/main" xmlns="" w="9525">
                 <a:solidFill>
                   <a:srgbClr val="000000"/>
                 </a:solidFill>
@@ -4265,14 +4265,14 @@
           </a:ln>
           <a:extLst>
             <a:ext uri="{909E8E84-426E-40dd-AFC4-6F175D3DCCD1}">
-              <a14:hiddenFill xmlns="" xmlns:a14="http://schemas.microsoft.com/office/drawing/2010/main" xmlns:mv="urn:schemas-microsoft-com:mac:vml" xmlns:mc="http://schemas.openxmlformats.org/markup-compatibility/2006">
+              <a14:hiddenFill xmlns:mc="http://schemas.openxmlformats.org/markup-compatibility/2006" xmlns:mv="urn:schemas-microsoft-com:mac:vml" xmlns:a14="http://schemas.microsoft.com/office/drawing/2010/main" xmlns="">
                 <a:solidFill>
                   <a:srgbClr val="FFFFFF"/>
                 </a:solidFill>
               </a14:hiddenFill>
             </a:ext>
             <a:ext uri="{91240B29-F687-4f45-9708-019B960494DF}">
-              <a14:hiddenLine xmlns="" xmlns:a14="http://schemas.microsoft.com/office/drawing/2010/main" xmlns:mv="urn:schemas-microsoft-com:mac:vml" xmlns:mc="http://schemas.openxmlformats.org/markup-compatibility/2006" w="9525">
+              <a14:hiddenLine xmlns:mc="http://schemas.openxmlformats.org/markup-compatibility/2006" xmlns:mv="urn:schemas-microsoft-com:mac:vml" xmlns:a14="http://schemas.microsoft.com/office/drawing/2010/main" xmlns="" w="9525">
                 <a:solidFill>
                   <a:srgbClr val="000000"/>
                 </a:solidFill>
@@ -4468,7 +4468,7 @@
           </a:ln>
           <a:extLst>
             <a:ext uri="{91240B29-F687-4f45-9708-019B960494DF}">
-              <a14:hiddenLine xmlns="" xmlns:a14="http://schemas.microsoft.com/office/drawing/2010/main" xmlns:mv="urn:schemas-microsoft-com:mac:vml" xmlns:mc="http://schemas.openxmlformats.org/markup-compatibility/2006" w="9525">
+              <a14:hiddenLine xmlns:mc="http://schemas.openxmlformats.org/markup-compatibility/2006" xmlns:mv="urn:schemas-microsoft-com:mac:vml" xmlns:a14="http://schemas.microsoft.com/office/drawing/2010/main" xmlns="" w="9525">
                 <a:solidFill>
                   <a:srgbClr val="000000"/>
                 </a:solidFill>
@@ -5009,7 +5009,7 @@
           </a:ln>
           <a:extLst>
             <a:ext uri="{91240B29-F687-4f45-9708-019B960494DF}">
-              <a14:hiddenLine xmlns="" xmlns:a14="http://schemas.microsoft.com/office/drawing/2010/main" xmlns:mv="urn:schemas-microsoft-com:mac:vml" xmlns:mc="http://schemas.openxmlformats.org/markup-compatibility/2006" w="9525">
+              <a14:hiddenLine xmlns:mc="http://schemas.openxmlformats.org/markup-compatibility/2006" xmlns:mv="urn:schemas-microsoft-com:mac:vml" xmlns:a14="http://schemas.microsoft.com/office/drawing/2010/main" xmlns="" w="9525">
                 <a:solidFill>
                   <a:srgbClr val="000000"/>
                 </a:solidFill>
@@ -5071,15 +5071,16 @@
           </p:cNvPicPr>
           <p:nvPr/>
         </p:nvPicPr>
-        <p:blipFill rotWithShape="1">
+        <p:blipFill>
           <a:blip r:embed="rId4"/>
-          <a:srcRect r="-2016"/>
-          <a:stretch/>
+          <a:stretch>
+            <a:fillRect/>
+          </a:stretch>
         </p:blipFill>
         <p:spPr>
           <a:xfrm>
-            <a:off x="1143000" y="12192000"/>
-            <a:ext cx="6629400" cy="5268510"/>
+            <a:off x="1288053" y="12413793"/>
+            <a:ext cx="6484320" cy="5268510"/>
           </a:xfrm>
           <a:prstGeom prst="rect">
             <a:avLst/>
@@ -5118,7 +5119,7 @@
           </a:ln>
           <a:extLst>
             <a:ext uri="{91240B29-F687-4f45-9708-019B960494DF}">
-              <a14:hiddenLine xmlns="" xmlns:a14="http://schemas.microsoft.com/office/drawing/2010/main" xmlns:mv="urn:schemas-microsoft-com:mac:vml" xmlns:mc="http://schemas.openxmlformats.org/markup-compatibility/2006" w="9525">
+              <a14:hiddenLine xmlns:mc="http://schemas.openxmlformats.org/markup-compatibility/2006" xmlns:mv="urn:schemas-microsoft-com:mac:vml" xmlns:a14="http://schemas.microsoft.com/office/drawing/2010/main" xmlns="" w="9525">
                 <a:solidFill>
                   <a:srgbClr val="000000"/>
                 </a:solidFill>
@@ -5368,7 +5369,7 @@
           </a:ln>
           <a:extLst>
             <a:ext uri="{91240B29-F687-4f45-9708-019B960494DF}">
-              <a14:hiddenLine xmlns="" xmlns:a14="http://schemas.microsoft.com/office/drawing/2010/main" xmlns:mv="urn:schemas-microsoft-com:mac:vml" xmlns:mc="http://schemas.openxmlformats.org/markup-compatibility/2006" w="9525">
+              <a14:hiddenLine xmlns:mc="http://schemas.openxmlformats.org/markup-compatibility/2006" xmlns:mv="urn:schemas-microsoft-com:mac:vml" xmlns:a14="http://schemas.microsoft.com/office/drawing/2010/main" xmlns="" w="9525">
                 <a:solidFill>
                   <a:srgbClr val="000000"/>
                 </a:solidFill>
@@ -5756,7 +5757,7 @@
           </a:ln>
           <a:extLst>
             <a:ext uri="{91240B29-F687-4f45-9708-019B960494DF}">
-              <a14:hiddenLine xmlns="" xmlns:a14="http://schemas.microsoft.com/office/drawing/2010/main" xmlns:mv="urn:schemas-microsoft-com:mac:vml" xmlns:mc="http://schemas.openxmlformats.org/markup-compatibility/2006" w="9525">
+              <a14:hiddenLine xmlns:mc="http://schemas.openxmlformats.org/markup-compatibility/2006" xmlns:mv="urn:schemas-microsoft-com:mac:vml" xmlns:a14="http://schemas.microsoft.com/office/drawing/2010/main" xmlns="" w="9525">
                 <a:solidFill>
                   <a:srgbClr val="000000"/>
                 </a:solidFill>
@@ -8677,7 +8678,7 @@
           </a:ln>
           <a:extLst>
             <a:ext uri="{91240B29-F687-4f45-9708-019B960494DF}">
-              <a14:hiddenLine xmlns="" xmlns:a14="http://schemas.microsoft.com/office/drawing/2010/main" xmlns:mv="urn:schemas-microsoft-com:mac:vml" xmlns:mc="http://schemas.openxmlformats.org/markup-compatibility/2006" w="9525">
+              <a14:hiddenLine xmlns:mc="http://schemas.openxmlformats.org/markup-compatibility/2006" xmlns:mv="urn:schemas-microsoft-com:mac:vml" xmlns:a14="http://schemas.microsoft.com/office/drawing/2010/main" xmlns="" w="9525">
                 <a:solidFill>
                   <a:srgbClr val="000000"/>
                 </a:solidFill>
@@ -8848,7 +8849,7 @@
           </a:ln>
           <a:extLst>
             <a:ext uri="{91240B29-F687-4f45-9708-019B960494DF}">
-              <a14:hiddenLine xmlns="" xmlns:a14="http://schemas.microsoft.com/office/drawing/2010/main" xmlns:mv="urn:schemas-microsoft-com:mac:vml" xmlns:mc="http://schemas.openxmlformats.org/markup-compatibility/2006" w="9525">
+              <a14:hiddenLine xmlns:mc="http://schemas.openxmlformats.org/markup-compatibility/2006" xmlns:mv="urn:schemas-microsoft-com:mac:vml" xmlns:a14="http://schemas.microsoft.com/office/drawing/2010/main" xmlns="" w="9525">
                 <a:solidFill>
                   <a:srgbClr val="000000"/>
                 </a:solidFill>
@@ -9000,7 +9001,7 @@
           </a:ln>
           <a:extLst>
             <a:ext uri="{91240B29-F687-4f45-9708-019B960494DF}">
-              <a14:hiddenLine xmlns="" xmlns:a14="http://schemas.microsoft.com/office/drawing/2010/main" xmlns:mv="urn:schemas-microsoft-com:mac:vml" xmlns:mc="http://schemas.openxmlformats.org/markup-compatibility/2006" w="9525">
+              <a14:hiddenLine xmlns:mc="http://schemas.openxmlformats.org/markup-compatibility/2006" xmlns:mv="urn:schemas-microsoft-com:mac:vml" xmlns:a14="http://schemas.microsoft.com/office/drawing/2010/main" xmlns="" w="9525">
                 <a:solidFill>
                   <a:srgbClr val="000000"/>
                 </a:solidFill>

</xml_diff>

<commit_message>
removed 'idiosyncratic' from poster (I consider it a neutral or even positive term, but not everyone responds to the word this way)
</commit_message>
<xml_diff>
--- a/tapp2019/poster/tapp2019-poster.pptx
+++ b/tapp2019/poster/tapp2019-poster.pptx
@@ -260,7 +260,7 @@
             <a:fld id="{4515C850-977F-4425-946C-FDF18C8806C6}" type="datetime1">
               <a:rPr lang="en-US"/>
               <a:pPr/>
-              <a:t>5/29/19</a:t>
+              <a:t>6/1/2019</a:t>
             </a:fld>
             <a:endParaRPr lang="en-US"/>
           </a:p>
@@ -1014,7 +1014,7 @@
             <a:fld id="{AA2AC842-8558-4AC8-B9E2-87B4AF0E5092}" type="datetime1">
               <a:rPr lang="en-US"/>
               <a:pPr/>
-              <a:t>5/29/19</a:t>
+              <a:t>6/1/2019</a:t>
             </a:fld>
             <a:endParaRPr lang="en-US"/>
           </a:p>
@@ -1196,7 +1196,7 @@
             <a:fld id="{DF378F2E-43CF-494D-8AA1-0E25E3A6D7E5}" type="datetime1">
               <a:rPr lang="en-US"/>
               <a:pPr/>
-              <a:t>5/29/19</a:t>
+              <a:t>6/1/2019</a:t>
             </a:fld>
             <a:endParaRPr lang="en-US"/>
           </a:p>
@@ -1388,7 +1388,7 @@
             <a:fld id="{FCAA0075-A89C-4CC4-8D44-BE21213EC665}" type="datetime1">
               <a:rPr lang="en-US"/>
               <a:pPr/>
-              <a:t>5/29/19</a:t>
+              <a:t>6/1/2019</a:t>
             </a:fld>
             <a:endParaRPr lang="en-US"/>
           </a:p>
@@ -1570,7 +1570,7 @@
             <a:fld id="{3FBD16BB-C81B-488C-A058-02DF1EBA30A9}" type="datetime1">
               <a:rPr lang="en-US"/>
               <a:pPr/>
-              <a:t>5/29/19</a:t>
+              <a:t>6/1/2019</a:t>
             </a:fld>
             <a:endParaRPr lang="en-US"/>
           </a:p>
@@ -1829,7 +1829,7 @@
             <a:fld id="{61D71B2D-85F4-4D1F-A97A-0F3FCF28FF78}" type="datetime1">
               <a:rPr lang="en-US"/>
               <a:pPr/>
-              <a:t>5/29/19</a:t>
+              <a:t>6/1/2019</a:t>
             </a:fld>
             <a:endParaRPr lang="en-US"/>
           </a:p>
@@ -2128,7 +2128,7 @@
             <a:fld id="{543EB801-F414-4E3F-810B-AB50C12F8E62}" type="datetime1">
               <a:rPr lang="en-US"/>
               <a:pPr/>
-              <a:t>5/29/19</a:t>
+              <a:t>6/1/2019</a:t>
             </a:fld>
             <a:endParaRPr lang="en-US"/>
           </a:p>
@@ -2566,7 +2566,7 @@
             <a:fld id="{8FB21926-4148-4271-A9EA-9B5C988855C5}" type="datetime1">
               <a:rPr lang="en-US"/>
               <a:pPr/>
-              <a:t>5/29/19</a:t>
+              <a:t>6/1/2019</a:t>
             </a:fld>
             <a:endParaRPr lang="en-US"/>
           </a:p>
@@ -2697,7 +2697,7 @@
             <a:fld id="{BAA8212A-8BC5-4403-9CF2-3B62135E8215}" type="datetime1">
               <a:rPr lang="en-US"/>
               <a:pPr/>
-              <a:t>5/29/19</a:t>
+              <a:t>6/1/2019</a:t>
             </a:fld>
             <a:endParaRPr lang="en-US"/>
           </a:p>
@@ -2806,7 +2806,7 @@
             <a:fld id="{DAB8904B-D74D-4D4C-AF9F-80D5C0011187}" type="datetime1">
               <a:rPr lang="en-US"/>
               <a:pPr/>
-              <a:t>5/29/19</a:t>
+              <a:t>6/1/2019</a:t>
             </a:fld>
             <a:endParaRPr lang="en-US"/>
           </a:p>
@@ -3095,7 +3095,7 @@
             <a:fld id="{5AFA53D8-5F34-42FF-A06B-C0EDA73AA4FC}" type="datetime1">
               <a:rPr lang="en-US"/>
               <a:pPr/>
-              <a:t>5/29/19</a:t>
+              <a:t>6/1/2019</a:t>
             </a:fld>
             <a:endParaRPr lang="en-US"/>
           </a:p>
@@ -3367,7 +3367,7 @@
             <a:fld id="{97FD32E0-1D5E-4345-BC8F-A88532F655AC}" type="datetime1">
               <a:rPr lang="en-US"/>
               <a:pPr/>
-              <a:t>5/29/19</a:t>
+              <a:t>6/1/2019</a:t>
             </a:fld>
             <a:endParaRPr lang="en-US"/>
           </a:p>
@@ -3641,7 +3641,7 @@
             <a:fld id="{CCA49F0C-5252-4983-9722-A40AADD52538}" type="datetime1">
               <a:rPr lang="en-US"/>
               <a:pPr/>
-              <a:t>5/29/19</a:t>
+              <a:t>6/1/2019</a:t>
             </a:fld>
             <a:endParaRPr lang="en-US"/>
           </a:p>
@@ -4948,15 +4948,7 @@
             </a:r>
             <a:r>
               <a:rPr lang="en-US" sz="3000" dirty="0"/>
-              <a:t>Research into provenance and reproducibility should be held to the highest standards of reproducibility and transparency. To this end we employ reproducible computing environments, and aim to make it easy for other </a:t>
-            </a:r>
-            <a:r>
-              <a:rPr lang="en-US" sz="3000"/>
-              <a:t>researchers to </a:t>
-            </a:r>
-            <a:r>
-              <a:rPr lang="en-US" sz="3000" dirty="0"/>
-              <a:t>repeat our observations and to evaluate our claims.</a:t>
+              <a:t>Research into provenance and reproducibility should be held to the highest standards of reproducibility and transparency. To this end we employ reproducible computing environments and aim to make it easy for other researchers to repeat our observations and to evaluate our claims.</a:t>
             </a:r>
           </a:p>
           <a:p>
@@ -5168,7 +5160,7 @@
             </a:r>
             <a:r>
               <a:rPr lang="en-US" altLang="zh-CN" sz="3000" dirty="0"/>
-              <a:t> has its own idiosyncratic terminology for describing the records it keeps and the capabilities it provides using them. We are mapping the </a:t>
+              <a:t> has its own terminology for describing the records it keeps and the capabilities it provides using them. We are mapping the </a:t>
             </a:r>
             <a:r>
               <a:rPr lang="en-US" altLang="zh-CN" sz="3000" dirty="0" err="1"/>
@@ -5912,12 +5904,12 @@
               </a:spcBef>
             </a:pPr>
             <a:r>
-              <a:rPr lang="en-US" altLang="zh-CN" sz="3000" b="1" dirty="0" err="1">
+              <a:rPr lang="en-US" altLang="zh-CN" sz="3000" b="1">
                 <a:solidFill>
                   <a:srgbClr val="CC3200"/>
                 </a:solidFill>
               </a:rPr>
-              <a:t>Reproducibile</a:t>
+              <a:t>Reproducible </a:t>
             </a:r>
             <a:r>
               <a:rPr lang="en-US" altLang="zh-CN" sz="3000" b="1" dirty="0">
@@ -5925,7 +5917,7 @@
                   <a:srgbClr val="CC3200"/>
                 </a:solidFill>
               </a:rPr>
-              <a:t> computing environments. </a:t>
+              <a:t>computing environments. </a:t>
             </a:r>
             <a:r>
               <a:rPr lang="en-US" altLang="zh-CN" sz="3000" dirty="0"/>

</xml_diff>

<commit_message>
fixed figure on poster
</commit_message>
<xml_diff>
--- a/tapp2019/poster/tapp2019-poster.pptx
+++ b/tapp2019/poster/tapp2019-poster.pptx
@@ -11,7 +11,7 @@
     <p:sldId id="258" r:id="rId2"/>
   </p:sldIdLst>
   <p:sldSz cx="32918400" cy="43891200"/>
-  <p:notesSz cx="7010400" cy="9296400"/>
+  <p:notesSz cx="7315200" cy="9601200"/>
   <p:defaultTextStyle>
     <a:defPPr>
       <a:defRPr lang="en-US"/>
@@ -200,14 +200,14 @@
         <p:spPr>
           <a:xfrm>
             <a:off x="0" y="0"/>
-            <a:ext cx="3037840" cy="464820"/>
+            <a:ext cx="3169920" cy="480060"/>
           </a:xfrm>
           <a:prstGeom prst="rect">
             <a:avLst/>
           </a:prstGeom>
         </p:spPr>
         <p:txBody>
-          <a:bodyPr vert="horz" wrap="square" lIns="93177" tIns="46589" rIns="93177" bIns="46589" numCol="1" anchor="t" anchorCtr="0" compatLnSpc="1">
+          <a:bodyPr vert="horz" wrap="square" lIns="96639" tIns="48320" rIns="96639" bIns="48320" numCol="1" anchor="t" anchorCtr="0" compatLnSpc="1">
             <a:prstTxWarp prst="textNoShape">
               <a:avLst/>
             </a:prstTxWarp>
@@ -236,15 +236,15 @@
         </p:nvSpPr>
         <p:spPr>
           <a:xfrm>
-            <a:off x="3970938" y="0"/>
-            <a:ext cx="3037840" cy="464820"/>
+            <a:off x="4143587" y="0"/>
+            <a:ext cx="3169920" cy="480060"/>
           </a:xfrm>
           <a:prstGeom prst="rect">
             <a:avLst/>
           </a:prstGeom>
         </p:spPr>
         <p:txBody>
-          <a:bodyPr vert="horz" wrap="square" lIns="93177" tIns="46589" rIns="93177" bIns="46589" numCol="1" anchor="t" anchorCtr="0" compatLnSpc="1">
+          <a:bodyPr vert="horz" wrap="square" lIns="96639" tIns="48320" rIns="96639" bIns="48320" numCol="1" anchor="t" anchorCtr="0" compatLnSpc="1">
             <a:prstTxWarp prst="textNoShape">
               <a:avLst/>
             </a:prstTxWarp>
@@ -260,7 +260,7 @@
             <a:fld id="{4515C850-977F-4425-946C-FDF18C8806C6}" type="datetime1">
               <a:rPr lang="en-US"/>
               <a:pPr/>
-              <a:t>6/1/2019</a:t>
+              <a:t>6/3/2019</a:t>
             </a:fld>
             <a:endParaRPr lang="en-US"/>
           </a:p>
@@ -278,8 +278,8 @@
         </p:nvSpPr>
         <p:spPr>
           <a:xfrm>
-            <a:off x="2197100" y="696913"/>
-            <a:ext cx="2616200" cy="3486150"/>
+            <a:off x="2306638" y="719138"/>
+            <a:ext cx="2701925" cy="3600450"/>
           </a:xfrm>
           <a:prstGeom prst="rect">
             <a:avLst/>
@@ -292,7 +292,7 @@
           </a:ln>
         </p:spPr>
         <p:txBody>
-          <a:bodyPr vert="horz" wrap="square" lIns="93177" tIns="46589" rIns="93177" bIns="46589" numCol="1" anchor="ctr" anchorCtr="0" compatLnSpc="1">
+          <a:bodyPr vert="horz" wrap="square" lIns="96639" tIns="48320" rIns="96639" bIns="48320" numCol="1" anchor="ctr" anchorCtr="0" compatLnSpc="1">
             <a:prstTxWarp prst="textNoShape">
               <a:avLst/>
             </a:prstTxWarp>
@@ -316,15 +316,15 @@
         </p:nvSpPr>
         <p:spPr>
           <a:xfrm>
-            <a:off x="701040" y="4415790"/>
-            <a:ext cx="5608320" cy="4183380"/>
+            <a:off x="731520" y="4560570"/>
+            <a:ext cx="5852160" cy="4320540"/>
           </a:xfrm>
           <a:prstGeom prst="rect">
             <a:avLst/>
           </a:prstGeom>
         </p:spPr>
         <p:txBody>
-          <a:bodyPr vert="horz" wrap="square" lIns="93177" tIns="46589" rIns="93177" bIns="46589" numCol="1" anchor="t" anchorCtr="0" compatLnSpc="1">
+          <a:bodyPr vert="horz" wrap="square" lIns="96639" tIns="48320" rIns="96639" bIns="48320" numCol="1" anchor="t" anchorCtr="0" compatLnSpc="1">
             <a:prstTxWarp prst="textNoShape">
               <a:avLst/>
             </a:prstTxWarp>
@@ -380,15 +380,15 @@
         </p:nvSpPr>
         <p:spPr>
           <a:xfrm>
-            <a:off x="0" y="8829967"/>
-            <a:ext cx="3037840" cy="464820"/>
+            <a:off x="0" y="9119474"/>
+            <a:ext cx="3169920" cy="480060"/>
           </a:xfrm>
           <a:prstGeom prst="rect">
             <a:avLst/>
           </a:prstGeom>
         </p:spPr>
         <p:txBody>
-          <a:bodyPr vert="horz" wrap="square" lIns="93177" tIns="46589" rIns="93177" bIns="46589" numCol="1" anchor="b" anchorCtr="0" compatLnSpc="1">
+          <a:bodyPr vert="horz" wrap="square" lIns="96639" tIns="48320" rIns="96639" bIns="48320" numCol="1" anchor="b" anchorCtr="0" compatLnSpc="1">
             <a:prstTxWarp prst="textNoShape">
               <a:avLst/>
             </a:prstTxWarp>
@@ -417,15 +417,15 @@
         </p:nvSpPr>
         <p:spPr>
           <a:xfrm>
-            <a:off x="3970938" y="8829967"/>
-            <a:ext cx="3037840" cy="464820"/>
+            <a:off x="4143587" y="9119474"/>
+            <a:ext cx="3169920" cy="480060"/>
           </a:xfrm>
           <a:prstGeom prst="rect">
             <a:avLst/>
           </a:prstGeom>
         </p:spPr>
         <p:txBody>
-          <a:bodyPr vert="horz" wrap="square" lIns="93177" tIns="46589" rIns="93177" bIns="46589" numCol="1" anchor="b" anchorCtr="0" compatLnSpc="1">
+          <a:bodyPr vert="horz" wrap="square" lIns="96639" tIns="48320" rIns="96639" bIns="48320" numCol="1" anchor="b" anchorCtr="0" compatLnSpc="1">
             <a:prstTxWarp prst="textNoShape">
               <a:avLst/>
             </a:prstTxWarp>
@@ -609,8 +609,8 @@
         </p:nvSpPr>
         <p:spPr bwMode="auto">
           <a:xfrm>
-            <a:off x="2197100" y="696913"/>
-            <a:ext cx="2616200" cy="3486150"/>
+            <a:off x="2306638" y="719138"/>
+            <a:ext cx="2701925" cy="3600450"/>
           </a:xfrm>
           <a:noFill/>
           <a:ln>
@@ -702,7 +702,7 @@
           <a:bodyPr/>
           <a:lstStyle>
             <a:lvl1pPr eaLnBrk="0" hangingPunct="0">
-              <a:defRPr sz="8800">
+              <a:defRPr sz="9100">
                 <a:solidFill>
                   <a:schemeClr val="tx1"/>
                 </a:solidFill>
@@ -710,8 +710,8 @@
                 <a:ea typeface="ＭＳ Ｐゴシック" pitchFamily="-65" charset="-128"/>
               </a:defRPr>
             </a:lvl1pPr>
-            <a:lvl2pPr marL="38652428" indent="-38186541" eaLnBrk="0" hangingPunct="0">
-              <a:defRPr sz="8800">
+            <a:lvl2pPr marL="40088289" indent="-39605095" eaLnBrk="0" hangingPunct="0">
+              <a:defRPr sz="9100">
                 <a:solidFill>
                   <a:schemeClr val="tx1"/>
                 </a:solidFill>
@@ -720,7 +720,7 @@
               </a:defRPr>
             </a:lvl2pPr>
             <a:lvl3pPr eaLnBrk="0" hangingPunct="0">
-              <a:defRPr sz="8800">
+              <a:defRPr sz="9100">
                 <a:solidFill>
                   <a:schemeClr val="tx1"/>
                 </a:solidFill>
@@ -729,7 +729,7 @@
               </a:defRPr>
             </a:lvl3pPr>
             <a:lvl4pPr eaLnBrk="0" hangingPunct="0">
-              <a:defRPr sz="8800">
+              <a:defRPr sz="9100">
                 <a:solidFill>
                   <a:schemeClr val="tx1"/>
                 </a:solidFill>
@@ -738,7 +738,7 @@
               </a:defRPr>
             </a:lvl4pPr>
             <a:lvl5pPr eaLnBrk="0" hangingPunct="0">
-              <a:defRPr sz="8800">
+              <a:defRPr sz="9100">
                 <a:solidFill>
                   <a:schemeClr val="tx1"/>
                 </a:solidFill>
@@ -746,14 +746,14 @@
                 <a:ea typeface="ＭＳ Ｐゴシック" pitchFamily="-65" charset="-128"/>
               </a:defRPr>
             </a:lvl5pPr>
-            <a:lvl6pPr marL="465887" eaLnBrk="0" fontAlgn="base" hangingPunct="0">
+            <a:lvl6pPr marL="483194" eaLnBrk="0" fontAlgn="base" hangingPunct="0">
               <a:spcBef>
                 <a:spcPct val="0"/>
               </a:spcBef>
               <a:spcAft>
                 <a:spcPct val="0"/>
               </a:spcAft>
-              <a:defRPr sz="8800">
+              <a:defRPr sz="9100">
                 <a:solidFill>
                   <a:schemeClr val="tx1"/>
                 </a:solidFill>
@@ -761,14 +761,14 @@
                 <a:ea typeface="ＭＳ Ｐゴシック" pitchFamily="-65" charset="-128"/>
               </a:defRPr>
             </a:lvl6pPr>
-            <a:lvl7pPr marL="931774" eaLnBrk="0" fontAlgn="base" hangingPunct="0">
+            <a:lvl7pPr marL="966387" eaLnBrk="0" fontAlgn="base" hangingPunct="0">
               <a:spcBef>
                 <a:spcPct val="0"/>
               </a:spcBef>
               <a:spcAft>
                 <a:spcPct val="0"/>
               </a:spcAft>
-              <a:defRPr sz="8800">
+              <a:defRPr sz="9100">
                 <a:solidFill>
                   <a:schemeClr val="tx1"/>
                 </a:solidFill>
@@ -776,14 +776,14 @@
                 <a:ea typeface="ＭＳ Ｐゴシック" pitchFamily="-65" charset="-128"/>
               </a:defRPr>
             </a:lvl7pPr>
-            <a:lvl8pPr marL="1397660" eaLnBrk="0" fontAlgn="base" hangingPunct="0">
+            <a:lvl8pPr marL="1449580" eaLnBrk="0" fontAlgn="base" hangingPunct="0">
               <a:spcBef>
                 <a:spcPct val="0"/>
               </a:spcBef>
               <a:spcAft>
                 <a:spcPct val="0"/>
               </a:spcAft>
-              <a:defRPr sz="8800">
+              <a:defRPr sz="9100">
                 <a:solidFill>
                   <a:schemeClr val="tx1"/>
                 </a:solidFill>
@@ -791,14 +791,14 @@
                 <a:ea typeface="ＭＳ Ｐゴシック" pitchFamily="-65" charset="-128"/>
               </a:defRPr>
             </a:lvl8pPr>
-            <a:lvl9pPr marL="1863547" eaLnBrk="0" fontAlgn="base" hangingPunct="0">
+            <a:lvl9pPr marL="1932774" eaLnBrk="0" fontAlgn="base" hangingPunct="0">
               <a:spcBef>
                 <a:spcPct val="0"/>
               </a:spcBef>
               <a:spcAft>
                 <a:spcPct val="0"/>
               </a:spcAft>
-              <a:defRPr sz="8800">
+              <a:defRPr sz="9100">
                 <a:solidFill>
                   <a:schemeClr val="tx1"/>
                 </a:solidFill>
@@ -1014,7 +1014,7 @@
             <a:fld id="{AA2AC842-8558-4AC8-B9E2-87B4AF0E5092}" type="datetime1">
               <a:rPr lang="en-US"/>
               <a:pPr/>
-              <a:t>6/1/2019</a:t>
+              <a:t>6/3/2019</a:t>
             </a:fld>
             <a:endParaRPr lang="en-US"/>
           </a:p>
@@ -1196,7 +1196,7 @@
             <a:fld id="{DF378F2E-43CF-494D-8AA1-0E25E3A6D7E5}" type="datetime1">
               <a:rPr lang="en-US"/>
               <a:pPr/>
-              <a:t>6/1/2019</a:t>
+              <a:t>6/3/2019</a:t>
             </a:fld>
             <a:endParaRPr lang="en-US"/>
           </a:p>
@@ -1388,7 +1388,7 @@
             <a:fld id="{FCAA0075-A89C-4CC4-8D44-BE21213EC665}" type="datetime1">
               <a:rPr lang="en-US"/>
               <a:pPr/>
-              <a:t>6/1/2019</a:t>
+              <a:t>6/3/2019</a:t>
             </a:fld>
             <a:endParaRPr lang="en-US"/>
           </a:p>
@@ -1570,7 +1570,7 @@
             <a:fld id="{3FBD16BB-C81B-488C-A058-02DF1EBA30A9}" type="datetime1">
               <a:rPr lang="en-US"/>
               <a:pPr/>
-              <a:t>6/1/2019</a:t>
+              <a:t>6/3/2019</a:t>
             </a:fld>
             <a:endParaRPr lang="en-US"/>
           </a:p>
@@ -1829,7 +1829,7 @@
             <a:fld id="{61D71B2D-85F4-4D1F-A97A-0F3FCF28FF78}" type="datetime1">
               <a:rPr lang="en-US"/>
               <a:pPr/>
-              <a:t>6/1/2019</a:t>
+              <a:t>6/3/2019</a:t>
             </a:fld>
             <a:endParaRPr lang="en-US"/>
           </a:p>
@@ -2128,7 +2128,7 @@
             <a:fld id="{543EB801-F414-4E3F-810B-AB50C12F8E62}" type="datetime1">
               <a:rPr lang="en-US"/>
               <a:pPr/>
-              <a:t>6/1/2019</a:t>
+              <a:t>6/3/2019</a:t>
             </a:fld>
             <a:endParaRPr lang="en-US"/>
           </a:p>
@@ -2566,7 +2566,7 @@
             <a:fld id="{8FB21926-4148-4271-A9EA-9B5C988855C5}" type="datetime1">
               <a:rPr lang="en-US"/>
               <a:pPr/>
-              <a:t>6/1/2019</a:t>
+              <a:t>6/3/2019</a:t>
             </a:fld>
             <a:endParaRPr lang="en-US"/>
           </a:p>
@@ -2697,7 +2697,7 @@
             <a:fld id="{BAA8212A-8BC5-4403-9CF2-3B62135E8215}" type="datetime1">
               <a:rPr lang="en-US"/>
               <a:pPr/>
-              <a:t>6/1/2019</a:t>
+              <a:t>6/3/2019</a:t>
             </a:fld>
             <a:endParaRPr lang="en-US"/>
           </a:p>
@@ -2806,7 +2806,7 @@
             <a:fld id="{DAB8904B-D74D-4D4C-AF9F-80D5C0011187}" type="datetime1">
               <a:rPr lang="en-US"/>
               <a:pPr/>
-              <a:t>6/1/2019</a:t>
+              <a:t>6/3/2019</a:t>
             </a:fld>
             <a:endParaRPr lang="en-US"/>
           </a:p>
@@ -3095,7 +3095,7 @@
             <a:fld id="{5AFA53D8-5F34-42FF-A06B-C0EDA73AA4FC}" type="datetime1">
               <a:rPr lang="en-US"/>
               <a:pPr/>
-              <a:t>6/1/2019</a:t>
+              <a:t>6/3/2019</a:t>
             </a:fld>
             <a:endParaRPr lang="en-US"/>
           </a:p>
@@ -3367,7 +3367,7 @@
             <a:fld id="{97FD32E0-1D5E-4345-BC8F-A88532F655AC}" type="datetime1">
               <a:rPr lang="en-US"/>
               <a:pPr/>
-              <a:t>6/1/2019</a:t>
+              <a:t>6/3/2019</a:t>
             </a:fld>
             <a:endParaRPr lang="en-US"/>
           </a:p>
@@ -3641,7 +3641,7 @@
             <a:fld id="{CCA49F0C-5252-4983-9722-A40AADD52538}" type="datetime1">
               <a:rPr lang="en-US"/>
               <a:pPr/>
-              <a:t>6/1/2019</a:t>
+              <a:t>6/3/2019</a:t>
             </a:fld>
             <a:endParaRPr lang="en-US"/>
           </a:p>
@@ -5997,7 +5997,7 @@
                 </a:solidFill>
                 <a:latin typeface="Consolas" panose="020B0609020204030204" pitchFamily="49" charset="0"/>
               </a:rPr>
-              <a:t>%%%% STATE AFTER INITIAL IMPORT STEP %%%%%</a:t>
+              <a:t>%%%% State after initial import step %%%%%</a:t>
             </a:r>
           </a:p>
           <a:p>
@@ -8440,7 +8440,7 @@
         </p:nvGrpSpPr>
         <p:grpSpPr>
           <a:xfrm>
-            <a:off x="15697200" y="6324568"/>
+            <a:off x="15647872" y="6324568"/>
             <a:ext cx="6934200" cy="5486400"/>
             <a:chOff x="15773400" y="6096000"/>
             <a:chExt cx="6934200" cy="5486400"/>
@@ -8504,43 +8504,6 @@
             </a:p>
           </p:txBody>
         </p:sp>
-        <p:pic>
-          <p:nvPicPr>
-            <p:cNvPr id="7" name="Picture 6">
-              <a:extLst>
-                <a:ext uri="{FF2B5EF4-FFF2-40B4-BE49-F238E27FC236}">
-                  <a16:creationId xmlns:a16="http://schemas.microsoft.com/office/drawing/2014/main" id="{7ECB86EE-D4CF-4F71-AF3B-A33A21850428}"/>
-                </a:ext>
-              </a:extLst>
-            </p:cNvPr>
-            <p:cNvPicPr>
-              <a:picLocks noChangeAspect="1"/>
-            </p:cNvPicPr>
-            <p:nvPr/>
-          </p:nvPicPr>
-          <p:blipFill>
-            <a:blip r:embed="rId10"/>
-            <a:stretch>
-              <a:fillRect/>
-            </a:stretch>
-          </p:blipFill>
-          <p:spPr>
-            <a:xfrm>
-              <a:off x="15925800" y="6334868"/>
-              <a:ext cx="6652806" cy="1805182"/>
-            </a:xfrm>
-            <a:prstGeom prst="rect">
-              <a:avLst/>
-            </a:prstGeom>
-            <a:scene3d>
-              <a:camera prst="orthographicFront"/>
-              <a:lightRig rig="threePt" dir="t"/>
-            </a:scene3d>
-            <a:sp3d>
-              <a:bevelB/>
-            </a:sp3d>
-          </p:spPr>
-        </p:pic>
         <p:sp>
           <p:nvSpPr>
             <p:cNvPr id="12" name="Arrow: Down 11">
@@ -8555,7 +8518,7 @@
           </p:nvSpPr>
           <p:spPr>
             <a:xfrm>
-              <a:off x="18276375" y="8286680"/>
+              <a:off x="18410126" y="8328225"/>
               <a:ext cx="1660744" cy="1066800"/>
             </a:xfrm>
             <a:prstGeom prst="downArrow">
@@ -8600,43 +8563,6 @@
             </a:p>
           </p:txBody>
         </p:sp>
-        <p:pic>
-          <p:nvPicPr>
-            <p:cNvPr id="13" name="Picture 12">
-              <a:extLst>
-                <a:ext uri="{FF2B5EF4-FFF2-40B4-BE49-F238E27FC236}">
-                  <a16:creationId xmlns:a16="http://schemas.microsoft.com/office/drawing/2014/main" id="{98B5BF94-B3B5-4EB1-B02A-1BAF112770AA}"/>
-                </a:ext>
-              </a:extLst>
-            </p:cNvPr>
-            <p:cNvPicPr>
-              <a:picLocks noChangeAspect="1"/>
-            </p:cNvPicPr>
-            <p:nvPr/>
-          </p:nvPicPr>
-          <p:blipFill>
-            <a:blip r:embed="rId11"/>
-            <a:stretch>
-              <a:fillRect/>
-            </a:stretch>
-          </p:blipFill>
-          <p:spPr>
-            <a:xfrm>
-              <a:off x="16081771" y="9544032"/>
-              <a:ext cx="6397229" cy="1781506"/>
-            </a:xfrm>
-            <a:prstGeom prst="rect">
-              <a:avLst/>
-            </a:prstGeom>
-            <a:scene3d>
-              <a:camera prst="orthographicFront"/>
-              <a:lightRig rig="threePt" dir="t"/>
-            </a:scene3d>
-            <a:sp3d>
-              <a:bevelB/>
-            </a:sp3d>
-          </p:spPr>
-        </p:pic>
       </p:grpSp>
       <p:sp>
         <p:nvSpPr>
@@ -9153,6 +9079,66 @@
           </a:p>
         </p:txBody>
       </p:sp>
+      <p:pic>
+        <p:nvPicPr>
+          <p:cNvPr id="7" name="Picture 6">
+            <a:extLst>
+              <a:ext uri="{FF2B5EF4-FFF2-40B4-BE49-F238E27FC236}">
+                <a16:creationId xmlns:a16="http://schemas.microsoft.com/office/drawing/2014/main" id="{03080FC6-68BC-4115-A5E5-E98AEC6E75D9}"/>
+              </a:ext>
+            </a:extLst>
+          </p:cNvPr>
+          <p:cNvPicPr>
+            <a:picLocks noChangeAspect="1"/>
+          </p:cNvPicPr>
+          <p:nvPr/>
+        </p:nvPicPr>
+        <p:blipFill>
+          <a:blip r:embed="rId10"/>
+          <a:stretch>
+            <a:fillRect/>
+          </a:stretch>
+        </p:blipFill>
+        <p:spPr>
+          <a:xfrm>
+            <a:off x="15935575" y="6583555"/>
+            <a:ext cx="6358793" cy="1686410"/>
+          </a:xfrm>
+          <a:prstGeom prst="rect">
+            <a:avLst/>
+          </a:prstGeom>
+        </p:spPr>
+      </p:pic>
+      <p:pic>
+        <p:nvPicPr>
+          <p:cNvPr id="9" name="Picture 8">
+            <a:extLst>
+              <a:ext uri="{FF2B5EF4-FFF2-40B4-BE49-F238E27FC236}">
+                <a16:creationId xmlns:a16="http://schemas.microsoft.com/office/drawing/2014/main" id="{5AF4D1A3-572F-4FA3-B5CB-A7EAA6DC347C}"/>
+              </a:ext>
+            </a:extLst>
+          </p:cNvPr>
+          <p:cNvPicPr>
+            <a:picLocks noChangeAspect="1"/>
+          </p:cNvPicPr>
+          <p:nvPr/>
+        </p:nvPicPr>
+        <p:blipFill>
+          <a:blip r:embed="rId11"/>
+          <a:stretch>
+            <a:fillRect/>
+          </a:stretch>
+        </p:blipFill>
+        <p:spPr>
+          <a:xfrm>
+            <a:off x="16162100" y="9819624"/>
+            <a:ext cx="5905741" cy="1652201"/>
+          </a:xfrm>
+          <a:prstGeom prst="rect">
+            <a:avLst/>
+          </a:prstGeom>
+        </p:spPr>
+      </p:pic>
     </p:spTree>
   </p:cSld>
   <p:clrMapOvr>

</xml_diff>